<commit_message>
first draft of presentation
</commit_message>
<xml_diff>
--- a/D2.pptx
+++ b/D2.pptx
@@ -13,8 +13,9 @@
     <p:sldId id="260" r:id="rId7"/>
     <p:sldId id="261" r:id="rId8"/>
     <p:sldId id="262" r:id="rId9"/>
-    <p:sldId id="263" r:id="rId10"/>
-    <p:sldId id="264" r:id="rId11"/>
+    <p:sldId id="266" r:id="rId10"/>
+    <p:sldId id="267" r:id="rId11"/>
+    <p:sldId id="264" r:id="rId12"/>
   </p:sldIdLst>
   <p:sldSz cx="12192000" cy="6858000"/>
   <p:notesSz cx="6858000" cy="9144000"/>
@@ -270,7 +271,7 @@
           <a:p>
             <a:fld id="{24C3A72B-EA9F-49ED-9480-D5BBE463D3C6}" type="datetimeFigureOut">
               <a:rPr lang="en-GB" smtClean="0"/>
-              <a:t>17/02/2018</a:t>
+              <a:t>18/02/2018</a:t>
             </a:fld>
             <a:endParaRPr lang="en-GB"/>
           </a:p>
@@ -470,7 +471,7 @@
           <a:p>
             <a:fld id="{24C3A72B-EA9F-49ED-9480-D5BBE463D3C6}" type="datetimeFigureOut">
               <a:rPr lang="en-GB" smtClean="0"/>
-              <a:t>17/02/2018</a:t>
+              <a:t>18/02/2018</a:t>
             </a:fld>
             <a:endParaRPr lang="en-GB"/>
           </a:p>
@@ -680,7 +681,7 @@
           <a:p>
             <a:fld id="{24C3A72B-EA9F-49ED-9480-D5BBE463D3C6}" type="datetimeFigureOut">
               <a:rPr lang="en-GB" smtClean="0"/>
-              <a:t>17/02/2018</a:t>
+              <a:t>18/02/2018</a:t>
             </a:fld>
             <a:endParaRPr lang="en-GB"/>
           </a:p>
@@ -880,7 +881,7 @@
           <a:p>
             <a:fld id="{24C3A72B-EA9F-49ED-9480-D5BBE463D3C6}" type="datetimeFigureOut">
               <a:rPr lang="en-GB" smtClean="0"/>
-              <a:t>17/02/2018</a:t>
+              <a:t>18/02/2018</a:t>
             </a:fld>
             <a:endParaRPr lang="en-GB"/>
           </a:p>
@@ -1156,7 +1157,7 @@
           <a:p>
             <a:fld id="{24C3A72B-EA9F-49ED-9480-D5BBE463D3C6}" type="datetimeFigureOut">
               <a:rPr lang="en-GB" smtClean="0"/>
-              <a:t>17/02/2018</a:t>
+              <a:t>18/02/2018</a:t>
             </a:fld>
             <a:endParaRPr lang="en-GB"/>
           </a:p>
@@ -1424,7 +1425,7 @@
           <a:p>
             <a:fld id="{24C3A72B-EA9F-49ED-9480-D5BBE463D3C6}" type="datetimeFigureOut">
               <a:rPr lang="en-GB" smtClean="0"/>
-              <a:t>17/02/2018</a:t>
+              <a:t>18/02/2018</a:t>
             </a:fld>
             <a:endParaRPr lang="en-GB"/>
           </a:p>
@@ -1839,7 +1840,7 @@
           <a:p>
             <a:fld id="{24C3A72B-EA9F-49ED-9480-D5BBE463D3C6}" type="datetimeFigureOut">
               <a:rPr lang="en-GB" smtClean="0"/>
-              <a:t>17/02/2018</a:t>
+              <a:t>18/02/2018</a:t>
             </a:fld>
             <a:endParaRPr lang="en-GB"/>
           </a:p>
@@ -1981,7 +1982,7 @@
           <a:p>
             <a:fld id="{24C3A72B-EA9F-49ED-9480-D5BBE463D3C6}" type="datetimeFigureOut">
               <a:rPr lang="en-GB" smtClean="0"/>
-              <a:t>17/02/2018</a:t>
+              <a:t>18/02/2018</a:t>
             </a:fld>
             <a:endParaRPr lang="en-GB"/>
           </a:p>
@@ -2094,7 +2095,7 @@
           <a:p>
             <a:fld id="{24C3A72B-EA9F-49ED-9480-D5BBE463D3C6}" type="datetimeFigureOut">
               <a:rPr lang="en-GB" smtClean="0"/>
-              <a:t>17/02/2018</a:t>
+              <a:t>18/02/2018</a:t>
             </a:fld>
             <a:endParaRPr lang="en-GB"/>
           </a:p>
@@ -2407,7 +2408,7 @@
           <a:p>
             <a:fld id="{24C3A72B-EA9F-49ED-9480-D5BBE463D3C6}" type="datetimeFigureOut">
               <a:rPr lang="en-GB" smtClean="0"/>
-              <a:t>17/02/2018</a:t>
+              <a:t>18/02/2018</a:t>
             </a:fld>
             <a:endParaRPr lang="en-GB"/>
           </a:p>
@@ -2696,7 +2697,7 @@
           <a:p>
             <a:fld id="{24C3A72B-EA9F-49ED-9480-D5BBE463D3C6}" type="datetimeFigureOut">
               <a:rPr lang="en-GB" smtClean="0"/>
-              <a:t>17/02/2018</a:t>
+              <a:t>18/02/2018</a:t>
             </a:fld>
             <a:endParaRPr lang="en-GB"/>
           </a:p>
@@ -2939,7 +2940,7 @@
           <a:p>
             <a:fld id="{24C3A72B-EA9F-49ED-9480-D5BBE463D3C6}" type="datetimeFigureOut">
               <a:rPr lang="en-GB" smtClean="0"/>
-              <a:t>17/02/2018</a:t>
+              <a:t>18/02/2018</a:t>
             </a:fld>
             <a:endParaRPr lang="en-GB"/>
           </a:p>
@@ -3698,6 +3699,65 @@
           <a:chExt cx="0" cy="0"/>
         </a:xfrm>
       </p:grpSpPr>
+      <p:pic>
+        <p:nvPicPr>
+          <p:cNvPr id="10" name="Picture 9">
+            <a:extLst>
+              <a:ext uri="{FF2B5EF4-FFF2-40B4-BE49-F238E27FC236}">
+                <a16:creationId xmlns:a16="http://schemas.microsoft.com/office/drawing/2014/main" id="{6248F25B-52F9-4CF0-BF52-629A9FD032CE}"/>
+              </a:ext>
+            </a:extLst>
+          </p:cNvPr>
+          <p:cNvPicPr>
+            <a:picLocks noChangeAspect="1"/>
+          </p:cNvPicPr>
+          <p:nvPr/>
+        </p:nvPicPr>
+        <p:blipFill rotWithShape="1">
+          <a:blip r:embed="rId2"/>
+          <a:srcRect r="52066"/>
+          <a:stretch/>
+        </p:blipFill>
+        <p:spPr>
+          <a:xfrm>
+            <a:off x="7808860" y="0"/>
+            <a:ext cx="4383140" cy="6858000"/>
+          </a:xfrm>
+          <a:prstGeom prst="rect">
+            <a:avLst/>
+          </a:prstGeom>
+        </p:spPr>
+      </p:pic>
+      <p:pic>
+        <p:nvPicPr>
+          <p:cNvPr id="9" name="Picture 8">
+            <a:extLst>
+              <a:ext uri="{FF2B5EF4-FFF2-40B4-BE49-F238E27FC236}">
+                <a16:creationId xmlns:a16="http://schemas.microsoft.com/office/drawing/2014/main" id="{158091B3-A577-4C1D-8D3E-131CBA84C0EE}"/>
+              </a:ext>
+            </a:extLst>
+          </p:cNvPr>
+          <p:cNvPicPr>
+            <a:picLocks noChangeAspect="1"/>
+          </p:cNvPicPr>
+          <p:nvPr/>
+        </p:nvPicPr>
+        <p:blipFill>
+          <a:blip r:embed="rId2"/>
+          <a:stretch>
+            <a:fillRect/>
+          </a:stretch>
+        </p:blipFill>
+        <p:spPr>
+          <a:xfrm>
+            <a:off x="0" y="0"/>
+            <a:ext cx="9144000" cy="6858000"/>
+          </a:xfrm>
+          <a:prstGeom prst="rect">
+            <a:avLst/>
+          </a:prstGeom>
+        </p:spPr>
+      </p:pic>
       <p:sp>
         <p:nvSpPr>
           <p:cNvPr id="2" name="Title 1">
@@ -3719,6 +3779,9 @@
             <a:off x="838200" y="365125"/>
             <a:ext cx="10515600" cy="566053"/>
           </a:xfrm>
+          <a:solidFill>
+            <a:schemeClr val="bg1"/>
+          </a:solidFill>
           <a:ln>
             <a:solidFill>
               <a:schemeClr val="tx1"/>
@@ -3736,7 +3799,7 @@
               <a:rPr lang="en-GB" dirty="0">
                 <a:latin typeface="Bodoni MT" panose="02070603080606020203" pitchFamily="18" charset="0"/>
               </a:rPr>
-              <a:t>Project Evaluation</a:t>
+              <a:t>User Testing Feedback (ii)</a:t>
             </a:r>
           </a:p>
         </p:txBody>
@@ -3762,6 +3825,391 @@
             <a:off x="838200" y="931178"/>
             <a:ext cx="10515600" cy="5245785"/>
           </a:xfrm>
+          <a:solidFill>
+            <a:schemeClr val="bg1"/>
+          </a:solidFill>
+          <a:ln>
+            <a:solidFill>
+              <a:schemeClr val="tx1"/>
+            </a:solidFill>
+          </a:ln>
+        </p:spPr>
+        <p:txBody>
+          <a:bodyPr/>
+          <a:lstStyle/>
+          <a:p>
+            <a:pPr marL="0" indent="0">
+              <a:buNone/>
+            </a:pPr>
+            <a:endParaRPr lang="en-GB" dirty="0">
+              <a:latin typeface="Bodoni MT" panose="02070603080606020203" pitchFamily="18" charset="0"/>
+            </a:endParaRPr>
+          </a:p>
+          <a:p>
+            <a:pPr marL="0" indent="0">
+              <a:buNone/>
+            </a:pPr>
+            <a:endParaRPr lang="en-GB" dirty="0">
+              <a:latin typeface="Bodoni MT" panose="02070603080606020203" pitchFamily="18" charset="0"/>
+            </a:endParaRPr>
+          </a:p>
+        </p:txBody>
+      </p:sp>
+      <p:sp>
+        <p:nvSpPr>
+          <p:cNvPr id="6" name="TextBox 5">
+            <a:extLst>
+              <a:ext uri="{FF2B5EF4-FFF2-40B4-BE49-F238E27FC236}">
+                <a16:creationId xmlns:a16="http://schemas.microsoft.com/office/drawing/2014/main" id="{2A7FCD91-3666-4A23-B530-B70A5977CFC4}"/>
+              </a:ext>
+            </a:extLst>
+          </p:cNvPr>
+          <p:cNvSpPr txBox="1"/>
+          <p:nvPr/>
+        </p:nvSpPr>
+        <p:spPr>
+          <a:xfrm>
+            <a:off x="10233870" y="240664"/>
+            <a:ext cx="1393272" cy="707886"/>
+          </a:xfrm>
+          <a:prstGeom prst="rect">
+            <a:avLst/>
+          </a:prstGeom>
+          <a:noFill/>
+        </p:spPr>
+        <p:txBody>
+          <a:bodyPr wrap="square" rtlCol="0">
+            <a:spAutoFit/>
+          </a:bodyPr>
+          <a:lstStyle/>
+          <a:p>
+            <a:pPr algn="ctr"/>
+            <a:r>
+              <a:rPr lang="en-GB" sz="4000" i="1" dirty="0">
+                <a:latin typeface="Bodoni MT" panose="02070603080606020203" pitchFamily="18" charset="0"/>
+                <a:ea typeface="Cambria Math" panose="02040503050406030204" pitchFamily="18" charset="0"/>
+              </a:rPr>
+              <a:t>(4)</a:t>
+            </a:r>
+          </a:p>
+        </p:txBody>
+      </p:sp>
+      <p:pic>
+        <p:nvPicPr>
+          <p:cNvPr id="8" name="Picture 7">
+            <a:extLst>
+              <a:ext uri="{FF2B5EF4-FFF2-40B4-BE49-F238E27FC236}">
+                <a16:creationId xmlns:a16="http://schemas.microsoft.com/office/drawing/2014/main" id="{A3117FBC-7DFD-4758-B4B9-29961EBB7136}"/>
+              </a:ext>
+            </a:extLst>
+          </p:cNvPr>
+          <p:cNvPicPr>
+            <a:picLocks noChangeAspect="1"/>
+          </p:cNvPicPr>
+          <p:nvPr/>
+        </p:nvPicPr>
+        <p:blipFill>
+          <a:blip r:embed="rId3"/>
+          <a:stretch>
+            <a:fillRect/>
+          </a:stretch>
+        </p:blipFill>
+        <p:spPr>
+          <a:xfrm>
+            <a:off x="7105940" y="1632457"/>
+            <a:ext cx="3782621" cy="3770054"/>
+          </a:xfrm>
+          <a:prstGeom prst="rect">
+            <a:avLst/>
+          </a:prstGeom>
+          <a:ln>
+            <a:solidFill>
+              <a:schemeClr val="tx1"/>
+            </a:solidFill>
+          </a:ln>
+        </p:spPr>
+      </p:pic>
+      <p:sp>
+        <p:nvSpPr>
+          <p:cNvPr id="11" name="TextBox 10">
+            <a:extLst>
+              <a:ext uri="{FF2B5EF4-FFF2-40B4-BE49-F238E27FC236}">
+                <a16:creationId xmlns:a16="http://schemas.microsoft.com/office/drawing/2014/main" id="{0B108C47-D011-4547-9642-A8F7197FB2ED}"/>
+              </a:ext>
+            </a:extLst>
+          </p:cNvPr>
+          <p:cNvSpPr txBox="1"/>
+          <p:nvPr/>
+        </p:nvSpPr>
+        <p:spPr>
+          <a:xfrm>
+            <a:off x="1229920" y="1296303"/>
+            <a:ext cx="5349021" cy="2308324"/>
+          </a:xfrm>
+          <a:prstGeom prst="rect">
+            <a:avLst/>
+          </a:prstGeom>
+          <a:noFill/>
+          <a:ln>
+            <a:solidFill>
+              <a:schemeClr val="tx1"/>
+            </a:solidFill>
+          </a:ln>
+        </p:spPr>
+        <p:txBody>
+          <a:bodyPr wrap="square" rtlCol="0">
+            <a:spAutoFit/>
+          </a:bodyPr>
+          <a:lstStyle/>
+          <a:p>
+            <a:r>
+              <a:rPr lang="en-GB" b="1" dirty="0">
+                <a:latin typeface="Bodoni MT" panose="02070603080606020203" pitchFamily="18" charset="0"/>
+              </a:rPr>
+              <a:t>TEST 3: FULL RUN-THROUGH:</a:t>
+            </a:r>
+          </a:p>
+          <a:p>
+            <a:r>
+              <a:rPr lang="en-GB" i="1" dirty="0">
+                <a:latin typeface="Bodoni MT" panose="02070603080606020203" pitchFamily="18" charset="0"/>
+              </a:rPr>
+              <a:t>Our intention</a:t>
+            </a:r>
+            <a:r>
+              <a:rPr lang="en-GB" dirty="0">
+                <a:latin typeface="Bodoni MT" panose="02070603080606020203" pitchFamily="18" charset="0"/>
+              </a:rPr>
+              <a:t>: For the overall experience to be both enjoyable and challenging for the player.</a:t>
+            </a:r>
+          </a:p>
+          <a:p>
+            <a:r>
+              <a:rPr lang="en-GB" i="1" dirty="0">
+                <a:latin typeface="Bodoni MT" panose="02070603080606020203" pitchFamily="18" charset="0"/>
+              </a:rPr>
+              <a:t>Our findings</a:t>
+            </a:r>
+            <a:r>
+              <a:rPr lang="en-GB" dirty="0">
+                <a:latin typeface="Bodoni MT" panose="02070603080606020203" pitchFamily="18" charset="0"/>
+              </a:rPr>
+              <a:t>: Participants felt a disconnect between their character and the aim of the game.</a:t>
+            </a:r>
+          </a:p>
+          <a:p>
+            <a:r>
+              <a:rPr lang="en-GB" i="1" dirty="0">
+                <a:latin typeface="Bodoni MT" panose="02070603080606020203" pitchFamily="18" charset="0"/>
+              </a:rPr>
+              <a:t>QUOTE: </a:t>
+            </a:r>
+            <a:r>
+              <a:rPr lang="en-GB" dirty="0">
+                <a:latin typeface="Bodoni MT" panose="02070603080606020203" pitchFamily="18" charset="0"/>
+              </a:rPr>
+              <a:t>“Why is this elf fixing the house?”</a:t>
+            </a:r>
+          </a:p>
+          <a:p>
+            <a:r>
+              <a:rPr lang="en-GB" i="1" dirty="0">
+                <a:latin typeface="Bodoni MT" panose="02070603080606020203" pitchFamily="18" charset="0"/>
+              </a:rPr>
+              <a:t>Action Taken</a:t>
+            </a:r>
+            <a:r>
+              <a:rPr lang="en-GB" dirty="0">
+                <a:latin typeface="Bodoni MT" panose="02070603080606020203" pitchFamily="18" charset="0"/>
+              </a:rPr>
+              <a:t>: Added the character to the house background in the main menu to create a mental link.</a:t>
+            </a:r>
+          </a:p>
+        </p:txBody>
+      </p:sp>
+      <p:sp>
+        <p:nvSpPr>
+          <p:cNvPr id="13" name="TextBox 12">
+            <a:extLst>
+              <a:ext uri="{FF2B5EF4-FFF2-40B4-BE49-F238E27FC236}">
+                <a16:creationId xmlns:a16="http://schemas.microsoft.com/office/drawing/2014/main" id="{51D2C041-9487-41F5-B1A0-947375EFE397}"/>
+              </a:ext>
+            </a:extLst>
+          </p:cNvPr>
+          <p:cNvSpPr txBox="1"/>
+          <p:nvPr/>
+        </p:nvSpPr>
+        <p:spPr>
+          <a:xfrm>
+            <a:off x="1229920" y="3604627"/>
+            <a:ext cx="5349021" cy="646331"/>
+          </a:xfrm>
+          <a:prstGeom prst="rect">
+            <a:avLst/>
+          </a:prstGeom>
+          <a:noFill/>
+          <a:ln>
+            <a:solidFill>
+              <a:schemeClr val="tx1"/>
+            </a:solidFill>
+          </a:ln>
+        </p:spPr>
+        <p:txBody>
+          <a:bodyPr wrap="square" rtlCol="0">
+            <a:spAutoFit/>
+          </a:bodyPr>
+          <a:lstStyle/>
+          <a:p>
+            <a:r>
+              <a:rPr lang="en-GB" b="1" dirty="0">
+                <a:latin typeface="Bodoni MT" panose="02070603080606020203" pitchFamily="18" charset="0"/>
+              </a:rPr>
+              <a:t>NOTE: </a:t>
+            </a:r>
+            <a:r>
+              <a:rPr lang="en-GB" dirty="0">
+                <a:latin typeface="Bodoni MT" panose="02070603080606020203" pitchFamily="18" charset="0"/>
+              </a:rPr>
+              <a:t>Test 3 was completed after the changes made following Tests 1 and 2.</a:t>
+            </a:r>
+          </a:p>
+        </p:txBody>
+      </p:sp>
+    </p:spTree>
+    <p:extLst>
+      <p:ext uri="{BB962C8B-B14F-4D97-AF65-F5344CB8AC3E}">
+        <p14:creationId xmlns:p14="http://schemas.microsoft.com/office/powerpoint/2010/main" val="396850397"/>
+      </p:ext>
+    </p:extLst>
+  </p:cSld>
+  <p:clrMapOvr>
+    <a:masterClrMapping/>
+  </p:clrMapOvr>
+</p:sld>
+</file>
+
+<file path=ppt/slides/slide11.xml><?xml version="1.0" encoding="utf-8"?>
+<p:sld xmlns:a="http://schemas.openxmlformats.org/drawingml/2006/main" xmlns:r="http://schemas.openxmlformats.org/officeDocument/2006/relationships" xmlns:p="http://schemas.openxmlformats.org/presentationml/2006/main">
+  <p:cSld>
+    <p:spTree>
+      <p:nvGrpSpPr>
+        <p:cNvPr id="1" name=""/>
+        <p:cNvGrpSpPr/>
+        <p:nvPr/>
+      </p:nvGrpSpPr>
+      <p:grpSpPr>
+        <a:xfrm>
+          <a:off x="0" y="0"/>
+          <a:ext cx="0" cy="0"/>
+          <a:chOff x="0" y="0"/>
+          <a:chExt cx="0" cy="0"/>
+        </a:xfrm>
+      </p:grpSpPr>
+      <p:pic>
+        <p:nvPicPr>
+          <p:cNvPr id="4" name="Picture 3">
+            <a:extLst>
+              <a:ext uri="{FF2B5EF4-FFF2-40B4-BE49-F238E27FC236}">
+                <a16:creationId xmlns:a16="http://schemas.microsoft.com/office/drawing/2014/main" id="{1F7B8747-803D-41C8-89FD-730522D4A3D6}"/>
+              </a:ext>
+            </a:extLst>
+          </p:cNvPr>
+          <p:cNvPicPr>
+            <a:picLocks noChangeAspect="1"/>
+          </p:cNvPicPr>
+          <p:nvPr/>
+        </p:nvPicPr>
+        <p:blipFill>
+          <a:blip r:embed="rId2"/>
+          <a:stretch>
+            <a:fillRect/>
+          </a:stretch>
+        </p:blipFill>
+        <p:spPr>
+          <a:xfrm>
+            <a:off x="0" y="1"/>
+            <a:ext cx="12192000" cy="6858000"/>
+          </a:xfrm>
+          <a:prstGeom prst="rect">
+            <a:avLst/>
+          </a:prstGeom>
+          <a:ln>
+            <a:solidFill>
+              <a:schemeClr val="tx1"/>
+            </a:solidFill>
+          </a:ln>
+        </p:spPr>
+      </p:pic>
+      <p:sp>
+        <p:nvSpPr>
+          <p:cNvPr id="2" name="Title 1">
+            <a:extLst>
+              <a:ext uri="{FF2B5EF4-FFF2-40B4-BE49-F238E27FC236}">
+                <a16:creationId xmlns:a16="http://schemas.microsoft.com/office/drawing/2014/main" id="{DFC049F8-2284-4161-BE3C-431BCD0EFAB7}"/>
+              </a:ext>
+            </a:extLst>
+          </p:cNvPr>
+          <p:cNvSpPr>
+            <a:spLocks noGrp="1"/>
+          </p:cNvSpPr>
+          <p:nvPr>
+            <p:ph type="title"/>
+          </p:nvPr>
+        </p:nvSpPr>
+        <p:spPr>
+          <a:xfrm>
+            <a:off x="838200" y="365125"/>
+            <a:ext cx="10515600" cy="566053"/>
+          </a:xfrm>
+          <a:solidFill>
+            <a:schemeClr val="bg1"/>
+          </a:solidFill>
+          <a:ln>
+            <a:solidFill>
+              <a:schemeClr val="tx1"/>
+            </a:solidFill>
+          </a:ln>
+        </p:spPr>
+        <p:txBody>
+          <a:bodyPr>
+            <a:normAutofit fontScale="90000"/>
+          </a:bodyPr>
+          <a:lstStyle/>
+          <a:p>
+            <a:pPr algn="ctr"/>
+            <a:r>
+              <a:rPr lang="en-GB" dirty="0">
+                <a:latin typeface="Bodoni MT" panose="02070603080606020203" pitchFamily="18" charset="0"/>
+              </a:rPr>
+              <a:t>Project Evaluation</a:t>
+            </a:r>
+          </a:p>
+        </p:txBody>
+      </p:sp>
+      <p:sp>
+        <p:nvSpPr>
+          <p:cNvPr id="3" name="Content Placeholder 2">
+            <a:extLst>
+              <a:ext uri="{FF2B5EF4-FFF2-40B4-BE49-F238E27FC236}">
+                <a16:creationId xmlns:a16="http://schemas.microsoft.com/office/drawing/2014/main" id="{F2E045F5-714F-4E07-87A1-F5696A62ED28}"/>
+              </a:ext>
+            </a:extLst>
+          </p:cNvPr>
+          <p:cNvSpPr>
+            <a:spLocks noGrp="1"/>
+          </p:cNvSpPr>
+          <p:nvPr>
+            <p:ph idx="1"/>
+          </p:nvPr>
+        </p:nvSpPr>
+        <p:spPr>
+          <a:xfrm>
+            <a:off x="838200" y="931178"/>
+            <a:ext cx="10515600" cy="5427677"/>
+          </a:xfrm>
+          <a:solidFill>
+            <a:schemeClr val="bg1"/>
+          </a:solidFill>
           <a:ln>
             <a:solidFill>
               <a:schemeClr val="tx1"/>
@@ -3953,7 +4401,7 @@
               <a:rPr lang="en-GB" dirty="0">
                 <a:latin typeface="Bodoni MT" panose="02070603080606020203" pitchFamily="18" charset="0"/>
               </a:rPr>
-              <a:t>Children (ages 7+)</a:t>
+              <a:t>Family / Children (ages 7+)</a:t>
             </a:r>
           </a:p>
           <a:p>
@@ -5310,7 +5758,7 @@
         </p:blipFill>
         <p:spPr>
           <a:xfrm>
-            <a:off x="8728407" y="4706818"/>
+            <a:off x="8734906" y="4373652"/>
             <a:ext cx="969210" cy="1332663"/>
           </a:xfrm>
           <a:prstGeom prst="rect">
@@ -5346,7 +5794,7 @@
         </p:blipFill>
         <p:spPr>
           <a:xfrm>
-            <a:off x="10123216" y="4707411"/>
+            <a:off x="10044353" y="4371997"/>
             <a:ext cx="969209" cy="1332662"/>
           </a:xfrm>
           <a:prstGeom prst="rect">
@@ -5639,6 +6087,486 @@
           </a:p>
         </p:txBody>
       </p:sp>
+      <p:sp>
+        <p:nvSpPr>
+          <p:cNvPr id="12" name="Content Placeholder 2">
+            <a:extLst>
+              <a:ext uri="{FF2B5EF4-FFF2-40B4-BE49-F238E27FC236}">
+                <a16:creationId xmlns:a16="http://schemas.microsoft.com/office/drawing/2014/main" id="{0005FAC1-D63E-4606-9908-2EC64C974176}"/>
+              </a:ext>
+            </a:extLst>
+          </p:cNvPr>
+          <p:cNvSpPr txBox="1">
+            <a:spLocks/>
+          </p:cNvSpPr>
+          <p:nvPr/>
+        </p:nvSpPr>
+        <p:spPr>
+          <a:xfrm>
+            <a:off x="838200" y="2567032"/>
+            <a:ext cx="10515600" cy="1332662"/>
+          </a:xfrm>
+          <a:prstGeom prst="rect">
+            <a:avLst/>
+          </a:prstGeom>
+          <a:ln>
+            <a:solidFill>
+              <a:schemeClr val="tx1"/>
+            </a:solidFill>
+          </a:ln>
+        </p:spPr>
+        <p:txBody>
+          <a:bodyPr vert="horz" lIns="91440" tIns="45720" rIns="91440" bIns="45720" rtlCol="0">
+            <a:normAutofit lnSpcReduction="10000"/>
+          </a:bodyPr>
+          <a:lstStyle>
+            <a:lvl1pPr marL="228600" indent="-228600" algn="l" defTabSz="914400" rtl="0" eaLnBrk="1" latinLnBrk="0" hangingPunct="1">
+              <a:lnSpc>
+                <a:spcPct val="90000"/>
+              </a:lnSpc>
+              <a:spcBef>
+                <a:spcPts val="1000"/>
+              </a:spcBef>
+              <a:buFont typeface="Arial" panose="020B0604020202020204" pitchFamily="34" charset="0"/>
+              <a:buChar char="•"/>
+              <a:defRPr sz="2800" kern="1200">
+                <a:solidFill>
+                  <a:schemeClr val="tx1"/>
+                </a:solidFill>
+                <a:latin typeface="+mn-lt"/>
+                <a:ea typeface="+mn-ea"/>
+                <a:cs typeface="+mn-cs"/>
+              </a:defRPr>
+            </a:lvl1pPr>
+            <a:lvl2pPr marL="685800" indent="-228600" algn="l" defTabSz="914400" rtl="0" eaLnBrk="1" latinLnBrk="0" hangingPunct="1">
+              <a:lnSpc>
+                <a:spcPct val="90000"/>
+              </a:lnSpc>
+              <a:spcBef>
+                <a:spcPts val="500"/>
+              </a:spcBef>
+              <a:buFont typeface="Arial" panose="020B0604020202020204" pitchFamily="34" charset="0"/>
+              <a:buChar char="•"/>
+              <a:defRPr sz="2400" kern="1200">
+                <a:solidFill>
+                  <a:schemeClr val="tx1"/>
+                </a:solidFill>
+                <a:latin typeface="+mn-lt"/>
+                <a:ea typeface="+mn-ea"/>
+                <a:cs typeface="+mn-cs"/>
+              </a:defRPr>
+            </a:lvl2pPr>
+            <a:lvl3pPr marL="1143000" indent="-228600" algn="l" defTabSz="914400" rtl="0" eaLnBrk="1" latinLnBrk="0" hangingPunct="1">
+              <a:lnSpc>
+                <a:spcPct val="90000"/>
+              </a:lnSpc>
+              <a:spcBef>
+                <a:spcPts val="500"/>
+              </a:spcBef>
+              <a:buFont typeface="Arial" panose="020B0604020202020204" pitchFamily="34" charset="0"/>
+              <a:buChar char="•"/>
+              <a:defRPr sz="2000" kern="1200">
+                <a:solidFill>
+                  <a:schemeClr val="tx1"/>
+                </a:solidFill>
+                <a:latin typeface="+mn-lt"/>
+                <a:ea typeface="+mn-ea"/>
+                <a:cs typeface="+mn-cs"/>
+              </a:defRPr>
+            </a:lvl3pPr>
+            <a:lvl4pPr marL="1600200" indent="-228600" algn="l" defTabSz="914400" rtl="0" eaLnBrk="1" latinLnBrk="0" hangingPunct="1">
+              <a:lnSpc>
+                <a:spcPct val="90000"/>
+              </a:lnSpc>
+              <a:spcBef>
+                <a:spcPts val="500"/>
+              </a:spcBef>
+              <a:buFont typeface="Arial" panose="020B0604020202020204" pitchFamily="34" charset="0"/>
+              <a:buChar char="•"/>
+              <a:defRPr sz="1800" kern="1200">
+                <a:solidFill>
+                  <a:schemeClr val="tx1"/>
+                </a:solidFill>
+                <a:latin typeface="+mn-lt"/>
+                <a:ea typeface="+mn-ea"/>
+                <a:cs typeface="+mn-cs"/>
+              </a:defRPr>
+            </a:lvl4pPr>
+            <a:lvl5pPr marL="2057400" indent="-228600" algn="l" defTabSz="914400" rtl="0" eaLnBrk="1" latinLnBrk="0" hangingPunct="1">
+              <a:lnSpc>
+                <a:spcPct val="90000"/>
+              </a:lnSpc>
+              <a:spcBef>
+                <a:spcPts val="500"/>
+              </a:spcBef>
+              <a:buFont typeface="Arial" panose="020B0604020202020204" pitchFamily="34" charset="0"/>
+              <a:buChar char="•"/>
+              <a:defRPr sz="1800" kern="1200">
+                <a:solidFill>
+                  <a:schemeClr val="tx1"/>
+                </a:solidFill>
+                <a:latin typeface="+mn-lt"/>
+                <a:ea typeface="+mn-ea"/>
+                <a:cs typeface="+mn-cs"/>
+              </a:defRPr>
+            </a:lvl5pPr>
+            <a:lvl6pPr marL="2514600" indent="-228600" algn="l" defTabSz="914400" rtl="0" eaLnBrk="1" latinLnBrk="0" hangingPunct="1">
+              <a:lnSpc>
+                <a:spcPct val="90000"/>
+              </a:lnSpc>
+              <a:spcBef>
+                <a:spcPts val="500"/>
+              </a:spcBef>
+              <a:buFont typeface="Arial" panose="020B0604020202020204" pitchFamily="34" charset="0"/>
+              <a:buChar char="•"/>
+              <a:defRPr sz="1800" kern="1200">
+                <a:solidFill>
+                  <a:schemeClr val="tx1"/>
+                </a:solidFill>
+                <a:latin typeface="+mn-lt"/>
+                <a:ea typeface="+mn-ea"/>
+                <a:cs typeface="+mn-cs"/>
+              </a:defRPr>
+            </a:lvl6pPr>
+            <a:lvl7pPr marL="2971800" indent="-228600" algn="l" defTabSz="914400" rtl="0" eaLnBrk="1" latinLnBrk="0" hangingPunct="1">
+              <a:lnSpc>
+                <a:spcPct val="90000"/>
+              </a:lnSpc>
+              <a:spcBef>
+                <a:spcPts val="500"/>
+              </a:spcBef>
+              <a:buFont typeface="Arial" panose="020B0604020202020204" pitchFamily="34" charset="0"/>
+              <a:buChar char="•"/>
+              <a:defRPr sz="1800" kern="1200">
+                <a:solidFill>
+                  <a:schemeClr val="tx1"/>
+                </a:solidFill>
+                <a:latin typeface="+mn-lt"/>
+                <a:ea typeface="+mn-ea"/>
+                <a:cs typeface="+mn-cs"/>
+              </a:defRPr>
+            </a:lvl7pPr>
+            <a:lvl8pPr marL="3429000" indent="-228600" algn="l" defTabSz="914400" rtl="0" eaLnBrk="1" latinLnBrk="0" hangingPunct="1">
+              <a:lnSpc>
+                <a:spcPct val="90000"/>
+              </a:lnSpc>
+              <a:spcBef>
+                <a:spcPts val="500"/>
+              </a:spcBef>
+              <a:buFont typeface="Arial" panose="020B0604020202020204" pitchFamily="34" charset="0"/>
+              <a:buChar char="•"/>
+              <a:defRPr sz="1800" kern="1200">
+                <a:solidFill>
+                  <a:schemeClr val="tx1"/>
+                </a:solidFill>
+                <a:latin typeface="+mn-lt"/>
+                <a:ea typeface="+mn-ea"/>
+                <a:cs typeface="+mn-cs"/>
+              </a:defRPr>
+            </a:lvl8pPr>
+            <a:lvl9pPr marL="3886200" indent="-228600" algn="l" defTabSz="914400" rtl="0" eaLnBrk="1" latinLnBrk="0" hangingPunct="1">
+              <a:lnSpc>
+                <a:spcPct val="90000"/>
+              </a:lnSpc>
+              <a:spcBef>
+                <a:spcPts val="500"/>
+              </a:spcBef>
+              <a:buFont typeface="Arial" panose="020B0604020202020204" pitchFamily="34" charset="0"/>
+              <a:buChar char="•"/>
+              <a:defRPr sz="1800" kern="1200">
+                <a:solidFill>
+                  <a:schemeClr val="tx1"/>
+                </a:solidFill>
+                <a:latin typeface="+mn-lt"/>
+                <a:ea typeface="+mn-ea"/>
+                <a:cs typeface="+mn-cs"/>
+              </a:defRPr>
+            </a:lvl9pPr>
+          </a:lstStyle>
+          <a:p>
+            <a:pPr marL="0" indent="0">
+              <a:buFont typeface="Arial" panose="020B0604020202020204" pitchFamily="34" charset="0"/>
+              <a:buNone/>
+            </a:pPr>
+            <a:r>
+              <a:rPr lang="en-GB" sz="1800" b="1" dirty="0">
+                <a:latin typeface="Bodoni MT" panose="02070603080606020203" pitchFamily="18" charset="0"/>
+              </a:rPr>
+              <a:t>GAME DIRECTION:</a:t>
+            </a:r>
+          </a:p>
+          <a:p>
+            <a:pPr marL="0" indent="0">
+              <a:buFont typeface="Arial" panose="020B0604020202020204" pitchFamily="34" charset="0"/>
+              <a:buNone/>
+            </a:pPr>
+            <a:r>
+              <a:rPr lang="en-GB" sz="1800" dirty="0">
+                <a:latin typeface="Bodoni MT" panose="02070603080606020203" pitchFamily="18" charset="0"/>
+              </a:rPr>
+              <a:t>The game must be played through in chronological order beginning with platform level 1 (forest), leading to a puzzle. This sequence is to be repeated for the following 3 levels.</a:t>
+            </a:r>
+          </a:p>
+          <a:p>
+            <a:pPr marL="0" indent="0">
+              <a:buFont typeface="Arial" panose="020B0604020202020204" pitchFamily="34" charset="0"/>
+              <a:buNone/>
+            </a:pPr>
+            <a:r>
+              <a:rPr lang="en-GB" sz="1800" dirty="0">
+                <a:latin typeface="Bodoni MT" panose="02070603080606020203" pitchFamily="18" charset="0"/>
+              </a:rPr>
+              <a:t>Levels &amp; puzzles can be replayed in order to find all the collectables. </a:t>
+            </a:r>
+          </a:p>
+        </p:txBody>
+      </p:sp>
+      <p:sp>
+        <p:nvSpPr>
+          <p:cNvPr id="13" name="Content Placeholder 2">
+            <a:extLst>
+              <a:ext uri="{FF2B5EF4-FFF2-40B4-BE49-F238E27FC236}">
+                <a16:creationId xmlns:a16="http://schemas.microsoft.com/office/drawing/2014/main" id="{A6B71EFB-4EB9-48D0-A7CA-693B1830CB7E}"/>
+              </a:ext>
+            </a:extLst>
+          </p:cNvPr>
+          <p:cNvSpPr txBox="1">
+            <a:spLocks/>
+          </p:cNvSpPr>
+          <p:nvPr/>
+        </p:nvSpPr>
+        <p:spPr>
+          <a:xfrm>
+            <a:off x="838200" y="3903005"/>
+            <a:ext cx="7628832" cy="2273958"/>
+          </a:xfrm>
+          <a:prstGeom prst="rect">
+            <a:avLst/>
+          </a:prstGeom>
+          <a:ln>
+            <a:solidFill>
+              <a:schemeClr val="tx1"/>
+            </a:solidFill>
+          </a:ln>
+        </p:spPr>
+        <p:txBody>
+          <a:bodyPr vert="horz" lIns="91440" tIns="45720" rIns="91440" bIns="45720" rtlCol="0">
+            <a:normAutofit/>
+          </a:bodyPr>
+          <a:lstStyle>
+            <a:lvl1pPr marL="228600" indent="-228600" algn="l" defTabSz="914400" rtl="0" eaLnBrk="1" latinLnBrk="0" hangingPunct="1">
+              <a:lnSpc>
+                <a:spcPct val="90000"/>
+              </a:lnSpc>
+              <a:spcBef>
+                <a:spcPts val="1000"/>
+              </a:spcBef>
+              <a:buFont typeface="Arial" panose="020B0604020202020204" pitchFamily="34" charset="0"/>
+              <a:buChar char="•"/>
+              <a:defRPr sz="2800" kern="1200">
+                <a:solidFill>
+                  <a:schemeClr val="tx1"/>
+                </a:solidFill>
+                <a:latin typeface="+mn-lt"/>
+                <a:ea typeface="+mn-ea"/>
+                <a:cs typeface="+mn-cs"/>
+              </a:defRPr>
+            </a:lvl1pPr>
+            <a:lvl2pPr marL="685800" indent="-228600" algn="l" defTabSz="914400" rtl="0" eaLnBrk="1" latinLnBrk="0" hangingPunct="1">
+              <a:lnSpc>
+                <a:spcPct val="90000"/>
+              </a:lnSpc>
+              <a:spcBef>
+                <a:spcPts val="500"/>
+              </a:spcBef>
+              <a:buFont typeface="Arial" panose="020B0604020202020204" pitchFamily="34" charset="0"/>
+              <a:buChar char="•"/>
+              <a:defRPr sz="2400" kern="1200">
+                <a:solidFill>
+                  <a:schemeClr val="tx1"/>
+                </a:solidFill>
+                <a:latin typeface="+mn-lt"/>
+                <a:ea typeface="+mn-ea"/>
+                <a:cs typeface="+mn-cs"/>
+              </a:defRPr>
+            </a:lvl2pPr>
+            <a:lvl3pPr marL="1143000" indent="-228600" algn="l" defTabSz="914400" rtl="0" eaLnBrk="1" latinLnBrk="0" hangingPunct="1">
+              <a:lnSpc>
+                <a:spcPct val="90000"/>
+              </a:lnSpc>
+              <a:spcBef>
+                <a:spcPts val="500"/>
+              </a:spcBef>
+              <a:buFont typeface="Arial" panose="020B0604020202020204" pitchFamily="34" charset="0"/>
+              <a:buChar char="•"/>
+              <a:defRPr sz="2000" kern="1200">
+                <a:solidFill>
+                  <a:schemeClr val="tx1"/>
+                </a:solidFill>
+                <a:latin typeface="+mn-lt"/>
+                <a:ea typeface="+mn-ea"/>
+                <a:cs typeface="+mn-cs"/>
+              </a:defRPr>
+            </a:lvl3pPr>
+            <a:lvl4pPr marL="1600200" indent="-228600" algn="l" defTabSz="914400" rtl="0" eaLnBrk="1" latinLnBrk="0" hangingPunct="1">
+              <a:lnSpc>
+                <a:spcPct val="90000"/>
+              </a:lnSpc>
+              <a:spcBef>
+                <a:spcPts val="500"/>
+              </a:spcBef>
+              <a:buFont typeface="Arial" panose="020B0604020202020204" pitchFamily="34" charset="0"/>
+              <a:buChar char="•"/>
+              <a:defRPr sz="1800" kern="1200">
+                <a:solidFill>
+                  <a:schemeClr val="tx1"/>
+                </a:solidFill>
+                <a:latin typeface="+mn-lt"/>
+                <a:ea typeface="+mn-ea"/>
+                <a:cs typeface="+mn-cs"/>
+              </a:defRPr>
+            </a:lvl4pPr>
+            <a:lvl5pPr marL="2057400" indent="-228600" algn="l" defTabSz="914400" rtl="0" eaLnBrk="1" latinLnBrk="0" hangingPunct="1">
+              <a:lnSpc>
+                <a:spcPct val="90000"/>
+              </a:lnSpc>
+              <a:spcBef>
+                <a:spcPts val="500"/>
+              </a:spcBef>
+              <a:buFont typeface="Arial" panose="020B0604020202020204" pitchFamily="34" charset="0"/>
+              <a:buChar char="•"/>
+              <a:defRPr sz="1800" kern="1200">
+                <a:solidFill>
+                  <a:schemeClr val="tx1"/>
+                </a:solidFill>
+                <a:latin typeface="+mn-lt"/>
+                <a:ea typeface="+mn-ea"/>
+                <a:cs typeface="+mn-cs"/>
+              </a:defRPr>
+            </a:lvl5pPr>
+            <a:lvl6pPr marL="2514600" indent="-228600" algn="l" defTabSz="914400" rtl="0" eaLnBrk="1" latinLnBrk="0" hangingPunct="1">
+              <a:lnSpc>
+                <a:spcPct val="90000"/>
+              </a:lnSpc>
+              <a:spcBef>
+                <a:spcPts val="500"/>
+              </a:spcBef>
+              <a:buFont typeface="Arial" panose="020B0604020202020204" pitchFamily="34" charset="0"/>
+              <a:buChar char="•"/>
+              <a:defRPr sz="1800" kern="1200">
+                <a:solidFill>
+                  <a:schemeClr val="tx1"/>
+                </a:solidFill>
+                <a:latin typeface="+mn-lt"/>
+                <a:ea typeface="+mn-ea"/>
+                <a:cs typeface="+mn-cs"/>
+              </a:defRPr>
+            </a:lvl6pPr>
+            <a:lvl7pPr marL="2971800" indent="-228600" algn="l" defTabSz="914400" rtl="0" eaLnBrk="1" latinLnBrk="0" hangingPunct="1">
+              <a:lnSpc>
+                <a:spcPct val="90000"/>
+              </a:lnSpc>
+              <a:spcBef>
+                <a:spcPts val="500"/>
+              </a:spcBef>
+              <a:buFont typeface="Arial" panose="020B0604020202020204" pitchFamily="34" charset="0"/>
+              <a:buChar char="•"/>
+              <a:defRPr sz="1800" kern="1200">
+                <a:solidFill>
+                  <a:schemeClr val="tx1"/>
+                </a:solidFill>
+                <a:latin typeface="+mn-lt"/>
+                <a:ea typeface="+mn-ea"/>
+                <a:cs typeface="+mn-cs"/>
+              </a:defRPr>
+            </a:lvl7pPr>
+            <a:lvl8pPr marL="3429000" indent="-228600" algn="l" defTabSz="914400" rtl="0" eaLnBrk="1" latinLnBrk="0" hangingPunct="1">
+              <a:lnSpc>
+                <a:spcPct val="90000"/>
+              </a:lnSpc>
+              <a:spcBef>
+                <a:spcPts val="500"/>
+              </a:spcBef>
+              <a:buFont typeface="Arial" panose="020B0604020202020204" pitchFamily="34" charset="0"/>
+              <a:buChar char="•"/>
+              <a:defRPr sz="1800" kern="1200">
+                <a:solidFill>
+                  <a:schemeClr val="tx1"/>
+                </a:solidFill>
+                <a:latin typeface="+mn-lt"/>
+                <a:ea typeface="+mn-ea"/>
+                <a:cs typeface="+mn-cs"/>
+              </a:defRPr>
+            </a:lvl8pPr>
+            <a:lvl9pPr marL="3886200" indent="-228600" algn="l" defTabSz="914400" rtl="0" eaLnBrk="1" latinLnBrk="0" hangingPunct="1">
+              <a:lnSpc>
+                <a:spcPct val="90000"/>
+              </a:lnSpc>
+              <a:spcBef>
+                <a:spcPts val="500"/>
+              </a:spcBef>
+              <a:buFont typeface="Arial" panose="020B0604020202020204" pitchFamily="34" charset="0"/>
+              <a:buChar char="•"/>
+              <a:defRPr sz="1800" kern="1200">
+                <a:solidFill>
+                  <a:schemeClr val="tx1"/>
+                </a:solidFill>
+                <a:latin typeface="+mn-lt"/>
+                <a:ea typeface="+mn-ea"/>
+                <a:cs typeface="+mn-cs"/>
+              </a:defRPr>
+            </a:lvl9pPr>
+          </a:lstStyle>
+          <a:p>
+            <a:pPr marL="0" indent="0">
+              <a:buFont typeface="Arial" panose="020B0604020202020204" pitchFamily="34" charset="0"/>
+              <a:buNone/>
+            </a:pPr>
+            <a:r>
+              <a:rPr lang="en-GB" sz="1800" b="1" dirty="0">
+                <a:latin typeface="Bodoni MT" panose="02070603080606020203" pitchFamily="18" charset="0"/>
+              </a:rPr>
+              <a:t>LEVEL PROGRESSION:</a:t>
+            </a:r>
+          </a:p>
+          <a:p>
+            <a:pPr marL="0" indent="0">
+              <a:buFont typeface="Arial" panose="020B0604020202020204" pitchFamily="34" charset="0"/>
+              <a:buNone/>
+            </a:pPr>
+            <a:r>
+              <a:rPr lang="en-GB" sz="1800" dirty="0">
+                <a:latin typeface="Bodoni MT" panose="02070603080606020203" pitchFamily="18" charset="0"/>
+              </a:rPr>
+              <a:t>In order to complete each level, the player must find the scroll, situated towards the end of the level.</a:t>
+            </a:r>
+          </a:p>
+          <a:p>
+            <a:pPr marL="0" indent="0">
+              <a:buFont typeface="Arial" panose="020B0604020202020204" pitchFamily="34" charset="0"/>
+              <a:buNone/>
+            </a:pPr>
+            <a:r>
+              <a:rPr lang="en-GB" sz="1800" dirty="0">
+                <a:latin typeface="Bodoni MT" panose="02070603080606020203" pitchFamily="18" charset="0"/>
+              </a:rPr>
+              <a:t>However, by default the scroll is locked, and to unlock it, the player must collect the key to remove the padlock from the scroll.</a:t>
+            </a:r>
+          </a:p>
+          <a:p>
+            <a:pPr marL="0" indent="0">
+              <a:buFont typeface="Arial" panose="020B0604020202020204" pitchFamily="34" charset="0"/>
+              <a:buNone/>
+            </a:pPr>
+            <a:r>
+              <a:rPr lang="en-GB" sz="1800" dirty="0">
+                <a:latin typeface="Bodoni MT" panose="02070603080606020203" pitchFamily="18" charset="0"/>
+              </a:rPr>
+              <a:t>Once the scroll is unlocked and found, the puzzle can be initiated, and the player can progress with the next stage of the game.</a:t>
+            </a:r>
+          </a:p>
+        </p:txBody>
+      </p:sp>
     </p:spTree>
     <p:extLst>
       <p:ext uri="{BB962C8B-B14F-4D97-AF65-F5344CB8AC3E}">
@@ -5669,6 +6597,118 @@
           <a:chExt cx="0" cy="0"/>
         </a:xfrm>
       </p:grpSpPr>
+      <p:pic>
+        <p:nvPicPr>
+          <p:cNvPr id="7" name="Picture 6">
+            <a:extLst>
+              <a:ext uri="{FF2B5EF4-FFF2-40B4-BE49-F238E27FC236}">
+                <a16:creationId xmlns:a16="http://schemas.microsoft.com/office/drawing/2014/main" id="{2FF80050-A6DA-4A1C-B6D8-AA5AA7F78A23}"/>
+              </a:ext>
+            </a:extLst>
+          </p:cNvPr>
+          <p:cNvPicPr>
+            <a:picLocks noChangeAspect="1"/>
+          </p:cNvPicPr>
+          <p:nvPr/>
+        </p:nvPicPr>
+        <p:blipFill>
+          <a:blip r:embed="rId2"/>
+          <a:stretch>
+            <a:fillRect/>
+          </a:stretch>
+        </p:blipFill>
+        <p:spPr>
+          <a:xfrm>
+            <a:off x="3065859" y="0"/>
+            <a:ext cx="9126141" cy="6858000"/>
+          </a:xfrm>
+          <a:prstGeom prst="rect">
+            <a:avLst/>
+          </a:prstGeom>
+        </p:spPr>
+      </p:pic>
+      <p:sp>
+        <p:nvSpPr>
+          <p:cNvPr id="8" name="Rectangle 7">
+            <a:extLst>
+              <a:ext uri="{FF2B5EF4-FFF2-40B4-BE49-F238E27FC236}">
+                <a16:creationId xmlns:a16="http://schemas.microsoft.com/office/drawing/2014/main" id="{5E3721CF-6C16-4B38-8E56-417FAD19673B}"/>
+              </a:ext>
+            </a:extLst>
+          </p:cNvPr>
+          <p:cNvSpPr/>
+          <p:nvPr/>
+        </p:nvSpPr>
+        <p:spPr>
+          <a:xfrm>
+            <a:off x="2910979" y="30125"/>
+            <a:ext cx="1837189" cy="503340"/>
+          </a:xfrm>
+          <a:prstGeom prst="rect">
+            <a:avLst/>
+          </a:prstGeom>
+          <a:solidFill>
+            <a:schemeClr val="tx1"/>
+          </a:solidFill>
+          <a:ln>
+            <a:noFill/>
+          </a:ln>
+        </p:spPr>
+        <p:style>
+          <a:lnRef idx="2">
+            <a:schemeClr val="accent1">
+              <a:shade val="50000"/>
+            </a:schemeClr>
+          </a:lnRef>
+          <a:fillRef idx="1">
+            <a:schemeClr val="accent1"/>
+          </a:fillRef>
+          <a:effectRef idx="0">
+            <a:schemeClr val="accent1"/>
+          </a:effectRef>
+          <a:fontRef idx="minor">
+            <a:schemeClr val="lt1"/>
+          </a:fontRef>
+        </p:style>
+        <p:txBody>
+          <a:bodyPr rtlCol="0" anchor="ctr"/>
+          <a:lstStyle/>
+          <a:p>
+            <a:pPr algn="ctr"/>
+            <a:endParaRPr lang="en-GB"/>
+          </a:p>
+        </p:txBody>
+      </p:sp>
+      <p:pic>
+        <p:nvPicPr>
+          <p:cNvPr id="5" name="Picture 4">
+            <a:extLst>
+              <a:ext uri="{FF2B5EF4-FFF2-40B4-BE49-F238E27FC236}">
+                <a16:creationId xmlns:a16="http://schemas.microsoft.com/office/drawing/2014/main" id="{BE6895F0-339F-4782-9F13-51BA81259136}"/>
+              </a:ext>
+            </a:extLst>
+          </p:cNvPr>
+          <p:cNvPicPr>
+            <a:picLocks noChangeAspect="1"/>
+          </p:cNvPicPr>
+          <p:nvPr/>
+        </p:nvPicPr>
+        <p:blipFill>
+          <a:blip r:embed="rId2"/>
+          <a:stretch>
+            <a:fillRect/>
+          </a:stretch>
+        </p:blipFill>
+        <p:spPr>
+          <a:xfrm>
+            <a:off x="0" y="0"/>
+            <a:ext cx="9126141" cy="6858000"/>
+          </a:xfrm>
+          <a:prstGeom prst="rect">
+            <a:avLst/>
+          </a:prstGeom>
+        </p:spPr>
+      </p:pic>
       <p:sp>
         <p:nvSpPr>
           <p:cNvPr id="2" name="Title 1">
@@ -5690,6 +6730,9 @@
             <a:off x="838200" y="365125"/>
             <a:ext cx="10515600" cy="566053"/>
           </a:xfrm>
+          <a:solidFill>
+            <a:schemeClr val="bg1"/>
+          </a:solidFill>
           <a:ln>
             <a:solidFill>
               <a:schemeClr val="tx1"/>
@@ -5733,6 +6776,9 @@
             <a:off x="838200" y="931178"/>
             <a:ext cx="10515600" cy="5245785"/>
           </a:xfrm>
+          <a:solidFill>
+            <a:schemeClr val="bg1"/>
+          </a:solidFill>
           <a:ln>
             <a:solidFill>
               <a:schemeClr val="tx1"/>
@@ -5743,6 +6789,17 @@
           <a:bodyPr/>
           <a:lstStyle/>
           <a:p>
+            <a:pPr marL="0" indent="0">
+              <a:buNone/>
+            </a:pPr>
+            <a:endParaRPr lang="en-GB" dirty="0">
+              <a:latin typeface="Bodoni MT" panose="02070603080606020203" pitchFamily="18" charset="0"/>
+            </a:endParaRPr>
+          </a:p>
+          <a:p>
+            <a:pPr marL="0" indent="0">
+              <a:buNone/>
+            </a:pPr>
             <a:endParaRPr lang="en-GB" dirty="0">
               <a:latin typeface="Bodoni MT" panose="02070603080606020203" pitchFamily="18" charset="0"/>
             </a:endParaRPr>
@@ -5788,6 +6845,1883 @@
           </a:p>
         </p:txBody>
       </p:sp>
+      <p:sp>
+        <p:nvSpPr>
+          <p:cNvPr id="10" name="Oval 9">
+            <a:extLst>
+              <a:ext uri="{FF2B5EF4-FFF2-40B4-BE49-F238E27FC236}">
+                <a16:creationId xmlns:a16="http://schemas.microsoft.com/office/drawing/2014/main" id="{C29C5979-7CCB-416B-B3A4-A452F3F30A10}"/>
+              </a:ext>
+            </a:extLst>
+          </p:cNvPr>
+          <p:cNvSpPr/>
+          <p:nvPr/>
+        </p:nvSpPr>
+        <p:spPr>
+          <a:xfrm>
+            <a:off x="3411522" y="1043054"/>
+            <a:ext cx="1602297" cy="789345"/>
+          </a:xfrm>
+          <a:prstGeom prst="ellipse">
+            <a:avLst/>
+          </a:prstGeom>
+          <a:solidFill>
+            <a:schemeClr val="accent2">
+              <a:lumMod val="60000"/>
+              <a:lumOff val="40000"/>
+            </a:schemeClr>
+          </a:solidFill>
+        </p:spPr>
+        <p:style>
+          <a:lnRef idx="2">
+            <a:schemeClr val="accent2">
+              <a:shade val="50000"/>
+            </a:schemeClr>
+          </a:lnRef>
+          <a:fillRef idx="1">
+            <a:schemeClr val="accent2"/>
+          </a:fillRef>
+          <a:effectRef idx="0">
+            <a:schemeClr val="accent2"/>
+          </a:effectRef>
+          <a:fontRef idx="minor">
+            <a:schemeClr val="lt1"/>
+          </a:fontRef>
+        </p:style>
+        <p:txBody>
+          <a:bodyPr rtlCol="0" anchor="ctr"/>
+          <a:lstStyle/>
+          <a:p>
+            <a:pPr algn="ctr"/>
+            <a:r>
+              <a:rPr lang="en-GB" dirty="0">
+                <a:latin typeface="Bodoni MT" panose="02070603080606020203" pitchFamily="18" charset="0"/>
+              </a:rPr>
+              <a:t>Design Spec.</a:t>
+            </a:r>
+          </a:p>
+        </p:txBody>
+      </p:sp>
+      <p:sp>
+        <p:nvSpPr>
+          <p:cNvPr id="11" name="Rectangle: Rounded Corners 10">
+            <a:extLst>
+              <a:ext uri="{FF2B5EF4-FFF2-40B4-BE49-F238E27FC236}">
+                <a16:creationId xmlns:a16="http://schemas.microsoft.com/office/drawing/2014/main" id="{F6A5F7EB-82A6-484E-9C43-CFB554F813E9}"/>
+              </a:ext>
+            </a:extLst>
+          </p:cNvPr>
+          <p:cNvSpPr/>
+          <p:nvPr/>
+        </p:nvSpPr>
+        <p:spPr>
+          <a:xfrm>
+            <a:off x="1542683" y="2675120"/>
+            <a:ext cx="1719743" cy="566053"/>
+          </a:xfrm>
+          <a:prstGeom prst="roundRect">
+            <a:avLst/>
+          </a:prstGeom>
+          <a:solidFill>
+            <a:schemeClr val="accent2">
+              <a:alpha val="50000"/>
+            </a:schemeClr>
+          </a:solidFill>
+          <a:ln>
+            <a:noFill/>
+          </a:ln>
+        </p:spPr>
+        <p:style>
+          <a:lnRef idx="0">
+            <a:scrgbClr r="0" g="0" b="0"/>
+          </a:lnRef>
+          <a:fillRef idx="0">
+            <a:scrgbClr r="0" g="0" b="0"/>
+          </a:fillRef>
+          <a:effectRef idx="0">
+            <a:scrgbClr r="0" g="0" b="0"/>
+          </a:effectRef>
+          <a:fontRef idx="minor">
+            <a:schemeClr val="lt1"/>
+          </a:fontRef>
+        </p:style>
+        <p:txBody>
+          <a:bodyPr rtlCol="0" anchor="ctr"/>
+          <a:lstStyle/>
+          <a:p>
+            <a:pPr algn="ctr"/>
+            <a:r>
+              <a:rPr lang="en-GB" dirty="0">
+                <a:latin typeface="Bodoni MT" panose="02070603080606020203" pitchFamily="18" charset="0"/>
+              </a:rPr>
+              <a:t>Base Tile Set</a:t>
+            </a:r>
+          </a:p>
+        </p:txBody>
+      </p:sp>
+      <p:sp>
+        <p:nvSpPr>
+          <p:cNvPr id="13" name="Rectangle: Rounded Corners 12">
+            <a:extLst>
+              <a:ext uri="{FF2B5EF4-FFF2-40B4-BE49-F238E27FC236}">
+                <a16:creationId xmlns:a16="http://schemas.microsoft.com/office/drawing/2014/main" id="{3719CF2D-2824-4299-B2CC-CE697E27AA7E}"/>
+              </a:ext>
+            </a:extLst>
+          </p:cNvPr>
+          <p:cNvSpPr/>
+          <p:nvPr/>
+        </p:nvSpPr>
+        <p:spPr>
+          <a:xfrm>
+            <a:off x="8878347" y="1711353"/>
+            <a:ext cx="1719743" cy="566053"/>
+          </a:xfrm>
+          <a:prstGeom prst="roundRect">
+            <a:avLst/>
+          </a:prstGeom>
+          <a:solidFill>
+            <a:schemeClr val="accent2">
+              <a:alpha val="50000"/>
+            </a:schemeClr>
+          </a:solidFill>
+          <a:ln>
+            <a:noFill/>
+          </a:ln>
+        </p:spPr>
+        <p:style>
+          <a:lnRef idx="0">
+            <a:scrgbClr r="0" g="0" b="0"/>
+          </a:lnRef>
+          <a:fillRef idx="0">
+            <a:scrgbClr r="0" g="0" b="0"/>
+          </a:fillRef>
+          <a:effectRef idx="0">
+            <a:scrgbClr r="0" g="0" b="0"/>
+          </a:effectRef>
+          <a:fontRef idx="minor">
+            <a:schemeClr val="lt1"/>
+          </a:fontRef>
+        </p:style>
+        <p:txBody>
+          <a:bodyPr rtlCol="0" anchor="ctr"/>
+          <a:lstStyle/>
+          <a:p>
+            <a:pPr algn="ctr"/>
+            <a:r>
+              <a:rPr lang="en-GB" dirty="0">
+                <a:latin typeface="Bodoni MT" panose="02070603080606020203" pitchFamily="18" charset="0"/>
+              </a:rPr>
+              <a:t>Placeholders</a:t>
+            </a:r>
+          </a:p>
+        </p:txBody>
+      </p:sp>
+      <p:cxnSp>
+        <p:nvCxnSpPr>
+          <p:cNvPr id="15" name="Straight Connector 14">
+            <a:extLst>
+              <a:ext uri="{FF2B5EF4-FFF2-40B4-BE49-F238E27FC236}">
+                <a16:creationId xmlns:a16="http://schemas.microsoft.com/office/drawing/2014/main" id="{30710670-372E-4F34-950F-06F225466007}"/>
+              </a:ext>
+            </a:extLst>
+          </p:cNvPr>
+          <p:cNvCxnSpPr/>
+          <p:nvPr/>
+        </p:nvCxnSpPr>
+        <p:spPr>
+          <a:xfrm>
+            <a:off x="8103765" y="931178"/>
+            <a:ext cx="0" cy="5234730"/>
+          </a:xfrm>
+          <a:prstGeom prst="line">
+            <a:avLst/>
+          </a:prstGeom>
+          <a:ln w="9525" cap="flat" cmpd="sng" algn="ctr">
+            <a:solidFill>
+              <a:schemeClr val="dk1"/>
+            </a:solidFill>
+            <a:prstDash val="dash"/>
+            <a:round/>
+            <a:headEnd type="none" w="med" len="med"/>
+            <a:tailEnd type="none" w="med" len="med"/>
+          </a:ln>
+        </p:spPr>
+        <p:style>
+          <a:lnRef idx="0">
+            <a:scrgbClr r="0" g="0" b="0"/>
+          </a:lnRef>
+          <a:fillRef idx="0">
+            <a:scrgbClr r="0" g="0" b="0"/>
+          </a:fillRef>
+          <a:effectRef idx="0">
+            <a:scrgbClr r="0" g="0" b="0"/>
+          </a:effectRef>
+          <a:fontRef idx="minor">
+            <a:schemeClr val="tx1"/>
+          </a:fontRef>
+        </p:style>
+      </p:cxnSp>
+      <p:cxnSp>
+        <p:nvCxnSpPr>
+          <p:cNvPr id="16" name="Straight Connector 15">
+            <a:extLst>
+              <a:ext uri="{FF2B5EF4-FFF2-40B4-BE49-F238E27FC236}">
+                <a16:creationId xmlns:a16="http://schemas.microsoft.com/office/drawing/2014/main" id="{288054B3-BE24-4398-9D5F-A28183FA7014}"/>
+              </a:ext>
+            </a:extLst>
+          </p:cNvPr>
+          <p:cNvCxnSpPr>
+            <a:cxnSpLocks/>
+          </p:cNvCxnSpPr>
+          <p:nvPr/>
+        </p:nvCxnSpPr>
+        <p:spPr>
+          <a:xfrm>
+            <a:off x="4188901" y="2277406"/>
+            <a:ext cx="0" cy="3888502"/>
+          </a:xfrm>
+          <a:prstGeom prst="line">
+            <a:avLst/>
+          </a:prstGeom>
+          <a:ln w="9525" cap="flat" cmpd="sng" algn="ctr">
+            <a:solidFill>
+              <a:schemeClr val="dk1"/>
+            </a:solidFill>
+            <a:prstDash val="dash"/>
+            <a:round/>
+            <a:headEnd type="none" w="med" len="med"/>
+            <a:tailEnd type="none" w="med" len="med"/>
+          </a:ln>
+        </p:spPr>
+        <p:style>
+          <a:lnRef idx="0">
+            <a:scrgbClr r="0" g="0" b="0"/>
+          </a:lnRef>
+          <a:fillRef idx="0">
+            <a:scrgbClr r="0" g="0" b="0"/>
+          </a:fillRef>
+          <a:effectRef idx="0">
+            <a:scrgbClr r="0" g="0" b="0"/>
+          </a:effectRef>
+          <a:fontRef idx="minor">
+            <a:schemeClr val="tx1"/>
+          </a:fontRef>
+        </p:style>
+      </p:cxnSp>
+      <p:sp>
+        <p:nvSpPr>
+          <p:cNvPr id="17" name="TextBox 16">
+            <a:extLst>
+              <a:ext uri="{FF2B5EF4-FFF2-40B4-BE49-F238E27FC236}">
+                <a16:creationId xmlns:a16="http://schemas.microsoft.com/office/drawing/2014/main" id="{971E6CAA-6D6E-412E-9FD7-5D77D4FC053C}"/>
+              </a:ext>
+            </a:extLst>
+          </p:cNvPr>
+          <p:cNvSpPr txBox="1"/>
+          <p:nvPr/>
+        </p:nvSpPr>
+        <p:spPr>
+          <a:xfrm>
+            <a:off x="9181691" y="1161597"/>
+            <a:ext cx="1115731" cy="369332"/>
+          </a:xfrm>
+          <a:prstGeom prst="rect">
+            <a:avLst/>
+          </a:prstGeom>
+          <a:noFill/>
+        </p:spPr>
+        <p:txBody>
+          <a:bodyPr wrap="square" rtlCol="0">
+            <a:spAutoFit/>
+          </a:bodyPr>
+          <a:lstStyle/>
+          <a:p>
+            <a:r>
+              <a:rPr lang="en-GB" dirty="0">
+                <a:latin typeface="Bodoni MT" panose="02070603080606020203" pitchFamily="18" charset="0"/>
+              </a:rPr>
+              <a:t>Artwork</a:t>
+            </a:r>
+          </a:p>
+        </p:txBody>
+      </p:sp>
+      <p:cxnSp>
+        <p:nvCxnSpPr>
+          <p:cNvPr id="19" name="Straight Connector 18">
+            <a:extLst>
+              <a:ext uri="{FF2B5EF4-FFF2-40B4-BE49-F238E27FC236}">
+                <a16:creationId xmlns:a16="http://schemas.microsoft.com/office/drawing/2014/main" id="{FFECA4B2-B854-4585-9ECA-1FD3048F8E67}"/>
+              </a:ext>
+            </a:extLst>
+          </p:cNvPr>
+          <p:cNvCxnSpPr>
+            <a:cxnSpLocks/>
+          </p:cNvCxnSpPr>
+          <p:nvPr/>
+        </p:nvCxnSpPr>
+        <p:spPr>
+          <a:xfrm>
+            <a:off x="838200" y="2277406"/>
+            <a:ext cx="7260480" cy="0"/>
+          </a:xfrm>
+          <a:prstGeom prst="line">
+            <a:avLst/>
+          </a:prstGeom>
+          <a:ln w="9525" cap="flat" cmpd="sng" algn="ctr">
+            <a:solidFill>
+              <a:schemeClr val="dk1"/>
+            </a:solidFill>
+            <a:prstDash val="dash"/>
+            <a:round/>
+            <a:headEnd type="none" w="med" len="med"/>
+            <a:tailEnd type="none" w="med" len="med"/>
+          </a:ln>
+        </p:spPr>
+        <p:style>
+          <a:lnRef idx="0">
+            <a:scrgbClr r="0" g="0" b="0"/>
+          </a:lnRef>
+          <a:fillRef idx="0">
+            <a:scrgbClr r="0" g="0" b="0"/>
+          </a:fillRef>
+          <a:effectRef idx="0">
+            <a:scrgbClr r="0" g="0" b="0"/>
+          </a:effectRef>
+          <a:fontRef idx="minor">
+            <a:schemeClr val="tx1"/>
+          </a:fontRef>
+        </p:style>
+      </p:cxnSp>
+      <p:cxnSp>
+        <p:nvCxnSpPr>
+          <p:cNvPr id="23" name="Straight Arrow Connector 22">
+            <a:extLst>
+              <a:ext uri="{FF2B5EF4-FFF2-40B4-BE49-F238E27FC236}">
+                <a16:creationId xmlns:a16="http://schemas.microsoft.com/office/drawing/2014/main" id="{7FAC0E52-268B-4550-B064-28EAE19CA4A2}"/>
+              </a:ext>
+            </a:extLst>
+          </p:cNvPr>
+          <p:cNvCxnSpPr>
+            <a:stCxn id="10" idx="6"/>
+          </p:cNvCxnSpPr>
+          <p:nvPr/>
+        </p:nvCxnSpPr>
+        <p:spPr>
+          <a:xfrm flipV="1">
+            <a:off x="5013819" y="1437726"/>
+            <a:ext cx="3095032" cy="1"/>
+          </a:xfrm>
+          <a:prstGeom prst="straightConnector1">
+            <a:avLst/>
+          </a:prstGeom>
+          <a:ln w="9525" cap="flat" cmpd="sng" algn="ctr">
+            <a:solidFill>
+              <a:schemeClr val="dk1"/>
+            </a:solidFill>
+            <a:prstDash val="solid"/>
+            <a:round/>
+            <a:headEnd type="none" w="med" len="med"/>
+            <a:tailEnd type="arrow" w="med" len="med"/>
+          </a:ln>
+        </p:spPr>
+        <p:style>
+          <a:lnRef idx="0">
+            <a:scrgbClr r="0" g="0" b="0"/>
+          </a:lnRef>
+          <a:fillRef idx="0">
+            <a:scrgbClr r="0" g="0" b="0"/>
+          </a:fillRef>
+          <a:effectRef idx="0">
+            <a:scrgbClr r="0" g="0" b="0"/>
+          </a:effectRef>
+          <a:fontRef idx="minor">
+            <a:schemeClr val="tx1"/>
+          </a:fontRef>
+        </p:style>
+      </p:cxnSp>
+      <p:sp>
+        <p:nvSpPr>
+          <p:cNvPr id="24" name="TextBox 23">
+            <a:extLst>
+              <a:ext uri="{FF2B5EF4-FFF2-40B4-BE49-F238E27FC236}">
+                <a16:creationId xmlns:a16="http://schemas.microsoft.com/office/drawing/2014/main" id="{1FB9C7CE-2331-47EB-A1D2-D8DB9B0C2513}"/>
+              </a:ext>
+            </a:extLst>
+          </p:cNvPr>
+          <p:cNvSpPr txBox="1"/>
+          <p:nvPr/>
+        </p:nvSpPr>
+        <p:spPr>
+          <a:xfrm>
+            <a:off x="5416972" y="2291597"/>
+            <a:ext cx="1358053" cy="369332"/>
+          </a:xfrm>
+          <a:prstGeom prst="rect">
+            <a:avLst/>
+          </a:prstGeom>
+          <a:noFill/>
+        </p:spPr>
+        <p:txBody>
+          <a:bodyPr wrap="square" rtlCol="0">
+            <a:spAutoFit/>
+          </a:bodyPr>
+          <a:lstStyle/>
+          <a:p>
+            <a:r>
+              <a:rPr lang="en-GB" dirty="0">
+                <a:latin typeface="Bodoni MT" panose="02070603080606020203" pitchFamily="18" charset="0"/>
+              </a:rPr>
+              <a:t>Platforming</a:t>
+            </a:r>
+          </a:p>
+        </p:txBody>
+      </p:sp>
+      <p:sp>
+        <p:nvSpPr>
+          <p:cNvPr id="25" name="TextBox 24">
+            <a:extLst>
+              <a:ext uri="{FF2B5EF4-FFF2-40B4-BE49-F238E27FC236}">
+                <a16:creationId xmlns:a16="http://schemas.microsoft.com/office/drawing/2014/main" id="{DBBC0D55-02A6-4EDB-AF84-B16D0A2B2E7B}"/>
+              </a:ext>
+            </a:extLst>
+          </p:cNvPr>
+          <p:cNvSpPr txBox="1"/>
+          <p:nvPr/>
+        </p:nvSpPr>
+        <p:spPr>
+          <a:xfrm>
+            <a:off x="3623367" y="1873835"/>
+            <a:ext cx="1178606" cy="369332"/>
+          </a:xfrm>
+          <a:prstGeom prst="rect">
+            <a:avLst/>
+          </a:prstGeom>
+          <a:noFill/>
+        </p:spPr>
+        <p:txBody>
+          <a:bodyPr wrap="square" rtlCol="0">
+            <a:spAutoFit/>
+          </a:bodyPr>
+          <a:lstStyle/>
+          <a:p>
+            <a:r>
+              <a:rPr lang="en-GB" dirty="0">
+                <a:latin typeface="Bodoni MT" panose="02070603080606020203" pitchFamily="18" charset="0"/>
+              </a:rPr>
+              <a:t>Gameplay</a:t>
+            </a:r>
+          </a:p>
+        </p:txBody>
+      </p:sp>
+      <p:sp>
+        <p:nvSpPr>
+          <p:cNvPr id="26" name="TextBox 25">
+            <a:extLst>
+              <a:ext uri="{FF2B5EF4-FFF2-40B4-BE49-F238E27FC236}">
+                <a16:creationId xmlns:a16="http://schemas.microsoft.com/office/drawing/2014/main" id="{C1CD6ED1-DC11-4F49-B765-F575D41091A5}"/>
+              </a:ext>
+            </a:extLst>
+          </p:cNvPr>
+          <p:cNvSpPr txBox="1"/>
+          <p:nvPr/>
+        </p:nvSpPr>
+        <p:spPr>
+          <a:xfrm>
+            <a:off x="1950749" y="2291597"/>
+            <a:ext cx="901480" cy="369332"/>
+          </a:xfrm>
+          <a:prstGeom prst="rect">
+            <a:avLst/>
+          </a:prstGeom>
+          <a:noFill/>
+        </p:spPr>
+        <p:txBody>
+          <a:bodyPr wrap="square" rtlCol="0">
+            <a:spAutoFit/>
+          </a:bodyPr>
+          <a:lstStyle/>
+          <a:p>
+            <a:r>
+              <a:rPr lang="en-GB" dirty="0">
+                <a:latin typeface="Bodoni MT" panose="02070603080606020203" pitchFamily="18" charset="0"/>
+              </a:rPr>
+              <a:t>Puzzles</a:t>
+            </a:r>
+          </a:p>
+        </p:txBody>
+      </p:sp>
+      <p:cxnSp>
+        <p:nvCxnSpPr>
+          <p:cNvPr id="27" name="Straight Arrow Connector 26">
+            <a:extLst>
+              <a:ext uri="{FF2B5EF4-FFF2-40B4-BE49-F238E27FC236}">
+                <a16:creationId xmlns:a16="http://schemas.microsoft.com/office/drawing/2014/main" id="{5E8555D3-376F-417B-8432-5BEEAFCBB21F}"/>
+              </a:ext>
+            </a:extLst>
+          </p:cNvPr>
+          <p:cNvCxnSpPr>
+            <a:cxnSpLocks/>
+            <a:stCxn id="10" idx="5"/>
+            <a:endCxn id="24" idx="0"/>
+          </p:cNvCxnSpPr>
+          <p:nvPr/>
+        </p:nvCxnSpPr>
+        <p:spPr>
+          <a:xfrm>
+            <a:off x="4779168" y="1716802"/>
+            <a:ext cx="1316831" cy="574795"/>
+          </a:xfrm>
+          <a:prstGeom prst="straightConnector1">
+            <a:avLst/>
+          </a:prstGeom>
+          <a:ln w="9525" cap="flat" cmpd="sng" algn="ctr">
+            <a:solidFill>
+              <a:schemeClr val="dk1"/>
+            </a:solidFill>
+            <a:prstDash val="solid"/>
+            <a:round/>
+            <a:headEnd type="none" w="med" len="med"/>
+            <a:tailEnd type="arrow" w="med" len="med"/>
+          </a:ln>
+        </p:spPr>
+        <p:style>
+          <a:lnRef idx="0">
+            <a:scrgbClr r="0" g="0" b="0"/>
+          </a:lnRef>
+          <a:fillRef idx="0">
+            <a:scrgbClr r="0" g="0" b="0"/>
+          </a:fillRef>
+          <a:effectRef idx="0">
+            <a:scrgbClr r="0" g="0" b="0"/>
+          </a:effectRef>
+          <a:fontRef idx="minor">
+            <a:schemeClr val="tx1"/>
+          </a:fontRef>
+        </p:style>
+      </p:cxnSp>
+      <p:cxnSp>
+        <p:nvCxnSpPr>
+          <p:cNvPr id="30" name="Straight Arrow Connector 29">
+            <a:extLst>
+              <a:ext uri="{FF2B5EF4-FFF2-40B4-BE49-F238E27FC236}">
+                <a16:creationId xmlns:a16="http://schemas.microsoft.com/office/drawing/2014/main" id="{183EB38B-BC90-4354-BB70-B17AD571698C}"/>
+              </a:ext>
+            </a:extLst>
+          </p:cNvPr>
+          <p:cNvCxnSpPr>
+            <a:cxnSpLocks/>
+            <a:stCxn id="10" idx="3"/>
+            <a:endCxn id="26" idx="0"/>
+          </p:cNvCxnSpPr>
+          <p:nvPr/>
+        </p:nvCxnSpPr>
+        <p:spPr>
+          <a:xfrm flipH="1">
+            <a:off x="2401489" y="1716802"/>
+            <a:ext cx="1244684" cy="574795"/>
+          </a:xfrm>
+          <a:prstGeom prst="straightConnector1">
+            <a:avLst/>
+          </a:prstGeom>
+          <a:ln w="9525" cap="flat" cmpd="sng" algn="ctr">
+            <a:solidFill>
+              <a:schemeClr val="dk1"/>
+            </a:solidFill>
+            <a:prstDash val="solid"/>
+            <a:round/>
+            <a:headEnd type="none" w="med" len="med"/>
+            <a:tailEnd type="arrow" w="med" len="med"/>
+          </a:ln>
+        </p:spPr>
+        <p:style>
+          <a:lnRef idx="0">
+            <a:scrgbClr r="0" g="0" b="0"/>
+          </a:lnRef>
+          <a:fillRef idx="0">
+            <a:scrgbClr r="0" g="0" b="0"/>
+          </a:fillRef>
+          <a:effectRef idx="0">
+            <a:scrgbClr r="0" g="0" b="0"/>
+          </a:effectRef>
+          <a:fontRef idx="minor">
+            <a:schemeClr val="tx1"/>
+          </a:fontRef>
+        </p:style>
+      </p:cxnSp>
+      <p:sp>
+        <p:nvSpPr>
+          <p:cNvPr id="33" name="Rectangle: Rounded Corners 32">
+            <a:extLst>
+              <a:ext uri="{FF2B5EF4-FFF2-40B4-BE49-F238E27FC236}">
+                <a16:creationId xmlns:a16="http://schemas.microsoft.com/office/drawing/2014/main" id="{5D612AEE-5C5A-45AE-9431-93F8F6FB3305}"/>
+              </a:ext>
+            </a:extLst>
+          </p:cNvPr>
+          <p:cNvSpPr/>
+          <p:nvPr/>
+        </p:nvSpPr>
+        <p:spPr>
+          <a:xfrm>
+            <a:off x="5398154" y="3503638"/>
+            <a:ext cx="1395688" cy="437833"/>
+          </a:xfrm>
+          <a:prstGeom prst="roundRect">
+            <a:avLst/>
+          </a:prstGeom>
+          <a:solidFill>
+            <a:schemeClr val="accent2">
+              <a:alpha val="50000"/>
+            </a:schemeClr>
+          </a:solidFill>
+          <a:ln>
+            <a:noFill/>
+          </a:ln>
+        </p:spPr>
+        <p:style>
+          <a:lnRef idx="0">
+            <a:scrgbClr r="0" g="0" b="0"/>
+          </a:lnRef>
+          <a:fillRef idx="0">
+            <a:scrgbClr r="0" g="0" b="0"/>
+          </a:fillRef>
+          <a:effectRef idx="0">
+            <a:scrgbClr r="0" g="0" b="0"/>
+          </a:effectRef>
+          <a:fontRef idx="minor">
+            <a:schemeClr val="lt1"/>
+          </a:fontRef>
+        </p:style>
+        <p:txBody>
+          <a:bodyPr rtlCol="0" anchor="ctr"/>
+          <a:lstStyle/>
+          <a:p>
+            <a:pPr algn="ctr"/>
+            <a:r>
+              <a:rPr lang="en-GB" dirty="0">
+                <a:latin typeface="Bodoni MT" panose="02070603080606020203" pitchFamily="18" charset="0"/>
+              </a:rPr>
+              <a:t>Collision</a:t>
+            </a:r>
+          </a:p>
+        </p:txBody>
+      </p:sp>
+      <p:sp>
+        <p:nvSpPr>
+          <p:cNvPr id="34" name="Rectangle: Rounded Corners 33">
+            <a:extLst>
+              <a:ext uri="{FF2B5EF4-FFF2-40B4-BE49-F238E27FC236}">
+                <a16:creationId xmlns:a16="http://schemas.microsoft.com/office/drawing/2014/main" id="{5351534C-969F-4206-A607-10E3CBD3EB6E}"/>
+              </a:ext>
+            </a:extLst>
+          </p:cNvPr>
+          <p:cNvSpPr/>
+          <p:nvPr/>
+        </p:nvSpPr>
+        <p:spPr>
+          <a:xfrm>
+            <a:off x="5226759" y="4176274"/>
+            <a:ext cx="1719743" cy="774786"/>
+          </a:xfrm>
+          <a:prstGeom prst="roundRect">
+            <a:avLst/>
+          </a:prstGeom>
+          <a:solidFill>
+            <a:schemeClr val="accent2">
+              <a:alpha val="50000"/>
+            </a:schemeClr>
+          </a:solidFill>
+          <a:ln>
+            <a:noFill/>
+          </a:ln>
+        </p:spPr>
+        <p:style>
+          <a:lnRef idx="0">
+            <a:scrgbClr r="0" g="0" b="0"/>
+          </a:lnRef>
+          <a:fillRef idx="0">
+            <a:scrgbClr r="0" g="0" b="0"/>
+          </a:fillRef>
+          <a:effectRef idx="0">
+            <a:scrgbClr r="0" g="0" b="0"/>
+          </a:effectRef>
+          <a:fontRef idx="minor">
+            <a:schemeClr val="lt1"/>
+          </a:fontRef>
+        </p:style>
+        <p:txBody>
+          <a:bodyPr rtlCol="0" anchor="ctr"/>
+          <a:lstStyle/>
+          <a:p>
+            <a:pPr algn="ctr"/>
+            <a:r>
+              <a:rPr lang="en-GB" dirty="0">
+                <a:latin typeface="Bodoni MT" panose="02070603080606020203" pitchFamily="18" charset="0"/>
+              </a:rPr>
+              <a:t>Platform &amp; Collectables Layout</a:t>
+            </a:r>
+          </a:p>
+        </p:txBody>
+      </p:sp>
+      <p:sp>
+        <p:nvSpPr>
+          <p:cNvPr id="35" name="Rectangle: Rounded Corners 34">
+            <a:extLst>
+              <a:ext uri="{FF2B5EF4-FFF2-40B4-BE49-F238E27FC236}">
+                <a16:creationId xmlns:a16="http://schemas.microsoft.com/office/drawing/2014/main" id="{CC0DB683-0D5F-4A20-8627-22A83FCA57C0}"/>
+              </a:ext>
+            </a:extLst>
+          </p:cNvPr>
+          <p:cNvSpPr/>
+          <p:nvPr/>
+        </p:nvSpPr>
+        <p:spPr>
+          <a:xfrm>
+            <a:off x="5050872" y="5185863"/>
+            <a:ext cx="2093053" cy="566053"/>
+          </a:xfrm>
+          <a:prstGeom prst="roundRect">
+            <a:avLst/>
+          </a:prstGeom>
+          <a:solidFill>
+            <a:schemeClr val="accent2">
+              <a:alpha val="50000"/>
+            </a:schemeClr>
+          </a:solidFill>
+          <a:ln>
+            <a:noFill/>
+          </a:ln>
+        </p:spPr>
+        <p:style>
+          <a:lnRef idx="0">
+            <a:scrgbClr r="0" g="0" b="0"/>
+          </a:lnRef>
+          <a:fillRef idx="0">
+            <a:scrgbClr r="0" g="0" b="0"/>
+          </a:fillRef>
+          <a:effectRef idx="0">
+            <a:scrgbClr r="0" g="0" b="0"/>
+          </a:effectRef>
+          <a:fontRef idx="minor">
+            <a:schemeClr val="lt1"/>
+          </a:fontRef>
+        </p:style>
+        <p:txBody>
+          <a:bodyPr rtlCol="0" anchor="ctr"/>
+          <a:lstStyle/>
+          <a:p>
+            <a:pPr algn="ctr"/>
+            <a:r>
+              <a:rPr lang="en-GB" dirty="0">
+                <a:latin typeface="Bodoni MT" panose="02070603080606020203" pitchFamily="18" charset="0"/>
+              </a:rPr>
+              <a:t>Failure and Success conditions</a:t>
+            </a:r>
+          </a:p>
+        </p:txBody>
+      </p:sp>
+      <p:sp>
+        <p:nvSpPr>
+          <p:cNvPr id="36" name="Rectangle: Rounded Corners 35">
+            <a:extLst>
+              <a:ext uri="{FF2B5EF4-FFF2-40B4-BE49-F238E27FC236}">
+                <a16:creationId xmlns:a16="http://schemas.microsoft.com/office/drawing/2014/main" id="{58471160-97AC-4E81-A948-3E6D85AFAB8E}"/>
+              </a:ext>
+            </a:extLst>
+          </p:cNvPr>
+          <p:cNvSpPr/>
+          <p:nvPr/>
+        </p:nvSpPr>
+        <p:spPr>
+          <a:xfrm>
+            <a:off x="1542683" y="3476465"/>
+            <a:ext cx="1719743" cy="566053"/>
+          </a:xfrm>
+          <a:prstGeom prst="roundRect">
+            <a:avLst/>
+          </a:prstGeom>
+          <a:solidFill>
+            <a:schemeClr val="accent2">
+              <a:alpha val="50000"/>
+            </a:schemeClr>
+          </a:solidFill>
+          <a:ln>
+            <a:noFill/>
+          </a:ln>
+        </p:spPr>
+        <p:style>
+          <a:lnRef idx="0">
+            <a:scrgbClr r="0" g="0" b="0"/>
+          </a:lnRef>
+          <a:fillRef idx="0">
+            <a:scrgbClr r="0" g="0" b="0"/>
+          </a:fillRef>
+          <a:effectRef idx="0">
+            <a:scrgbClr r="0" g="0" b="0"/>
+          </a:effectRef>
+          <a:fontRef idx="minor">
+            <a:schemeClr val="lt1"/>
+          </a:fontRef>
+        </p:style>
+        <p:txBody>
+          <a:bodyPr rtlCol="0" anchor="ctr"/>
+          <a:lstStyle/>
+          <a:p>
+            <a:pPr algn="ctr"/>
+            <a:r>
+              <a:rPr lang="en-GB" dirty="0">
+                <a:latin typeface="Bodoni MT" panose="02070603080606020203" pitchFamily="18" charset="0"/>
+              </a:rPr>
+              <a:t>Specification for each puzzle</a:t>
+            </a:r>
+          </a:p>
+        </p:txBody>
+      </p:sp>
+      <p:sp>
+        <p:nvSpPr>
+          <p:cNvPr id="37" name="Rectangle: Rounded Corners 36">
+            <a:extLst>
+              <a:ext uri="{FF2B5EF4-FFF2-40B4-BE49-F238E27FC236}">
+                <a16:creationId xmlns:a16="http://schemas.microsoft.com/office/drawing/2014/main" id="{92E98563-DB25-47E0-BFE7-B8A52201AFBF}"/>
+              </a:ext>
+            </a:extLst>
+          </p:cNvPr>
+          <p:cNvSpPr/>
+          <p:nvPr/>
+        </p:nvSpPr>
+        <p:spPr>
+          <a:xfrm>
+            <a:off x="1536673" y="4280640"/>
+            <a:ext cx="1719743" cy="566053"/>
+          </a:xfrm>
+          <a:prstGeom prst="roundRect">
+            <a:avLst/>
+          </a:prstGeom>
+          <a:solidFill>
+            <a:schemeClr val="accent2">
+              <a:alpha val="50000"/>
+            </a:schemeClr>
+          </a:solidFill>
+          <a:ln>
+            <a:noFill/>
+          </a:ln>
+        </p:spPr>
+        <p:style>
+          <a:lnRef idx="0">
+            <a:scrgbClr r="0" g="0" b="0"/>
+          </a:lnRef>
+          <a:fillRef idx="0">
+            <a:scrgbClr r="0" g="0" b="0"/>
+          </a:fillRef>
+          <a:effectRef idx="0">
+            <a:scrgbClr r="0" g="0" b="0"/>
+          </a:effectRef>
+          <a:fontRef idx="minor">
+            <a:schemeClr val="lt1"/>
+          </a:fontRef>
+        </p:style>
+        <p:txBody>
+          <a:bodyPr rtlCol="0" anchor="ctr"/>
+          <a:lstStyle/>
+          <a:p>
+            <a:pPr algn="ctr"/>
+            <a:r>
+              <a:rPr lang="en-GB" dirty="0">
+                <a:latin typeface="Bodoni MT" panose="02070603080606020203" pitchFamily="18" charset="0"/>
+              </a:rPr>
+              <a:t>Puzzle Interaction</a:t>
+            </a:r>
+          </a:p>
+        </p:txBody>
+      </p:sp>
+      <p:sp>
+        <p:nvSpPr>
+          <p:cNvPr id="38" name="Rectangle: Rounded Corners 37">
+            <a:extLst>
+              <a:ext uri="{FF2B5EF4-FFF2-40B4-BE49-F238E27FC236}">
+                <a16:creationId xmlns:a16="http://schemas.microsoft.com/office/drawing/2014/main" id="{F9DE6B22-A874-4C5B-A2F4-37E624346379}"/>
+              </a:ext>
+            </a:extLst>
+          </p:cNvPr>
+          <p:cNvSpPr/>
+          <p:nvPr/>
+        </p:nvSpPr>
+        <p:spPr>
+          <a:xfrm>
+            <a:off x="1555617" y="5079841"/>
+            <a:ext cx="1719743" cy="566053"/>
+          </a:xfrm>
+          <a:prstGeom prst="roundRect">
+            <a:avLst/>
+          </a:prstGeom>
+          <a:solidFill>
+            <a:schemeClr val="accent2">
+              <a:alpha val="50000"/>
+            </a:schemeClr>
+          </a:solidFill>
+          <a:ln>
+            <a:noFill/>
+          </a:ln>
+        </p:spPr>
+        <p:style>
+          <a:lnRef idx="0">
+            <a:scrgbClr r="0" g="0" b="0"/>
+          </a:lnRef>
+          <a:fillRef idx="0">
+            <a:scrgbClr r="0" g="0" b="0"/>
+          </a:fillRef>
+          <a:effectRef idx="0">
+            <a:scrgbClr r="0" g="0" b="0"/>
+          </a:effectRef>
+          <a:fontRef idx="minor">
+            <a:schemeClr val="lt1"/>
+          </a:fontRef>
+        </p:style>
+        <p:txBody>
+          <a:bodyPr rtlCol="0" anchor="ctr"/>
+          <a:lstStyle/>
+          <a:p>
+            <a:pPr algn="ctr"/>
+            <a:r>
+              <a:rPr lang="en-GB" dirty="0">
+                <a:latin typeface="Bodoni MT" panose="02070603080606020203" pitchFamily="18" charset="0"/>
+              </a:rPr>
+              <a:t>Success Conditions</a:t>
+            </a:r>
+          </a:p>
+        </p:txBody>
+      </p:sp>
+      <p:sp>
+        <p:nvSpPr>
+          <p:cNvPr id="39" name="Rectangle: Rounded Corners 38">
+            <a:extLst>
+              <a:ext uri="{FF2B5EF4-FFF2-40B4-BE49-F238E27FC236}">
+                <a16:creationId xmlns:a16="http://schemas.microsoft.com/office/drawing/2014/main" id="{EB977FAA-DCA6-4B55-ACC4-847FBF97687B}"/>
+              </a:ext>
+            </a:extLst>
+          </p:cNvPr>
+          <p:cNvSpPr/>
+          <p:nvPr/>
+        </p:nvSpPr>
+        <p:spPr>
+          <a:xfrm>
+            <a:off x="8878346" y="2544729"/>
+            <a:ext cx="1719743" cy="566053"/>
+          </a:xfrm>
+          <a:prstGeom prst="roundRect">
+            <a:avLst/>
+          </a:prstGeom>
+          <a:solidFill>
+            <a:schemeClr val="accent2">
+              <a:alpha val="50000"/>
+            </a:schemeClr>
+          </a:solidFill>
+          <a:ln>
+            <a:noFill/>
+          </a:ln>
+        </p:spPr>
+        <p:style>
+          <a:lnRef idx="0">
+            <a:scrgbClr r="0" g="0" b="0"/>
+          </a:lnRef>
+          <a:fillRef idx="0">
+            <a:scrgbClr r="0" g="0" b="0"/>
+          </a:fillRef>
+          <a:effectRef idx="0">
+            <a:scrgbClr r="0" g="0" b="0"/>
+          </a:effectRef>
+          <a:fontRef idx="minor">
+            <a:schemeClr val="lt1"/>
+          </a:fontRef>
+        </p:style>
+        <p:txBody>
+          <a:bodyPr rtlCol="0" anchor="ctr"/>
+          <a:lstStyle/>
+          <a:p>
+            <a:pPr algn="ctr"/>
+            <a:r>
+              <a:rPr lang="en-GB" dirty="0">
+                <a:latin typeface="Bodoni MT" panose="02070603080606020203" pitchFamily="18" charset="0"/>
+              </a:rPr>
+              <a:t>Sprites</a:t>
+            </a:r>
+          </a:p>
+        </p:txBody>
+      </p:sp>
+      <p:sp>
+        <p:nvSpPr>
+          <p:cNvPr id="40" name="Rectangle: Rounded Corners 39">
+            <a:extLst>
+              <a:ext uri="{FF2B5EF4-FFF2-40B4-BE49-F238E27FC236}">
+                <a16:creationId xmlns:a16="http://schemas.microsoft.com/office/drawing/2014/main" id="{57387805-6EE0-4686-A3AD-F33DE6D3DA9D}"/>
+              </a:ext>
+            </a:extLst>
+          </p:cNvPr>
+          <p:cNvSpPr/>
+          <p:nvPr/>
+        </p:nvSpPr>
+        <p:spPr>
+          <a:xfrm>
+            <a:off x="8868420" y="3308862"/>
+            <a:ext cx="1719743" cy="566053"/>
+          </a:xfrm>
+          <a:prstGeom prst="roundRect">
+            <a:avLst/>
+          </a:prstGeom>
+          <a:solidFill>
+            <a:schemeClr val="accent2">
+              <a:alpha val="50000"/>
+            </a:schemeClr>
+          </a:solidFill>
+          <a:ln>
+            <a:noFill/>
+          </a:ln>
+        </p:spPr>
+        <p:style>
+          <a:lnRef idx="0">
+            <a:scrgbClr r="0" g="0" b="0"/>
+          </a:lnRef>
+          <a:fillRef idx="0">
+            <a:scrgbClr r="0" g="0" b="0"/>
+          </a:fillRef>
+          <a:effectRef idx="0">
+            <a:scrgbClr r="0" g="0" b="0"/>
+          </a:effectRef>
+          <a:fontRef idx="minor">
+            <a:schemeClr val="lt1"/>
+          </a:fontRef>
+        </p:style>
+        <p:txBody>
+          <a:bodyPr rtlCol="0" anchor="ctr"/>
+          <a:lstStyle/>
+          <a:p>
+            <a:pPr algn="ctr"/>
+            <a:r>
+              <a:rPr lang="en-GB" dirty="0">
+                <a:latin typeface="Bodoni MT" panose="02070603080606020203" pitchFamily="18" charset="0"/>
+              </a:rPr>
+              <a:t>Backgrounds &amp; Platforms</a:t>
+            </a:r>
+          </a:p>
+        </p:txBody>
+      </p:sp>
+      <p:sp>
+        <p:nvSpPr>
+          <p:cNvPr id="41" name="Rectangle: Rounded Corners 40">
+            <a:extLst>
+              <a:ext uri="{FF2B5EF4-FFF2-40B4-BE49-F238E27FC236}">
+                <a16:creationId xmlns:a16="http://schemas.microsoft.com/office/drawing/2014/main" id="{0AF77ADA-8652-49EA-87E9-2EBD25A9D60F}"/>
+              </a:ext>
+            </a:extLst>
+          </p:cNvPr>
+          <p:cNvSpPr/>
+          <p:nvPr/>
+        </p:nvSpPr>
+        <p:spPr>
+          <a:xfrm>
+            <a:off x="8878345" y="4072997"/>
+            <a:ext cx="1719743" cy="566053"/>
+          </a:xfrm>
+          <a:prstGeom prst="roundRect">
+            <a:avLst/>
+          </a:prstGeom>
+          <a:solidFill>
+            <a:schemeClr val="accent2">
+              <a:alpha val="50000"/>
+            </a:schemeClr>
+          </a:solidFill>
+          <a:ln>
+            <a:noFill/>
+          </a:ln>
+        </p:spPr>
+        <p:style>
+          <a:lnRef idx="0">
+            <a:scrgbClr r="0" g="0" b="0"/>
+          </a:lnRef>
+          <a:fillRef idx="0">
+            <a:scrgbClr r="0" g="0" b="0"/>
+          </a:fillRef>
+          <a:effectRef idx="0">
+            <a:scrgbClr r="0" g="0" b="0"/>
+          </a:effectRef>
+          <a:fontRef idx="minor">
+            <a:schemeClr val="lt1"/>
+          </a:fontRef>
+        </p:style>
+        <p:txBody>
+          <a:bodyPr rtlCol="0" anchor="ctr"/>
+          <a:lstStyle/>
+          <a:p>
+            <a:pPr algn="ctr"/>
+            <a:r>
+              <a:rPr lang="en-GB" dirty="0">
+                <a:latin typeface="Bodoni MT" panose="02070603080606020203" pitchFamily="18" charset="0"/>
+              </a:rPr>
+              <a:t>Puzzle Tiles</a:t>
+            </a:r>
+          </a:p>
+        </p:txBody>
+      </p:sp>
+      <p:cxnSp>
+        <p:nvCxnSpPr>
+          <p:cNvPr id="42" name="Straight Arrow Connector 41">
+            <a:extLst>
+              <a:ext uri="{FF2B5EF4-FFF2-40B4-BE49-F238E27FC236}">
+                <a16:creationId xmlns:a16="http://schemas.microsoft.com/office/drawing/2014/main" id="{37A39690-B33F-4ED6-BE2F-C59BC2ABAA73}"/>
+              </a:ext>
+            </a:extLst>
+          </p:cNvPr>
+          <p:cNvCxnSpPr>
+            <a:cxnSpLocks/>
+            <a:endCxn id="39" idx="3"/>
+          </p:cNvCxnSpPr>
+          <p:nvPr/>
+        </p:nvCxnSpPr>
+        <p:spPr>
+          <a:xfrm flipH="1">
+            <a:off x="10598089" y="2827755"/>
+            <a:ext cx="261108" cy="1"/>
+          </a:xfrm>
+          <a:prstGeom prst="straightConnector1">
+            <a:avLst/>
+          </a:prstGeom>
+          <a:ln w="9525" cap="flat" cmpd="sng" algn="ctr">
+            <a:solidFill>
+              <a:schemeClr val="dk1"/>
+            </a:solidFill>
+            <a:prstDash val="solid"/>
+            <a:round/>
+            <a:headEnd type="none" w="med" len="med"/>
+            <a:tailEnd type="arrow" w="med" len="med"/>
+          </a:ln>
+        </p:spPr>
+        <p:style>
+          <a:lnRef idx="0">
+            <a:scrgbClr r="0" g="0" b="0"/>
+          </a:lnRef>
+          <a:fillRef idx="0">
+            <a:scrgbClr r="0" g="0" b="0"/>
+          </a:fillRef>
+          <a:effectRef idx="0">
+            <a:scrgbClr r="0" g="0" b="0"/>
+          </a:effectRef>
+          <a:fontRef idx="minor">
+            <a:schemeClr val="tx1"/>
+          </a:fontRef>
+        </p:style>
+      </p:cxnSp>
+      <p:cxnSp>
+        <p:nvCxnSpPr>
+          <p:cNvPr id="49" name="Connector: Elbow 48">
+            <a:extLst>
+              <a:ext uri="{FF2B5EF4-FFF2-40B4-BE49-F238E27FC236}">
+                <a16:creationId xmlns:a16="http://schemas.microsoft.com/office/drawing/2014/main" id="{6F018749-49F9-4969-A271-C3C29767FD5C}"/>
+              </a:ext>
+            </a:extLst>
+          </p:cNvPr>
+          <p:cNvCxnSpPr>
+            <a:cxnSpLocks/>
+            <a:stCxn id="13" idx="3"/>
+          </p:cNvCxnSpPr>
+          <p:nvPr/>
+        </p:nvCxnSpPr>
+        <p:spPr>
+          <a:xfrm>
+            <a:off x="10598090" y="1994380"/>
+            <a:ext cx="261107" cy="2352818"/>
+          </a:xfrm>
+          <a:prstGeom prst="bentConnector2">
+            <a:avLst/>
+          </a:prstGeom>
+          <a:ln w="9525" cap="flat" cmpd="sng" algn="ctr">
+            <a:solidFill>
+              <a:schemeClr val="dk1"/>
+            </a:solidFill>
+            <a:prstDash val="solid"/>
+            <a:round/>
+            <a:headEnd type="none" w="med" len="med"/>
+            <a:tailEnd type="arrow" w="med" len="med"/>
+          </a:ln>
+        </p:spPr>
+        <p:style>
+          <a:lnRef idx="0">
+            <a:scrgbClr r="0" g="0" b="0"/>
+          </a:lnRef>
+          <a:fillRef idx="0">
+            <a:scrgbClr r="0" g="0" b="0"/>
+          </a:fillRef>
+          <a:effectRef idx="0">
+            <a:scrgbClr r="0" g="0" b="0"/>
+          </a:effectRef>
+          <a:fontRef idx="minor">
+            <a:schemeClr val="tx1"/>
+          </a:fontRef>
+        </p:style>
+      </p:cxnSp>
+      <p:cxnSp>
+        <p:nvCxnSpPr>
+          <p:cNvPr id="51" name="Straight Arrow Connector 50">
+            <a:extLst>
+              <a:ext uri="{FF2B5EF4-FFF2-40B4-BE49-F238E27FC236}">
+                <a16:creationId xmlns:a16="http://schemas.microsoft.com/office/drawing/2014/main" id="{529BEA91-D614-4620-8E3D-97946455F9B8}"/>
+              </a:ext>
+            </a:extLst>
+          </p:cNvPr>
+          <p:cNvCxnSpPr>
+            <a:cxnSpLocks/>
+            <a:endCxn id="40" idx="3"/>
+          </p:cNvCxnSpPr>
+          <p:nvPr/>
+        </p:nvCxnSpPr>
+        <p:spPr>
+          <a:xfrm flipH="1">
+            <a:off x="10588163" y="3591889"/>
+            <a:ext cx="271034" cy="0"/>
+          </a:xfrm>
+          <a:prstGeom prst="straightConnector1">
+            <a:avLst/>
+          </a:prstGeom>
+          <a:ln w="9525" cap="flat" cmpd="sng" algn="ctr">
+            <a:solidFill>
+              <a:schemeClr val="dk1"/>
+            </a:solidFill>
+            <a:prstDash val="solid"/>
+            <a:round/>
+            <a:headEnd type="none" w="med" len="med"/>
+            <a:tailEnd type="arrow" w="med" len="med"/>
+          </a:ln>
+        </p:spPr>
+        <p:style>
+          <a:lnRef idx="0">
+            <a:scrgbClr r="0" g="0" b="0"/>
+          </a:lnRef>
+          <a:fillRef idx="0">
+            <a:scrgbClr r="0" g="0" b="0"/>
+          </a:fillRef>
+          <a:effectRef idx="0">
+            <a:scrgbClr r="0" g="0" b="0"/>
+          </a:effectRef>
+          <a:fontRef idx="minor">
+            <a:schemeClr val="tx1"/>
+          </a:fontRef>
+        </p:style>
+      </p:cxnSp>
+      <p:cxnSp>
+        <p:nvCxnSpPr>
+          <p:cNvPr id="52" name="Straight Arrow Connector 51">
+            <a:extLst>
+              <a:ext uri="{FF2B5EF4-FFF2-40B4-BE49-F238E27FC236}">
+                <a16:creationId xmlns:a16="http://schemas.microsoft.com/office/drawing/2014/main" id="{5B84C7E6-A42F-4657-A73B-3CBEE18B7E6F}"/>
+              </a:ext>
+            </a:extLst>
+          </p:cNvPr>
+          <p:cNvCxnSpPr>
+            <a:cxnSpLocks/>
+          </p:cNvCxnSpPr>
+          <p:nvPr/>
+        </p:nvCxnSpPr>
+        <p:spPr>
+          <a:xfrm flipH="1">
+            <a:off x="10598089" y="4347198"/>
+            <a:ext cx="261108" cy="1"/>
+          </a:xfrm>
+          <a:prstGeom prst="straightConnector1">
+            <a:avLst/>
+          </a:prstGeom>
+          <a:ln w="9525" cap="flat" cmpd="sng" algn="ctr">
+            <a:solidFill>
+              <a:schemeClr val="dk1"/>
+            </a:solidFill>
+            <a:prstDash val="solid"/>
+            <a:round/>
+            <a:headEnd type="none" w="med" len="med"/>
+            <a:tailEnd type="arrow" w="med" len="med"/>
+          </a:ln>
+        </p:spPr>
+        <p:style>
+          <a:lnRef idx="0">
+            <a:scrgbClr r="0" g="0" b="0"/>
+          </a:lnRef>
+          <a:fillRef idx="0">
+            <a:scrgbClr r="0" g="0" b="0"/>
+          </a:fillRef>
+          <a:effectRef idx="0">
+            <a:scrgbClr r="0" g="0" b="0"/>
+          </a:effectRef>
+          <a:fontRef idx="minor">
+            <a:schemeClr val="tx1"/>
+          </a:fontRef>
+        </p:style>
+      </p:cxnSp>
+      <p:cxnSp>
+        <p:nvCxnSpPr>
+          <p:cNvPr id="55" name="Connector: Elbow 54">
+            <a:extLst>
+              <a:ext uri="{FF2B5EF4-FFF2-40B4-BE49-F238E27FC236}">
+                <a16:creationId xmlns:a16="http://schemas.microsoft.com/office/drawing/2014/main" id="{0EC221BA-BD1E-4AE7-B1B2-90EE3720F5FB}"/>
+              </a:ext>
+            </a:extLst>
+          </p:cNvPr>
+          <p:cNvCxnSpPr>
+            <a:stCxn id="39" idx="1"/>
+          </p:cNvCxnSpPr>
+          <p:nvPr/>
+        </p:nvCxnSpPr>
+        <p:spPr>
+          <a:xfrm rot="10800000" flipV="1">
+            <a:off x="7843706" y="2827755"/>
+            <a:ext cx="1034640" cy="764133"/>
+          </a:xfrm>
+          <a:prstGeom prst="bentConnector3">
+            <a:avLst/>
+          </a:prstGeom>
+          <a:ln w="9525" cap="flat" cmpd="sng" algn="ctr">
+            <a:solidFill>
+              <a:schemeClr val="dk1"/>
+            </a:solidFill>
+            <a:prstDash val="solid"/>
+            <a:round/>
+            <a:headEnd type="none" w="med" len="med"/>
+            <a:tailEnd type="arrow" w="med" len="med"/>
+          </a:ln>
+        </p:spPr>
+        <p:style>
+          <a:lnRef idx="0">
+            <a:scrgbClr r="0" g="0" b="0"/>
+          </a:lnRef>
+          <a:fillRef idx="0">
+            <a:scrgbClr r="0" g="0" b="0"/>
+          </a:fillRef>
+          <a:effectRef idx="0">
+            <a:scrgbClr r="0" g="0" b="0"/>
+          </a:effectRef>
+          <a:fontRef idx="minor">
+            <a:schemeClr val="tx1"/>
+          </a:fontRef>
+        </p:style>
+      </p:cxnSp>
+      <p:cxnSp>
+        <p:nvCxnSpPr>
+          <p:cNvPr id="56" name="Connector: Elbow 55">
+            <a:extLst>
+              <a:ext uri="{FF2B5EF4-FFF2-40B4-BE49-F238E27FC236}">
+                <a16:creationId xmlns:a16="http://schemas.microsoft.com/office/drawing/2014/main" id="{7ED8B67D-2C95-4C7F-B66D-35ED490532B0}"/>
+              </a:ext>
+            </a:extLst>
+          </p:cNvPr>
+          <p:cNvCxnSpPr>
+            <a:cxnSpLocks/>
+            <a:stCxn id="41" idx="1"/>
+          </p:cNvCxnSpPr>
+          <p:nvPr/>
+        </p:nvCxnSpPr>
+        <p:spPr>
+          <a:xfrm rot="10800000">
+            <a:off x="8363825" y="3583066"/>
+            <a:ext cx="514521" cy="772958"/>
+          </a:xfrm>
+          <a:prstGeom prst="bentConnector2">
+            <a:avLst/>
+          </a:prstGeom>
+          <a:ln w="9525" cap="flat" cmpd="sng" algn="ctr">
+            <a:solidFill>
+              <a:schemeClr val="dk1"/>
+            </a:solidFill>
+            <a:prstDash val="solid"/>
+            <a:round/>
+            <a:headEnd type="none" w="med" len="med"/>
+            <a:tailEnd type="arrow" w="med" len="med"/>
+          </a:ln>
+        </p:spPr>
+        <p:style>
+          <a:lnRef idx="0">
+            <a:scrgbClr r="0" g="0" b="0"/>
+          </a:lnRef>
+          <a:fillRef idx="0">
+            <a:scrgbClr r="0" g="0" b="0"/>
+          </a:fillRef>
+          <a:effectRef idx="0">
+            <a:scrgbClr r="0" g="0" b="0"/>
+          </a:effectRef>
+          <a:fontRef idx="minor">
+            <a:schemeClr val="tx1"/>
+          </a:fontRef>
+        </p:style>
+      </p:cxnSp>
+      <p:cxnSp>
+        <p:nvCxnSpPr>
+          <p:cNvPr id="60" name="Straight Connector 59">
+            <a:extLst>
+              <a:ext uri="{FF2B5EF4-FFF2-40B4-BE49-F238E27FC236}">
+                <a16:creationId xmlns:a16="http://schemas.microsoft.com/office/drawing/2014/main" id="{2DE7001C-61A4-4D8C-9487-D0519BB5C287}"/>
+              </a:ext>
+            </a:extLst>
+          </p:cNvPr>
+          <p:cNvCxnSpPr>
+            <a:cxnSpLocks/>
+            <a:stCxn id="40" idx="1"/>
+          </p:cNvCxnSpPr>
+          <p:nvPr/>
+        </p:nvCxnSpPr>
+        <p:spPr>
+          <a:xfrm flipH="1">
+            <a:off x="8353898" y="3591889"/>
+            <a:ext cx="514522" cy="0"/>
+          </a:xfrm>
+          <a:prstGeom prst="line">
+            <a:avLst/>
+          </a:prstGeom>
+        </p:spPr>
+        <p:style>
+          <a:lnRef idx="1">
+            <a:schemeClr val="dk1"/>
+          </a:lnRef>
+          <a:fillRef idx="0">
+            <a:schemeClr val="dk1"/>
+          </a:fillRef>
+          <a:effectRef idx="0">
+            <a:schemeClr val="dk1"/>
+          </a:effectRef>
+          <a:fontRef idx="minor">
+            <a:schemeClr val="tx1"/>
+          </a:fontRef>
+        </p:style>
+      </p:cxnSp>
+      <p:cxnSp>
+        <p:nvCxnSpPr>
+          <p:cNvPr id="67" name="Connector: Elbow 66">
+            <a:extLst>
+              <a:ext uri="{FF2B5EF4-FFF2-40B4-BE49-F238E27FC236}">
+                <a16:creationId xmlns:a16="http://schemas.microsoft.com/office/drawing/2014/main" id="{9BE8C34A-75B0-466E-B230-A6AA0EF6FF90}"/>
+              </a:ext>
+            </a:extLst>
+          </p:cNvPr>
+          <p:cNvCxnSpPr>
+            <a:cxnSpLocks/>
+            <a:endCxn id="11" idx="3"/>
+          </p:cNvCxnSpPr>
+          <p:nvPr/>
+        </p:nvCxnSpPr>
+        <p:spPr>
+          <a:xfrm rot="10800000">
+            <a:off x="3262426" y="2958148"/>
+            <a:ext cx="4581280" cy="624919"/>
+          </a:xfrm>
+          <a:prstGeom prst="bentConnector3">
+            <a:avLst>
+              <a:gd name="adj1" fmla="val 13926"/>
+            </a:avLst>
+          </a:prstGeom>
+          <a:ln w="9525" cap="flat" cmpd="sng" algn="ctr">
+            <a:solidFill>
+              <a:schemeClr val="dk1"/>
+            </a:solidFill>
+            <a:prstDash val="solid"/>
+            <a:round/>
+            <a:headEnd type="none" w="med" len="med"/>
+            <a:tailEnd type="arrow" w="med" len="med"/>
+          </a:ln>
+        </p:spPr>
+        <p:style>
+          <a:lnRef idx="0">
+            <a:scrgbClr r="0" g="0" b="0"/>
+          </a:lnRef>
+          <a:fillRef idx="0">
+            <a:scrgbClr r="0" g="0" b="0"/>
+          </a:fillRef>
+          <a:effectRef idx="0">
+            <a:scrgbClr r="0" g="0" b="0"/>
+          </a:effectRef>
+          <a:fontRef idx="minor">
+            <a:schemeClr val="tx1"/>
+          </a:fontRef>
+        </p:style>
+      </p:cxnSp>
+      <p:cxnSp>
+        <p:nvCxnSpPr>
+          <p:cNvPr id="66" name="Connector: Elbow 65">
+            <a:extLst>
+              <a:ext uri="{FF2B5EF4-FFF2-40B4-BE49-F238E27FC236}">
+                <a16:creationId xmlns:a16="http://schemas.microsoft.com/office/drawing/2014/main" id="{2B6EBE20-55B6-4C79-AC8D-3D2DEACD0F27}"/>
+              </a:ext>
+            </a:extLst>
+          </p:cNvPr>
+          <p:cNvCxnSpPr>
+            <a:endCxn id="34" idx="3"/>
+          </p:cNvCxnSpPr>
+          <p:nvPr/>
+        </p:nvCxnSpPr>
+        <p:spPr>
+          <a:xfrm rot="5400000">
+            <a:off x="6909215" y="3629175"/>
+            <a:ext cx="971779" cy="897204"/>
+          </a:xfrm>
+          <a:prstGeom prst="bentConnector2">
+            <a:avLst/>
+          </a:prstGeom>
+          <a:ln w="9525" cap="flat" cmpd="sng" algn="ctr">
+            <a:solidFill>
+              <a:schemeClr val="dk1"/>
+            </a:solidFill>
+            <a:prstDash val="solid"/>
+            <a:round/>
+            <a:headEnd type="none" w="med" len="med"/>
+            <a:tailEnd type="arrow" w="med" len="med"/>
+          </a:ln>
+        </p:spPr>
+        <p:style>
+          <a:lnRef idx="0">
+            <a:scrgbClr r="0" g="0" b="0"/>
+          </a:lnRef>
+          <a:fillRef idx="0">
+            <a:scrgbClr r="0" g="0" b="0"/>
+          </a:fillRef>
+          <a:effectRef idx="0">
+            <a:scrgbClr r="0" g="0" b="0"/>
+          </a:effectRef>
+          <a:fontRef idx="minor">
+            <a:schemeClr val="tx1"/>
+          </a:fontRef>
+        </p:style>
+      </p:cxnSp>
+      <p:sp>
+        <p:nvSpPr>
+          <p:cNvPr id="12" name="Rectangle: Rounded Corners 11">
+            <a:extLst>
+              <a:ext uri="{FF2B5EF4-FFF2-40B4-BE49-F238E27FC236}">
+                <a16:creationId xmlns:a16="http://schemas.microsoft.com/office/drawing/2014/main" id="{0EF29BEE-62BD-4987-BA52-D89AE53A8B33}"/>
+              </a:ext>
+            </a:extLst>
+          </p:cNvPr>
+          <p:cNvSpPr/>
+          <p:nvPr/>
+        </p:nvSpPr>
+        <p:spPr>
+          <a:xfrm>
+            <a:off x="5236128" y="2696279"/>
+            <a:ext cx="1719743" cy="566053"/>
+          </a:xfrm>
+          <a:prstGeom prst="roundRect">
+            <a:avLst/>
+          </a:prstGeom>
+          <a:solidFill>
+            <a:srgbClr val="F6BE98"/>
+          </a:solidFill>
+          <a:ln>
+            <a:noFill/>
+          </a:ln>
+        </p:spPr>
+        <p:style>
+          <a:lnRef idx="0">
+            <a:scrgbClr r="0" g="0" b="0"/>
+          </a:lnRef>
+          <a:fillRef idx="0">
+            <a:scrgbClr r="0" g="0" b="0"/>
+          </a:fillRef>
+          <a:effectRef idx="0">
+            <a:scrgbClr r="0" g="0" b="0"/>
+          </a:effectRef>
+          <a:fontRef idx="minor">
+            <a:schemeClr val="lt1"/>
+          </a:fontRef>
+        </p:style>
+        <p:txBody>
+          <a:bodyPr rtlCol="0" anchor="ctr"/>
+          <a:lstStyle/>
+          <a:p>
+            <a:pPr algn="ctr"/>
+            <a:r>
+              <a:rPr lang="en-GB" dirty="0">
+                <a:latin typeface="Bodoni MT" panose="02070603080606020203" pitchFamily="18" charset="0"/>
+              </a:rPr>
+              <a:t>Character Movement</a:t>
+            </a:r>
+          </a:p>
+        </p:txBody>
+      </p:sp>
+      <p:cxnSp>
+        <p:nvCxnSpPr>
+          <p:cNvPr id="73" name="Straight Arrow Connector 72">
+            <a:extLst>
+              <a:ext uri="{FF2B5EF4-FFF2-40B4-BE49-F238E27FC236}">
+                <a16:creationId xmlns:a16="http://schemas.microsoft.com/office/drawing/2014/main" id="{69C2A71F-34B3-45C5-B5C2-CAD80873AAD3}"/>
+              </a:ext>
+            </a:extLst>
+          </p:cNvPr>
+          <p:cNvCxnSpPr>
+            <a:cxnSpLocks/>
+            <a:stCxn id="12" idx="2"/>
+            <a:endCxn id="33" idx="0"/>
+          </p:cNvCxnSpPr>
+          <p:nvPr/>
+        </p:nvCxnSpPr>
+        <p:spPr>
+          <a:xfrm flipH="1">
+            <a:off x="6095998" y="3262332"/>
+            <a:ext cx="2" cy="241306"/>
+          </a:xfrm>
+          <a:prstGeom prst="straightConnector1">
+            <a:avLst/>
+          </a:prstGeom>
+          <a:ln w="9525" cap="flat" cmpd="sng" algn="ctr">
+            <a:solidFill>
+              <a:schemeClr val="dk1"/>
+            </a:solidFill>
+            <a:prstDash val="solid"/>
+            <a:round/>
+            <a:headEnd type="none" w="med" len="med"/>
+            <a:tailEnd type="arrow" w="med" len="med"/>
+          </a:ln>
+        </p:spPr>
+        <p:style>
+          <a:lnRef idx="0">
+            <a:scrgbClr r="0" g="0" b="0"/>
+          </a:lnRef>
+          <a:fillRef idx="0">
+            <a:scrgbClr r="0" g="0" b="0"/>
+          </a:fillRef>
+          <a:effectRef idx="0">
+            <a:scrgbClr r="0" g="0" b="0"/>
+          </a:effectRef>
+          <a:fontRef idx="minor">
+            <a:schemeClr val="tx1"/>
+          </a:fontRef>
+        </p:style>
+      </p:cxnSp>
+      <p:cxnSp>
+        <p:nvCxnSpPr>
+          <p:cNvPr id="77" name="Straight Arrow Connector 76">
+            <a:extLst>
+              <a:ext uri="{FF2B5EF4-FFF2-40B4-BE49-F238E27FC236}">
+                <a16:creationId xmlns:a16="http://schemas.microsoft.com/office/drawing/2014/main" id="{57464C7E-A3BB-4249-922D-CFCFCCBF91D6}"/>
+              </a:ext>
+            </a:extLst>
+          </p:cNvPr>
+          <p:cNvCxnSpPr>
+            <a:cxnSpLocks/>
+          </p:cNvCxnSpPr>
+          <p:nvPr/>
+        </p:nvCxnSpPr>
+        <p:spPr>
+          <a:xfrm flipH="1">
+            <a:off x="6086630" y="3941471"/>
+            <a:ext cx="2" cy="241306"/>
+          </a:xfrm>
+          <a:prstGeom prst="straightConnector1">
+            <a:avLst/>
+          </a:prstGeom>
+          <a:ln w="9525" cap="flat" cmpd="sng" algn="ctr">
+            <a:solidFill>
+              <a:schemeClr val="dk1"/>
+            </a:solidFill>
+            <a:prstDash val="solid"/>
+            <a:round/>
+            <a:headEnd type="none" w="med" len="med"/>
+            <a:tailEnd type="arrow" w="med" len="med"/>
+          </a:ln>
+        </p:spPr>
+        <p:style>
+          <a:lnRef idx="0">
+            <a:scrgbClr r="0" g="0" b="0"/>
+          </a:lnRef>
+          <a:fillRef idx="0">
+            <a:scrgbClr r="0" g="0" b="0"/>
+          </a:fillRef>
+          <a:effectRef idx="0">
+            <a:scrgbClr r="0" g="0" b="0"/>
+          </a:effectRef>
+          <a:fontRef idx="minor">
+            <a:schemeClr val="tx1"/>
+          </a:fontRef>
+        </p:style>
+      </p:cxnSp>
+      <p:cxnSp>
+        <p:nvCxnSpPr>
+          <p:cNvPr id="78" name="Straight Arrow Connector 77">
+            <a:extLst>
+              <a:ext uri="{FF2B5EF4-FFF2-40B4-BE49-F238E27FC236}">
+                <a16:creationId xmlns:a16="http://schemas.microsoft.com/office/drawing/2014/main" id="{D03E9D33-30E8-457E-9B54-73E66853B100}"/>
+              </a:ext>
+            </a:extLst>
+          </p:cNvPr>
+          <p:cNvCxnSpPr>
+            <a:cxnSpLocks/>
+          </p:cNvCxnSpPr>
+          <p:nvPr/>
+        </p:nvCxnSpPr>
+        <p:spPr>
+          <a:xfrm flipH="1">
+            <a:off x="6095996" y="4944557"/>
+            <a:ext cx="2" cy="241306"/>
+          </a:xfrm>
+          <a:prstGeom prst="straightConnector1">
+            <a:avLst/>
+          </a:prstGeom>
+          <a:ln w="9525" cap="flat" cmpd="sng" algn="ctr">
+            <a:solidFill>
+              <a:schemeClr val="dk1"/>
+            </a:solidFill>
+            <a:prstDash val="solid"/>
+            <a:round/>
+            <a:headEnd type="none" w="med" len="med"/>
+            <a:tailEnd type="arrow" w="med" len="med"/>
+          </a:ln>
+        </p:spPr>
+        <p:style>
+          <a:lnRef idx="0">
+            <a:scrgbClr r="0" g="0" b="0"/>
+          </a:lnRef>
+          <a:fillRef idx="0">
+            <a:scrgbClr r="0" g="0" b="0"/>
+          </a:fillRef>
+          <a:effectRef idx="0">
+            <a:scrgbClr r="0" g="0" b="0"/>
+          </a:effectRef>
+          <a:fontRef idx="minor">
+            <a:schemeClr val="tx1"/>
+          </a:fontRef>
+        </p:style>
+      </p:cxnSp>
+      <p:cxnSp>
+        <p:nvCxnSpPr>
+          <p:cNvPr id="79" name="Straight Arrow Connector 78">
+            <a:extLst>
+              <a:ext uri="{FF2B5EF4-FFF2-40B4-BE49-F238E27FC236}">
+                <a16:creationId xmlns:a16="http://schemas.microsoft.com/office/drawing/2014/main" id="{0A90E022-FEFC-46DE-89ED-17C345356F2C}"/>
+              </a:ext>
+            </a:extLst>
+          </p:cNvPr>
+          <p:cNvCxnSpPr>
+            <a:cxnSpLocks/>
+          </p:cNvCxnSpPr>
+          <p:nvPr/>
+        </p:nvCxnSpPr>
+        <p:spPr>
+          <a:xfrm flipH="1">
+            <a:off x="2381755" y="3233015"/>
+            <a:ext cx="2" cy="241306"/>
+          </a:xfrm>
+          <a:prstGeom prst="straightConnector1">
+            <a:avLst/>
+          </a:prstGeom>
+          <a:ln w="9525" cap="flat" cmpd="sng" algn="ctr">
+            <a:solidFill>
+              <a:schemeClr val="dk1"/>
+            </a:solidFill>
+            <a:prstDash val="solid"/>
+            <a:round/>
+            <a:headEnd type="none" w="med" len="med"/>
+            <a:tailEnd type="arrow" w="med" len="med"/>
+          </a:ln>
+        </p:spPr>
+        <p:style>
+          <a:lnRef idx="0">
+            <a:scrgbClr r="0" g="0" b="0"/>
+          </a:lnRef>
+          <a:fillRef idx="0">
+            <a:scrgbClr r="0" g="0" b="0"/>
+          </a:fillRef>
+          <a:effectRef idx="0">
+            <a:scrgbClr r="0" g="0" b="0"/>
+          </a:effectRef>
+          <a:fontRef idx="minor">
+            <a:schemeClr val="tx1"/>
+          </a:fontRef>
+        </p:style>
+      </p:cxnSp>
+      <p:cxnSp>
+        <p:nvCxnSpPr>
+          <p:cNvPr id="80" name="Straight Arrow Connector 79">
+            <a:extLst>
+              <a:ext uri="{FF2B5EF4-FFF2-40B4-BE49-F238E27FC236}">
+                <a16:creationId xmlns:a16="http://schemas.microsoft.com/office/drawing/2014/main" id="{3A681EC4-C304-44D6-8FE8-F7EBE52D4E19}"/>
+              </a:ext>
+            </a:extLst>
+          </p:cNvPr>
+          <p:cNvCxnSpPr>
+            <a:cxnSpLocks/>
+          </p:cNvCxnSpPr>
+          <p:nvPr/>
+        </p:nvCxnSpPr>
+        <p:spPr>
+          <a:xfrm flipH="1">
+            <a:off x="2381403" y="4044630"/>
+            <a:ext cx="2" cy="241306"/>
+          </a:xfrm>
+          <a:prstGeom prst="straightConnector1">
+            <a:avLst/>
+          </a:prstGeom>
+          <a:ln w="9525" cap="flat" cmpd="sng" algn="ctr">
+            <a:solidFill>
+              <a:schemeClr val="dk1"/>
+            </a:solidFill>
+            <a:prstDash val="solid"/>
+            <a:round/>
+            <a:headEnd type="none" w="med" len="med"/>
+            <a:tailEnd type="arrow" w="med" len="med"/>
+          </a:ln>
+        </p:spPr>
+        <p:style>
+          <a:lnRef idx="0">
+            <a:scrgbClr r="0" g="0" b="0"/>
+          </a:lnRef>
+          <a:fillRef idx="0">
+            <a:scrgbClr r="0" g="0" b="0"/>
+          </a:fillRef>
+          <a:effectRef idx="0">
+            <a:scrgbClr r="0" g="0" b="0"/>
+          </a:effectRef>
+          <a:fontRef idx="minor">
+            <a:schemeClr val="tx1"/>
+          </a:fontRef>
+        </p:style>
+      </p:cxnSp>
+      <p:cxnSp>
+        <p:nvCxnSpPr>
+          <p:cNvPr id="81" name="Straight Arrow Connector 80">
+            <a:extLst>
+              <a:ext uri="{FF2B5EF4-FFF2-40B4-BE49-F238E27FC236}">
+                <a16:creationId xmlns:a16="http://schemas.microsoft.com/office/drawing/2014/main" id="{19F654F4-6D55-4385-8976-5B80EBD24850}"/>
+              </a:ext>
+            </a:extLst>
+          </p:cNvPr>
+          <p:cNvCxnSpPr>
+            <a:cxnSpLocks/>
+          </p:cNvCxnSpPr>
+          <p:nvPr/>
+        </p:nvCxnSpPr>
+        <p:spPr>
+          <a:xfrm flipH="1">
+            <a:off x="2381401" y="4850441"/>
+            <a:ext cx="2" cy="241306"/>
+          </a:xfrm>
+          <a:prstGeom prst="straightConnector1">
+            <a:avLst/>
+          </a:prstGeom>
+          <a:ln w="9525" cap="flat" cmpd="sng" algn="ctr">
+            <a:solidFill>
+              <a:schemeClr val="dk1"/>
+            </a:solidFill>
+            <a:prstDash val="solid"/>
+            <a:round/>
+            <a:headEnd type="none" w="med" len="med"/>
+            <a:tailEnd type="arrow" w="med" len="med"/>
+          </a:ln>
+        </p:spPr>
+        <p:style>
+          <a:lnRef idx="0">
+            <a:scrgbClr r="0" g="0" b="0"/>
+          </a:lnRef>
+          <a:fillRef idx="0">
+            <a:scrgbClr r="0" g="0" b="0"/>
+          </a:fillRef>
+          <a:effectRef idx="0">
+            <a:scrgbClr r="0" g="0" b="0"/>
+          </a:effectRef>
+          <a:fontRef idx="minor">
+            <a:schemeClr val="tx1"/>
+          </a:fontRef>
+        </p:style>
+      </p:cxnSp>
     </p:spTree>
     <p:extLst>
       <p:ext uri="{BB962C8B-B14F-4D97-AF65-F5344CB8AC3E}">
@@ -5818,6 +8752,66 @@
           <a:chExt cx="0" cy="0"/>
         </a:xfrm>
       </p:grpSpPr>
+      <p:pic>
+        <p:nvPicPr>
+          <p:cNvPr id="7" name="Picture 6">
+            <a:extLst>
+              <a:ext uri="{FF2B5EF4-FFF2-40B4-BE49-F238E27FC236}">
+                <a16:creationId xmlns:a16="http://schemas.microsoft.com/office/drawing/2014/main" id="{0452B86A-B01F-4002-A1C0-9EF0AE9558E4}"/>
+              </a:ext>
+            </a:extLst>
+          </p:cNvPr>
+          <p:cNvPicPr>
+            <a:picLocks noChangeAspect="1"/>
+          </p:cNvPicPr>
+          <p:nvPr/>
+        </p:nvPicPr>
+        <p:blipFill>
+          <a:blip r:embed="rId2"/>
+          <a:stretch>
+            <a:fillRect/>
+          </a:stretch>
+        </p:blipFill>
+        <p:spPr>
+          <a:xfrm>
+            <a:off x="3065859" y="0"/>
+            <a:ext cx="9126141" cy="6858000"/>
+          </a:xfrm>
+          <a:prstGeom prst="rect">
+            <a:avLst/>
+          </a:prstGeom>
+        </p:spPr>
+      </p:pic>
+      <p:pic>
+        <p:nvPicPr>
+          <p:cNvPr id="8" name="Picture 7">
+            <a:extLst>
+              <a:ext uri="{FF2B5EF4-FFF2-40B4-BE49-F238E27FC236}">
+                <a16:creationId xmlns:a16="http://schemas.microsoft.com/office/drawing/2014/main" id="{37F75148-183E-43C0-AC18-81F40A1DD034}"/>
+              </a:ext>
+            </a:extLst>
+          </p:cNvPr>
+          <p:cNvPicPr>
+            <a:picLocks noChangeAspect="1"/>
+          </p:cNvPicPr>
+          <p:nvPr/>
+        </p:nvPicPr>
+        <p:blipFill>
+          <a:blip r:embed="rId2"/>
+          <a:stretch>
+            <a:fillRect/>
+          </a:stretch>
+        </p:blipFill>
+        <p:spPr>
+          <a:xfrm>
+            <a:off x="0" y="0"/>
+            <a:ext cx="9126141" cy="6858000"/>
+          </a:xfrm>
+          <a:prstGeom prst="rect">
+            <a:avLst/>
+          </a:prstGeom>
+        </p:spPr>
+      </p:pic>
       <p:sp>
         <p:nvSpPr>
           <p:cNvPr id="2" name="Title 1">
@@ -5839,6 +8833,9 @@
             <a:off x="838200" y="365125"/>
             <a:ext cx="10515600" cy="566053"/>
           </a:xfrm>
+          <a:solidFill>
+            <a:schemeClr val="bg1"/>
+          </a:solidFill>
           <a:ln>
             <a:solidFill>
               <a:schemeClr val="tx1"/>
@@ -5882,6 +8879,9 @@
             <a:off x="838200" y="931178"/>
             <a:ext cx="10515600" cy="5245785"/>
           </a:xfrm>
+          <a:solidFill>
+            <a:schemeClr val="bg1"/>
+          </a:solidFill>
           <a:ln>
             <a:solidFill>
               <a:schemeClr val="tx1"/>
@@ -5892,6 +8892,17 @@
           <a:bodyPr/>
           <a:lstStyle/>
           <a:p>
+            <a:pPr marL="0" indent="0">
+              <a:buNone/>
+            </a:pPr>
+            <a:endParaRPr lang="en-GB" dirty="0">
+              <a:latin typeface="Bodoni MT" panose="02070603080606020203" pitchFamily="18" charset="0"/>
+            </a:endParaRPr>
+          </a:p>
+          <a:p>
+            <a:pPr marL="0" indent="0">
+              <a:buNone/>
+            </a:pPr>
             <a:endParaRPr lang="en-GB" dirty="0">
               <a:latin typeface="Bodoni MT" panose="02070603080606020203" pitchFamily="18" charset="0"/>
             </a:endParaRPr>
@@ -5933,6 +8944,163 @@
                 <a:ea typeface="Cambria Math" panose="02040503050406030204" pitchFamily="18" charset="0"/>
               </a:rPr>
               <a:t>(3)</a:t>
+            </a:r>
+          </a:p>
+        </p:txBody>
+      </p:sp>
+      <p:pic>
+        <p:nvPicPr>
+          <p:cNvPr id="5" name="Picture 4">
+            <a:extLst>
+              <a:ext uri="{FF2B5EF4-FFF2-40B4-BE49-F238E27FC236}">
+                <a16:creationId xmlns:a16="http://schemas.microsoft.com/office/drawing/2014/main" id="{07E31DEA-147A-4661-8DB9-CB3281426F67}"/>
+              </a:ext>
+            </a:extLst>
+          </p:cNvPr>
+          <p:cNvPicPr>
+            <a:picLocks noChangeAspect="1"/>
+          </p:cNvPicPr>
+          <p:nvPr/>
+        </p:nvPicPr>
+        <p:blipFill>
+          <a:blip r:embed="rId3"/>
+          <a:stretch>
+            <a:fillRect/>
+          </a:stretch>
+        </p:blipFill>
+        <p:spPr>
+          <a:xfrm>
+            <a:off x="7251583" y="1386866"/>
+            <a:ext cx="3446888" cy="4084268"/>
+          </a:xfrm>
+          <a:prstGeom prst="rect">
+            <a:avLst/>
+          </a:prstGeom>
+          <a:ln>
+            <a:solidFill>
+              <a:schemeClr val="tx1"/>
+            </a:solidFill>
+          </a:ln>
+        </p:spPr>
+      </p:pic>
+      <p:sp>
+        <p:nvSpPr>
+          <p:cNvPr id="9" name="Rectangle 8">
+            <a:extLst>
+              <a:ext uri="{FF2B5EF4-FFF2-40B4-BE49-F238E27FC236}">
+                <a16:creationId xmlns:a16="http://schemas.microsoft.com/office/drawing/2014/main" id="{639288EF-1393-49D8-9524-1863E2A39901}"/>
+              </a:ext>
+            </a:extLst>
+          </p:cNvPr>
+          <p:cNvSpPr/>
+          <p:nvPr/>
+        </p:nvSpPr>
+        <p:spPr>
+          <a:xfrm>
+            <a:off x="1166070" y="1191237"/>
+            <a:ext cx="5757643" cy="4630723"/>
+          </a:xfrm>
+          <a:prstGeom prst="rect">
+            <a:avLst/>
+          </a:prstGeom>
+          <a:noFill/>
+          <a:ln w="9525" cap="flat" cmpd="sng" algn="ctr">
+            <a:solidFill>
+              <a:schemeClr val="dk1"/>
+            </a:solidFill>
+            <a:prstDash val="solid"/>
+            <a:round/>
+            <a:headEnd type="none" w="med" len="med"/>
+            <a:tailEnd type="none" w="med" len="med"/>
+          </a:ln>
+        </p:spPr>
+        <p:style>
+          <a:lnRef idx="0">
+            <a:scrgbClr r="0" g="0" b="0"/>
+          </a:lnRef>
+          <a:fillRef idx="0">
+            <a:scrgbClr r="0" g="0" b="0"/>
+          </a:fillRef>
+          <a:effectRef idx="0">
+            <a:scrgbClr r="0" g="0" b="0"/>
+          </a:effectRef>
+          <a:fontRef idx="minor">
+            <a:schemeClr val="dk1"/>
+          </a:fontRef>
+        </p:style>
+        <p:txBody>
+          <a:bodyPr rtlCol="0" anchor="ctr"/>
+          <a:lstStyle/>
+          <a:p>
+            <a:r>
+              <a:rPr lang="en-GB" b="1" dirty="0">
+                <a:latin typeface="Bodoni MT" panose="02070603080606020203" pitchFamily="18" charset="0"/>
+              </a:rPr>
+              <a:t>HOW DO WE SIDESCROLL WITHOUT A CAMERA?</a:t>
+            </a:r>
+          </a:p>
+          <a:p>
+            <a:r>
+              <a:rPr lang="en-GB" dirty="0">
+                <a:latin typeface="Bodoni MT" panose="02070603080606020203" pitchFamily="18" charset="0"/>
+              </a:rPr>
+              <a:t>Give all objects in the level movement along the X axis. Keep the player centralised and move everything in accordance with the player.</a:t>
+            </a:r>
+          </a:p>
+          <a:p>
+            <a:endParaRPr lang="en-GB" dirty="0">
+              <a:latin typeface="Bodoni MT" panose="02070603080606020203" pitchFamily="18" charset="0"/>
+            </a:endParaRPr>
+          </a:p>
+          <a:p>
+            <a:r>
+              <a:rPr lang="en-GB" b="1" dirty="0">
+                <a:latin typeface="Bodoni MT" panose="02070603080606020203" pitchFamily="18" charset="0"/>
+              </a:rPr>
+              <a:t>HOW DO WE ENCOURAGE REPLAYABILITY?</a:t>
+            </a:r>
+          </a:p>
+          <a:p>
+            <a:r>
+              <a:rPr lang="en-GB" dirty="0">
+                <a:latin typeface="Bodoni MT" panose="02070603080606020203" pitchFamily="18" charset="0"/>
+              </a:rPr>
+              <a:t>Create persistent collectables across all levels as an additional optional measure of tracking progress. Collectables are stored and displayed in the main menu.</a:t>
+            </a:r>
+          </a:p>
+          <a:p>
+            <a:endParaRPr lang="en-GB" dirty="0">
+              <a:latin typeface="Bodoni MT" panose="02070603080606020203" pitchFamily="18" charset="0"/>
+            </a:endParaRPr>
+          </a:p>
+          <a:p>
+            <a:r>
+              <a:rPr lang="en-GB" b="1" dirty="0">
+                <a:latin typeface="Bodoni MT" panose="02070603080606020203" pitchFamily="18" charset="0"/>
+              </a:rPr>
+              <a:t>HOW DO WE TRANSLATE REAL LIFE PUZZLES TO NON-MOUSE DRIVEN INTERFACE?</a:t>
+            </a:r>
+          </a:p>
+          <a:p>
+            <a:pPr marL="400050" indent="-400050">
+              <a:buAutoNum type="romanLcPeriod"/>
+            </a:pPr>
+            <a:r>
+              <a:rPr lang="en-GB" dirty="0">
+                <a:latin typeface="Bodoni MT" panose="02070603080606020203" pitchFamily="18" charset="0"/>
+              </a:rPr>
+              <a:t>Create a player controlled focal point. (maze, tile).</a:t>
+            </a:r>
+          </a:p>
+          <a:p>
+            <a:pPr marL="400050" indent="-400050">
+              <a:buAutoNum type="romanLcPeriod"/>
+            </a:pPr>
+            <a:r>
+              <a:rPr lang="en-GB" dirty="0">
+                <a:latin typeface="Bodoni MT" panose="02070603080606020203" pitchFamily="18" charset="0"/>
+              </a:rPr>
+              <a:t>Limit scalability to bindable keys on the keyboard (traffic).</a:t>
             </a:r>
           </a:p>
         </p:txBody>
@@ -5967,6 +9135,64 @@
           <a:chExt cx="0" cy="0"/>
         </a:xfrm>
       </p:grpSpPr>
+      <p:pic>
+        <p:nvPicPr>
+          <p:cNvPr id="7" name="Picture 6">
+            <a:extLst>
+              <a:ext uri="{FF2B5EF4-FFF2-40B4-BE49-F238E27FC236}">
+                <a16:creationId xmlns:a16="http://schemas.microsoft.com/office/drawing/2014/main" id="{B477D94D-934D-4616-A570-6D98195B104B}"/>
+              </a:ext>
+            </a:extLst>
+          </p:cNvPr>
+          <p:cNvPicPr>
+            <a:picLocks noChangeAspect="1"/>
+          </p:cNvPicPr>
+          <p:nvPr/>
+        </p:nvPicPr>
+        <p:blipFill rotWithShape="1">
+          <a:blip r:embed="rId2"/>
+          <a:srcRect t="857"/>
+          <a:stretch/>
+        </p:blipFill>
+        <p:spPr>
+          <a:xfrm>
+            <a:off x="3059891" y="1"/>
+            <a:ext cx="9132109" cy="6857999"/>
+          </a:xfrm>
+          <a:prstGeom prst="rect">
+            <a:avLst/>
+          </a:prstGeom>
+        </p:spPr>
+      </p:pic>
+      <p:pic>
+        <p:nvPicPr>
+          <p:cNvPr id="5" name="Picture 4">
+            <a:extLst>
+              <a:ext uri="{FF2B5EF4-FFF2-40B4-BE49-F238E27FC236}">
+                <a16:creationId xmlns:a16="http://schemas.microsoft.com/office/drawing/2014/main" id="{B41C1CB2-FA0D-4FE8-B995-E97A83ACB1AE}"/>
+              </a:ext>
+            </a:extLst>
+          </p:cNvPr>
+          <p:cNvPicPr>
+            <a:picLocks noChangeAspect="1"/>
+          </p:cNvPicPr>
+          <p:nvPr/>
+        </p:nvPicPr>
+        <p:blipFill rotWithShape="1">
+          <a:blip r:embed="rId2"/>
+          <a:srcRect t="857"/>
+          <a:stretch/>
+        </p:blipFill>
+        <p:spPr>
+          <a:xfrm>
+            <a:off x="0" y="0"/>
+            <a:ext cx="9132109" cy="6857999"/>
+          </a:xfrm>
+          <a:prstGeom prst="rect">
+            <a:avLst/>
+          </a:prstGeom>
+        </p:spPr>
+      </p:pic>
       <p:sp>
         <p:nvSpPr>
           <p:cNvPr id="2" name="Title 1">
@@ -5988,6 +9214,9 @@
             <a:off x="838200" y="365125"/>
             <a:ext cx="10515600" cy="566053"/>
           </a:xfrm>
+          <a:solidFill>
+            <a:schemeClr val="bg1"/>
+          </a:solidFill>
           <a:ln>
             <a:solidFill>
               <a:schemeClr val="tx1"/>
@@ -6005,7 +9234,7 @@
               <a:rPr lang="en-GB" dirty="0">
                 <a:latin typeface="Bodoni MT" panose="02070603080606020203" pitchFamily="18" charset="0"/>
               </a:rPr>
-              <a:t>User Testing</a:t>
+              <a:t>User Testing Methodology</a:t>
             </a:r>
           </a:p>
         </p:txBody>
@@ -6031,6 +9260,9 @@
             <a:off x="838200" y="931178"/>
             <a:ext cx="10515600" cy="5245785"/>
           </a:xfrm>
+          <a:solidFill>
+            <a:schemeClr val="bg1"/>
+          </a:solidFill>
           <a:ln>
             <a:solidFill>
               <a:schemeClr val="tx1"/>
@@ -6041,6 +9273,17 @@
           <a:bodyPr/>
           <a:lstStyle/>
           <a:p>
+            <a:pPr marL="0" indent="0">
+              <a:buNone/>
+            </a:pPr>
+            <a:endParaRPr lang="en-GB" dirty="0">
+              <a:latin typeface="Bodoni MT" panose="02070603080606020203" pitchFamily="18" charset="0"/>
+            </a:endParaRPr>
+          </a:p>
+          <a:p>
+            <a:pPr marL="0" indent="0">
+              <a:buNone/>
+            </a:pPr>
             <a:endParaRPr lang="en-GB" dirty="0">
               <a:latin typeface="Bodoni MT" panose="02070603080606020203" pitchFamily="18" charset="0"/>
             </a:endParaRPr>
@@ -6083,6 +9326,465 @@
               </a:rPr>
               <a:t>(4)</a:t>
             </a:r>
+          </a:p>
+        </p:txBody>
+      </p:sp>
+      <p:pic>
+        <p:nvPicPr>
+          <p:cNvPr id="4" name="Picture 3">
+            <a:extLst>
+              <a:ext uri="{FF2B5EF4-FFF2-40B4-BE49-F238E27FC236}">
+                <a16:creationId xmlns:a16="http://schemas.microsoft.com/office/drawing/2014/main" id="{7DBBE77A-8D3A-40D6-94A0-7EC9A7E761A3}"/>
+              </a:ext>
+            </a:extLst>
+          </p:cNvPr>
+          <p:cNvPicPr>
+            <a:picLocks noChangeAspect="1"/>
+          </p:cNvPicPr>
+          <p:nvPr/>
+        </p:nvPicPr>
+        <p:blipFill>
+          <a:blip r:embed="rId3"/>
+          <a:stretch>
+            <a:fillRect/>
+          </a:stretch>
+        </p:blipFill>
+        <p:spPr>
+          <a:xfrm>
+            <a:off x="7239682" y="1296302"/>
+            <a:ext cx="3784854" cy="3784854"/>
+          </a:xfrm>
+          <a:prstGeom prst="rect">
+            <a:avLst/>
+          </a:prstGeom>
+          <a:ln>
+            <a:solidFill>
+              <a:schemeClr val="tx1"/>
+            </a:solidFill>
+          </a:ln>
+        </p:spPr>
+      </p:pic>
+      <p:sp>
+        <p:nvSpPr>
+          <p:cNvPr id="8" name="Rectangle 7">
+            <a:extLst>
+              <a:ext uri="{FF2B5EF4-FFF2-40B4-BE49-F238E27FC236}">
+                <a16:creationId xmlns:a16="http://schemas.microsoft.com/office/drawing/2014/main" id="{BBD93274-AD19-4924-B84B-10DE820ED811}"/>
+              </a:ext>
+            </a:extLst>
+          </p:cNvPr>
+          <p:cNvSpPr/>
+          <p:nvPr/>
+        </p:nvSpPr>
+        <p:spPr>
+          <a:xfrm>
+            <a:off x="1166070" y="1191237"/>
+            <a:ext cx="5757643" cy="4071039"/>
+          </a:xfrm>
+          <a:prstGeom prst="rect">
+            <a:avLst/>
+          </a:prstGeom>
+          <a:noFill/>
+          <a:ln w="9525" cap="flat" cmpd="sng" algn="ctr">
+            <a:solidFill>
+              <a:schemeClr val="dk1"/>
+            </a:solidFill>
+            <a:prstDash val="solid"/>
+            <a:round/>
+            <a:headEnd type="none" w="med" len="med"/>
+            <a:tailEnd type="none" w="med" len="med"/>
+          </a:ln>
+        </p:spPr>
+        <p:style>
+          <a:lnRef idx="0">
+            <a:scrgbClr r="0" g="0" b="0"/>
+          </a:lnRef>
+          <a:fillRef idx="0">
+            <a:scrgbClr r="0" g="0" b="0"/>
+          </a:fillRef>
+          <a:effectRef idx="0">
+            <a:scrgbClr r="0" g="0" b="0"/>
+          </a:effectRef>
+          <a:fontRef idx="minor">
+            <a:schemeClr val="dk1"/>
+          </a:fontRef>
+        </p:style>
+        <p:txBody>
+          <a:bodyPr rtlCol="0" anchor="ctr"/>
+          <a:lstStyle/>
+          <a:p>
+            <a:endParaRPr lang="en-GB" dirty="0">
+              <a:latin typeface="Bodoni MT" panose="02070603080606020203" pitchFamily="18" charset="0"/>
+            </a:endParaRPr>
+          </a:p>
+        </p:txBody>
+      </p:sp>
+      <p:sp>
+        <p:nvSpPr>
+          <p:cNvPr id="9" name="TextBox 8">
+            <a:extLst>
+              <a:ext uri="{FF2B5EF4-FFF2-40B4-BE49-F238E27FC236}">
+                <a16:creationId xmlns:a16="http://schemas.microsoft.com/office/drawing/2014/main" id="{614F1665-FB4D-4576-912A-8CB0AE08F8B2}"/>
+              </a:ext>
+            </a:extLst>
+          </p:cNvPr>
+          <p:cNvSpPr txBox="1"/>
+          <p:nvPr/>
+        </p:nvSpPr>
+        <p:spPr>
+          <a:xfrm>
+            <a:off x="1166070" y="1191236"/>
+            <a:ext cx="5751692" cy="377721"/>
+          </a:xfrm>
+          <a:prstGeom prst="rect">
+            <a:avLst/>
+          </a:prstGeom>
+          <a:noFill/>
+          <a:ln>
+            <a:solidFill>
+              <a:schemeClr val="tx1"/>
+            </a:solidFill>
+          </a:ln>
+        </p:spPr>
+        <p:txBody>
+          <a:bodyPr wrap="square" rtlCol="0">
+            <a:spAutoFit/>
+          </a:bodyPr>
+          <a:lstStyle/>
+          <a:p>
+            <a:r>
+              <a:rPr lang="en-GB" b="1" dirty="0">
+                <a:latin typeface="Bodoni MT" panose="02070603080606020203" pitchFamily="18" charset="0"/>
+              </a:rPr>
+              <a:t>TESTERS: </a:t>
+            </a:r>
+            <a:r>
+              <a:rPr lang="en-GB" dirty="0">
+                <a:latin typeface="Bodoni MT" panose="02070603080606020203" pitchFamily="18" charset="0"/>
+              </a:rPr>
+              <a:t>2</a:t>
+            </a:r>
+            <a:r>
+              <a:rPr lang="en-GB" baseline="30000" dirty="0">
+                <a:latin typeface="Bodoni MT" panose="02070603080606020203" pitchFamily="18" charset="0"/>
+              </a:rPr>
+              <a:t>nd</a:t>
+            </a:r>
+            <a:r>
+              <a:rPr lang="en-GB" dirty="0">
+                <a:latin typeface="Bodoni MT" panose="02070603080606020203" pitchFamily="18" charset="0"/>
+              </a:rPr>
+              <a:t> Year SCC Students.</a:t>
+            </a:r>
+          </a:p>
+        </p:txBody>
+      </p:sp>
+      <p:sp>
+        <p:nvSpPr>
+          <p:cNvPr id="10" name="TextBox 9">
+            <a:extLst>
+              <a:ext uri="{FF2B5EF4-FFF2-40B4-BE49-F238E27FC236}">
+                <a16:creationId xmlns:a16="http://schemas.microsoft.com/office/drawing/2014/main" id="{B73BD718-AF4E-48A2-A46D-2EFB4DF802D3}"/>
+              </a:ext>
+            </a:extLst>
+          </p:cNvPr>
+          <p:cNvSpPr txBox="1"/>
+          <p:nvPr/>
+        </p:nvSpPr>
+        <p:spPr>
+          <a:xfrm>
+            <a:off x="1166070" y="1568957"/>
+            <a:ext cx="5751692" cy="3693319"/>
+          </a:xfrm>
+          <a:prstGeom prst="rect">
+            <a:avLst/>
+          </a:prstGeom>
+          <a:noFill/>
+          <a:ln>
+            <a:solidFill>
+              <a:schemeClr val="tx1"/>
+            </a:solidFill>
+          </a:ln>
+        </p:spPr>
+        <p:txBody>
+          <a:bodyPr wrap="square" rtlCol="0">
+            <a:spAutoFit/>
+          </a:bodyPr>
+          <a:lstStyle/>
+          <a:p>
+            <a:r>
+              <a:rPr lang="en-GB" b="1" dirty="0">
+                <a:latin typeface="Bodoni MT" panose="02070603080606020203" pitchFamily="18" charset="0"/>
+              </a:rPr>
+              <a:t>TESTS CONDUCTED: </a:t>
+            </a:r>
+          </a:p>
+          <a:p>
+            <a:r>
+              <a:rPr lang="en-GB" dirty="0">
+                <a:latin typeface="Bodoni MT" panose="02070603080606020203" pitchFamily="18" charset="0"/>
+              </a:rPr>
+              <a:t>1.   Platforms Only</a:t>
+            </a:r>
+          </a:p>
+          <a:p>
+            <a:endParaRPr lang="en-GB" dirty="0">
+              <a:latin typeface="Bodoni MT" panose="02070603080606020203" pitchFamily="18" charset="0"/>
+            </a:endParaRPr>
+          </a:p>
+          <a:p>
+            <a:endParaRPr lang="en-GB" dirty="0">
+              <a:latin typeface="Bodoni MT" panose="02070603080606020203" pitchFamily="18" charset="0"/>
+            </a:endParaRPr>
+          </a:p>
+          <a:p>
+            <a:endParaRPr lang="en-GB" dirty="0">
+              <a:latin typeface="Bodoni MT" panose="02070603080606020203" pitchFamily="18" charset="0"/>
+            </a:endParaRPr>
+          </a:p>
+          <a:p>
+            <a:pPr marL="342900" indent="-342900">
+              <a:buAutoNum type="arabicPeriod" startAt="2"/>
+            </a:pPr>
+            <a:r>
+              <a:rPr lang="en-GB" dirty="0">
+                <a:latin typeface="Bodoni MT" panose="02070603080606020203" pitchFamily="18" charset="0"/>
+              </a:rPr>
+              <a:t>Puzzles Only</a:t>
+            </a:r>
+          </a:p>
+          <a:p>
+            <a:endParaRPr lang="en-GB" dirty="0">
+              <a:latin typeface="Bodoni MT" panose="02070603080606020203" pitchFamily="18" charset="0"/>
+            </a:endParaRPr>
+          </a:p>
+          <a:p>
+            <a:endParaRPr lang="en-GB" dirty="0">
+              <a:latin typeface="Bodoni MT" panose="02070603080606020203" pitchFamily="18" charset="0"/>
+            </a:endParaRPr>
+          </a:p>
+          <a:p>
+            <a:endParaRPr lang="en-GB" dirty="0">
+              <a:latin typeface="Bodoni MT" panose="02070603080606020203" pitchFamily="18" charset="0"/>
+            </a:endParaRPr>
+          </a:p>
+          <a:p>
+            <a:pPr marL="342900" indent="-342900">
+              <a:buAutoNum type="arabicPeriod" startAt="3"/>
+            </a:pPr>
+            <a:r>
+              <a:rPr lang="en-GB" dirty="0">
+                <a:latin typeface="Bodoni MT" panose="02070603080606020203" pitchFamily="18" charset="0"/>
+              </a:rPr>
+              <a:t>Full Game Run-through</a:t>
+            </a:r>
+          </a:p>
+          <a:p>
+            <a:pPr marL="342900" indent="-342900">
+              <a:buAutoNum type="arabicPeriod" startAt="3"/>
+            </a:pPr>
+            <a:endParaRPr lang="en-GB" dirty="0">
+              <a:latin typeface="Bodoni MT" panose="02070603080606020203" pitchFamily="18" charset="0"/>
+            </a:endParaRPr>
+          </a:p>
+          <a:p>
+            <a:pPr marL="342900" indent="-342900">
+              <a:buAutoNum type="arabicPeriod" startAt="3"/>
+            </a:pPr>
+            <a:endParaRPr lang="en-GB" dirty="0">
+              <a:latin typeface="Bodoni MT" panose="02070603080606020203" pitchFamily="18" charset="0"/>
+            </a:endParaRPr>
+          </a:p>
+          <a:p>
+            <a:pPr marL="342900" indent="-342900">
+              <a:buAutoNum type="arabicPeriod" startAt="3"/>
+            </a:pPr>
+            <a:endParaRPr lang="en-GB" dirty="0">
+              <a:latin typeface="Bodoni MT" panose="02070603080606020203" pitchFamily="18" charset="0"/>
+            </a:endParaRPr>
+          </a:p>
+        </p:txBody>
+      </p:sp>
+      <p:sp>
+        <p:nvSpPr>
+          <p:cNvPr id="11" name="TextBox 10">
+            <a:extLst>
+              <a:ext uri="{FF2B5EF4-FFF2-40B4-BE49-F238E27FC236}">
+                <a16:creationId xmlns:a16="http://schemas.microsoft.com/office/drawing/2014/main" id="{045FE3E0-C21F-4E84-A6C3-B78C5DA14375}"/>
+              </a:ext>
+            </a:extLst>
+          </p:cNvPr>
+          <p:cNvSpPr txBox="1"/>
+          <p:nvPr/>
+        </p:nvSpPr>
+        <p:spPr>
+          <a:xfrm>
+            <a:off x="1568741" y="2171964"/>
+            <a:ext cx="5349021" cy="646331"/>
+          </a:xfrm>
+          <a:prstGeom prst="rect">
+            <a:avLst/>
+          </a:prstGeom>
+          <a:noFill/>
+          <a:ln>
+            <a:solidFill>
+              <a:schemeClr val="tx1"/>
+            </a:solidFill>
+          </a:ln>
+        </p:spPr>
+        <p:txBody>
+          <a:bodyPr wrap="square" rtlCol="0">
+            <a:spAutoFit/>
+          </a:bodyPr>
+          <a:lstStyle/>
+          <a:p>
+            <a:r>
+              <a:rPr lang="en-GB" dirty="0">
+                <a:latin typeface="Bodoni MT" panose="02070603080606020203" pitchFamily="18" charset="0"/>
+              </a:rPr>
+              <a:t>To test the logical progression and difficulty scaling simply following the platforming sections of the game</a:t>
+            </a:r>
+          </a:p>
+        </p:txBody>
+      </p:sp>
+      <p:sp>
+        <p:nvSpPr>
+          <p:cNvPr id="12" name="TextBox 11">
+            <a:extLst>
+              <a:ext uri="{FF2B5EF4-FFF2-40B4-BE49-F238E27FC236}">
+                <a16:creationId xmlns:a16="http://schemas.microsoft.com/office/drawing/2014/main" id="{715C8695-F831-4AEA-8788-D3F362FE0855}"/>
+              </a:ext>
+            </a:extLst>
+          </p:cNvPr>
+          <p:cNvSpPr txBox="1"/>
+          <p:nvPr/>
+        </p:nvSpPr>
+        <p:spPr>
+          <a:xfrm>
+            <a:off x="1568740" y="3240286"/>
+            <a:ext cx="5349021" cy="646331"/>
+          </a:xfrm>
+          <a:prstGeom prst="rect">
+            <a:avLst/>
+          </a:prstGeom>
+          <a:noFill/>
+          <a:ln>
+            <a:solidFill>
+              <a:schemeClr val="tx1"/>
+            </a:solidFill>
+          </a:ln>
+        </p:spPr>
+        <p:txBody>
+          <a:bodyPr wrap="square" rtlCol="0">
+            <a:spAutoFit/>
+          </a:bodyPr>
+          <a:lstStyle/>
+          <a:p>
+            <a:r>
+              <a:rPr lang="en-GB" dirty="0">
+                <a:latin typeface="Bodoni MT" panose="02070603080606020203" pitchFamily="18" charset="0"/>
+              </a:rPr>
+              <a:t>To test the difficulty and sense of satisfaction or frustration from each puzzle.</a:t>
+            </a:r>
+          </a:p>
+        </p:txBody>
+      </p:sp>
+      <p:sp>
+        <p:nvSpPr>
+          <p:cNvPr id="13" name="TextBox 12">
+            <a:extLst>
+              <a:ext uri="{FF2B5EF4-FFF2-40B4-BE49-F238E27FC236}">
+                <a16:creationId xmlns:a16="http://schemas.microsoft.com/office/drawing/2014/main" id="{3D143883-7E11-42FA-820F-FD25A0706494}"/>
+              </a:ext>
+            </a:extLst>
+          </p:cNvPr>
+          <p:cNvSpPr txBox="1"/>
+          <p:nvPr/>
+        </p:nvSpPr>
+        <p:spPr>
+          <a:xfrm>
+            <a:off x="1568739" y="4408476"/>
+            <a:ext cx="5349021" cy="646331"/>
+          </a:xfrm>
+          <a:prstGeom prst="rect">
+            <a:avLst/>
+          </a:prstGeom>
+          <a:noFill/>
+          <a:ln>
+            <a:solidFill>
+              <a:schemeClr val="tx1"/>
+            </a:solidFill>
+          </a:ln>
+        </p:spPr>
+        <p:txBody>
+          <a:bodyPr wrap="square" rtlCol="0">
+            <a:spAutoFit/>
+          </a:bodyPr>
+          <a:lstStyle/>
+          <a:p>
+            <a:r>
+              <a:rPr lang="en-GB" dirty="0">
+                <a:latin typeface="Bodoni MT" panose="02070603080606020203" pitchFamily="18" charset="0"/>
+              </a:rPr>
+              <a:t>To test the logical progression, difficulty and enjoyment from playing the game from start to finish.</a:t>
+            </a:r>
+          </a:p>
+        </p:txBody>
+      </p:sp>
+      <p:sp>
+        <p:nvSpPr>
+          <p:cNvPr id="14" name="TextBox 13">
+            <a:extLst>
+              <a:ext uri="{FF2B5EF4-FFF2-40B4-BE49-F238E27FC236}">
+                <a16:creationId xmlns:a16="http://schemas.microsoft.com/office/drawing/2014/main" id="{441B9A9E-965F-4808-97BB-765FA754A34C}"/>
+              </a:ext>
+            </a:extLst>
+          </p:cNvPr>
+          <p:cNvSpPr txBox="1"/>
+          <p:nvPr/>
+        </p:nvSpPr>
+        <p:spPr>
+          <a:xfrm>
+            <a:off x="1166070" y="5262275"/>
+            <a:ext cx="5751692" cy="377721"/>
+          </a:xfrm>
+          <a:prstGeom prst="rect">
+            <a:avLst/>
+          </a:prstGeom>
+          <a:noFill/>
+          <a:ln>
+            <a:solidFill>
+              <a:schemeClr val="tx1"/>
+            </a:solidFill>
+          </a:ln>
+        </p:spPr>
+        <p:txBody>
+          <a:bodyPr wrap="square" rtlCol="0">
+            <a:spAutoFit/>
+          </a:bodyPr>
+          <a:lstStyle/>
+          <a:p>
+            <a:r>
+              <a:rPr lang="en-GB" b="1" dirty="0">
+                <a:latin typeface="Bodoni MT" panose="02070603080606020203" pitchFamily="18" charset="0"/>
+              </a:rPr>
+              <a:t>METHOD: </a:t>
+            </a:r>
+            <a:r>
+              <a:rPr lang="en-GB" dirty="0">
+                <a:latin typeface="Bodoni MT" panose="02070603080606020203" pitchFamily="18" charset="0"/>
+              </a:rPr>
+              <a:t>Speak-aloud demos with an observer. </a:t>
+            </a:r>
+            <a:r>
+              <a:rPr lang="en-GB" b="1" dirty="0">
+                <a:latin typeface="Bodoni MT" panose="02070603080606020203" pitchFamily="18" charset="0"/>
+              </a:rPr>
+              <a:t> </a:t>
+            </a:r>
+            <a:endParaRPr lang="en-GB" dirty="0">
+              <a:latin typeface="Bodoni MT" panose="02070603080606020203" pitchFamily="18" charset="0"/>
+            </a:endParaRPr>
           </a:p>
         </p:txBody>
       </p:sp>
@@ -6116,6 +9818,65 @@
           <a:chExt cx="0" cy="0"/>
         </a:xfrm>
       </p:grpSpPr>
+      <p:pic>
+        <p:nvPicPr>
+          <p:cNvPr id="10" name="Picture 9">
+            <a:extLst>
+              <a:ext uri="{FF2B5EF4-FFF2-40B4-BE49-F238E27FC236}">
+                <a16:creationId xmlns:a16="http://schemas.microsoft.com/office/drawing/2014/main" id="{6248F25B-52F9-4CF0-BF52-629A9FD032CE}"/>
+              </a:ext>
+            </a:extLst>
+          </p:cNvPr>
+          <p:cNvPicPr>
+            <a:picLocks noChangeAspect="1"/>
+          </p:cNvPicPr>
+          <p:nvPr/>
+        </p:nvPicPr>
+        <p:blipFill rotWithShape="1">
+          <a:blip r:embed="rId2"/>
+          <a:srcRect r="52066"/>
+          <a:stretch/>
+        </p:blipFill>
+        <p:spPr>
+          <a:xfrm>
+            <a:off x="7808860" y="0"/>
+            <a:ext cx="4383140" cy="6858000"/>
+          </a:xfrm>
+          <a:prstGeom prst="rect">
+            <a:avLst/>
+          </a:prstGeom>
+        </p:spPr>
+      </p:pic>
+      <p:pic>
+        <p:nvPicPr>
+          <p:cNvPr id="9" name="Picture 8">
+            <a:extLst>
+              <a:ext uri="{FF2B5EF4-FFF2-40B4-BE49-F238E27FC236}">
+                <a16:creationId xmlns:a16="http://schemas.microsoft.com/office/drawing/2014/main" id="{158091B3-A577-4C1D-8D3E-131CBA84C0EE}"/>
+              </a:ext>
+            </a:extLst>
+          </p:cNvPr>
+          <p:cNvPicPr>
+            <a:picLocks noChangeAspect="1"/>
+          </p:cNvPicPr>
+          <p:nvPr/>
+        </p:nvPicPr>
+        <p:blipFill>
+          <a:blip r:embed="rId2"/>
+          <a:stretch>
+            <a:fillRect/>
+          </a:stretch>
+        </p:blipFill>
+        <p:spPr>
+          <a:xfrm>
+            <a:off x="0" y="0"/>
+            <a:ext cx="9144000" cy="6858000"/>
+          </a:xfrm>
+          <a:prstGeom prst="rect">
+            <a:avLst/>
+          </a:prstGeom>
+        </p:spPr>
+      </p:pic>
       <p:sp>
         <p:nvSpPr>
           <p:cNvPr id="2" name="Title 1">
@@ -6137,6 +9898,9 @@
             <a:off x="838200" y="365125"/>
             <a:ext cx="10515600" cy="566053"/>
           </a:xfrm>
+          <a:solidFill>
+            <a:schemeClr val="bg1"/>
+          </a:solidFill>
           <a:ln>
             <a:solidFill>
               <a:schemeClr val="tx1"/>
@@ -6154,7 +9918,7 @@
               <a:rPr lang="en-GB" dirty="0">
                 <a:latin typeface="Bodoni MT" panose="02070603080606020203" pitchFamily="18" charset="0"/>
               </a:rPr>
-              <a:t>Results</a:t>
+              <a:t>User Testing Feedback (i)</a:t>
             </a:r>
           </a:p>
         </p:txBody>
@@ -6180,6 +9944,9 @@
             <a:off x="838200" y="931178"/>
             <a:ext cx="10515600" cy="5245785"/>
           </a:xfrm>
+          <a:solidFill>
+            <a:schemeClr val="bg1"/>
+          </a:solidFill>
           <a:ln>
             <a:solidFill>
               <a:schemeClr val="tx1"/>
@@ -6190,6 +9957,17 @@
           <a:bodyPr/>
           <a:lstStyle/>
           <a:p>
+            <a:pPr marL="0" indent="0">
+              <a:buNone/>
+            </a:pPr>
+            <a:endParaRPr lang="en-GB" dirty="0">
+              <a:latin typeface="Bodoni MT" panose="02070603080606020203" pitchFamily="18" charset="0"/>
+            </a:endParaRPr>
+          </a:p>
+          <a:p>
+            <a:pPr marL="0" indent="0">
+              <a:buNone/>
+            </a:pPr>
             <a:endParaRPr lang="en-GB" dirty="0">
               <a:latin typeface="Bodoni MT" panose="02070603080606020203" pitchFamily="18" charset="0"/>
             </a:endParaRPr>
@@ -6235,10 +10013,219 @@
           </a:p>
         </p:txBody>
       </p:sp>
+      <p:pic>
+        <p:nvPicPr>
+          <p:cNvPr id="8" name="Picture 7">
+            <a:extLst>
+              <a:ext uri="{FF2B5EF4-FFF2-40B4-BE49-F238E27FC236}">
+                <a16:creationId xmlns:a16="http://schemas.microsoft.com/office/drawing/2014/main" id="{A3117FBC-7DFD-4758-B4B9-29961EBB7136}"/>
+              </a:ext>
+            </a:extLst>
+          </p:cNvPr>
+          <p:cNvPicPr>
+            <a:picLocks noChangeAspect="1"/>
+          </p:cNvPicPr>
+          <p:nvPr/>
+        </p:nvPicPr>
+        <p:blipFill>
+          <a:blip r:embed="rId3"/>
+          <a:stretch>
+            <a:fillRect/>
+          </a:stretch>
+        </p:blipFill>
+        <p:spPr>
+          <a:xfrm>
+            <a:off x="7105940" y="1632457"/>
+            <a:ext cx="3782621" cy="3770054"/>
+          </a:xfrm>
+          <a:prstGeom prst="rect">
+            <a:avLst/>
+          </a:prstGeom>
+          <a:ln>
+            <a:solidFill>
+              <a:schemeClr val="tx1"/>
+            </a:solidFill>
+          </a:ln>
+        </p:spPr>
+      </p:pic>
+      <p:sp>
+        <p:nvSpPr>
+          <p:cNvPr id="11" name="TextBox 10">
+            <a:extLst>
+              <a:ext uri="{FF2B5EF4-FFF2-40B4-BE49-F238E27FC236}">
+                <a16:creationId xmlns:a16="http://schemas.microsoft.com/office/drawing/2014/main" id="{0B108C47-D011-4547-9642-A8F7197FB2ED}"/>
+              </a:ext>
+            </a:extLst>
+          </p:cNvPr>
+          <p:cNvSpPr txBox="1"/>
+          <p:nvPr/>
+        </p:nvSpPr>
+        <p:spPr>
+          <a:xfrm>
+            <a:off x="1229920" y="1296303"/>
+            <a:ext cx="5349021" cy="2031325"/>
+          </a:xfrm>
+          <a:prstGeom prst="rect">
+            <a:avLst/>
+          </a:prstGeom>
+          <a:noFill/>
+          <a:ln>
+            <a:solidFill>
+              <a:schemeClr val="tx1"/>
+            </a:solidFill>
+          </a:ln>
+        </p:spPr>
+        <p:txBody>
+          <a:bodyPr wrap="square" rtlCol="0">
+            <a:spAutoFit/>
+          </a:bodyPr>
+          <a:lstStyle/>
+          <a:p>
+            <a:r>
+              <a:rPr lang="en-GB" b="1" dirty="0">
+                <a:latin typeface="Bodoni MT" panose="02070603080606020203" pitchFamily="18" charset="0"/>
+              </a:rPr>
+              <a:t>TEST 1: PLATFORMS:</a:t>
+            </a:r>
+          </a:p>
+          <a:p>
+            <a:r>
+              <a:rPr lang="en-GB" i="1" dirty="0">
+                <a:latin typeface="Bodoni MT" panose="02070603080606020203" pitchFamily="18" charset="0"/>
+              </a:rPr>
+              <a:t>Our intention</a:t>
+            </a:r>
+            <a:r>
+              <a:rPr lang="en-GB" dirty="0">
+                <a:latin typeface="Bodoni MT" panose="02070603080606020203" pitchFamily="18" charset="0"/>
+              </a:rPr>
+              <a:t>: For difficulty to scale linearly upwards for each sequential level.</a:t>
+            </a:r>
+          </a:p>
+          <a:p>
+            <a:r>
+              <a:rPr lang="en-GB" i="1" dirty="0">
+                <a:latin typeface="Bodoni MT" panose="02070603080606020203" pitchFamily="18" charset="0"/>
+              </a:rPr>
+              <a:t>Our findings</a:t>
+            </a:r>
+            <a:r>
+              <a:rPr lang="en-GB" dirty="0">
+                <a:latin typeface="Bodoni MT" panose="02070603080606020203" pitchFamily="18" charset="0"/>
+              </a:rPr>
+              <a:t>: Participants found level 1 more difficult than level 2.</a:t>
+            </a:r>
+            <a:endParaRPr lang="en-GB" i="1" dirty="0">
+              <a:latin typeface="Bodoni MT" panose="02070603080606020203" pitchFamily="18" charset="0"/>
+            </a:endParaRPr>
+          </a:p>
+          <a:p>
+            <a:r>
+              <a:rPr lang="en-GB" i="1" dirty="0">
+                <a:latin typeface="Bodoni MT" panose="02070603080606020203" pitchFamily="18" charset="0"/>
+              </a:rPr>
+              <a:t>Action Taken</a:t>
+            </a:r>
+            <a:r>
+              <a:rPr lang="en-GB" dirty="0">
+                <a:latin typeface="Bodoni MT" panose="02070603080606020203" pitchFamily="18" charset="0"/>
+              </a:rPr>
+              <a:t>: Increased the number of fall locations and obstacles in level 2.</a:t>
+            </a:r>
+          </a:p>
+        </p:txBody>
+      </p:sp>
+      <p:sp>
+        <p:nvSpPr>
+          <p:cNvPr id="12" name="TextBox 11">
+            <a:extLst>
+              <a:ext uri="{FF2B5EF4-FFF2-40B4-BE49-F238E27FC236}">
+                <a16:creationId xmlns:a16="http://schemas.microsoft.com/office/drawing/2014/main" id="{B703FA5C-A8C2-4740-B5EE-2A5922A54DF9}"/>
+              </a:ext>
+            </a:extLst>
+          </p:cNvPr>
+          <p:cNvSpPr txBox="1"/>
+          <p:nvPr/>
+        </p:nvSpPr>
+        <p:spPr>
+          <a:xfrm>
+            <a:off x="1229919" y="3327628"/>
+            <a:ext cx="5349021" cy="2308324"/>
+          </a:xfrm>
+          <a:prstGeom prst="rect">
+            <a:avLst/>
+          </a:prstGeom>
+          <a:noFill/>
+          <a:ln>
+            <a:solidFill>
+              <a:schemeClr val="tx1"/>
+            </a:solidFill>
+          </a:ln>
+        </p:spPr>
+        <p:txBody>
+          <a:bodyPr wrap="square" rtlCol="0">
+            <a:spAutoFit/>
+          </a:bodyPr>
+          <a:lstStyle/>
+          <a:p>
+            <a:r>
+              <a:rPr lang="en-GB" b="1" dirty="0">
+                <a:latin typeface="Bodoni MT" panose="02070603080606020203" pitchFamily="18" charset="0"/>
+              </a:rPr>
+              <a:t>TEST 2: PUZZLES:</a:t>
+            </a:r>
+          </a:p>
+          <a:p>
+            <a:r>
+              <a:rPr lang="en-GB" i="1" dirty="0">
+                <a:latin typeface="Bodoni MT" panose="02070603080606020203" pitchFamily="18" charset="0"/>
+              </a:rPr>
+              <a:t>Our intention</a:t>
+            </a:r>
+            <a:r>
+              <a:rPr lang="en-GB" dirty="0">
+                <a:latin typeface="Bodoni MT" panose="02070603080606020203" pitchFamily="18" charset="0"/>
+              </a:rPr>
+              <a:t>: For each puzzle to be unique and challenging in its own way, but not to cause frustration.</a:t>
+            </a:r>
+          </a:p>
+          <a:p>
+            <a:r>
+              <a:rPr lang="en-GB" i="1" dirty="0">
+                <a:latin typeface="Bodoni MT" panose="02070603080606020203" pitchFamily="18" charset="0"/>
+              </a:rPr>
+              <a:t>Our findings</a:t>
+            </a:r>
+            <a:r>
+              <a:rPr lang="en-GB" dirty="0">
+                <a:latin typeface="Bodoni MT" panose="02070603080606020203" pitchFamily="18" charset="0"/>
+              </a:rPr>
+              <a:t>: Participants found the tile puzzle to be too complex, taking upwards of 10 minutes to solve.</a:t>
+            </a:r>
+            <a:endParaRPr lang="en-GB" i="1" dirty="0">
+              <a:latin typeface="Bodoni MT" panose="02070603080606020203" pitchFamily="18" charset="0"/>
+            </a:endParaRPr>
+          </a:p>
+          <a:p>
+            <a:r>
+              <a:rPr lang="en-GB" i="1" dirty="0">
+                <a:latin typeface="Bodoni MT" panose="02070603080606020203" pitchFamily="18" charset="0"/>
+              </a:rPr>
+              <a:t>Action Taken</a:t>
+            </a:r>
+            <a:r>
+              <a:rPr lang="en-GB" dirty="0">
+                <a:latin typeface="Bodoni MT" panose="02070603080606020203" pitchFamily="18" charset="0"/>
+              </a:rPr>
+              <a:t>: Reduced the tile size of the tile puzzle from 4x4 to 3x3.</a:t>
+            </a:r>
+          </a:p>
+        </p:txBody>
+      </p:sp>
     </p:spTree>
     <p:extLst>
       <p:ext uri="{BB962C8B-B14F-4D97-AF65-F5344CB8AC3E}">
-        <p14:creationId xmlns:p14="http://schemas.microsoft.com/office/powerpoint/2010/main" val="2348529542"/>
+        <p14:creationId xmlns:p14="http://schemas.microsoft.com/office/powerpoint/2010/main" val="3187953464"/>
       </p:ext>
     </p:extLst>
   </p:cSld>

</xml_diff>

<commit_message>
my final evaluation for d2
</commit_message>
<xml_diff>
--- a/D2.pptx
+++ b/D2.pptx
@@ -5,7 +5,7 @@
     <p:sldMasterId id="2147483648" r:id="rId1"/>
   </p:sldMasterIdLst>
   <p:notesMasterIdLst>
-    <p:notesMasterId r:id="rId14"/>
+    <p:notesMasterId r:id="rId15"/>
   </p:notesMasterIdLst>
   <p:sldIdLst>
     <p:sldId id="256" r:id="rId2"/>
@@ -20,6 +20,7 @@
     <p:sldId id="266" r:id="rId11"/>
     <p:sldId id="267" r:id="rId12"/>
     <p:sldId id="264" r:id="rId13"/>
+    <p:sldId id="269" r:id="rId14"/>
   </p:sldIdLst>
   <p:sldSz cx="12192000" cy="6858000"/>
   <p:notesSz cx="6858000" cy="9144000"/>
@@ -135,10 +136,6 @@
     </p:ext>
   </p:extLst>
 </p:presentation>
-</file>
-
-<file path=ppt/revisionInfo.xml><?xml version="1.0" encoding="utf-8"?>
-<p1510:revInfo xmlns:a="http://schemas.openxmlformats.org/drawingml/2006/main" xmlns:r="http://schemas.openxmlformats.org/officeDocument/2006/relationships" xmlns:p1510="http://schemas.microsoft.com/office/powerpoint/2015/10/main"/>
 </file>
 
 <file path=ppt/notesMasters/notesMaster1.xml><?xml version="1.0" encoding="utf-8"?>
@@ -5763,7 +5760,7 @@
               <a:rPr lang="en-GB" dirty="0">
                 <a:latin typeface="Bodoni MT" panose="02070603080606020203" pitchFamily="18" charset="0"/>
               </a:rPr>
-              <a:t>Project Evaluation</a:t>
+              <a:t>Project Evaluation - Val</a:t>
             </a:r>
           </a:p>
         </p:txBody>
@@ -5906,6 +5903,237 @@
     <p:extLst>
       <p:ext uri="{BB962C8B-B14F-4D97-AF65-F5344CB8AC3E}">
         <p14:creationId xmlns:p14="http://schemas.microsoft.com/office/powerpoint/2010/main" val="3875203172"/>
+      </p:ext>
+    </p:extLst>
+  </p:cSld>
+  <p:clrMapOvr>
+    <a:masterClrMapping/>
+  </p:clrMapOvr>
+</p:sld>
+</file>
+
+<file path=ppt/slides/slide13.xml><?xml version="1.0" encoding="utf-8"?>
+<p:sld xmlns:a="http://schemas.openxmlformats.org/drawingml/2006/main" xmlns:r="http://schemas.openxmlformats.org/officeDocument/2006/relationships" xmlns:p="http://schemas.openxmlformats.org/presentationml/2006/main">
+  <p:cSld>
+    <p:spTree>
+      <p:nvGrpSpPr>
+        <p:cNvPr id="1" name=""/>
+        <p:cNvGrpSpPr/>
+        <p:nvPr/>
+      </p:nvGrpSpPr>
+      <p:grpSpPr>
+        <a:xfrm>
+          <a:off x="0" y="0"/>
+          <a:ext cx="0" cy="0"/>
+          <a:chOff x="0" y="0"/>
+          <a:chExt cx="0" cy="0"/>
+        </a:xfrm>
+      </p:grpSpPr>
+      <p:pic>
+        <p:nvPicPr>
+          <p:cNvPr id="4" name="Picture 3">
+            <a:extLst>
+              <a:ext uri="{FF2B5EF4-FFF2-40B4-BE49-F238E27FC236}">
+                <a16:creationId xmlns:a16="http://schemas.microsoft.com/office/drawing/2014/main" id="{1F7B8747-803D-41C8-89FD-730522D4A3D6}"/>
+              </a:ext>
+            </a:extLst>
+          </p:cNvPr>
+          <p:cNvPicPr>
+            <a:picLocks noChangeAspect="1"/>
+          </p:cNvPicPr>
+          <p:nvPr/>
+        </p:nvPicPr>
+        <p:blipFill>
+          <a:blip r:embed="rId2"/>
+          <a:stretch>
+            <a:fillRect/>
+          </a:stretch>
+        </p:blipFill>
+        <p:spPr>
+          <a:xfrm>
+            <a:off x="0" y="1"/>
+            <a:ext cx="12192000" cy="6858000"/>
+          </a:xfrm>
+          <a:prstGeom prst="rect">
+            <a:avLst/>
+          </a:prstGeom>
+          <a:ln>
+            <a:solidFill>
+              <a:schemeClr val="tx1"/>
+            </a:solidFill>
+          </a:ln>
+        </p:spPr>
+      </p:pic>
+      <p:sp>
+        <p:nvSpPr>
+          <p:cNvPr id="2" name="Title 1">
+            <a:extLst>
+              <a:ext uri="{FF2B5EF4-FFF2-40B4-BE49-F238E27FC236}">
+                <a16:creationId xmlns:a16="http://schemas.microsoft.com/office/drawing/2014/main" id="{DFC049F8-2284-4161-BE3C-431BCD0EFAB7}"/>
+              </a:ext>
+            </a:extLst>
+          </p:cNvPr>
+          <p:cNvSpPr>
+            <a:spLocks noGrp="1"/>
+          </p:cNvSpPr>
+          <p:nvPr>
+            <p:ph type="title"/>
+          </p:nvPr>
+        </p:nvSpPr>
+        <p:spPr>
+          <a:xfrm>
+            <a:off x="838200" y="365125"/>
+            <a:ext cx="10515600" cy="566053"/>
+          </a:xfrm>
+          <a:solidFill>
+            <a:schemeClr val="bg1"/>
+          </a:solidFill>
+          <a:ln>
+            <a:solidFill>
+              <a:schemeClr val="tx1"/>
+            </a:solidFill>
+          </a:ln>
+        </p:spPr>
+        <p:txBody>
+          <a:bodyPr>
+            <a:normAutofit fontScale="90000"/>
+          </a:bodyPr>
+          <a:lstStyle/>
+          <a:p>
+            <a:pPr algn="ctr"/>
+            <a:r>
+              <a:rPr lang="en-GB" dirty="0">
+                <a:latin typeface="Bodoni MT" panose="02070603080606020203" pitchFamily="18" charset="0"/>
+              </a:rPr>
+              <a:t>Project Evaluation - Ben</a:t>
+            </a:r>
+          </a:p>
+        </p:txBody>
+      </p:sp>
+      <p:sp>
+        <p:nvSpPr>
+          <p:cNvPr id="3" name="Content Placeholder 2">
+            <a:extLst>
+              <a:ext uri="{FF2B5EF4-FFF2-40B4-BE49-F238E27FC236}">
+                <a16:creationId xmlns:a16="http://schemas.microsoft.com/office/drawing/2014/main" id="{F2E045F5-714F-4E07-87A1-F5696A62ED28}"/>
+              </a:ext>
+            </a:extLst>
+          </p:cNvPr>
+          <p:cNvSpPr>
+            <a:spLocks noGrp="1"/>
+          </p:cNvSpPr>
+          <p:nvPr>
+            <p:ph idx="1"/>
+          </p:nvPr>
+        </p:nvSpPr>
+        <p:spPr>
+          <a:xfrm>
+            <a:off x="838200" y="931178"/>
+            <a:ext cx="10515600" cy="5427677"/>
+          </a:xfrm>
+          <a:solidFill>
+            <a:schemeClr val="bg1"/>
+          </a:solidFill>
+          <a:ln>
+            <a:solidFill>
+              <a:schemeClr val="tx1"/>
+            </a:solidFill>
+          </a:ln>
+        </p:spPr>
+        <p:txBody>
+          <a:bodyPr>
+            <a:normAutofit/>
+          </a:bodyPr>
+          <a:lstStyle/>
+          <a:p>
+            <a:pPr marL="0" indent="0">
+              <a:buNone/>
+            </a:pPr>
+            <a:r>
+              <a:rPr lang="en-GB" dirty="0">
+                <a:latin typeface="Bodoni MT" panose="02070603080606020203" pitchFamily="18" charset="0"/>
+              </a:rPr>
+              <a:t>Despite having some small scale leadership experience in the past, I thoroughly enjoyed taking the role of team leader in this longer and more in-depth assignment.</a:t>
+            </a:r>
+          </a:p>
+          <a:p>
+            <a:pPr marL="0" indent="0">
+              <a:buNone/>
+            </a:pPr>
+            <a:r>
+              <a:rPr lang="en-GB" dirty="0">
+                <a:latin typeface="Bodoni MT" panose="02070603080606020203" pitchFamily="18" charset="0"/>
+              </a:rPr>
+              <a:t>Personally, I found that I was not always able to accurately describe my mental image of a task to my teammates, and developed methods such as forming reference material, creating lists and diagrams to help others better understand my intentions.</a:t>
+            </a:r>
+          </a:p>
+          <a:p>
+            <a:pPr marL="0" indent="0">
+              <a:buNone/>
+            </a:pPr>
+            <a:r>
+              <a:rPr lang="en-GB" dirty="0">
+                <a:latin typeface="Bodoni MT" panose="02070603080606020203" pitchFamily="18" charset="0"/>
+              </a:rPr>
+              <a:t>I tried to be fair when dividing tasks between group members and always double-checked for their own opinions on the tasks they’d been assigned.</a:t>
+            </a:r>
+          </a:p>
+          <a:p>
+            <a:pPr marL="0" indent="0">
+              <a:buNone/>
+            </a:pPr>
+            <a:r>
+              <a:rPr lang="en-GB" dirty="0">
+                <a:latin typeface="Bodoni MT" panose="02070603080606020203" pitchFamily="18" charset="0"/>
+              </a:rPr>
+              <a:t>I also enjoyed the challenge of translating real-life tangible puzzles that I used to complete as a child onto a computer-orientated format.</a:t>
+            </a:r>
+          </a:p>
+        </p:txBody>
+      </p:sp>
+      <p:sp>
+        <p:nvSpPr>
+          <p:cNvPr id="6" name="TextBox 5">
+            <a:extLst>
+              <a:ext uri="{FF2B5EF4-FFF2-40B4-BE49-F238E27FC236}">
+                <a16:creationId xmlns:a16="http://schemas.microsoft.com/office/drawing/2014/main" id="{2A7FCD91-3666-4A23-B530-B70A5977CFC4}"/>
+              </a:ext>
+            </a:extLst>
+          </p:cNvPr>
+          <p:cNvSpPr txBox="1"/>
+          <p:nvPr/>
+        </p:nvSpPr>
+        <p:spPr>
+          <a:xfrm>
+            <a:off x="10233870" y="240664"/>
+            <a:ext cx="1393272" cy="707886"/>
+          </a:xfrm>
+          <a:prstGeom prst="rect">
+            <a:avLst/>
+          </a:prstGeom>
+          <a:noFill/>
+        </p:spPr>
+        <p:txBody>
+          <a:bodyPr wrap="square" rtlCol="0">
+            <a:spAutoFit/>
+          </a:bodyPr>
+          <a:lstStyle/>
+          <a:p>
+            <a:pPr algn="ctr"/>
+            <a:r>
+              <a:rPr lang="en-GB" sz="4000" i="1" dirty="0">
+                <a:latin typeface="Bodoni MT" panose="02070603080606020203" pitchFamily="18" charset="0"/>
+                <a:ea typeface="Cambria Math" panose="02040503050406030204" pitchFamily="18" charset="0"/>
+              </a:rPr>
+              <a:t>(5)</a:t>
+            </a:r>
+          </a:p>
+        </p:txBody>
+      </p:sp>
+    </p:spTree>
+    <p:extLst>
+      <p:ext uri="{BB962C8B-B14F-4D97-AF65-F5344CB8AC3E}">
+        <p14:creationId xmlns:p14="http://schemas.microsoft.com/office/powerpoint/2010/main" val="2467745637"/>
       </p:ext>
     </p:extLst>
   </p:cSld>

</xml_diff>

<commit_message>
Add user feedback after fixes from earlier comments
</commit_message>
<xml_diff>
--- a/D2.pptx
+++ b/D2.pptx
@@ -5,7 +5,7 @@
     <p:sldMasterId id="2147483648" r:id="rId1"/>
   </p:sldMasterIdLst>
   <p:notesMasterIdLst>
-    <p:notesMasterId r:id="rId20"/>
+    <p:notesMasterId r:id="rId21"/>
   </p:notesMasterIdLst>
   <p:sldIdLst>
     <p:sldId id="275" r:id="rId2"/>
@@ -24,8 +24,9 @@
     <p:sldId id="279" r:id="rId15"/>
     <p:sldId id="280" r:id="rId16"/>
     <p:sldId id="281" r:id="rId17"/>
-    <p:sldId id="264" r:id="rId18"/>
-    <p:sldId id="269" r:id="rId19"/>
+    <p:sldId id="282" r:id="rId18"/>
+    <p:sldId id="264" r:id="rId19"/>
+    <p:sldId id="269" r:id="rId20"/>
   </p:sldIdLst>
   <p:sldSz cx="12192000" cy="6858000"/>
   <p:notesSz cx="6858000" cy="9144000"/>
@@ -126,7 +127,7 @@
   </p:defaultTextStyle>
   <p:extLst>
     <p:ext uri="{EFAFB233-063F-42B5-8137-9DF3F51BA10A}">
-      <p15:sldGuideLst xmlns:p15="http://schemas.microsoft.com/office/powerpoint/2012/main" xmlns="">
+      <p15:sldGuideLst xmlns="" xmlns:p15="http://schemas.microsoft.com/office/powerpoint/2012/main">
         <p15:guide id="1" orient="horz" pos="2160">
           <p15:clr>
             <a:srgbClr val="A4A3A4"/>
@@ -226,7 +227,7 @@
             <a:fld id="{72120EEF-C798-4279-B1C0-A28BE5B39C66}" type="datetimeFigureOut">
               <a:rPr lang="en-GB" smtClean="0"/>
               <a:pPr/>
-              <a:t>02/03/2018</a:t>
+              <a:t>03/03/2018</a:t>
             </a:fld>
             <a:endParaRPr lang="en-GB"/>
           </a:p>
@@ -395,7 +396,7 @@
     </p:spTree>
     <p:extLst>
       <p:ext uri="{BB962C8B-B14F-4D97-AF65-F5344CB8AC3E}">
-        <p14:creationId xmlns:p14="http://schemas.microsoft.com/office/powerpoint/2010/main" xmlns="" val="3478088536"/>
+        <p14:creationId xmlns="" xmlns:p14="http://schemas.microsoft.com/office/powerpoint/2010/main" val="3478088536"/>
       </p:ext>
     </p:extLst>
   </p:cSld>
@@ -1018,13 +1019,6 @@
           <a:p>
             <a:endParaRPr lang="en-GB" baseline="0" dirty="0" smtClean="0"/>
           </a:p>
-          <a:p>
-            <a:r>
-              <a:rPr lang="en-GB" baseline="0" dirty="0" smtClean="0"/>
-              <a:t>HAVE ASKED USER TO DO FRESH FEEDBACK BASED ON SUBMITTED CODE – I will add an extra slide for this</a:t>
-            </a:r>
-            <a:endParaRPr lang="en-GB" dirty="0"/>
-          </a:p>
         </p:txBody>
       </p:sp>
       <p:sp>
@@ -1046,6 +1040,153 @@
               <a:rPr lang="en-GB" smtClean="0"/>
               <a:pPr/>
               <a:t>16</a:t>
+            </a:fld>
+            <a:endParaRPr lang="en-GB"/>
+          </a:p>
+        </p:txBody>
+      </p:sp>
+    </p:spTree>
+  </p:cSld>
+  <p:clrMapOvr>
+    <a:masterClrMapping/>
+  </p:clrMapOvr>
+</p:notes>
+</file>
+
+<file path=ppt/notesSlides/notesSlide15.xml><?xml version="1.0" encoding="utf-8"?>
+<p:notes xmlns:a="http://schemas.openxmlformats.org/drawingml/2006/main" xmlns:r="http://schemas.openxmlformats.org/officeDocument/2006/relationships" xmlns:p="http://schemas.openxmlformats.org/presentationml/2006/main">
+  <p:cSld>
+    <p:spTree>
+      <p:nvGrpSpPr>
+        <p:cNvPr id="1" name=""/>
+        <p:cNvGrpSpPr/>
+        <p:nvPr/>
+      </p:nvGrpSpPr>
+      <p:grpSpPr>
+        <a:xfrm>
+          <a:off x="0" y="0"/>
+          <a:ext cx="0" cy="0"/>
+          <a:chOff x="0" y="0"/>
+          <a:chExt cx="0" cy="0"/>
+        </a:xfrm>
+      </p:grpSpPr>
+      <p:sp>
+        <p:nvSpPr>
+          <p:cNvPr id="2" name="Slide Image Placeholder 1"/>
+          <p:cNvSpPr>
+            <a:spLocks noGrp="1" noRot="1" noChangeAspect="1"/>
+          </p:cNvSpPr>
+          <p:nvPr>
+            <p:ph type="sldImg"/>
+          </p:nvPr>
+        </p:nvSpPr>
+        <p:spPr/>
+      </p:sp>
+      <p:sp>
+        <p:nvSpPr>
+          <p:cNvPr id="3" name="Notes Placeholder 2"/>
+          <p:cNvSpPr>
+            <a:spLocks noGrp="1"/>
+          </p:cNvSpPr>
+          <p:nvPr>
+            <p:ph type="body" idx="1"/>
+          </p:nvPr>
+        </p:nvSpPr>
+        <p:spPr/>
+        <p:txBody>
+          <a:bodyPr>
+            <a:normAutofit/>
+          </a:bodyPr>
+          <a:lstStyle/>
+          <a:p>
+            <a:r>
+              <a:rPr lang="en-GB" dirty="0" smtClean="0"/>
+              <a:t>This questionnaire</a:t>
+            </a:r>
+            <a:r>
+              <a:rPr lang="en-GB" baseline="0" dirty="0" smtClean="0"/>
+              <a:t> was from one tester, and was </a:t>
+            </a:r>
+            <a:r>
+              <a:rPr lang="en-GB" baseline="0" dirty="0" smtClean="0"/>
+              <a:t>after we </a:t>
+            </a:r>
+            <a:r>
+              <a:rPr lang="en-GB" baseline="0" dirty="0" smtClean="0"/>
+              <a:t>did all the </a:t>
+            </a:r>
+            <a:r>
+              <a:rPr lang="en-GB" baseline="0" dirty="0" smtClean="0"/>
+              <a:t>fixes.</a:t>
+            </a:r>
+          </a:p>
+          <a:p>
+            <a:r>
+              <a:rPr lang="en-GB" baseline="0" dirty="0" smtClean="0"/>
+              <a:t>The tester was not told what fixes had been applied; they were simply asked to re-test the game and submit </a:t>
+            </a:r>
+            <a:r>
+              <a:rPr lang="en-GB" baseline="0" smtClean="0"/>
+              <a:t>new feedback.</a:t>
+            </a:r>
+            <a:endParaRPr lang="en-GB" baseline="0" dirty="0" smtClean="0"/>
+          </a:p>
+          <a:p>
+            <a:endParaRPr lang="en-GB" baseline="0" dirty="0" smtClean="0"/>
+          </a:p>
+          <a:p>
+            <a:r>
+              <a:rPr lang="en-GB" baseline="0" dirty="0" smtClean="0"/>
+              <a:t>Their feedback was:</a:t>
+            </a:r>
+          </a:p>
+          <a:p>
+            <a:r>
+              <a:rPr lang="en-GB" baseline="0" dirty="0" smtClean="0"/>
+              <a:t>“</a:t>
+            </a:r>
+            <a:r>
+              <a:rPr lang="en-GB" sz="1200" dirty="0" smtClean="0"/>
+              <a:t>A lot better. There are still irritating bits, but it is improved, and looks nice.</a:t>
+            </a:r>
+            <a:br>
+              <a:rPr lang="en-GB" sz="1200" dirty="0" smtClean="0"/>
+            </a:br>
+            <a:r>
+              <a:rPr lang="en-GB" sz="1200" dirty="0" smtClean="0"/>
+              <a:t>I found it easy to move the player where I wanted - Mostly very good,</a:t>
+            </a:r>
+            <a:r>
+              <a:rPr lang="en-GB" sz="1200" baseline="0" dirty="0" smtClean="0"/>
+              <a:t> though</a:t>
+            </a:r>
+            <a:r>
+              <a:rPr lang="en-GB" sz="1200" dirty="0" smtClean="0"/>
+              <a:t> the elf maze still moves many steps unless I jab at the keyboard to only move one.”</a:t>
+            </a:r>
+            <a:endParaRPr lang="en-GB" baseline="0" dirty="0" smtClean="0"/>
+          </a:p>
+        </p:txBody>
+      </p:sp>
+      <p:sp>
+        <p:nvSpPr>
+          <p:cNvPr id="4" name="Slide Number Placeholder 3"/>
+          <p:cNvSpPr>
+            <a:spLocks noGrp="1"/>
+          </p:cNvSpPr>
+          <p:nvPr>
+            <p:ph type="sldNum" sz="quarter" idx="10"/>
+          </p:nvPr>
+        </p:nvSpPr>
+        <p:spPr/>
+        <p:txBody>
+          <a:bodyPr/>
+          <a:lstStyle/>
+          <a:p>
+            <a:fld id="{B4FD0D0C-5710-4AE3-80D3-D826DB3CA674}" type="slidenum">
+              <a:rPr lang="en-GB" smtClean="0"/>
+              <a:pPr/>
+              <a:t>17</a:t>
             </a:fld>
             <a:endParaRPr lang="en-GB"/>
           </a:p>
@@ -1176,7 +1317,7 @@
     </p:spTree>
     <p:extLst>
       <p:ext uri="{BB962C8B-B14F-4D97-AF65-F5344CB8AC3E}">
-        <p14:creationId xmlns:p14="http://schemas.microsoft.com/office/powerpoint/2010/main" xmlns="" val="108767136"/>
+        <p14:creationId xmlns="" xmlns:p14="http://schemas.microsoft.com/office/powerpoint/2010/main" val="108767136"/>
       </p:ext>
     </p:extLst>
   </p:cSld>
@@ -1356,7 +1497,7 @@
     </p:spTree>
     <p:extLst>
       <p:ext uri="{BB962C8B-B14F-4D97-AF65-F5344CB8AC3E}">
-        <p14:creationId xmlns:p14="http://schemas.microsoft.com/office/powerpoint/2010/main" xmlns="" val="3079722329"/>
+        <p14:creationId xmlns="" xmlns:p14="http://schemas.microsoft.com/office/powerpoint/2010/main" val="3079722329"/>
       </p:ext>
     </p:extLst>
   </p:cSld>
@@ -1605,7 +1746,7 @@
     </p:spTree>
     <p:extLst>
       <p:ext uri="{BB962C8B-B14F-4D97-AF65-F5344CB8AC3E}">
-        <p14:creationId xmlns:p14="http://schemas.microsoft.com/office/powerpoint/2010/main" xmlns="" val="1280038544"/>
+        <p14:creationId xmlns="" xmlns:p14="http://schemas.microsoft.com/office/powerpoint/2010/main" val="1280038544"/>
       </p:ext>
     </p:extLst>
   </p:cSld>
@@ -1906,7 +2047,7 @@
     </p:spTree>
     <p:extLst>
       <p:ext uri="{BB962C8B-B14F-4D97-AF65-F5344CB8AC3E}">
-        <p14:creationId xmlns:p14="http://schemas.microsoft.com/office/powerpoint/2010/main" xmlns="" val="1280038544"/>
+        <p14:creationId xmlns="" xmlns:p14="http://schemas.microsoft.com/office/powerpoint/2010/main" val="1280038544"/>
       </p:ext>
     </p:extLst>
   </p:cSld>
@@ -2215,7 +2356,7 @@
           <p:cNvPr id="2" name="Title 1">
             <a:extLst>
               <a:ext uri="{FF2B5EF4-FFF2-40B4-BE49-F238E27FC236}">
-                <a16:creationId xmlns:a16="http://schemas.microsoft.com/office/drawing/2014/main" xmlns="" id="{DF83C6BF-9C25-47A7-9E90-203791DC8017}"/>
+                <a16:creationId xmlns="" xmlns:a16="http://schemas.microsoft.com/office/drawing/2014/main" id="{DF83C6BF-9C25-47A7-9E90-203791DC8017}"/>
               </a:ext>
             </a:extLst>
           </p:cNvPr>
@@ -2253,7 +2394,7 @@
           <p:cNvPr id="3" name="Subtitle 2">
             <a:extLst>
               <a:ext uri="{FF2B5EF4-FFF2-40B4-BE49-F238E27FC236}">
-                <a16:creationId xmlns:a16="http://schemas.microsoft.com/office/drawing/2014/main" xmlns="" id="{F43AB25B-D89F-430B-83D3-AFE59D87A0C9}"/>
+                <a16:creationId xmlns="" xmlns:a16="http://schemas.microsoft.com/office/drawing/2014/main" id="{F43AB25B-D89F-430B-83D3-AFE59D87A0C9}"/>
               </a:ext>
             </a:extLst>
           </p:cNvPr>
@@ -2324,7 +2465,7 @@
           <p:cNvPr id="4" name="Date Placeholder 3">
             <a:extLst>
               <a:ext uri="{FF2B5EF4-FFF2-40B4-BE49-F238E27FC236}">
-                <a16:creationId xmlns:a16="http://schemas.microsoft.com/office/drawing/2014/main" xmlns="" id="{FC28D84A-1E26-4ADB-9293-C973C9FDD312}"/>
+                <a16:creationId xmlns="" xmlns:a16="http://schemas.microsoft.com/office/drawing/2014/main" id="{FC28D84A-1E26-4ADB-9293-C973C9FDD312}"/>
               </a:ext>
             </a:extLst>
           </p:cNvPr>
@@ -2343,7 +2484,7 @@
             <a:fld id="{24C3A72B-EA9F-49ED-9480-D5BBE463D3C6}" type="datetimeFigureOut">
               <a:rPr lang="en-GB" smtClean="0"/>
               <a:pPr/>
-              <a:t>02/03/2018</a:t>
+              <a:t>03/03/2018</a:t>
             </a:fld>
             <a:endParaRPr lang="en-GB"/>
           </a:p>
@@ -2354,7 +2495,7 @@
           <p:cNvPr id="5" name="Footer Placeholder 4">
             <a:extLst>
               <a:ext uri="{FF2B5EF4-FFF2-40B4-BE49-F238E27FC236}">
-                <a16:creationId xmlns:a16="http://schemas.microsoft.com/office/drawing/2014/main" xmlns="" id="{BD1E3808-CC4A-410D-B94B-201CBF8416A2}"/>
+                <a16:creationId xmlns="" xmlns:a16="http://schemas.microsoft.com/office/drawing/2014/main" id="{BD1E3808-CC4A-410D-B94B-201CBF8416A2}"/>
               </a:ext>
             </a:extLst>
           </p:cNvPr>
@@ -2379,7 +2520,7 @@
           <p:cNvPr id="6" name="Slide Number Placeholder 5">
             <a:extLst>
               <a:ext uri="{FF2B5EF4-FFF2-40B4-BE49-F238E27FC236}">
-                <a16:creationId xmlns:a16="http://schemas.microsoft.com/office/drawing/2014/main" xmlns="" id="{C929150F-8AB1-49F3-8CBA-F3D34AD36D29}"/>
+                <a16:creationId xmlns="" xmlns:a16="http://schemas.microsoft.com/office/drawing/2014/main" id="{C929150F-8AB1-49F3-8CBA-F3D34AD36D29}"/>
               </a:ext>
             </a:extLst>
           </p:cNvPr>
@@ -2407,7 +2548,7 @@
     </p:spTree>
     <p:extLst>
       <p:ext uri="{BB962C8B-B14F-4D97-AF65-F5344CB8AC3E}">
-        <p14:creationId xmlns:p14="http://schemas.microsoft.com/office/powerpoint/2010/main" xmlns="" val="3770199555"/>
+        <p14:creationId xmlns="" xmlns:p14="http://schemas.microsoft.com/office/powerpoint/2010/main" val="3770199555"/>
       </p:ext>
     </p:extLst>
   </p:cSld>
@@ -2439,7 +2580,7 @@
           <p:cNvPr id="2" name="Title 1">
             <a:extLst>
               <a:ext uri="{FF2B5EF4-FFF2-40B4-BE49-F238E27FC236}">
-                <a16:creationId xmlns:a16="http://schemas.microsoft.com/office/drawing/2014/main" xmlns="" id="{E7320A48-0F56-4BFE-B5E3-C4B1A8363197}"/>
+                <a16:creationId xmlns="" xmlns:a16="http://schemas.microsoft.com/office/drawing/2014/main" id="{E7320A48-0F56-4BFE-B5E3-C4B1A8363197}"/>
               </a:ext>
             </a:extLst>
           </p:cNvPr>
@@ -2468,7 +2609,7 @@
           <p:cNvPr id="3" name="Vertical Text Placeholder 2">
             <a:extLst>
               <a:ext uri="{FF2B5EF4-FFF2-40B4-BE49-F238E27FC236}">
-                <a16:creationId xmlns:a16="http://schemas.microsoft.com/office/drawing/2014/main" xmlns="" id="{92301219-EFB4-4606-92FB-C77A02640AFC}"/>
+                <a16:creationId xmlns="" xmlns:a16="http://schemas.microsoft.com/office/drawing/2014/main" id="{92301219-EFB4-4606-92FB-C77A02640AFC}"/>
               </a:ext>
             </a:extLst>
           </p:cNvPr>
@@ -2526,7 +2667,7 @@
           <p:cNvPr id="4" name="Date Placeholder 3">
             <a:extLst>
               <a:ext uri="{FF2B5EF4-FFF2-40B4-BE49-F238E27FC236}">
-                <a16:creationId xmlns:a16="http://schemas.microsoft.com/office/drawing/2014/main" xmlns="" id="{B176B311-50DE-481D-AA1B-0D148FBEB50F}"/>
+                <a16:creationId xmlns="" xmlns:a16="http://schemas.microsoft.com/office/drawing/2014/main" id="{B176B311-50DE-481D-AA1B-0D148FBEB50F}"/>
               </a:ext>
             </a:extLst>
           </p:cNvPr>
@@ -2545,7 +2686,7 @@
             <a:fld id="{24C3A72B-EA9F-49ED-9480-D5BBE463D3C6}" type="datetimeFigureOut">
               <a:rPr lang="en-GB" smtClean="0"/>
               <a:pPr/>
-              <a:t>02/03/2018</a:t>
+              <a:t>03/03/2018</a:t>
             </a:fld>
             <a:endParaRPr lang="en-GB"/>
           </a:p>
@@ -2556,7 +2697,7 @@
           <p:cNvPr id="5" name="Footer Placeholder 4">
             <a:extLst>
               <a:ext uri="{FF2B5EF4-FFF2-40B4-BE49-F238E27FC236}">
-                <a16:creationId xmlns:a16="http://schemas.microsoft.com/office/drawing/2014/main" xmlns="" id="{6702C4FC-01C0-4882-AB0A-3FC6EEA94812}"/>
+                <a16:creationId xmlns="" xmlns:a16="http://schemas.microsoft.com/office/drawing/2014/main" id="{6702C4FC-01C0-4882-AB0A-3FC6EEA94812}"/>
               </a:ext>
             </a:extLst>
           </p:cNvPr>
@@ -2581,7 +2722,7 @@
           <p:cNvPr id="6" name="Slide Number Placeholder 5">
             <a:extLst>
               <a:ext uri="{FF2B5EF4-FFF2-40B4-BE49-F238E27FC236}">
-                <a16:creationId xmlns:a16="http://schemas.microsoft.com/office/drawing/2014/main" xmlns="" id="{441B0672-CB38-4C7F-8FE8-5B7BCF1A143B}"/>
+                <a16:creationId xmlns="" xmlns:a16="http://schemas.microsoft.com/office/drawing/2014/main" id="{441B0672-CB38-4C7F-8FE8-5B7BCF1A143B}"/>
               </a:ext>
             </a:extLst>
           </p:cNvPr>
@@ -2609,7 +2750,7 @@
     </p:spTree>
     <p:extLst>
       <p:ext uri="{BB962C8B-B14F-4D97-AF65-F5344CB8AC3E}">
-        <p14:creationId xmlns:p14="http://schemas.microsoft.com/office/powerpoint/2010/main" xmlns="" val="113615128"/>
+        <p14:creationId xmlns="" xmlns:p14="http://schemas.microsoft.com/office/powerpoint/2010/main" val="113615128"/>
       </p:ext>
     </p:extLst>
   </p:cSld>
@@ -2641,7 +2782,7 @@
           <p:cNvPr id="2" name="Vertical Title 1">
             <a:extLst>
               <a:ext uri="{FF2B5EF4-FFF2-40B4-BE49-F238E27FC236}">
-                <a16:creationId xmlns:a16="http://schemas.microsoft.com/office/drawing/2014/main" xmlns="" id="{9B3A92BF-0813-4A3B-818D-C11C33E4DEE9}"/>
+                <a16:creationId xmlns="" xmlns:a16="http://schemas.microsoft.com/office/drawing/2014/main" id="{9B3A92BF-0813-4A3B-818D-C11C33E4DEE9}"/>
               </a:ext>
             </a:extLst>
           </p:cNvPr>
@@ -2675,7 +2816,7 @@
           <p:cNvPr id="3" name="Vertical Text Placeholder 2">
             <a:extLst>
               <a:ext uri="{FF2B5EF4-FFF2-40B4-BE49-F238E27FC236}">
-                <a16:creationId xmlns:a16="http://schemas.microsoft.com/office/drawing/2014/main" xmlns="" id="{A7B1995E-87E9-464D-BFDD-FFDDCDF93F7E}"/>
+                <a16:creationId xmlns="" xmlns:a16="http://schemas.microsoft.com/office/drawing/2014/main" id="{A7B1995E-87E9-464D-BFDD-FFDDCDF93F7E}"/>
               </a:ext>
             </a:extLst>
           </p:cNvPr>
@@ -2738,7 +2879,7 @@
           <p:cNvPr id="4" name="Date Placeholder 3">
             <a:extLst>
               <a:ext uri="{FF2B5EF4-FFF2-40B4-BE49-F238E27FC236}">
-                <a16:creationId xmlns:a16="http://schemas.microsoft.com/office/drawing/2014/main" xmlns="" id="{6CA12D7A-59F4-418F-ADB1-D361AEF263CB}"/>
+                <a16:creationId xmlns="" xmlns:a16="http://schemas.microsoft.com/office/drawing/2014/main" id="{6CA12D7A-59F4-418F-ADB1-D361AEF263CB}"/>
               </a:ext>
             </a:extLst>
           </p:cNvPr>
@@ -2757,7 +2898,7 @@
             <a:fld id="{24C3A72B-EA9F-49ED-9480-D5BBE463D3C6}" type="datetimeFigureOut">
               <a:rPr lang="en-GB" smtClean="0"/>
               <a:pPr/>
-              <a:t>02/03/2018</a:t>
+              <a:t>03/03/2018</a:t>
             </a:fld>
             <a:endParaRPr lang="en-GB"/>
           </a:p>
@@ -2768,7 +2909,7 @@
           <p:cNvPr id="5" name="Footer Placeholder 4">
             <a:extLst>
               <a:ext uri="{FF2B5EF4-FFF2-40B4-BE49-F238E27FC236}">
-                <a16:creationId xmlns:a16="http://schemas.microsoft.com/office/drawing/2014/main" xmlns="" id="{467DB65F-E560-4A0C-8A4A-8E7A6A91C860}"/>
+                <a16:creationId xmlns="" xmlns:a16="http://schemas.microsoft.com/office/drawing/2014/main" id="{467DB65F-E560-4A0C-8A4A-8E7A6A91C860}"/>
               </a:ext>
             </a:extLst>
           </p:cNvPr>
@@ -2793,7 +2934,7 @@
           <p:cNvPr id="6" name="Slide Number Placeholder 5">
             <a:extLst>
               <a:ext uri="{FF2B5EF4-FFF2-40B4-BE49-F238E27FC236}">
-                <a16:creationId xmlns:a16="http://schemas.microsoft.com/office/drawing/2014/main" xmlns="" id="{E8E88C02-5AF6-43A6-9D49-032C7A2D2D72}"/>
+                <a16:creationId xmlns="" xmlns:a16="http://schemas.microsoft.com/office/drawing/2014/main" id="{E8E88C02-5AF6-43A6-9D49-032C7A2D2D72}"/>
               </a:ext>
             </a:extLst>
           </p:cNvPr>
@@ -2821,7 +2962,7 @@
     </p:spTree>
     <p:extLst>
       <p:ext uri="{BB962C8B-B14F-4D97-AF65-F5344CB8AC3E}">
-        <p14:creationId xmlns:p14="http://schemas.microsoft.com/office/powerpoint/2010/main" xmlns="" val="3170355863"/>
+        <p14:creationId xmlns="" xmlns:p14="http://schemas.microsoft.com/office/powerpoint/2010/main" val="3170355863"/>
       </p:ext>
     </p:extLst>
   </p:cSld>
@@ -2853,7 +2994,7 @@
           <p:cNvPr id="2" name="Title 1">
             <a:extLst>
               <a:ext uri="{FF2B5EF4-FFF2-40B4-BE49-F238E27FC236}">
-                <a16:creationId xmlns:a16="http://schemas.microsoft.com/office/drawing/2014/main" xmlns="" id="{B8856D69-20FF-4661-9073-426B77C624CB}"/>
+                <a16:creationId xmlns="" xmlns:a16="http://schemas.microsoft.com/office/drawing/2014/main" id="{B8856D69-20FF-4661-9073-426B77C624CB}"/>
               </a:ext>
             </a:extLst>
           </p:cNvPr>
@@ -2882,7 +3023,7 @@
           <p:cNvPr id="3" name="Content Placeholder 2">
             <a:extLst>
               <a:ext uri="{FF2B5EF4-FFF2-40B4-BE49-F238E27FC236}">
-                <a16:creationId xmlns:a16="http://schemas.microsoft.com/office/drawing/2014/main" xmlns="" id="{4D713998-E95E-442D-BD8B-F99BAFFEBE64}"/>
+                <a16:creationId xmlns="" xmlns:a16="http://schemas.microsoft.com/office/drawing/2014/main" id="{4D713998-E95E-442D-BD8B-F99BAFFEBE64}"/>
               </a:ext>
             </a:extLst>
           </p:cNvPr>
@@ -2940,7 +3081,7 @@
           <p:cNvPr id="4" name="Date Placeholder 3">
             <a:extLst>
               <a:ext uri="{FF2B5EF4-FFF2-40B4-BE49-F238E27FC236}">
-                <a16:creationId xmlns:a16="http://schemas.microsoft.com/office/drawing/2014/main" xmlns="" id="{31180D3F-E491-4445-8955-67AFE52FC796}"/>
+                <a16:creationId xmlns="" xmlns:a16="http://schemas.microsoft.com/office/drawing/2014/main" id="{31180D3F-E491-4445-8955-67AFE52FC796}"/>
               </a:ext>
             </a:extLst>
           </p:cNvPr>
@@ -2959,7 +3100,7 @@
             <a:fld id="{24C3A72B-EA9F-49ED-9480-D5BBE463D3C6}" type="datetimeFigureOut">
               <a:rPr lang="en-GB" smtClean="0"/>
               <a:pPr/>
-              <a:t>02/03/2018</a:t>
+              <a:t>03/03/2018</a:t>
             </a:fld>
             <a:endParaRPr lang="en-GB"/>
           </a:p>
@@ -2970,7 +3111,7 @@
           <p:cNvPr id="5" name="Footer Placeholder 4">
             <a:extLst>
               <a:ext uri="{FF2B5EF4-FFF2-40B4-BE49-F238E27FC236}">
-                <a16:creationId xmlns:a16="http://schemas.microsoft.com/office/drawing/2014/main" xmlns="" id="{5CED9A43-BFD2-4EDD-802E-19797C6D70CA}"/>
+                <a16:creationId xmlns="" xmlns:a16="http://schemas.microsoft.com/office/drawing/2014/main" id="{5CED9A43-BFD2-4EDD-802E-19797C6D70CA}"/>
               </a:ext>
             </a:extLst>
           </p:cNvPr>
@@ -2995,7 +3136,7 @@
           <p:cNvPr id="6" name="Slide Number Placeholder 5">
             <a:extLst>
               <a:ext uri="{FF2B5EF4-FFF2-40B4-BE49-F238E27FC236}">
-                <a16:creationId xmlns:a16="http://schemas.microsoft.com/office/drawing/2014/main" xmlns="" id="{28FC87F7-4CBA-466F-863D-11A1CA8764AA}"/>
+                <a16:creationId xmlns="" xmlns:a16="http://schemas.microsoft.com/office/drawing/2014/main" id="{28FC87F7-4CBA-466F-863D-11A1CA8764AA}"/>
               </a:ext>
             </a:extLst>
           </p:cNvPr>
@@ -3023,7 +3164,7 @@
     </p:spTree>
     <p:extLst>
       <p:ext uri="{BB962C8B-B14F-4D97-AF65-F5344CB8AC3E}">
-        <p14:creationId xmlns:p14="http://schemas.microsoft.com/office/powerpoint/2010/main" xmlns="" val="1398053472"/>
+        <p14:creationId xmlns="" xmlns:p14="http://schemas.microsoft.com/office/powerpoint/2010/main" val="1398053472"/>
       </p:ext>
     </p:extLst>
   </p:cSld>
@@ -3055,7 +3196,7 @@
           <p:cNvPr id="2" name="Title 1">
             <a:extLst>
               <a:ext uri="{FF2B5EF4-FFF2-40B4-BE49-F238E27FC236}">
-                <a16:creationId xmlns:a16="http://schemas.microsoft.com/office/drawing/2014/main" xmlns="" id="{F8713CCA-DA4A-4E8D-A6E6-4D5C06A1CA92}"/>
+                <a16:creationId xmlns="" xmlns:a16="http://schemas.microsoft.com/office/drawing/2014/main" id="{F8713CCA-DA4A-4E8D-A6E6-4D5C06A1CA92}"/>
               </a:ext>
             </a:extLst>
           </p:cNvPr>
@@ -3093,7 +3234,7 @@
           <p:cNvPr id="3" name="Text Placeholder 2">
             <a:extLst>
               <a:ext uri="{FF2B5EF4-FFF2-40B4-BE49-F238E27FC236}">
-                <a16:creationId xmlns:a16="http://schemas.microsoft.com/office/drawing/2014/main" xmlns="" id="{E796A181-893E-4E6D-8829-2ABB545F4D93}"/>
+                <a16:creationId xmlns="" xmlns:a16="http://schemas.microsoft.com/office/drawing/2014/main" id="{E796A181-893E-4E6D-8829-2ABB545F4D93}"/>
               </a:ext>
             </a:extLst>
           </p:cNvPr>
@@ -3218,7 +3359,7 @@
           <p:cNvPr id="4" name="Date Placeholder 3">
             <a:extLst>
               <a:ext uri="{FF2B5EF4-FFF2-40B4-BE49-F238E27FC236}">
-                <a16:creationId xmlns:a16="http://schemas.microsoft.com/office/drawing/2014/main" xmlns="" id="{4F60A353-D637-4AFB-963D-A375C8D7DE15}"/>
+                <a16:creationId xmlns="" xmlns:a16="http://schemas.microsoft.com/office/drawing/2014/main" id="{4F60A353-D637-4AFB-963D-A375C8D7DE15}"/>
               </a:ext>
             </a:extLst>
           </p:cNvPr>
@@ -3237,7 +3378,7 @@
             <a:fld id="{24C3A72B-EA9F-49ED-9480-D5BBE463D3C6}" type="datetimeFigureOut">
               <a:rPr lang="en-GB" smtClean="0"/>
               <a:pPr/>
-              <a:t>02/03/2018</a:t>
+              <a:t>03/03/2018</a:t>
             </a:fld>
             <a:endParaRPr lang="en-GB"/>
           </a:p>
@@ -3248,7 +3389,7 @@
           <p:cNvPr id="5" name="Footer Placeholder 4">
             <a:extLst>
               <a:ext uri="{FF2B5EF4-FFF2-40B4-BE49-F238E27FC236}">
-                <a16:creationId xmlns:a16="http://schemas.microsoft.com/office/drawing/2014/main" xmlns="" id="{14A1034E-26D2-46C4-B048-516F786DA9EC}"/>
+                <a16:creationId xmlns="" xmlns:a16="http://schemas.microsoft.com/office/drawing/2014/main" id="{14A1034E-26D2-46C4-B048-516F786DA9EC}"/>
               </a:ext>
             </a:extLst>
           </p:cNvPr>
@@ -3273,7 +3414,7 @@
           <p:cNvPr id="6" name="Slide Number Placeholder 5">
             <a:extLst>
               <a:ext uri="{FF2B5EF4-FFF2-40B4-BE49-F238E27FC236}">
-                <a16:creationId xmlns:a16="http://schemas.microsoft.com/office/drawing/2014/main" xmlns="" id="{946ACA28-BDA0-401C-B5E5-029DDA8E1D7B}"/>
+                <a16:creationId xmlns="" xmlns:a16="http://schemas.microsoft.com/office/drawing/2014/main" id="{946ACA28-BDA0-401C-B5E5-029DDA8E1D7B}"/>
               </a:ext>
             </a:extLst>
           </p:cNvPr>
@@ -3301,7 +3442,7 @@
     </p:spTree>
     <p:extLst>
       <p:ext uri="{BB962C8B-B14F-4D97-AF65-F5344CB8AC3E}">
-        <p14:creationId xmlns:p14="http://schemas.microsoft.com/office/powerpoint/2010/main" xmlns="" val="1945849922"/>
+        <p14:creationId xmlns="" xmlns:p14="http://schemas.microsoft.com/office/powerpoint/2010/main" val="1945849922"/>
       </p:ext>
     </p:extLst>
   </p:cSld>
@@ -3333,7 +3474,7 @@
           <p:cNvPr id="2" name="Title 1">
             <a:extLst>
               <a:ext uri="{FF2B5EF4-FFF2-40B4-BE49-F238E27FC236}">
-                <a16:creationId xmlns:a16="http://schemas.microsoft.com/office/drawing/2014/main" xmlns="" id="{5C30AE81-C3FC-46F8-A43E-6CEB9925FC44}"/>
+                <a16:creationId xmlns="" xmlns:a16="http://schemas.microsoft.com/office/drawing/2014/main" id="{5C30AE81-C3FC-46F8-A43E-6CEB9925FC44}"/>
               </a:ext>
             </a:extLst>
           </p:cNvPr>
@@ -3362,7 +3503,7 @@
           <p:cNvPr id="3" name="Content Placeholder 2">
             <a:extLst>
               <a:ext uri="{FF2B5EF4-FFF2-40B4-BE49-F238E27FC236}">
-                <a16:creationId xmlns:a16="http://schemas.microsoft.com/office/drawing/2014/main" xmlns="" id="{5088C0F7-4CD0-4904-8A34-D6A4CBE69A6E}"/>
+                <a16:creationId xmlns="" xmlns:a16="http://schemas.microsoft.com/office/drawing/2014/main" id="{5088C0F7-4CD0-4904-8A34-D6A4CBE69A6E}"/>
               </a:ext>
             </a:extLst>
           </p:cNvPr>
@@ -3425,7 +3566,7 @@
           <p:cNvPr id="4" name="Content Placeholder 3">
             <a:extLst>
               <a:ext uri="{FF2B5EF4-FFF2-40B4-BE49-F238E27FC236}">
-                <a16:creationId xmlns:a16="http://schemas.microsoft.com/office/drawing/2014/main" xmlns="" id="{16A80048-D1B9-4999-807E-1BF158739194}"/>
+                <a16:creationId xmlns="" xmlns:a16="http://schemas.microsoft.com/office/drawing/2014/main" id="{16A80048-D1B9-4999-807E-1BF158739194}"/>
               </a:ext>
             </a:extLst>
           </p:cNvPr>
@@ -3488,7 +3629,7 @@
           <p:cNvPr id="5" name="Date Placeholder 4">
             <a:extLst>
               <a:ext uri="{FF2B5EF4-FFF2-40B4-BE49-F238E27FC236}">
-                <a16:creationId xmlns:a16="http://schemas.microsoft.com/office/drawing/2014/main" xmlns="" id="{5F1C4467-5E7A-444D-8C1F-9C85A5350FEC}"/>
+                <a16:creationId xmlns="" xmlns:a16="http://schemas.microsoft.com/office/drawing/2014/main" id="{5F1C4467-5E7A-444D-8C1F-9C85A5350FEC}"/>
               </a:ext>
             </a:extLst>
           </p:cNvPr>
@@ -3507,7 +3648,7 @@
             <a:fld id="{24C3A72B-EA9F-49ED-9480-D5BBE463D3C6}" type="datetimeFigureOut">
               <a:rPr lang="en-GB" smtClean="0"/>
               <a:pPr/>
-              <a:t>02/03/2018</a:t>
+              <a:t>03/03/2018</a:t>
             </a:fld>
             <a:endParaRPr lang="en-GB"/>
           </a:p>
@@ -3518,7 +3659,7 @@
           <p:cNvPr id="6" name="Footer Placeholder 5">
             <a:extLst>
               <a:ext uri="{FF2B5EF4-FFF2-40B4-BE49-F238E27FC236}">
-                <a16:creationId xmlns:a16="http://schemas.microsoft.com/office/drawing/2014/main" xmlns="" id="{384026F4-B643-4CC3-B710-FE767082020C}"/>
+                <a16:creationId xmlns="" xmlns:a16="http://schemas.microsoft.com/office/drawing/2014/main" id="{384026F4-B643-4CC3-B710-FE767082020C}"/>
               </a:ext>
             </a:extLst>
           </p:cNvPr>
@@ -3543,7 +3684,7 @@
           <p:cNvPr id="7" name="Slide Number Placeholder 6">
             <a:extLst>
               <a:ext uri="{FF2B5EF4-FFF2-40B4-BE49-F238E27FC236}">
-                <a16:creationId xmlns:a16="http://schemas.microsoft.com/office/drawing/2014/main" xmlns="" id="{B4F45919-5C3E-4A20-BC4E-1A8950F00937}"/>
+                <a16:creationId xmlns="" xmlns:a16="http://schemas.microsoft.com/office/drawing/2014/main" id="{B4F45919-5C3E-4A20-BC4E-1A8950F00937}"/>
               </a:ext>
             </a:extLst>
           </p:cNvPr>
@@ -3571,7 +3712,7 @@
     </p:spTree>
     <p:extLst>
       <p:ext uri="{BB962C8B-B14F-4D97-AF65-F5344CB8AC3E}">
-        <p14:creationId xmlns:p14="http://schemas.microsoft.com/office/powerpoint/2010/main" xmlns="" val="1382044922"/>
+        <p14:creationId xmlns="" xmlns:p14="http://schemas.microsoft.com/office/powerpoint/2010/main" val="1382044922"/>
       </p:ext>
     </p:extLst>
   </p:cSld>
@@ -3603,7 +3744,7 @@
           <p:cNvPr id="2" name="Title 1">
             <a:extLst>
               <a:ext uri="{FF2B5EF4-FFF2-40B4-BE49-F238E27FC236}">
-                <a16:creationId xmlns:a16="http://schemas.microsoft.com/office/drawing/2014/main" xmlns="" id="{E40FFFB1-649D-426B-B189-1DAD66D14336}"/>
+                <a16:creationId xmlns="" xmlns:a16="http://schemas.microsoft.com/office/drawing/2014/main" id="{E40FFFB1-649D-426B-B189-1DAD66D14336}"/>
               </a:ext>
             </a:extLst>
           </p:cNvPr>
@@ -3637,7 +3778,7 @@
           <p:cNvPr id="3" name="Text Placeholder 2">
             <a:extLst>
               <a:ext uri="{FF2B5EF4-FFF2-40B4-BE49-F238E27FC236}">
-                <a16:creationId xmlns:a16="http://schemas.microsoft.com/office/drawing/2014/main" xmlns="" id="{8772471C-BEC4-47A2-ACB6-54F4C91BFB2A}"/>
+                <a16:creationId xmlns="" xmlns:a16="http://schemas.microsoft.com/office/drawing/2014/main" id="{8772471C-BEC4-47A2-ACB6-54F4C91BFB2A}"/>
               </a:ext>
             </a:extLst>
           </p:cNvPr>
@@ -3708,7 +3849,7 @@
           <p:cNvPr id="4" name="Content Placeholder 3">
             <a:extLst>
               <a:ext uri="{FF2B5EF4-FFF2-40B4-BE49-F238E27FC236}">
-                <a16:creationId xmlns:a16="http://schemas.microsoft.com/office/drawing/2014/main" xmlns="" id="{5AD87827-BA33-4B72-BCD3-C0C3D2AA931B}"/>
+                <a16:creationId xmlns="" xmlns:a16="http://schemas.microsoft.com/office/drawing/2014/main" id="{5AD87827-BA33-4B72-BCD3-C0C3D2AA931B}"/>
               </a:ext>
             </a:extLst>
           </p:cNvPr>
@@ -3771,7 +3912,7 @@
           <p:cNvPr id="5" name="Text Placeholder 4">
             <a:extLst>
               <a:ext uri="{FF2B5EF4-FFF2-40B4-BE49-F238E27FC236}">
-                <a16:creationId xmlns:a16="http://schemas.microsoft.com/office/drawing/2014/main" xmlns="" id="{138A58D4-A5B6-48A1-B509-C37CE93409BD}"/>
+                <a16:creationId xmlns="" xmlns:a16="http://schemas.microsoft.com/office/drawing/2014/main" id="{138A58D4-A5B6-48A1-B509-C37CE93409BD}"/>
               </a:ext>
             </a:extLst>
           </p:cNvPr>
@@ -3842,7 +3983,7 @@
           <p:cNvPr id="6" name="Content Placeholder 5">
             <a:extLst>
               <a:ext uri="{FF2B5EF4-FFF2-40B4-BE49-F238E27FC236}">
-                <a16:creationId xmlns:a16="http://schemas.microsoft.com/office/drawing/2014/main" xmlns="" id="{6CC17053-AB6B-4F65-8F9E-EDC8C39D1399}"/>
+                <a16:creationId xmlns="" xmlns:a16="http://schemas.microsoft.com/office/drawing/2014/main" id="{6CC17053-AB6B-4F65-8F9E-EDC8C39D1399}"/>
               </a:ext>
             </a:extLst>
           </p:cNvPr>
@@ -3905,7 +4046,7 @@
           <p:cNvPr id="7" name="Date Placeholder 6">
             <a:extLst>
               <a:ext uri="{FF2B5EF4-FFF2-40B4-BE49-F238E27FC236}">
-                <a16:creationId xmlns:a16="http://schemas.microsoft.com/office/drawing/2014/main" xmlns="" id="{E3D90822-B7B8-481A-BB0C-B672B0F6A17C}"/>
+                <a16:creationId xmlns="" xmlns:a16="http://schemas.microsoft.com/office/drawing/2014/main" id="{E3D90822-B7B8-481A-BB0C-B672B0F6A17C}"/>
               </a:ext>
             </a:extLst>
           </p:cNvPr>
@@ -3924,7 +4065,7 @@
             <a:fld id="{24C3A72B-EA9F-49ED-9480-D5BBE463D3C6}" type="datetimeFigureOut">
               <a:rPr lang="en-GB" smtClean="0"/>
               <a:pPr/>
-              <a:t>02/03/2018</a:t>
+              <a:t>03/03/2018</a:t>
             </a:fld>
             <a:endParaRPr lang="en-GB"/>
           </a:p>
@@ -3935,7 +4076,7 @@
           <p:cNvPr id="8" name="Footer Placeholder 7">
             <a:extLst>
               <a:ext uri="{FF2B5EF4-FFF2-40B4-BE49-F238E27FC236}">
-                <a16:creationId xmlns:a16="http://schemas.microsoft.com/office/drawing/2014/main" xmlns="" id="{3A433E44-143D-440A-8BD2-8BC9C9CF6734}"/>
+                <a16:creationId xmlns="" xmlns:a16="http://schemas.microsoft.com/office/drawing/2014/main" id="{3A433E44-143D-440A-8BD2-8BC9C9CF6734}"/>
               </a:ext>
             </a:extLst>
           </p:cNvPr>
@@ -3960,7 +4101,7 @@
           <p:cNvPr id="9" name="Slide Number Placeholder 8">
             <a:extLst>
               <a:ext uri="{FF2B5EF4-FFF2-40B4-BE49-F238E27FC236}">
-                <a16:creationId xmlns:a16="http://schemas.microsoft.com/office/drawing/2014/main" xmlns="" id="{EC97B467-9FF0-43E8-9056-E6AB688AFC17}"/>
+                <a16:creationId xmlns="" xmlns:a16="http://schemas.microsoft.com/office/drawing/2014/main" id="{EC97B467-9FF0-43E8-9056-E6AB688AFC17}"/>
               </a:ext>
             </a:extLst>
           </p:cNvPr>
@@ -3988,7 +4129,7 @@
     </p:spTree>
     <p:extLst>
       <p:ext uri="{BB962C8B-B14F-4D97-AF65-F5344CB8AC3E}">
-        <p14:creationId xmlns:p14="http://schemas.microsoft.com/office/powerpoint/2010/main" xmlns="" val="3457634593"/>
+        <p14:creationId xmlns="" xmlns:p14="http://schemas.microsoft.com/office/powerpoint/2010/main" val="3457634593"/>
       </p:ext>
     </p:extLst>
   </p:cSld>
@@ -4020,7 +4161,7 @@
           <p:cNvPr id="2" name="Title 1">
             <a:extLst>
               <a:ext uri="{FF2B5EF4-FFF2-40B4-BE49-F238E27FC236}">
-                <a16:creationId xmlns:a16="http://schemas.microsoft.com/office/drawing/2014/main" xmlns="" id="{126C16E5-B433-42A2-9EFF-55EF20909D15}"/>
+                <a16:creationId xmlns="" xmlns:a16="http://schemas.microsoft.com/office/drawing/2014/main" id="{126C16E5-B433-42A2-9EFF-55EF20909D15}"/>
               </a:ext>
             </a:extLst>
           </p:cNvPr>
@@ -4049,7 +4190,7 @@
           <p:cNvPr id="3" name="Date Placeholder 2">
             <a:extLst>
               <a:ext uri="{FF2B5EF4-FFF2-40B4-BE49-F238E27FC236}">
-                <a16:creationId xmlns:a16="http://schemas.microsoft.com/office/drawing/2014/main" xmlns="" id="{4B69A33F-53FA-4B8F-923C-811A663804E1}"/>
+                <a16:creationId xmlns="" xmlns:a16="http://schemas.microsoft.com/office/drawing/2014/main" id="{4B69A33F-53FA-4B8F-923C-811A663804E1}"/>
               </a:ext>
             </a:extLst>
           </p:cNvPr>
@@ -4068,7 +4209,7 @@
             <a:fld id="{24C3A72B-EA9F-49ED-9480-D5BBE463D3C6}" type="datetimeFigureOut">
               <a:rPr lang="en-GB" smtClean="0"/>
               <a:pPr/>
-              <a:t>02/03/2018</a:t>
+              <a:t>03/03/2018</a:t>
             </a:fld>
             <a:endParaRPr lang="en-GB"/>
           </a:p>
@@ -4079,7 +4220,7 @@
           <p:cNvPr id="4" name="Footer Placeholder 3">
             <a:extLst>
               <a:ext uri="{FF2B5EF4-FFF2-40B4-BE49-F238E27FC236}">
-                <a16:creationId xmlns:a16="http://schemas.microsoft.com/office/drawing/2014/main" xmlns="" id="{CE5979CA-B672-4BE0-9727-E607CF5FBA10}"/>
+                <a16:creationId xmlns="" xmlns:a16="http://schemas.microsoft.com/office/drawing/2014/main" id="{CE5979CA-B672-4BE0-9727-E607CF5FBA10}"/>
               </a:ext>
             </a:extLst>
           </p:cNvPr>
@@ -4104,7 +4245,7 @@
           <p:cNvPr id="5" name="Slide Number Placeholder 4">
             <a:extLst>
               <a:ext uri="{FF2B5EF4-FFF2-40B4-BE49-F238E27FC236}">
-                <a16:creationId xmlns:a16="http://schemas.microsoft.com/office/drawing/2014/main" xmlns="" id="{9F7BAA98-4121-40E6-B29F-2204B30F0C2E}"/>
+                <a16:creationId xmlns="" xmlns:a16="http://schemas.microsoft.com/office/drawing/2014/main" id="{9F7BAA98-4121-40E6-B29F-2204B30F0C2E}"/>
               </a:ext>
             </a:extLst>
           </p:cNvPr>
@@ -4132,7 +4273,7 @@
     </p:spTree>
     <p:extLst>
       <p:ext uri="{BB962C8B-B14F-4D97-AF65-F5344CB8AC3E}">
-        <p14:creationId xmlns:p14="http://schemas.microsoft.com/office/powerpoint/2010/main" xmlns="" val="4070145130"/>
+        <p14:creationId xmlns="" xmlns:p14="http://schemas.microsoft.com/office/powerpoint/2010/main" val="4070145130"/>
       </p:ext>
     </p:extLst>
   </p:cSld>
@@ -4164,7 +4305,7 @@
           <p:cNvPr id="2" name="Date Placeholder 1">
             <a:extLst>
               <a:ext uri="{FF2B5EF4-FFF2-40B4-BE49-F238E27FC236}">
-                <a16:creationId xmlns:a16="http://schemas.microsoft.com/office/drawing/2014/main" xmlns="" id="{5CC14C16-6481-4904-AC0A-7E3279C7059D}"/>
+                <a16:creationId xmlns="" xmlns:a16="http://schemas.microsoft.com/office/drawing/2014/main" id="{5CC14C16-6481-4904-AC0A-7E3279C7059D}"/>
               </a:ext>
             </a:extLst>
           </p:cNvPr>
@@ -4183,7 +4324,7 @@
             <a:fld id="{24C3A72B-EA9F-49ED-9480-D5BBE463D3C6}" type="datetimeFigureOut">
               <a:rPr lang="en-GB" smtClean="0"/>
               <a:pPr/>
-              <a:t>02/03/2018</a:t>
+              <a:t>03/03/2018</a:t>
             </a:fld>
             <a:endParaRPr lang="en-GB"/>
           </a:p>
@@ -4194,7 +4335,7 @@
           <p:cNvPr id="3" name="Footer Placeholder 2">
             <a:extLst>
               <a:ext uri="{FF2B5EF4-FFF2-40B4-BE49-F238E27FC236}">
-                <a16:creationId xmlns:a16="http://schemas.microsoft.com/office/drawing/2014/main" xmlns="" id="{F6C26942-E7C8-4D7B-AF06-F5CBEFE52D52}"/>
+                <a16:creationId xmlns="" xmlns:a16="http://schemas.microsoft.com/office/drawing/2014/main" id="{F6C26942-E7C8-4D7B-AF06-F5CBEFE52D52}"/>
               </a:ext>
             </a:extLst>
           </p:cNvPr>
@@ -4219,7 +4360,7 @@
           <p:cNvPr id="4" name="Slide Number Placeholder 3">
             <a:extLst>
               <a:ext uri="{FF2B5EF4-FFF2-40B4-BE49-F238E27FC236}">
-                <a16:creationId xmlns:a16="http://schemas.microsoft.com/office/drawing/2014/main" xmlns="" id="{F4DAB499-97FD-4827-B6B8-0F96F7C4FE5D}"/>
+                <a16:creationId xmlns="" xmlns:a16="http://schemas.microsoft.com/office/drawing/2014/main" id="{F4DAB499-97FD-4827-B6B8-0F96F7C4FE5D}"/>
               </a:ext>
             </a:extLst>
           </p:cNvPr>
@@ -4247,7 +4388,7 @@
     </p:spTree>
     <p:extLst>
       <p:ext uri="{BB962C8B-B14F-4D97-AF65-F5344CB8AC3E}">
-        <p14:creationId xmlns:p14="http://schemas.microsoft.com/office/powerpoint/2010/main" xmlns="" val="1991650923"/>
+        <p14:creationId xmlns="" xmlns:p14="http://schemas.microsoft.com/office/powerpoint/2010/main" val="1991650923"/>
       </p:ext>
     </p:extLst>
   </p:cSld>
@@ -4279,7 +4420,7 @@
           <p:cNvPr id="2" name="Title 1">
             <a:extLst>
               <a:ext uri="{FF2B5EF4-FFF2-40B4-BE49-F238E27FC236}">
-                <a16:creationId xmlns:a16="http://schemas.microsoft.com/office/drawing/2014/main" xmlns="" id="{8DB1DE1E-A84A-447A-898D-F7D7DEFFBBCD}"/>
+                <a16:creationId xmlns="" xmlns:a16="http://schemas.microsoft.com/office/drawing/2014/main" id="{8DB1DE1E-A84A-447A-898D-F7D7DEFFBBCD}"/>
               </a:ext>
             </a:extLst>
           </p:cNvPr>
@@ -4317,7 +4458,7 @@
           <p:cNvPr id="3" name="Content Placeholder 2">
             <a:extLst>
               <a:ext uri="{FF2B5EF4-FFF2-40B4-BE49-F238E27FC236}">
-                <a16:creationId xmlns:a16="http://schemas.microsoft.com/office/drawing/2014/main" xmlns="" id="{00C215BD-D7D7-49A5-86B5-19FA9FCE98D7}"/>
+                <a16:creationId xmlns="" xmlns:a16="http://schemas.microsoft.com/office/drawing/2014/main" id="{00C215BD-D7D7-49A5-86B5-19FA9FCE98D7}"/>
               </a:ext>
             </a:extLst>
           </p:cNvPr>
@@ -4408,7 +4549,7 @@
           <p:cNvPr id="4" name="Text Placeholder 3">
             <a:extLst>
               <a:ext uri="{FF2B5EF4-FFF2-40B4-BE49-F238E27FC236}">
-                <a16:creationId xmlns:a16="http://schemas.microsoft.com/office/drawing/2014/main" xmlns="" id="{963333A7-986A-4F23-AD4B-645062463568}"/>
+                <a16:creationId xmlns="" xmlns:a16="http://schemas.microsoft.com/office/drawing/2014/main" id="{963333A7-986A-4F23-AD4B-645062463568}"/>
               </a:ext>
             </a:extLst>
           </p:cNvPr>
@@ -4479,7 +4620,7 @@
           <p:cNvPr id="5" name="Date Placeholder 4">
             <a:extLst>
               <a:ext uri="{FF2B5EF4-FFF2-40B4-BE49-F238E27FC236}">
-                <a16:creationId xmlns:a16="http://schemas.microsoft.com/office/drawing/2014/main" xmlns="" id="{3D141368-BD0B-4EC5-894A-09555901F516}"/>
+                <a16:creationId xmlns="" xmlns:a16="http://schemas.microsoft.com/office/drawing/2014/main" id="{3D141368-BD0B-4EC5-894A-09555901F516}"/>
               </a:ext>
             </a:extLst>
           </p:cNvPr>
@@ -4498,7 +4639,7 @@
             <a:fld id="{24C3A72B-EA9F-49ED-9480-D5BBE463D3C6}" type="datetimeFigureOut">
               <a:rPr lang="en-GB" smtClean="0"/>
               <a:pPr/>
-              <a:t>02/03/2018</a:t>
+              <a:t>03/03/2018</a:t>
             </a:fld>
             <a:endParaRPr lang="en-GB"/>
           </a:p>
@@ -4509,7 +4650,7 @@
           <p:cNvPr id="6" name="Footer Placeholder 5">
             <a:extLst>
               <a:ext uri="{FF2B5EF4-FFF2-40B4-BE49-F238E27FC236}">
-                <a16:creationId xmlns:a16="http://schemas.microsoft.com/office/drawing/2014/main" xmlns="" id="{FA6D6A8F-73ED-40EE-9BF6-7C9A264B11E7}"/>
+                <a16:creationId xmlns="" xmlns:a16="http://schemas.microsoft.com/office/drawing/2014/main" id="{FA6D6A8F-73ED-40EE-9BF6-7C9A264B11E7}"/>
               </a:ext>
             </a:extLst>
           </p:cNvPr>
@@ -4534,7 +4675,7 @@
           <p:cNvPr id="7" name="Slide Number Placeholder 6">
             <a:extLst>
               <a:ext uri="{FF2B5EF4-FFF2-40B4-BE49-F238E27FC236}">
-                <a16:creationId xmlns:a16="http://schemas.microsoft.com/office/drawing/2014/main" xmlns="" id="{9FFB6450-457F-4CC9-9642-311C051E1BB6}"/>
+                <a16:creationId xmlns="" xmlns:a16="http://schemas.microsoft.com/office/drawing/2014/main" id="{9FFB6450-457F-4CC9-9642-311C051E1BB6}"/>
               </a:ext>
             </a:extLst>
           </p:cNvPr>
@@ -4562,7 +4703,7 @@
     </p:spTree>
     <p:extLst>
       <p:ext uri="{BB962C8B-B14F-4D97-AF65-F5344CB8AC3E}">
-        <p14:creationId xmlns:p14="http://schemas.microsoft.com/office/powerpoint/2010/main" xmlns="" val="3135145738"/>
+        <p14:creationId xmlns="" xmlns:p14="http://schemas.microsoft.com/office/powerpoint/2010/main" val="3135145738"/>
       </p:ext>
     </p:extLst>
   </p:cSld>
@@ -4594,7 +4735,7 @@
           <p:cNvPr id="2" name="Title 1">
             <a:extLst>
               <a:ext uri="{FF2B5EF4-FFF2-40B4-BE49-F238E27FC236}">
-                <a16:creationId xmlns:a16="http://schemas.microsoft.com/office/drawing/2014/main" xmlns="" id="{8C1296DB-0DB8-4F14-9BF6-5579C0960222}"/>
+                <a16:creationId xmlns="" xmlns:a16="http://schemas.microsoft.com/office/drawing/2014/main" id="{8C1296DB-0DB8-4F14-9BF6-5579C0960222}"/>
               </a:ext>
             </a:extLst>
           </p:cNvPr>
@@ -4632,7 +4773,7 @@
           <p:cNvPr id="3" name="Picture Placeholder 2">
             <a:extLst>
               <a:ext uri="{FF2B5EF4-FFF2-40B4-BE49-F238E27FC236}">
-                <a16:creationId xmlns:a16="http://schemas.microsoft.com/office/drawing/2014/main" xmlns="" id="{7EDD28FD-96ED-49BE-8A09-6B9C86BEA995}"/>
+                <a16:creationId xmlns="" xmlns:a16="http://schemas.microsoft.com/office/drawing/2014/main" id="{7EDD28FD-96ED-49BE-8A09-6B9C86BEA995}"/>
               </a:ext>
             </a:extLst>
           </p:cNvPr>
@@ -4699,7 +4840,7 @@
           <p:cNvPr id="4" name="Text Placeholder 3">
             <a:extLst>
               <a:ext uri="{FF2B5EF4-FFF2-40B4-BE49-F238E27FC236}">
-                <a16:creationId xmlns:a16="http://schemas.microsoft.com/office/drawing/2014/main" xmlns="" id="{ADA4AC5E-4A1B-482A-A3FE-C174ECCF882D}"/>
+                <a16:creationId xmlns="" xmlns:a16="http://schemas.microsoft.com/office/drawing/2014/main" id="{ADA4AC5E-4A1B-482A-A3FE-C174ECCF882D}"/>
               </a:ext>
             </a:extLst>
           </p:cNvPr>
@@ -4770,7 +4911,7 @@
           <p:cNvPr id="5" name="Date Placeholder 4">
             <a:extLst>
               <a:ext uri="{FF2B5EF4-FFF2-40B4-BE49-F238E27FC236}">
-                <a16:creationId xmlns:a16="http://schemas.microsoft.com/office/drawing/2014/main" xmlns="" id="{40D65AD9-E4E1-40E5-BE5B-AB193A4848A3}"/>
+                <a16:creationId xmlns="" xmlns:a16="http://schemas.microsoft.com/office/drawing/2014/main" id="{40D65AD9-E4E1-40E5-BE5B-AB193A4848A3}"/>
               </a:ext>
             </a:extLst>
           </p:cNvPr>
@@ -4789,7 +4930,7 @@
             <a:fld id="{24C3A72B-EA9F-49ED-9480-D5BBE463D3C6}" type="datetimeFigureOut">
               <a:rPr lang="en-GB" smtClean="0"/>
               <a:pPr/>
-              <a:t>02/03/2018</a:t>
+              <a:t>03/03/2018</a:t>
             </a:fld>
             <a:endParaRPr lang="en-GB"/>
           </a:p>
@@ -4800,7 +4941,7 @@
           <p:cNvPr id="6" name="Footer Placeholder 5">
             <a:extLst>
               <a:ext uri="{FF2B5EF4-FFF2-40B4-BE49-F238E27FC236}">
-                <a16:creationId xmlns:a16="http://schemas.microsoft.com/office/drawing/2014/main" xmlns="" id="{B8B67A65-51C4-42C3-BCE1-2B6CDFA11351}"/>
+                <a16:creationId xmlns="" xmlns:a16="http://schemas.microsoft.com/office/drawing/2014/main" id="{B8B67A65-51C4-42C3-BCE1-2B6CDFA11351}"/>
               </a:ext>
             </a:extLst>
           </p:cNvPr>
@@ -4825,7 +4966,7 @@
           <p:cNvPr id="7" name="Slide Number Placeholder 6">
             <a:extLst>
               <a:ext uri="{FF2B5EF4-FFF2-40B4-BE49-F238E27FC236}">
-                <a16:creationId xmlns:a16="http://schemas.microsoft.com/office/drawing/2014/main" xmlns="" id="{8FA693F4-23BB-49C6-947A-E9223A7DD702}"/>
+                <a16:creationId xmlns="" xmlns:a16="http://schemas.microsoft.com/office/drawing/2014/main" id="{8FA693F4-23BB-49C6-947A-E9223A7DD702}"/>
               </a:ext>
             </a:extLst>
           </p:cNvPr>
@@ -4853,7 +4994,7 @@
     </p:spTree>
     <p:extLst>
       <p:ext uri="{BB962C8B-B14F-4D97-AF65-F5344CB8AC3E}">
-        <p14:creationId xmlns:p14="http://schemas.microsoft.com/office/powerpoint/2010/main" xmlns="" val="3595103176"/>
+        <p14:creationId xmlns="" xmlns:p14="http://schemas.microsoft.com/office/powerpoint/2010/main" val="3595103176"/>
       </p:ext>
     </p:extLst>
   </p:cSld>
@@ -4890,7 +5031,7 @@
           <p:cNvPr id="2" name="Title Placeholder 1">
             <a:extLst>
               <a:ext uri="{FF2B5EF4-FFF2-40B4-BE49-F238E27FC236}">
-                <a16:creationId xmlns:a16="http://schemas.microsoft.com/office/drawing/2014/main" xmlns="" id="{84BFBAD9-9BA2-48E1-8F6D-508057E885A8}"/>
+                <a16:creationId xmlns="" xmlns:a16="http://schemas.microsoft.com/office/drawing/2014/main" id="{84BFBAD9-9BA2-48E1-8F6D-508057E885A8}"/>
               </a:ext>
             </a:extLst>
           </p:cNvPr>
@@ -4929,7 +5070,7 @@
           <p:cNvPr id="3" name="Text Placeholder 2">
             <a:extLst>
               <a:ext uri="{FF2B5EF4-FFF2-40B4-BE49-F238E27FC236}">
-                <a16:creationId xmlns:a16="http://schemas.microsoft.com/office/drawing/2014/main" xmlns="" id="{9E540119-8CD7-44A9-8AB4-22B4558FAC90}"/>
+                <a16:creationId xmlns="" xmlns:a16="http://schemas.microsoft.com/office/drawing/2014/main" id="{9E540119-8CD7-44A9-8AB4-22B4558FAC90}"/>
               </a:ext>
             </a:extLst>
           </p:cNvPr>
@@ -4997,7 +5138,7 @@
           <p:cNvPr id="4" name="Date Placeholder 3">
             <a:extLst>
               <a:ext uri="{FF2B5EF4-FFF2-40B4-BE49-F238E27FC236}">
-                <a16:creationId xmlns:a16="http://schemas.microsoft.com/office/drawing/2014/main" xmlns="" id="{6ADDB086-675C-45AE-B2E3-8AB1AC643C42}"/>
+                <a16:creationId xmlns="" xmlns:a16="http://schemas.microsoft.com/office/drawing/2014/main" id="{6ADDB086-675C-45AE-B2E3-8AB1AC643C42}"/>
               </a:ext>
             </a:extLst>
           </p:cNvPr>
@@ -5034,7 +5175,7 @@
             <a:fld id="{24C3A72B-EA9F-49ED-9480-D5BBE463D3C6}" type="datetimeFigureOut">
               <a:rPr lang="en-GB" smtClean="0"/>
               <a:pPr/>
-              <a:t>02/03/2018</a:t>
+              <a:t>03/03/2018</a:t>
             </a:fld>
             <a:endParaRPr lang="en-GB"/>
           </a:p>
@@ -5045,7 +5186,7 @@
           <p:cNvPr id="5" name="Footer Placeholder 4">
             <a:extLst>
               <a:ext uri="{FF2B5EF4-FFF2-40B4-BE49-F238E27FC236}">
-                <a16:creationId xmlns:a16="http://schemas.microsoft.com/office/drawing/2014/main" xmlns="" id="{20964F14-198A-4651-980F-B11F6946BEB6}"/>
+                <a16:creationId xmlns="" xmlns:a16="http://schemas.microsoft.com/office/drawing/2014/main" id="{20964F14-198A-4651-980F-B11F6946BEB6}"/>
               </a:ext>
             </a:extLst>
           </p:cNvPr>
@@ -5088,7 +5229,7 @@
           <p:cNvPr id="6" name="Slide Number Placeholder 5">
             <a:extLst>
               <a:ext uri="{FF2B5EF4-FFF2-40B4-BE49-F238E27FC236}">
-                <a16:creationId xmlns:a16="http://schemas.microsoft.com/office/drawing/2014/main" xmlns="" id="{49641EE6-2A40-457C-A97A-CE775F6542F4}"/>
+                <a16:creationId xmlns="" xmlns:a16="http://schemas.microsoft.com/office/drawing/2014/main" id="{49641EE6-2A40-457C-A97A-CE775F6542F4}"/>
               </a:ext>
             </a:extLst>
           </p:cNvPr>
@@ -5134,7 +5275,7 @@
     </p:spTree>
     <p:extLst>
       <p:ext uri="{BB962C8B-B14F-4D97-AF65-F5344CB8AC3E}">
-        <p14:creationId xmlns:p14="http://schemas.microsoft.com/office/powerpoint/2010/main" xmlns="" val="3074094979"/>
+        <p14:creationId xmlns="" xmlns:p14="http://schemas.microsoft.com/office/powerpoint/2010/main" val="3074094979"/>
       </p:ext>
     </p:extLst>
   </p:cSld>
@@ -5622,7 +5763,7 @@
           <p:cNvPr id="7" name="Picture 6">
             <a:extLst>
               <a:ext uri="{FF2B5EF4-FFF2-40B4-BE49-F238E27FC236}">
-                <a16:creationId xmlns:a16="http://schemas.microsoft.com/office/drawing/2014/main" xmlns="" id="{0452B86A-B01F-4002-A1C0-9EF0AE9558E4}"/>
+                <a16:creationId xmlns="" xmlns:a16="http://schemas.microsoft.com/office/drawing/2014/main" id="{0452B86A-B01F-4002-A1C0-9EF0AE9558E4}"/>
               </a:ext>
             </a:extLst>
           </p:cNvPr>
@@ -5652,7 +5793,7 @@
           <p:cNvPr id="8" name="Picture 7">
             <a:extLst>
               <a:ext uri="{FF2B5EF4-FFF2-40B4-BE49-F238E27FC236}">
-                <a16:creationId xmlns:a16="http://schemas.microsoft.com/office/drawing/2014/main" xmlns="" id="{37F75148-183E-43C0-AC18-81F40A1DD034}"/>
+                <a16:creationId xmlns="" xmlns:a16="http://schemas.microsoft.com/office/drawing/2014/main" id="{37F75148-183E-43C0-AC18-81F40A1DD034}"/>
               </a:ext>
             </a:extLst>
           </p:cNvPr>
@@ -5682,7 +5823,7 @@
           <p:cNvPr id="2" name="Title 1">
             <a:extLst>
               <a:ext uri="{FF2B5EF4-FFF2-40B4-BE49-F238E27FC236}">
-                <a16:creationId xmlns:a16="http://schemas.microsoft.com/office/drawing/2014/main" xmlns="" id="{DFC049F8-2284-4161-BE3C-431BCD0EFAB7}"/>
+                <a16:creationId xmlns="" xmlns:a16="http://schemas.microsoft.com/office/drawing/2014/main" id="{DFC049F8-2284-4161-BE3C-431BCD0EFAB7}"/>
               </a:ext>
             </a:extLst>
           </p:cNvPr>
@@ -5742,7 +5883,7 @@
           <p:cNvPr id="3" name="Content Placeholder 2">
             <a:extLst>
               <a:ext uri="{FF2B5EF4-FFF2-40B4-BE49-F238E27FC236}">
-                <a16:creationId xmlns:a16="http://schemas.microsoft.com/office/drawing/2014/main" xmlns="" id="{F2E045F5-714F-4E07-87A1-F5696A62ED28}"/>
+                <a16:creationId xmlns="" xmlns:a16="http://schemas.microsoft.com/office/drawing/2014/main" id="{F2E045F5-714F-4E07-87A1-F5696A62ED28}"/>
               </a:ext>
             </a:extLst>
           </p:cNvPr>
@@ -5793,7 +5934,7 @@
           <p:cNvPr id="9" name="Rectangle 8">
             <a:extLst>
               <a:ext uri="{FF2B5EF4-FFF2-40B4-BE49-F238E27FC236}">
-                <a16:creationId xmlns:a16="http://schemas.microsoft.com/office/drawing/2014/main" xmlns="" id="{639288EF-1393-49D8-9524-1863E2A39901}"/>
+                <a16:creationId xmlns="" xmlns:a16="http://schemas.microsoft.com/office/drawing/2014/main" id="{639288EF-1393-49D8-9524-1863E2A39901}"/>
               </a:ext>
             </a:extLst>
           </p:cNvPr>
@@ -6078,7 +6219,7 @@
     </p:spTree>
     <p:extLst>
       <p:ext uri="{BB962C8B-B14F-4D97-AF65-F5344CB8AC3E}">
-        <p14:creationId xmlns:p14="http://schemas.microsoft.com/office/powerpoint/2010/main" xmlns="" val="3490831543"/>
+        <p14:creationId xmlns="" xmlns:p14="http://schemas.microsoft.com/office/powerpoint/2010/main" val="3490831543"/>
       </p:ext>
     </p:extLst>
   </p:cSld>
@@ -6110,7 +6251,7 @@
           <p:cNvPr id="7" name="Picture 6">
             <a:extLst>
               <a:ext uri="{FF2B5EF4-FFF2-40B4-BE49-F238E27FC236}">
-                <a16:creationId xmlns:a16="http://schemas.microsoft.com/office/drawing/2014/main" xmlns="" id="{B477D94D-934D-4616-A570-6D98195B104B}"/>
+                <a16:creationId xmlns="" xmlns:a16="http://schemas.microsoft.com/office/drawing/2014/main" id="{B477D94D-934D-4616-A570-6D98195B104B}"/>
               </a:ext>
             </a:extLst>
           </p:cNvPr>
@@ -6139,7 +6280,7 @@
           <p:cNvPr id="5" name="Picture 4">
             <a:extLst>
               <a:ext uri="{FF2B5EF4-FFF2-40B4-BE49-F238E27FC236}">
-                <a16:creationId xmlns:a16="http://schemas.microsoft.com/office/drawing/2014/main" xmlns="" id="{B41C1CB2-FA0D-4FE8-B995-E97A83ACB1AE}"/>
+                <a16:creationId xmlns="" xmlns:a16="http://schemas.microsoft.com/office/drawing/2014/main" id="{B41C1CB2-FA0D-4FE8-B995-E97A83ACB1AE}"/>
               </a:ext>
             </a:extLst>
           </p:cNvPr>
@@ -6168,7 +6309,7 @@
           <p:cNvPr id="2" name="Title 1">
             <a:extLst>
               <a:ext uri="{FF2B5EF4-FFF2-40B4-BE49-F238E27FC236}">
-                <a16:creationId xmlns:a16="http://schemas.microsoft.com/office/drawing/2014/main" xmlns="" id="{DFC049F8-2284-4161-BE3C-431BCD0EFAB7}"/>
+                <a16:creationId xmlns="" xmlns:a16="http://schemas.microsoft.com/office/drawing/2014/main" id="{DFC049F8-2284-4161-BE3C-431BCD0EFAB7}"/>
               </a:ext>
             </a:extLst>
           </p:cNvPr>
@@ -6228,7 +6369,7 @@
           <p:cNvPr id="3" name="Content Placeholder 2">
             <a:extLst>
               <a:ext uri="{FF2B5EF4-FFF2-40B4-BE49-F238E27FC236}">
-                <a16:creationId xmlns:a16="http://schemas.microsoft.com/office/drawing/2014/main" xmlns="" id="{F2E045F5-714F-4E07-87A1-F5696A62ED28}"/>
+                <a16:creationId xmlns="" xmlns:a16="http://schemas.microsoft.com/office/drawing/2014/main" id="{F2E045F5-714F-4E07-87A1-F5696A62ED28}"/>
               </a:ext>
             </a:extLst>
           </p:cNvPr>
@@ -6279,7 +6420,7 @@
           <p:cNvPr id="15" name="Rectangle 14">
             <a:extLst>
               <a:ext uri="{FF2B5EF4-FFF2-40B4-BE49-F238E27FC236}">
-                <a16:creationId xmlns:a16="http://schemas.microsoft.com/office/drawing/2014/main" xmlns="" id="{639288EF-1393-49D8-9524-1863E2A39901}"/>
+                <a16:creationId xmlns="" xmlns:a16="http://schemas.microsoft.com/office/drawing/2014/main" id="{639288EF-1393-49D8-9524-1863E2A39901}"/>
               </a:ext>
             </a:extLst>
           </p:cNvPr>
@@ -6388,7 +6529,7 @@
     </p:spTree>
     <p:extLst>
       <p:ext uri="{BB962C8B-B14F-4D97-AF65-F5344CB8AC3E}">
-        <p14:creationId xmlns:p14="http://schemas.microsoft.com/office/powerpoint/2010/main" xmlns="" val="4096237443"/>
+        <p14:creationId xmlns="" xmlns:p14="http://schemas.microsoft.com/office/powerpoint/2010/main" val="4096237443"/>
       </p:ext>
     </p:extLst>
   </p:cSld>
@@ -6420,7 +6561,7 @@
           <p:cNvPr id="7" name="Picture 6">
             <a:extLst>
               <a:ext uri="{FF2B5EF4-FFF2-40B4-BE49-F238E27FC236}">
-                <a16:creationId xmlns:a16="http://schemas.microsoft.com/office/drawing/2014/main" xmlns="" id="{B477D94D-934D-4616-A570-6D98195B104B}"/>
+                <a16:creationId xmlns="" xmlns:a16="http://schemas.microsoft.com/office/drawing/2014/main" id="{B477D94D-934D-4616-A570-6D98195B104B}"/>
               </a:ext>
             </a:extLst>
           </p:cNvPr>
@@ -6449,7 +6590,7 @@
           <p:cNvPr id="5" name="Picture 4">
             <a:extLst>
               <a:ext uri="{FF2B5EF4-FFF2-40B4-BE49-F238E27FC236}">
-                <a16:creationId xmlns:a16="http://schemas.microsoft.com/office/drawing/2014/main" xmlns="" id="{B41C1CB2-FA0D-4FE8-B995-E97A83ACB1AE}"/>
+                <a16:creationId xmlns="" xmlns:a16="http://schemas.microsoft.com/office/drawing/2014/main" id="{B41C1CB2-FA0D-4FE8-B995-E97A83ACB1AE}"/>
               </a:ext>
             </a:extLst>
           </p:cNvPr>
@@ -6478,7 +6619,7 @@
           <p:cNvPr id="2" name="Title 1">
             <a:extLst>
               <a:ext uri="{FF2B5EF4-FFF2-40B4-BE49-F238E27FC236}">
-                <a16:creationId xmlns:a16="http://schemas.microsoft.com/office/drawing/2014/main" xmlns="" id="{DFC049F8-2284-4161-BE3C-431BCD0EFAB7}"/>
+                <a16:creationId xmlns="" xmlns:a16="http://schemas.microsoft.com/office/drawing/2014/main" id="{DFC049F8-2284-4161-BE3C-431BCD0EFAB7}"/>
               </a:ext>
             </a:extLst>
           </p:cNvPr>
@@ -6550,7 +6691,7 @@
           <p:cNvPr id="3" name="Content Placeholder 2">
             <a:extLst>
               <a:ext uri="{FF2B5EF4-FFF2-40B4-BE49-F238E27FC236}">
-                <a16:creationId xmlns:a16="http://schemas.microsoft.com/office/drawing/2014/main" xmlns="" id="{F2E045F5-714F-4E07-87A1-F5696A62ED28}"/>
+                <a16:creationId xmlns="" xmlns:a16="http://schemas.microsoft.com/office/drawing/2014/main" id="{F2E045F5-714F-4E07-87A1-F5696A62ED28}"/>
               </a:ext>
             </a:extLst>
           </p:cNvPr>
@@ -6601,7 +6742,7 @@
           <p:cNvPr id="4" name="Picture 3">
             <a:extLst>
               <a:ext uri="{FF2B5EF4-FFF2-40B4-BE49-F238E27FC236}">
-                <a16:creationId xmlns:a16="http://schemas.microsoft.com/office/drawing/2014/main" xmlns="" id="{7DBBE77A-8D3A-40D6-94A0-7EC9A7E761A3}"/>
+                <a16:creationId xmlns="" xmlns:a16="http://schemas.microsoft.com/office/drawing/2014/main" id="{7DBBE77A-8D3A-40D6-94A0-7EC9A7E761A3}"/>
               </a:ext>
             </a:extLst>
           </p:cNvPr>
@@ -6636,7 +6777,7 @@
           <p:cNvPr id="8" name="Rectangle 7">
             <a:extLst>
               <a:ext uri="{FF2B5EF4-FFF2-40B4-BE49-F238E27FC236}">
-                <a16:creationId xmlns:a16="http://schemas.microsoft.com/office/drawing/2014/main" xmlns="" id="{BBD93274-AD19-4924-B84B-10DE820ED811}"/>
+                <a16:creationId xmlns="" xmlns:a16="http://schemas.microsoft.com/office/drawing/2014/main" id="{BBD93274-AD19-4924-B84B-10DE820ED811}"/>
               </a:ext>
             </a:extLst>
           </p:cNvPr>
@@ -6691,7 +6832,7 @@
           <p:cNvPr id="9" name="TextBox 8">
             <a:extLst>
               <a:ext uri="{FF2B5EF4-FFF2-40B4-BE49-F238E27FC236}">
-                <a16:creationId xmlns:a16="http://schemas.microsoft.com/office/drawing/2014/main" xmlns="" id="{614F1665-FB4D-4576-912A-8CB0AE08F8B2}"/>
+                <a16:creationId xmlns="" xmlns:a16="http://schemas.microsoft.com/office/drawing/2014/main" id="{614F1665-FB4D-4576-912A-8CB0AE08F8B2}"/>
               </a:ext>
             </a:extLst>
           </p:cNvPr>
@@ -6748,7 +6889,7 @@
           <p:cNvPr id="10" name="TextBox 9">
             <a:extLst>
               <a:ext uri="{FF2B5EF4-FFF2-40B4-BE49-F238E27FC236}">
-                <a16:creationId xmlns:a16="http://schemas.microsoft.com/office/drawing/2014/main" xmlns="" id="{B73BD718-AF4E-48A2-A46D-2EFB4DF802D3}"/>
+                <a16:creationId xmlns="" xmlns:a16="http://schemas.microsoft.com/office/drawing/2014/main" id="{B73BD718-AF4E-48A2-A46D-2EFB4DF802D3}"/>
               </a:ext>
             </a:extLst>
           </p:cNvPr>
@@ -6852,7 +6993,7 @@
           <p:cNvPr id="11" name="TextBox 10">
             <a:extLst>
               <a:ext uri="{FF2B5EF4-FFF2-40B4-BE49-F238E27FC236}">
-                <a16:creationId xmlns:a16="http://schemas.microsoft.com/office/drawing/2014/main" xmlns="" id="{045FE3E0-C21F-4E84-A6C3-B78C5DA14375}"/>
+                <a16:creationId xmlns="" xmlns:a16="http://schemas.microsoft.com/office/drawing/2014/main" id="{045FE3E0-C21F-4E84-A6C3-B78C5DA14375}"/>
               </a:ext>
             </a:extLst>
           </p:cNvPr>
@@ -6900,7 +7041,7 @@
           <p:cNvPr id="12" name="TextBox 11">
             <a:extLst>
               <a:ext uri="{FF2B5EF4-FFF2-40B4-BE49-F238E27FC236}">
-                <a16:creationId xmlns:a16="http://schemas.microsoft.com/office/drawing/2014/main" xmlns="" id="{715C8695-F831-4AEA-8788-D3F362FE0855}"/>
+                <a16:creationId xmlns="" xmlns:a16="http://schemas.microsoft.com/office/drawing/2014/main" id="{715C8695-F831-4AEA-8788-D3F362FE0855}"/>
               </a:ext>
             </a:extLst>
           </p:cNvPr>
@@ -6945,7 +7086,7 @@
           <p:cNvPr id="13" name="TextBox 12">
             <a:extLst>
               <a:ext uri="{FF2B5EF4-FFF2-40B4-BE49-F238E27FC236}">
-                <a16:creationId xmlns:a16="http://schemas.microsoft.com/office/drawing/2014/main" xmlns="" id="{3D143883-7E11-42FA-820F-FD25A0706494}"/>
+                <a16:creationId xmlns="" xmlns:a16="http://schemas.microsoft.com/office/drawing/2014/main" id="{3D143883-7E11-42FA-820F-FD25A0706494}"/>
               </a:ext>
             </a:extLst>
           </p:cNvPr>
@@ -6990,7 +7131,7 @@
           <p:cNvPr id="14" name="TextBox 13">
             <a:extLst>
               <a:ext uri="{FF2B5EF4-FFF2-40B4-BE49-F238E27FC236}">
-                <a16:creationId xmlns:a16="http://schemas.microsoft.com/office/drawing/2014/main" xmlns="" id="{441B9A9E-965F-4808-97BB-765FA754A34C}"/>
+                <a16:creationId xmlns="" xmlns:a16="http://schemas.microsoft.com/office/drawing/2014/main" id="{441B9A9E-965F-4808-97BB-765FA754A34C}"/>
               </a:ext>
             </a:extLst>
           </p:cNvPr>
@@ -7045,7 +7186,7 @@
     </p:spTree>
     <p:extLst>
       <p:ext uri="{BB962C8B-B14F-4D97-AF65-F5344CB8AC3E}">
-        <p14:creationId xmlns:p14="http://schemas.microsoft.com/office/powerpoint/2010/main" xmlns="" val="4096237443"/>
+        <p14:creationId xmlns="" xmlns:p14="http://schemas.microsoft.com/office/powerpoint/2010/main" val="4096237443"/>
       </p:ext>
     </p:extLst>
   </p:cSld>
@@ -7077,7 +7218,7 @@
           <p:cNvPr id="10" name="Picture 9">
             <a:extLst>
               <a:ext uri="{FF2B5EF4-FFF2-40B4-BE49-F238E27FC236}">
-                <a16:creationId xmlns:a16="http://schemas.microsoft.com/office/drawing/2014/main" xmlns="" id="{6248F25B-52F9-4CF0-BF52-629A9FD032CE}"/>
+                <a16:creationId xmlns="" xmlns:a16="http://schemas.microsoft.com/office/drawing/2014/main" id="{6248F25B-52F9-4CF0-BF52-629A9FD032CE}"/>
               </a:ext>
             </a:extLst>
           </p:cNvPr>
@@ -7106,7 +7247,7 @@
           <p:cNvPr id="9" name="Picture 8">
             <a:extLst>
               <a:ext uri="{FF2B5EF4-FFF2-40B4-BE49-F238E27FC236}">
-                <a16:creationId xmlns:a16="http://schemas.microsoft.com/office/drawing/2014/main" xmlns="" id="{158091B3-A577-4C1D-8D3E-131CBA84C0EE}"/>
+                <a16:creationId xmlns="" xmlns:a16="http://schemas.microsoft.com/office/drawing/2014/main" id="{158091B3-A577-4C1D-8D3E-131CBA84C0EE}"/>
               </a:ext>
             </a:extLst>
           </p:cNvPr>
@@ -7136,7 +7277,7 @@
           <p:cNvPr id="2" name="Title 1">
             <a:extLst>
               <a:ext uri="{FF2B5EF4-FFF2-40B4-BE49-F238E27FC236}">
-                <a16:creationId xmlns:a16="http://schemas.microsoft.com/office/drawing/2014/main" xmlns="" id="{DFC049F8-2284-4161-BE3C-431BCD0EFAB7}"/>
+                <a16:creationId xmlns="" xmlns:a16="http://schemas.microsoft.com/office/drawing/2014/main" id="{DFC049F8-2284-4161-BE3C-431BCD0EFAB7}"/>
               </a:ext>
             </a:extLst>
           </p:cNvPr>
@@ -7214,7 +7355,7 @@
           <p:cNvPr id="3" name="Content Placeholder 2">
             <a:extLst>
               <a:ext uri="{FF2B5EF4-FFF2-40B4-BE49-F238E27FC236}">
-                <a16:creationId xmlns:a16="http://schemas.microsoft.com/office/drawing/2014/main" xmlns="" id="{F2E045F5-714F-4E07-87A1-F5696A62ED28}"/>
+                <a16:creationId xmlns="" xmlns:a16="http://schemas.microsoft.com/office/drawing/2014/main" id="{F2E045F5-714F-4E07-87A1-F5696A62ED28}"/>
               </a:ext>
             </a:extLst>
           </p:cNvPr>
@@ -7265,7 +7406,7 @@
           <p:cNvPr id="8" name="Picture 7">
             <a:extLst>
               <a:ext uri="{FF2B5EF4-FFF2-40B4-BE49-F238E27FC236}">
-                <a16:creationId xmlns:a16="http://schemas.microsoft.com/office/drawing/2014/main" xmlns="" id="{A3117FBC-7DFD-4758-B4B9-29961EBB7136}"/>
+                <a16:creationId xmlns="" xmlns:a16="http://schemas.microsoft.com/office/drawing/2014/main" id="{A3117FBC-7DFD-4758-B4B9-29961EBB7136}"/>
               </a:ext>
             </a:extLst>
           </p:cNvPr>
@@ -7300,7 +7441,7 @@
           <p:cNvPr id="11" name="TextBox 10">
             <a:extLst>
               <a:ext uri="{FF2B5EF4-FFF2-40B4-BE49-F238E27FC236}">
-                <a16:creationId xmlns:a16="http://schemas.microsoft.com/office/drawing/2014/main" xmlns="" id="{0B108C47-D011-4547-9642-A8F7197FB2ED}"/>
+                <a16:creationId xmlns="" xmlns:a16="http://schemas.microsoft.com/office/drawing/2014/main" id="{0B108C47-D011-4547-9642-A8F7197FB2ED}"/>
               </a:ext>
             </a:extLst>
           </p:cNvPr>
@@ -7395,7 +7536,7 @@
           <p:cNvPr id="12" name="TextBox 11">
             <a:extLst>
               <a:ext uri="{FF2B5EF4-FFF2-40B4-BE49-F238E27FC236}">
-                <a16:creationId xmlns:a16="http://schemas.microsoft.com/office/drawing/2014/main" xmlns="" id="{B703FA5C-A8C2-4740-B5EE-2A5922A54DF9}"/>
+                <a16:creationId xmlns="" xmlns:a16="http://schemas.microsoft.com/office/drawing/2014/main" id="{B703FA5C-A8C2-4740-B5EE-2A5922A54DF9}"/>
               </a:ext>
             </a:extLst>
           </p:cNvPr>
@@ -7490,7 +7631,7 @@
           <p:cNvPr id="13" name="TextBox 12">
             <a:extLst>
               <a:ext uri="{FF2B5EF4-FFF2-40B4-BE49-F238E27FC236}">
-                <a16:creationId xmlns:a16="http://schemas.microsoft.com/office/drawing/2014/main" xmlns="" id="{0B108C47-D011-4547-9642-A8F7197FB2ED}"/>
+                <a16:creationId xmlns="" xmlns:a16="http://schemas.microsoft.com/office/drawing/2014/main" id="{0B108C47-D011-4547-9642-A8F7197FB2ED}"/>
               </a:ext>
             </a:extLst>
           </p:cNvPr>
@@ -7612,7 +7753,7 @@
           <p:cNvPr id="14" name="TextBox 13">
             <a:extLst>
               <a:ext uri="{FF2B5EF4-FFF2-40B4-BE49-F238E27FC236}">
-                <a16:creationId xmlns:a16="http://schemas.microsoft.com/office/drawing/2014/main" xmlns="" id="{51D2C041-9487-41F5-B1A0-947375EFE397}"/>
+                <a16:creationId xmlns="" xmlns:a16="http://schemas.microsoft.com/office/drawing/2014/main" id="{51D2C041-9487-41F5-B1A0-947375EFE397}"/>
               </a:ext>
             </a:extLst>
           </p:cNvPr>
@@ -7652,7 +7793,7 @@
     </p:spTree>
     <p:extLst>
       <p:ext uri="{BB962C8B-B14F-4D97-AF65-F5344CB8AC3E}">
-        <p14:creationId xmlns:p14="http://schemas.microsoft.com/office/powerpoint/2010/main" xmlns="" val="3187953464"/>
+        <p14:creationId xmlns="" xmlns:p14="http://schemas.microsoft.com/office/powerpoint/2010/main" val="3187953464"/>
       </p:ext>
     </p:extLst>
   </p:cSld>
@@ -7684,7 +7825,7 @@
           <p:cNvPr id="4" name="Picture 3">
             <a:extLst>
               <a:ext uri="{FF2B5EF4-FFF2-40B4-BE49-F238E27FC236}">
-                <a16:creationId xmlns:a16="http://schemas.microsoft.com/office/drawing/2014/main" xmlns="" id="{0673D7FF-79D1-47CC-9F17-8BD3F4A92FD2}"/>
+                <a16:creationId xmlns="" xmlns:a16="http://schemas.microsoft.com/office/drawing/2014/main" id="{0673D7FF-79D1-47CC-9F17-8BD3F4A92FD2}"/>
               </a:ext>
             </a:extLst>
           </p:cNvPr>
@@ -7714,7 +7855,7 @@
           <p:cNvPr id="9" name="Picture 8">
             <a:extLst>
               <a:ext uri="{FF2B5EF4-FFF2-40B4-BE49-F238E27FC236}">
-                <a16:creationId xmlns:a16="http://schemas.microsoft.com/office/drawing/2014/main" xmlns="" id="{90E7F56C-9544-4654-9D9C-A258B0BC56B3}"/>
+                <a16:creationId xmlns="" xmlns:a16="http://schemas.microsoft.com/office/drawing/2014/main" id="{90E7F56C-9544-4654-9D9C-A258B0BC56B3}"/>
               </a:ext>
             </a:extLst>
           </p:cNvPr>
@@ -7744,7 +7885,7 @@
           <p:cNvPr id="10" name="Rectangle 9">
             <a:extLst>
               <a:ext uri="{FF2B5EF4-FFF2-40B4-BE49-F238E27FC236}">
-                <a16:creationId xmlns:a16="http://schemas.microsoft.com/office/drawing/2014/main" xmlns="" id="{7CE6DF49-6ADC-40B9-93F3-F6495F2DC7AB}"/>
+                <a16:creationId xmlns="" xmlns:a16="http://schemas.microsoft.com/office/drawing/2014/main" id="{7CE6DF49-6ADC-40B9-93F3-F6495F2DC7AB}"/>
               </a:ext>
             </a:extLst>
           </p:cNvPr>
@@ -7796,7 +7937,7 @@
           <p:cNvPr id="2" name="Title 1">
             <a:extLst>
               <a:ext uri="{FF2B5EF4-FFF2-40B4-BE49-F238E27FC236}">
-                <a16:creationId xmlns:a16="http://schemas.microsoft.com/office/drawing/2014/main" xmlns="" id="{DFC049F8-2284-4161-BE3C-431BCD0EFAB7}"/>
+                <a16:creationId xmlns="" xmlns:a16="http://schemas.microsoft.com/office/drawing/2014/main" id="{DFC049F8-2284-4161-BE3C-431BCD0EFAB7}"/>
               </a:ext>
             </a:extLst>
           </p:cNvPr>
@@ -7856,7 +7997,7 @@
           <p:cNvPr id="16" name="Content Placeholder 2">
             <a:extLst>
               <a:ext uri="{FF2B5EF4-FFF2-40B4-BE49-F238E27FC236}">
-                <a16:creationId xmlns:a16="http://schemas.microsoft.com/office/drawing/2014/main" xmlns="" id="{F2E045F5-714F-4E07-87A1-F5696A62ED28}"/>
+                <a16:creationId xmlns="" xmlns:a16="http://schemas.microsoft.com/office/drawing/2014/main" id="{F2E045F5-714F-4E07-87A1-F5696A62ED28}"/>
               </a:ext>
             </a:extLst>
           </p:cNvPr>
@@ -7979,11 +8120,7 @@
           <a:p>
             <a:r>
               <a:rPr lang="en-GB" dirty="0" smtClean="0"/>
-              <a:t>1:  Player </a:t>
-            </a:r>
-            <a:r>
-              <a:rPr lang="en-GB" dirty="0" smtClean="0"/>
-              <a:t>should be able to move up small amounts without having to jump, e.g. below lake</a:t>
+              <a:t>1:  Player should be able to move up small amounts without having to jump, e.g. below lake</a:t>
             </a:r>
           </a:p>
           <a:p>
@@ -8001,15 +8138,7 @@
                   <a:srgbClr val="0070C0"/>
                 </a:solidFill>
               </a:rPr>
-              <a:t>: amended code to allow small amounts of Y-movement as part of </a:t>
-            </a:r>
-            <a:r>
-              <a:rPr lang="en-GB" dirty="0" smtClean="0">
-                <a:solidFill>
-                  <a:srgbClr val="0070C0"/>
-                </a:solidFill>
-              </a:rPr>
-              <a:t>X-movement</a:t>
+              <a:t>: amended code to allow small amounts of Y-movement as part of X-movement</a:t>
             </a:r>
           </a:p>
         </p:txBody>
@@ -8078,19 +8207,7 @@
             </a:pPr>
             <a:r>
               <a:rPr lang="en-GB" dirty="0" smtClean="0"/>
-              <a:t>2: Pitfalls </a:t>
-            </a:r>
-            <a:r>
-              <a:rPr lang="en-GB" dirty="0" smtClean="0"/>
-              <a:t>in attic </a:t>
-            </a:r>
-            <a:r>
-              <a:rPr lang="en-GB" dirty="0" smtClean="0"/>
-              <a:t>are not </a:t>
-            </a:r>
-            <a:r>
-              <a:rPr lang="en-GB" dirty="0" smtClean="0"/>
-              <a:t>clearly visible due to coloration of background</a:t>
+              <a:t>2: Pitfalls in attic are not clearly visible due to coloration of background</a:t>
             </a:r>
           </a:p>
           <a:p>
@@ -8108,31 +8225,7 @@
                   <a:srgbClr val="0070C0"/>
                 </a:solidFill>
               </a:rPr>
-              <a:t>: moved </a:t>
-            </a:r>
-            <a:r>
-              <a:rPr lang="en-GB" dirty="0" smtClean="0">
-                <a:solidFill>
-                  <a:srgbClr val="0070C0"/>
-                </a:solidFill>
-              </a:rPr>
-              <a:t>pitfalls to </a:t>
-            </a:r>
-            <a:r>
-              <a:rPr lang="en-GB" dirty="0" smtClean="0">
-                <a:solidFill>
-                  <a:srgbClr val="0070C0"/>
-                </a:solidFill>
-              </a:rPr>
-              <a:t>be in front of black areas of </a:t>
-            </a:r>
-            <a:r>
-              <a:rPr lang="en-GB" dirty="0" smtClean="0">
-                <a:solidFill>
-                  <a:srgbClr val="0070C0"/>
-                </a:solidFill>
-              </a:rPr>
-              <a:t>background</a:t>
+              <a:t>: moved pitfalls to be in front of black areas of background</a:t>
             </a:r>
           </a:p>
           <a:p>
@@ -8143,35 +8236,7 @@
             </a:pPr>
             <a:r>
               <a:rPr lang="en-GB" dirty="0" smtClean="0"/>
-              <a:t>3. </a:t>
-            </a:r>
-            <a:r>
-              <a:rPr lang="en-GB" dirty="0" smtClean="0"/>
-              <a:t>In the attic, the </a:t>
-            </a:r>
-            <a:r>
-              <a:rPr lang="en-GB" dirty="0" smtClean="0"/>
-              <a:t>obstacles </a:t>
-            </a:r>
-            <a:r>
-              <a:rPr lang="en-GB" dirty="0" smtClean="0"/>
-              <a:t>you can jump on </a:t>
-            </a:r>
-            <a:r>
-              <a:rPr lang="en-GB" dirty="0" smtClean="0"/>
-              <a:t>merge </a:t>
-            </a:r>
-            <a:r>
-              <a:rPr lang="en-GB" dirty="0" smtClean="0"/>
-              <a:t>into the background because they a</a:t>
-            </a:r>
-            <a:r>
-              <a:rPr lang="en-GB" dirty="0" smtClean="0"/>
-              <a:t>re </a:t>
-            </a:r>
-            <a:r>
-              <a:rPr lang="en-GB" dirty="0" smtClean="0"/>
-              <a:t>all similar colours</a:t>
+              <a:t>3. In the attic, the obstacles you can jump on merge into the background because they are all similar colours</a:t>
             </a:r>
           </a:p>
           <a:p>
@@ -8189,27 +8254,14 @@
                   <a:srgbClr val="0070C0"/>
                 </a:solidFill>
               </a:rPr>
-              <a:t>: made foreground obstacles brighter </a:t>
-            </a:r>
-            <a:r>
-              <a:rPr lang="en-GB" dirty="0" smtClean="0">
-                <a:solidFill>
-                  <a:srgbClr val="0070C0"/>
-                </a:solidFill>
-              </a:rPr>
-              <a:t>colours</a:t>
-            </a:r>
-            <a:endParaRPr lang="en-GB" dirty="0" smtClean="0">
-              <a:solidFill>
-                <a:srgbClr val="0070C0"/>
-              </a:solidFill>
-            </a:endParaRPr>
+              <a:t>: made foreground obstacles brighter colours</a:t>
+            </a:r>
           </a:p>
         </p:txBody>
       </p:sp>
       <p:pic>
         <p:nvPicPr>
-          <p:cNvPr id="17" name="Picture 16"/>
+          <p:cNvPr id="17" name="Content Placeholder 16"/>
           <p:cNvPicPr>
             <a:picLocks noGrp="1" noChangeAspect="1" noChangeArrowheads="1"/>
           </p:cNvPicPr>
@@ -8271,52 +8323,15 @@
             </a:pPr>
             <a:r>
               <a:rPr lang="en-GB" dirty="0" smtClean="0"/>
-              <a:t>4</a:t>
-            </a:r>
-            <a:r>
-              <a:rPr lang="en-GB" dirty="0" smtClean="0"/>
-              <a:t>: When you jump </a:t>
-            </a:r>
-            <a:r>
-              <a:rPr lang="en-GB" dirty="0" smtClean="0"/>
-              <a:t>round to </a:t>
-            </a:r>
-            <a:r>
-              <a:rPr lang="en-GB" dirty="0" smtClean="0"/>
-              <a:t>the far </a:t>
-            </a:r>
-            <a:r>
-              <a:rPr lang="en-GB" dirty="0" smtClean="0"/>
-              <a:t>side of </a:t>
-            </a:r>
-            <a:r>
-              <a:rPr lang="en-GB" dirty="0" smtClean="0"/>
-              <a:t>the lake </a:t>
-            </a:r>
-            <a:r>
-              <a:rPr lang="en-GB" dirty="0" smtClean="0"/>
-              <a:t>in Level 1, you’re standing on snow, </a:t>
-            </a:r>
-            <a:r>
-              <a:rPr lang="en-GB" dirty="0" smtClean="0"/>
-              <a:t/>
+              <a:t>4: When you jump round to the far side of the lake in Level 1, you’re standing on snow, </a:t>
             </a:r>
             <a:br>
               <a:rPr lang="en-GB" dirty="0" smtClean="0"/>
             </a:br>
             <a:r>
               <a:rPr lang="en-GB" dirty="0" smtClean="0"/>
-              <a:t>which </a:t>
-            </a:r>
-            <a:r>
-              <a:rPr lang="en-GB" dirty="0" smtClean="0"/>
-              <a:t>isn’t </a:t>
-            </a:r>
-            <a:r>
-              <a:rPr lang="en-GB" dirty="0" smtClean="0"/>
-              <a:t>allowed elsewhere</a:t>
-            </a:r>
-            <a:endParaRPr lang="en-GB" dirty="0" smtClean="0"/>
+              <a:t>which isn’t allowed elsewhere</a:t>
+            </a:r>
           </a:p>
           <a:p>
             <a:r>
@@ -8333,15 +8348,7 @@
                   <a:srgbClr val="0070C0"/>
                 </a:solidFill>
               </a:rPr>
-              <a:t>: </a:t>
-            </a:r>
-            <a:r>
-              <a:rPr lang="en-GB" dirty="0" smtClean="0">
-                <a:solidFill>
-                  <a:srgbClr val="0070C0"/>
-                </a:solidFill>
-              </a:rPr>
-              <a:t>use other lake image so that you’re standing on the lake edge</a:t>
+              <a:t>: use other lake image so that you’re standing on the lake edge</a:t>
             </a:r>
           </a:p>
           <a:p>
@@ -8381,33 +8388,8 @@
             </a:pPr>
             <a:r>
               <a:rPr lang="en-GB" dirty="0" smtClean="0"/>
-              <a:t>6. </a:t>
-            </a:r>
-            <a:r>
-              <a:rPr lang="en-GB" dirty="0" smtClean="0"/>
-              <a:t>Have the game play in a single window, rather than </a:t>
-            </a:r>
-            <a:r>
-              <a:rPr lang="en-GB" dirty="0" smtClean="0"/>
-              <a:t>separate windows for menu</a:t>
-            </a:r>
-            <a:r>
-              <a:rPr lang="en-GB" dirty="0" smtClean="0"/>
-              <a:t>, </a:t>
-            </a:r>
-            <a:r>
-              <a:rPr lang="en-GB" dirty="0" smtClean="0"/>
-              <a:t>platform </a:t>
-            </a:r>
-            <a:r>
-              <a:rPr lang="en-GB" dirty="0" smtClean="0"/>
-              <a:t>and </a:t>
-            </a:r>
-            <a:r>
-              <a:rPr lang="en-GB" dirty="0" smtClean="0"/>
-              <a:t>puzzle</a:t>
-            </a:r>
-            <a:endParaRPr lang="en-GB" dirty="0" smtClean="0"/>
+              <a:t>6. Have the game play in a single window, rather than separate windows for menu, platform and puzzle</a:t>
+            </a:r>
           </a:p>
           <a:p>
             <a:r>
@@ -8424,37 +8406,8 @@
                   <a:srgbClr val="0070C0"/>
                 </a:solidFill>
               </a:rPr>
-              <a:t>: </a:t>
-            </a:r>
-            <a:r>
-              <a:rPr lang="en-GB" dirty="0" smtClean="0">
-                <a:solidFill>
-                  <a:srgbClr val="0070C0"/>
-                </a:solidFill>
-              </a:rPr>
-              <a:t>change </a:t>
-            </a:r>
-            <a:r>
-              <a:rPr lang="en-GB" dirty="0" smtClean="0">
-                <a:solidFill>
-                  <a:srgbClr val="0070C0"/>
-                </a:solidFill>
-              </a:rPr>
-              <a:t>to use </a:t>
-            </a:r>
-            <a:r>
-              <a:rPr lang="en-GB" dirty="0" smtClean="0">
-                <a:solidFill>
-                  <a:srgbClr val="0070C0"/>
-                </a:solidFill>
-              </a:rPr>
-              <a:t>single window</a:t>
-            </a:r>
-            <a:endParaRPr lang="en-GB" dirty="0" smtClean="0">
-              <a:solidFill>
-                <a:srgbClr val="0070C0"/>
-              </a:solidFill>
-            </a:endParaRPr>
+              <a:t>: change to use single window</a:t>
+            </a:r>
           </a:p>
         </p:txBody>
       </p:sp>
@@ -8496,7 +8449,7 @@
     </p:spTree>
     <p:extLst>
       <p:ext uri="{BB962C8B-B14F-4D97-AF65-F5344CB8AC3E}">
-        <p14:creationId xmlns:p14="http://schemas.microsoft.com/office/powerpoint/2010/main" xmlns="" val="2083772189"/>
+        <p14:creationId xmlns="" xmlns:p14="http://schemas.microsoft.com/office/powerpoint/2010/main" val="2083772189"/>
       </p:ext>
     </p:extLst>
   </p:cSld>
@@ -8535,7 +8488,7 @@
           <p:cNvPr id="4" name="Picture 3">
             <a:extLst>
               <a:ext uri="{FF2B5EF4-FFF2-40B4-BE49-F238E27FC236}">
-                <a16:creationId xmlns:a16="http://schemas.microsoft.com/office/drawing/2014/main" xmlns="" id="{0673D7FF-79D1-47CC-9F17-8BD3F4A92FD2}"/>
+                <a16:creationId xmlns="" xmlns:a16="http://schemas.microsoft.com/office/drawing/2014/main" id="{0673D7FF-79D1-47CC-9F17-8BD3F4A92FD2}"/>
               </a:ext>
             </a:extLst>
           </p:cNvPr>
@@ -8565,7 +8518,7 @@
           <p:cNvPr id="9" name="Picture 8">
             <a:extLst>
               <a:ext uri="{FF2B5EF4-FFF2-40B4-BE49-F238E27FC236}">
-                <a16:creationId xmlns:a16="http://schemas.microsoft.com/office/drawing/2014/main" xmlns="" id="{90E7F56C-9544-4654-9D9C-A258B0BC56B3}"/>
+                <a16:creationId xmlns="" xmlns:a16="http://schemas.microsoft.com/office/drawing/2014/main" id="{90E7F56C-9544-4654-9D9C-A258B0BC56B3}"/>
               </a:ext>
             </a:extLst>
           </p:cNvPr>
@@ -8595,7 +8548,7 @@
           <p:cNvPr id="10" name="Rectangle 9">
             <a:extLst>
               <a:ext uri="{FF2B5EF4-FFF2-40B4-BE49-F238E27FC236}">
-                <a16:creationId xmlns:a16="http://schemas.microsoft.com/office/drawing/2014/main" xmlns="" id="{7CE6DF49-6ADC-40B9-93F3-F6495F2DC7AB}"/>
+                <a16:creationId xmlns="" xmlns:a16="http://schemas.microsoft.com/office/drawing/2014/main" id="{7CE6DF49-6ADC-40B9-93F3-F6495F2DC7AB}"/>
               </a:ext>
             </a:extLst>
           </p:cNvPr>
@@ -8647,7 +8600,7 @@
           <p:cNvPr id="2" name="Title 1">
             <a:extLst>
               <a:ext uri="{FF2B5EF4-FFF2-40B4-BE49-F238E27FC236}">
-                <a16:creationId xmlns:a16="http://schemas.microsoft.com/office/drawing/2014/main" xmlns="" id="{DFC049F8-2284-4161-BE3C-431BCD0EFAB7}"/>
+                <a16:creationId xmlns="" xmlns:a16="http://schemas.microsoft.com/office/drawing/2014/main" id="{DFC049F8-2284-4161-BE3C-431BCD0EFAB7}"/>
               </a:ext>
             </a:extLst>
           </p:cNvPr>
@@ -8688,19 +8641,7 @@
               <a:rPr lang="en-GB" dirty="0" smtClean="0">
                 <a:latin typeface="+mn-lt"/>
               </a:rPr>
-              <a:t>	User Testing Feedback (</a:t>
-            </a:r>
-            <a:r>
-              <a:rPr lang="en-GB" dirty="0" smtClean="0">
-                <a:latin typeface="+mn-lt"/>
-              </a:rPr>
-              <a:t>iii</a:t>
-            </a:r>
-            <a:r>
-              <a:rPr lang="en-GB" dirty="0" smtClean="0">
-                <a:latin typeface="+mn-lt"/>
-              </a:rPr>
-              <a:t>)	</a:t>
+              <a:t>	User Testing Feedback (iii)	</a:t>
             </a:r>
             <a:r>
               <a:rPr lang="en-GB" i="1" dirty="0" smtClean="0">
@@ -8719,7 +8660,7 @@
           <p:cNvPr id="16" name="Content Placeholder 2">
             <a:extLst>
               <a:ext uri="{FF2B5EF4-FFF2-40B4-BE49-F238E27FC236}">
-                <a16:creationId xmlns:a16="http://schemas.microsoft.com/office/drawing/2014/main" xmlns="" id="{F2E045F5-714F-4E07-87A1-F5696A62ED28}"/>
+                <a16:creationId xmlns="" xmlns:a16="http://schemas.microsoft.com/office/drawing/2014/main" id="{F2E045F5-714F-4E07-87A1-F5696A62ED28}"/>
               </a:ext>
             </a:extLst>
           </p:cNvPr>
@@ -8849,7 +8790,6 @@
               <a:rPr lang="en-GB" dirty="0" smtClean="0"/>
               <a:t>9: Add an Oops sound on loss of life, and death</a:t>
             </a:r>
-            <a:endParaRPr lang="en-GB" dirty="0" smtClean="0"/>
           </a:p>
           <a:p>
             <a:r>
@@ -8866,21 +8806,8 @@
                   <a:srgbClr val="0070C0"/>
                 </a:solidFill>
               </a:rPr>
-              <a:t>: </a:t>
-            </a:r>
-            <a:r>
-              <a:rPr lang="en-GB" dirty="0" smtClean="0">
-                <a:solidFill>
-                  <a:srgbClr val="0070C0"/>
-                </a:solidFill>
-              </a:rPr>
-              <a:t>Add music, including Oops sound</a:t>
-            </a:r>
-            <a:endParaRPr lang="en-GB" dirty="0" smtClean="0">
-              <a:solidFill>
-                <a:srgbClr val="0070C0"/>
-              </a:solidFill>
-            </a:endParaRPr>
+              <a:t>: Add music, including Oops sound</a:t>
+            </a:r>
           </a:p>
           <a:p>
             <a:pPr>
@@ -8892,7 +8819,6 @@
               <a:rPr lang="en-GB" dirty="0" smtClean="0"/>
               <a:t>10: Not clear when you’ve reached the end game state</a:t>
             </a:r>
-            <a:endParaRPr lang="en-GB" dirty="0" smtClean="0"/>
           </a:p>
           <a:p>
             <a:r>
@@ -8909,21 +8835,8 @@
                   <a:srgbClr val="0070C0"/>
                 </a:solidFill>
               </a:rPr>
-              <a:t>: </a:t>
-            </a:r>
-            <a:r>
-              <a:rPr lang="en-GB" dirty="0" smtClean="0">
-                <a:solidFill>
-                  <a:srgbClr val="0070C0"/>
-                </a:solidFill>
-              </a:rPr>
-              <a:t>update instructions in main menu to show that game complete</a:t>
-            </a:r>
-            <a:endParaRPr lang="en-GB" dirty="0" smtClean="0">
-              <a:solidFill>
-                <a:srgbClr val="0070C0"/>
-              </a:solidFill>
-            </a:endParaRPr>
+              <a:t>: update instructions in main menu to show that game complete</a:t>
+            </a:r>
           </a:p>
           <a:p>
             <a:pPr>
@@ -8935,7 +8848,6 @@
               <a:rPr lang="en-GB" dirty="0" smtClean="0"/>
               <a:t>11: Did not notice collected items in Christmas Room, nor other Christmas Room updates</a:t>
             </a:r>
-            <a:endParaRPr lang="en-GB" dirty="0" smtClean="0"/>
           </a:p>
           <a:p>
             <a:r>
@@ -8952,15 +8864,7 @@
                   <a:srgbClr val="0070C0"/>
                 </a:solidFill>
               </a:rPr>
-              <a:t>: </a:t>
-            </a:r>
-            <a:r>
-              <a:rPr lang="en-GB" dirty="0" smtClean="0">
-                <a:solidFill>
-                  <a:srgbClr val="0070C0"/>
-                </a:solidFill>
-              </a:rPr>
-              <a:t>Add text above shelving that collected items will be shown there</a:t>
+              <a:t>: Add text above shelving that collected items will be shown there</a:t>
             </a:r>
           </a:p>
           <a:p>
@@ -9076,7 +8980,6 @@
               <a:rPr lang="en-GB" dirty="0" smtClean="0"/>
               <a:t>7: Sprite continues to move when window has lost focus</a:t>
             </a:r>
-            <a:endParaRPr lang="en-GB" dirty="0" smtClean="0"/>
           </a:p>
           <a:p>
             <a:r>
@@ -9093,15 +8996,7 @@
                   <a:srgbClr val="0070C0"/>
                 </a:solidFill>
               </a:rPr>
-              <a:t>: </a:t>
-            </a:r>
-            <a:r>
-              <a:rPr lang="en-GB" dirty="0" smtClean="0">
-                <a:solidFill>
-                  <a:srgbClr val="0070C0"/>
-                </a:solidFill>
-              </a:rPr>
-              <a:t>pause when window loses focus, and un-pause when focus regained</a:t>
+              <a:t>: pause when window loses focus, and un-pause when focus regained</a:t>
             </a:r>
           </a:p>
           <a:p>
@@ -9112,11 +9007,7 @@
             </a:pPr>
             <a:r>
               <a:rPr lang="en-GB" dirty="0" smtClean="0"/>
-              <a:t>8: Jump down in kitchen falls past fireplace when it ought to land </a:t>
-            </a:r>
-            <a:r>
-              <a:rPr lang="en-GB" dirty="0" smtClean="0"/>
-              <a:t>on top</a:t>
+              <a:t>8: Jump down in kitchen falls past fireplace when it ought to land on top</a:t>
             </a:r>
           </a:p>
           <a:p>
@@ -9134,28 +9025,15 @@
                   <a:srgbClr val="0070C0"/>
                 </a:solidFill>
               </a:rPr>
-              <a:t>: </a:t>
-            </a:r>
-            <a:r>
-              <a:rPr lang="en-GB" dirty="0" smtClean="0">
-                <a:solidFill>
-                  <a:srgbClr val="0070C0"/>
-                </a:solidFill>
-              </a:rPr>
-              <a:t>change shelving arrangement so this does not occur</a:t>
-            </a:r>
-            <a:endParaRPr lang="en-GB" dirty="0" smtClean="0">
-              <a:solidFill>
-                <a:srgbClr val="0070C0"/>
-              </a:solidFill>
-            </a:endParaRPr>
+              <a:t>: change shelving arrangement so this does not occur</a:t>
+            </a:r>
           </a:p>
         </p:txBody>
       </p:sp>
     </p:spTree>
     <p:extLst>
       <p:ext uri="{BB962C8B-B14F-4D97-AF65-F5344CB8AC3E}">
-        <p14:creationId xmlns:p14="http://schemas.microsoft.com/office/powerpoint/2010/main" xmlns="" val="2083772189"/>
+        <p14:creationId xmlns="" xmlns:p14="http://schemas.microsoft.com/office/powerpoint/2010/main" val="2083772189"/>
       </p:ext>
     </p:extLst>
   </p:cSld>
@@ -9194,7 +9072,7 @@
           <p:cNvPr id="4" name="Picture 3">
             <a:extLst>
               <a:ext uri="{FF2B5EF4-FFF2-40B4-BE49-F238E27FC236}">
-                <a16:creationId xmlns:a16="http://schemas.microsoft.com/office/drawing/2014/main" xmlns="" id="{0673D7FF-79D1-47CC-9F17-8BD3F4A92FD2}"/>
+                <a16:creationId xmlns="" xmlns:a16="http://schemas.microsoft.com/office/drawing/2014/main" id="{0673D7FF-79D1-47CC-9F17-8BD3F4A92FD2}"/>
               </a:ext>
             </a:extLst>
           </p:cNvPr>
@@ -9224,7 +9102,7 @@
           <p:cNvPr id="9" name="Picture 8">
             <a:extLst>
               <a:ext uri="{FF2B5EF4-FFF2-40B4-BE49-F238E27FC236}">
-                <a16:creationId xmlns:a16="http://schemas.microsoft.com/office/drawing/2014/main" xmlns="" id="{90E7F56C-9544-4654-9D9C-A258B0BC56B3}"/>
+                <a16:creationId xmlns="" xmlns:a16="http://schemas.microsoft.com/office/drawing/2014/main" id="{90E7F56C-9544-4654-9D9C-A258B0BC56B3}"/>
               </a:ext>
             </a:extLst>
           </p:cNvPr>
@@ -9254,7 +9132,7 @@
           <p:cNvPr id="10" name="Rectangle 9">
             <a:extLst>
               <a:ext uri="{FF2B5EF4-FFF2-40B4-BE49-F238E27FC236}">
-                <a16:creationId xmlns:a16="http://schemas.microsoft.com/office/drawing/2014/main" xmlns="" id="{7CE6DF49-6ADC-40B9-93F3-F6495F2DC7AB}"/>
+                <a16:creationId xmlns="" xmlns:a16="http://schemas.microsoft.com/office/drawing/2014/main" id="{7CE6DF49-6ADC-40B9-93F3-F6495F2DC7AB}"/>
               </a:ext>
             </a:extLst>
           </p:cNvPr>
@@ -9306,7 +9184,7 @@
           <p:cNvPr id="2" name="Title 1">
             <a:extLst>
               <a:ext uri="{FF2B5EF4-FFF2-40B4-BE49-F238E27FC236}">
-                <a16:creationId xmlns:a16="http://schemas.microsoft.com/office/drawing/2014/main" xmlns="" id="{DFC049F8-2284-4161-BE3C-431BCD0EFAB7}"/>
+                <a16:creationId xmlns="" xmlns:a16="http://schemas.microsoft.com/office/drawing/2014/main" id="{DFC049F8-2284-4161-BE3C-431BCD0EFAB7}"/>
               </a:ext>
             </a:extLst>
           </p:cNvPr>
@@ -9347,13 +9225,25 @@
               <a:rPr lang="en-GB" dirty="0" smtClean="0">
                 <a:latin typeface="+mn-lt"/>
               </a:rPr>
-              <a:t>	User </a:t>
+              <a:t>	User Feedback </a:t>
             </a:r>
             <a:r>
               <a:rPr lang="en-GB" dirty="0" smtClean="0">
                 <a:latin typeface="+mn-lt"/>
               </a:rPr>
-              <a:t>Feedback - Questionnaire</a:t>
+              <a:t>– Questionnaire (</a:t>
+            </a:r>
+            <a:r>
+              <a:rPr lang="en-GB" dirty="0" err="1" smtClean="0">
+                <a:latin typeface="+mn-lt"/>
+              </a:rPr>
+              <a:t>i</a:t>
+            </a:r>
+            <a:r>
+              <a:rPr lang="en-GB" dirty="0" smtClean="0">
+                <a:latin typeface="+mn-lt"/>
+              </a:rPr>
+              <a:t>)</a:t>
             </a:r>
             <a:r>
               <a:rPr lang="en-GB" dirty="0" smtClean="0">
@@ -9378,7 +9268,7 @@
           <p:cNvPr id="16" name="Content Placeholder 2">
             <a:extLst>
               <a:ext uri="{FF2B5EF4-FFF2-40B4-BE49-F238E27FC236}">
-                <a16:creationId xmlns:a16="http://schemas.microsoft.com/office/drawing/2014/main" xmlns="" id="{F2E045F5-714F-4E07-87A1-F5696A62ED28}"/>
+                <a16:creationId xmlns="" xmlns:a16="http://schemas.microsoft.com/office/drawing/2014/main" id="{F2E045F5-714F-4E07-87A1-F5696A62ED28}"/>
               </a:ext>
             </a:extLst>
           </p:cNvPr>
@@ -10238,8 +10128,30 @@
                     <a:bodyPr/>
                     <a:lstStyle/>
                     <a:p>
-                      <a:pPr algn="ctr"/>
-                      <a:endParaRPr lang="en-GB" sz="1600" dirty="0"/>
+                      <a:pPr marL="0" marR="0" indent="0" algn="ctr" defTabSz="914400" rtl="0" eaLnBrk="1" fontAlgn="auto" latinLnBrk="0" hangingPunct="1">
+                        <a:lnSpc>
+                          <a:spcPct val="100000"/>
+                        </a:lnSpc>
+                        <a:spcBef>
+                          <a:spcPts val="0"/>
+                        </a:spcBef>
+                        <a:spcAft>
+                          <a:spcPts val="0"/>
+                        </a:spcAft>
+                        <a:buClrTx/>
+                        <a:buSzTx/>
+                        <a:buFontTx/>
+                        <a:buNone/>
+                        <a:tabLst/>
+                        <a:defRPr/>
+                      </a:pPr>
+                      <a:r>
+                        <a:rPr lang="en-GB" sz="2000" dirty="0" smtClean="0">
+                          <a:sym typeface="Wingdings"/>
+                        </a:rPr>
+                        <a:t></a:t>
+                      </a:r>
+                      <a:endParaRPr lang="en-GB" sz="2000" dirty="0" smtClean="0"/>
                     </a:p>
                   </a:txBody>
                   <a:tcPr anchor="ctr">
@@ -10273,12 +10185,6 @@
                         <a:tabLst/>
                         <a:defRPr/>
                       </a:pPr>
-                      <a:r>
-                        <a:rPr lang="en-GB" sz="2000" dirty="0" smtClean="0">
-                          <a:sym typeface="Wingdings"/>
-                        </a:rPr>
-                        <a:t></a:t>
-                      </a:r>
                       <a:endParaRPr lang="en-GB" sz="2000" dirty="0" smtClean="0"/>
                     </a:p>
                   </a:txBody>
@@ -10773,7 +10679,7 @@
     </p:spTree>
     <p:extLst>
       <p:ext uri="{BB962C8B-B14F-4D97-AF65-F5344CB8AC3E}">
-        <p14:creationId xmlns:p14="http://schemas.microsoft.com/office/powerpoint/2010/main" xmlns="" val="2083772189"/>
+        <p14:creationId xmlns="" xmlns:p14="http://schemas.microsoft.com/office/powerpoint/2010/main" val="2083772189"/>
       </p:ext>
     </p:extLst>
   </p:cSld>
@@ -10812,7 +10718,1710 @@
           <p:cNvPr id="4" name="Picture 3">
             <a:extLst>
               <a:ext uri="{FF2B5EF4-FFF2-40B4-BE49-F238E27FC236}">
-                <a16:creationId xmlns:a16="http://schemas.microsoft.com/office/drawing/2014/main" xmlns="" id="{1F7B8747-803D-41C8-89FD-730522D4A3D6}"/>
+                <a16:creationId xmlns="" xmlns:a16="http://schemas.microsoft.com/office/drawing/2014/main" id="{0673D7FF-79D1-47CC-9F17-8BD3F4A92FD2}"/>
+              </a:ext>
+            </a:extLst>
+          </p:cNvPr>
+          <p:cNvPicPr>
+            <a:picLocks noChangeAspect="1"/>
+          </p:cNvPicPr>
+          <p:nvPr/>
+        </p:nvPicPr>
+        <p:blipFill>
+          <a:blip r:embed="rId3"/>
+          <a:stretch>
+            <a:fillRect/>
+          </a:stretch>
+        </p:blipFill>
+        <p:spPr>
+          <a:xfrm>
+            <a:off x="0" y="0"/>
+            <a:ext cx="9141027" cy="6858000"/>
+          </a:xfrm>
+          <a:prstGeom prst="rect">
+            <a:avLst/>
+          </a:prstGeom>
+        </p:spPr>
+      </p:pic>
+      <p:pic>
+        <p:nvPicPr>
+          <p:cNvPr id="9" name="Picture 8">
+            <a:extLst>
+              <a:ext uri="{FF2B5EF4-FFF2-40B4-BE49-F238E27FC236}">
+                <a16:creationId xmlns="" xmlns:a16="http://schemas.microsoft.com/office/drawing/2014/main" id="{90E7F56C-9544-4654-9D9C-A258B0BC56B3}"/>
+              </a:ext>
+            </a:extLst>
+          </p:cNvPr>
+          <p:cNvPicPr>
+            <a:picLocks noChangeAspect="1"/>
+          </p:cNvPicPr>
+          <p:nvPr/>
+        </p:nvPicPr>
+        <p:blipFill>
+          <a:blip r:embed="rId3"/>
+          <a:stretch>
+            <a:fillRect/>
+          </a:stretch>
+        </p:blipFill>
+        <p:spPr>
+          <a:xfrm>
+            <a:off x="3050973" y="0"/>
+            <a:ext cx="9141027" cy="6858000"/>
+          </a:xfrm>
+          <a:prstGeom prst="rect">
+            <a:avLst/>
+          </a:prstGeom>
+        </p:spPr>
+      </p:pic>
+      <p:sp>
+        <p:nvSpPr>
+          <p:cNvPr id="10" name="Rectangle 9">
+            <a:extLst>
+              <a:ext uri="{FF2B5EF4-FFF2-40B4-BE49-F238E27FC236}">
+                <a16:creationId xmlns="" xmlns:a16="http://schemas.microsoft.com/office/drawing/2014/main" id="{7CE6DF49-6ADC-40B9-93F3-F6495F2DC7AB}"/>
+              </a:ext>
+            </a:extLst>
+          </p:cNvPr>
+          <p:cNvSpPr/>
+          <p:nvPr/>
+        </p:nvSpPr>
+        <p:spPr>
+          <a:xfrm>
+            <a:off x="2625754" y="0"/>
+            <a:ext cx="2357307" cy="566053"/>
+          </a:xfrm>
+          <a:prstGeom prst="rect">
+            <a:avLst/>
+          </a:prstGeom>
+          <a:solidFill>
+            <a:srgbClr val="46CDFE"/>
+          </a:solidFill>
+          <a:ln>
+            <a:noFill/>
+          </a:ln>
+        </p:spPr>
+        <p:style>
+          <a:lnRef idx="2">
+            <a:schemeClr val="accent1">
+              <a:shade val="50000"/>
+            </a:schemeClr>
+          </a:lnRef>
+          <a:fillRef idx="1">
+            <a:schemeClr val="accent1"/>
+          </a:fillRef>
+          <a:effectRef idx="0">
+            <a:schemeClr val="accent1"/>
+          </a:effectRef>
+          <a:fontRef idx="minor">
+            <a:schemeClr val="lt1"/>
+          </a:fontRef>
+        </p:style>
+        <p:txBody>
+          <a:bodyPr rtlCol="0" anchor="ctr"/>
+          <a:lstStyle/>
+          <a:p>
+            <a:pPr algn="ctr"/>
+            <a:endParaRPr lang="en-GB"/>
+          </a:p>
+        </p:txBody>
+      </p:sp>
+      <p:sp>
+        <p:nvSpPr>
+          <p:cNvPr id="2" name="Title 1">
+            <a:extLst>
+              <a:ext uri="{FF2B5EF4-FFF2-40B4-BE49-F238E27FC236}">
+                <a16:creationId xmlns="" xmlns:a16="http://schemas.microsoft.com/office/drawing/2014/main" id="{DFC049F8-2284-4161-BE3C-431BCD0EFAB7}"/>
+              </a:ext>
+            </a:extLst>
+          </p:cNvPr>
+          <p:cNvSpPr>
+            <a:spLocks noGrp="1"/>
+          </p:cNvSpPr>
+          <p:nvPr>
+            <p:ph type="title"/>
+          </p:nvPr>
+        </p:nvSpPr>
+        <p:spPr>
+          <a:xfrm>
+            <a:off x="523836" y="365125"/>
+            <a:ext cx="11001452" cy="566053"/>
+          </a:xfrm>
+          <a:solidFill>
+            <a:schemeClr val="bg1"/>
+          </a:solidFill>
+          <a:ln>
+            <a:solidFill>
+              <a:schemeClr val="tx1"/>
+            </a:solidFill>
+          </a:ln>
+        </p:spPr>
+        <p:txBody>
+          <a:bodyPr>
+            <a:normAutofit fontScale="90000"/>
+          </a:bodyPr>
+          <a:lstStyle/>
+          <a:p>
+            <a:pPr>
+              <a:tabLst>
+                <a:tab pos="5383213" algn="ctr"/>
+                <a:tab pos="10817225" algn="r"/>
+              </a:tabLst>
+            </a:pPr>
+            <a:r>
+              <a:rPr lang="en-GB" dirty="0" smtClean="0">
+                <a:latin typeface="+mn-lt"/>
+              </a:rPr>
+              <a:t>	User Feedback </a:t>
+            </a:r>
+            <a:r>
+              <a:rPr lang="en-GB" dirty="0" smtClean="0">
+                <a:latin typeface="+mn-lt"/>
+              </a:rPr>
+              <a:t>– Questionnaire (ii)</a:t>
+            </a:r>
+            <a:r>
+              <a:rPr lang="en-GB" dirty="0" smtClean="0">
+                <a:latin typeface="+mn-lt"/>
+              </a:rPr>
+              <a:t>	</a:t>
+            </a:r>
+            <a:r>
+              <a:rPr lang="en-GB" i="1" dirty="0" smtClean="0">
+                <a:latin typeface="+mn-lt"/>
+              </a:rPr>
+              <a:t>(4)</a:t>
+            </a:r>
+            <a:endParaRPr lang="en-GB" i="1" dirty="0">
+              <a:latin typeface="+mn-lt"/>
+            </a:endParaRPr>
+          </a:p>
+        </p:txBody>
+      </p:sp>
+      <p:sp>
+        <p:nvSpPr>
+          <p:cNvPr id="16" name="Content Placeholder 2">
+            <a:extLst>
+              <a:ext uri="{FF2B5EF4-FFF2-40B4-BE49-F238E27FC236}">
+                <a16:creationId xmlns="" xmlns:a16="http://schemas.microsoft.com/office/drawing/2014/main" id="{F2E045F5-714F-4E07-87A1-F5696A62ED28}"/>
+              </a:ext>
+            </a:extLst>
+          </p:cNvPr>
+          <p:cNvSpPr txBox="1">
+            <a:spLocks/>
+          </p:cNvSpPr>
+          <p:nvPr/>
+        </p:nvSpPr>
+        <p:spPr>
+          <a:xfrm>
+            <a:off x="523836" y="928670"/>
+            <a:ext cx="11001452" cy="5245785"/>
+          </a:xfrm>
+          <a:prstGeom prst="rect">
+            <a:avLst/>
+          </a:prstGeom>
+          <a:solidFill>
+            <a:schemeClr val="bg1"/>
+          </a:solidFill>
+          <a:ln>
+            <a:solidFill>
+              <a:schemeClr val="tx1"/>
+            </a:solidFill>
+          </a:ln>
+        </p:spPr>
+        <p:txBody>
+          <a:bodyPr vert="horz" lIns="91440" tIns="45720" rIns="91440" bIns="45720" rtlCol="0">
+            <a:normAutofit/>
+          </a:bodyPr>
+          <a:lstStyle/>
+          <a:p>
+            <a:pPr marL="0" marR="0" lvl="0" indent="0" algn="l" defTabSz="914400" rtl="0" eaLnBrk="1" fontAlgn="auto" latinLnBrk="0" hangingPunct="1">
+              <a:lnSpc>
+                <a:spcPct val="90000"/>
+              </a:lnSpc>
+              <a:spcBef>
+                <a:spcPts val="1000"/>
+              </a:spcBef>
+              <a:spcAft>
+                <a:spcPts val="0"/>
+              </a:spcAft>
+              <a:buClrTx/>
+              <a:buSzTx/>
+              <a:buFont typeface="Arial" panose="020B0604020202020204" pitchFamily="34" charset="0"/>
+              <a:buNone/>
+              <a:tabLst/>
+              <a:defRPr/>
+            </a:pPr>
+            <a:endParaRPr kumimoji="0" lang="en-GB" sz="2800" b="0" i="0" u="none" strike="noStrike" kern="1200" cap="none" spc="0" normalizeH="0" baseline="0" noProof="0" smtClean="0">
+              <a:ln>
+                <a:noFill/>
+              </a:ln>
+              <a:solidFill>
+                <a:schemeClr val="tx1"/>
+              </a:solidFill>
+              <a:effectLst/>
+              <a:uLnTx/>
+              <a:uFillTx/>
+              <a:latin typeface="Bodoni MT" panose="02070603080606020203" pitchFamily="18" charset="0"/>
+              <a:ea typeface="+mn-ea"/>
+              <a:cs typeface="+mn-cs"/>
+            </a:endParaRPr>
+          </a:p>
+          <a:p>
+            <a:pPr marL="0" marR="0" lvl="0" indent="0" algn="l" defTabSz="914400" rtl="0" eaLnBrk="1" fontAlgn="auto" latinLnBrk="0" hangingPunct="1">
+              <a:lnSpc>
+                <a:spcPct val="90000"/>
+              </a:lnSpc>
+              <a:spcBef>
+                <a:spcPts val="1000"/>
+              </a:spcBef>
+              <a:spcAft>
+                <a:spcPts val="0"/>
+              </a:spcAft>
+              <a:buClrTx/>
+              <a:buSzTx/>
+              <a:buFont typeface="Arial" panose="020B0604020202020204" pitchFamily="34" charset="0"/>
+              <a:buNone/>
+              <a:tabLst/>
+              <a:defRPr/>
+            </a:pPr>
+            <a:endParaRPr kumimoji="0" lang="en-GB" sz="2800" b="0" i="0" u="none" strike="noStrike" kern="1200" cap="none" spc="0" normalizeH="0" baseline="0" noProof="0" dirty="0">
+              <a:ln>
+                <a:noFill/>
+              </a:ln>
+              <a:solidFill>
+                <a:schemeClr val="tx1"/>
+              </a:solidFill>
+              <a:effectLst/>
+              <a:uLnTx/>
+              <a:uFillTx/>
+              <a:latin typeface="Bodoni MT" panose="02070603080606020203" pitchFamily="18" charset="0"/>
+              <a:ea typeface="+mn-ea"/>
+              <a:cs typeface="+mn-cs"/>
+            </a:endParaRPr>
+          </a:p>
+        </p:txBody>
+      </p:sp>
+      <p:graphicFrame>
+        <p:nvGraphicFramePr>
+          <p:cNvPr id="12" name="Content Placeholder 3"/>
+          <p:cNvGraphicFramePr>
+            <a:graphicFrameLocks noGrp="1"/>
+          </p:cNvGraphicFramePr>
+          <p:nvPr>
+            <p:ph idx="1"/>
+          </p:nvPr>
+        </p:nvGraphicFramePr>
+        <p:xfrm>
+          <a:off x="881026" y="1234456"/>
+          <a:ext cx="10215634" cy="4480560"/>
+        </p:xfrm>
+        <a:graphic>
+          <a:graphicData uri="http://schemas.openxmlformats.org/drawingml/2006/table">
+            <a:tbl>
+              <a:tblPr firstRow="1" bandRow="1">
+                <a:tableStyleId>{5C22544A-7EE6-4342-B048-85BDC9FD1C3A}</a:tableStyleId>
+              </a:tblPr>
+              <a:tblGrid>
+                <a:gridCol w="5500726"/>
+                <a:gridCol w="1000132"/>
+                <a:gridCol w="970036"/>
+                <a:gridCol w="925801"/>
+                <a:gridCol w="820418"/>
+                <a:gridCol w="998521"/>
+              </a:tblGrid>
+              <a:tr h="370840">
+                <a:tc>
+                  <a:txBody>
+                    <a:bodyPr/>
+                    <a:lstStyle/>
+                    <a:p>
+                      <a:endParaRPr lang="en-GB" sz="1600" dirty="0"/>
+                    </a:p>
+                  </a:txBody>
+                  <a:tcPr>
+                    <a:solidFill>
+                      <a:schemeClr val="accent5">
+                        <a:lumMod val="75000"/>
+                      </a:schemeClr>
+                    </a:solidFill>
+                  </a:tcPr>
+                </a:tc>
+                <a:tc>
+                  <a:txBody>
+                    <a:bodyPr/>
+                    <a:lstStyle/>
+                    <a:p>
+                      <a:pPr algn="ctr"/>
+                      <a:r>
+                        <a:rPr lang="en-GB" sz="1600" dirty="0" smtClean="0"/>
+                        <a:t>Strongly Disagree</a:t>
+                      </a:r>
+                      <a:endParaRPr lang="en-GB" sz="1600" dirty="0"/>
+                    </a:p>
+                  </a:txBody>
+                  <a:tcPr>
+                    <a:solidFill>
+                      <a:schemeClr val="accent5">
+                        <a:lumMod val="75000"/>
+                      </a:schemeClr>
+                    </a:solidFill>
+                  </a:tcPr>
+                </a:tc>
+                <a:tc>
+                  <a:txBody>
+                    <a:bodyPr/>
+                    <a:lstStyle/>
+                    <a:p>
+                      <a:pPr algn="ctr"/>
+                      <a:r>
+                        <a:rPr lang="en-GB" sz="1600" dirty="0" smtClean="0"/>
+                        <a:t>Disagree</a:t>
+                      </a:r>
+                      <a:endParaRPr lang="en-GB" sz="1600" dirty="0"/>
+                    </a:p>
+                  </a:txBody>
+                  <a:tcPr>
+                    <a:solidFill>
+                      <a:schemeClr val="accent5">
+                        <a:lumMod val="75000"/>
+                      </a:schemeClr>
+                    </a:solidFill>
+                  </a:tcPr>
+                </a:tc>
+                <a:tc>
+                  <a:txBody>
+                    <a:bodyPr/>
+                    <a:lstStyle/>
+                    <a:p>
+                      <a:pPr algn="ctr"/>
+                      <a:r>
+                        <a:rPr lang="en-GB" sz="1600" dirty="0" smtClean="0"/>
+                        <a:t>Neutral</a:t>
+                      </a:r>
+                      <a:endParaRPr lang="en-GB" sz="1600" dirty="0"/>
+                    </a:p>
+                  </a:txBody>
+                  <a:tcPr>
+                    <a:solidFill>
+                      <a:schemeClr val="accent5">
+                        <a:lumMod val="75000"/>
+                      </a:schemeClr>
+                    </a:solidFill>
+                  </a:tcPr>
+                </a:tc>
+                <a:tc>
+                  <a:txBody>
+                    <a:bodyPr/>
+                    <a:lstStyle/>
+                    <a:p>
+                      <a:pPr algn="ctr"/>
+                      <a:r>
+                        <a:rPr lang="en-GB" sz="1600" dirty="0" smtClean="0"/>
+                        <a:t>Agree</a:t>
+                      </a:r>
+                      <a:endParaRPr lang="en-GB" sz="1600" dirty="0"/>
+                    </a:p>
+                  </a:txBody>
+                  <a:tcPr>
+                    <a:solidFill>
+                      <a:schemeClr val="accent5">
+                        <a:lumMod val="75000"/>
+                      </a:schemeClr>
+                    </a:solidFill>
+                  </a:tcPr>
+                </a:tc>
+                <a:tc>
+                  <a:txBody>
+                    <a:bodyPr/>
+                    <a:lstStyle/>
+                    <a:p>
+                      <a:pPr algn="ctr"/>
+                      <a:r>
+                        <a:rPr lang="en-GB" sz="1600" dirty="0" smtClean="0"/>
+                        <a:t>Strongly</a:t>
+                      </a:r>
+                      <a:r>
+                        <a:rPr lang="en-GB" sz="1600" baseline="0" dirty="0" smtClean="0"/>
+                        <a:t> Agree</a:t>
+                      </a:r>
+                      <a:endParaRPr lang="en-GB" sz="1600" dirty="0"/>
+                    </a:p>
+                  </a:txBody>
+                  <a:tcPr>
+                    <a:solidFill>
+                      <a:schemeClr val="accent5">
+                        <a:lumMod val="75000"/>
+                      </a:schemeClr>
+                    </a:solidFill>
+                  </a:tcPr>
+                </a:tc>
+              </a:tr>
+              <a:tr h="370840">
+                <a:tc>
+                  <a:txBody>
+                    <a:bodyPr/>
+                    <a:lstStyle/>
+                    <a:p>
+                      <a:r>
+                        <a:rPr lang="en-GB" sz="1800" kern="1200" dirty="0" smtClean="0">
+                          <a:solidFill>
+                            <a:schemeClr val="dk1"/>
+                          </a:solidFill>
+                          <a:latin typeface="+mn-lt"/>
+                          <a:ea typeface="+mn-ea"/>
+                          <a:cs typeface="+mn-cs"/>
+                        </a:rPr>
+                        <a:t>The game was fun to play</a:t>
+                      </a:r>
+                      <a:endParaRPr lang="en-GB" sz="1800" dirty="0"/>
+                    </a:p>
+                  </a:txBody>
+                  <a:tcPr>
+                    <a:solidFill>
+                      <a:schemeClr val="accent5">
+                        <a:lumMod val="20000"/>
+                        <a:lumOff val="80000"/>
+                      </a:schemeClr>
+                    </a:solidFill>
+                  </a:tcPr>
+                </a:tc>
+                <a:tc>
+                  <a:txBody>
+                    <a:bodyPr/>
+                    <a:lstStyle/>
+                    <a:p>
+                      <a:pPr algn="ctr"/>
+                      <a:endParaRPr lang="en-GB" sz="1600" dirty="0"/>
+                    </a:p>
+                  </a:txBody>
+                  <a:tcPr anchor="ctr">
+                    <a:solidFill>
+                      <a:schemeClr val="accent5">
+                        <a:lumMod val="20000"/>
+                        <a:lumOff val="80000"/>
+                      </a:schemeClr>
+                    </a:solidFill>
+                  </a:tcPr>
+                </a:tc>
+                <a:tc>
+                  <a:txBody>
+                    <a:bodyPr/>
+                    <a:lstStyle/>
+                    <a:p>
+                      <a:pPr algn="ctr"/>
+                      <a:endParaRPr lang="en-GB" sz="1600" dirty="0"/>
+                    </a:p>
+                  </a:txBody>
+                  <a:tcPr anchor="ctr">
+                    <a:solidFill>
+                      <a:schemeClr val="accent5">
+                        <a:lumMod val="20000"/>
+                        <a:lumOff val="80000"/>
+                      </a:schemeClr>
+                    </a:solidFill>
+                  </a:tcPr>
+                </a:tc>
+                <a:tc>
+                  <a:txBody>
+                    <a:bodyPr/>
+                    <a:lstStyle/>
+                    <a:p>
+                      <a:pPr algn="ctr"/>
+                      <a:endParaRPr lang="en-GB" sz="1600" dirty="0"/>
+                    </a:p>
+                  </a:txBody>
+                  <a:tcPr anchor="ctr">
+                    <a:solidFill>
+                      <a:schemeClr val="accent5">
+                        <a:lumMod val="20000"/>
+                        <a:lumOff val="80000"/>
+                      </a:schemeClr>
+                    </a:solidFill>
+                  </a:tcPr>
+                </a:tc>
+                <a:tc>
+                  <a:txBody>
+                    <a:bodyPr/>
+                    <a:lstStyle/>
+                    <a:p>
+                      <a:pPr algn="ctr"/>
+                      <a:r>
+                        <a:rPr lang="en-GB" sz="2000" dirty="0" smtClean="0">
+                          <a:sym typeface="Wingdings"/>
+                        </a:rPr>
+                        <a:t></a:t>
+                      </a:r>
+                      <a:endParaRPr lang="en-GB" sz="2000" dirty="0"/>
+                    </a:p>
+                  </a:txBody>
+                  <a:tcPr anchor="ctr">
+                    <a:solidFill>
+                      <a:schemeClr val="accent5">
+                        <a:lumMod val="20000"/>
+                        <a:lumOff val="80000"/>
+                      </a:schemeClr>
+                    </a:solidFill>
+                  </a:tcPr>
+                </a:tc>
+                <a:tc>
+                  <a:txBody>
+                    <a:bodyPr/>
+                    <a:lstStyle/>
+                    <a:p>
+                      <a:pPr algn="ctr"/>
+                      <a:endParaRPr lang="en-GB" sz="1600" dirty="0"/>
+                    </a:p>
+                  </a:txBody>
+                  <a:tcPr anchor="ctr">
+                    <a:solidFill>
+                      <a:schemeClr val="accent5">
+                        <a:lumMod val="20000"/>
+                        <a:lumOff val="80000"/>
+                      </a:schemeClr>
+                    </a:solidFill>
+                  </a:tcPr>
+                </a:tc>
+              </a:tr>
+              <a:tr h="370840">
+                <a:tc>
+                  <a:txBody>
+                    <a:bodyPr/>
+                    <a:lstStyle/>
+                    <a:p>
+                      <a:r>
+                        <a:rPr lang="en-GB" sz="1800" kern="1200" dirty="0" smtClean="0">
+                          <a:solidFill>
+                            <a:schemeClr val="dk1"/>
+                          </a:solidFill>
+                          <a:latin typeface="+mn-lt"/>
+                          <a:ea typeface="+mn-ea"/>
+                          <a:cs typeface="+mn-cs"/>
+                        </a:rPr>
+                        <a:t>It felt festive (good for Christmas)</a:t>
+                      </a:r>
+                      <a:endParaRPr lang="en-GB" sz="1800" dirty="0"/>
+                    </a:p>
+                  </a:txBody>
+                  <a:tcPr>
+                    <a:solidFill>
+                      <a:schemeClr val="accent5">
+                        <a:lumMod val="40000"/>
+                        <a:lumOff val="60000"/>
+                      </a:schemeClr>
+                    </a:solidFill>
+                  </a:tcPr>
+                </a:tc>
+                <a:tc>
+                  <a:txBody>
+                    <a:bodyPr/>
+                    <a:lstStyle/>
+                    <a:p>
+                      <a:pPr algn="ctr"/>
+                      <a:endParaRPr lang="en-GB" sz="1600" dirty="0"/>
+                    </a:p>
+                  </a:txBody>
+                  <a:tcPr anchor="ctr">
+                    <a:solidFill>
+                      <a:schemeClr val="accent5">
+                        <a:lumMod val="40000"/>
+                        <a:lumOff val="60000"/>
+                      </a:schemeClr>
+                    </a:solidFill>
+                  </a:tcPr>
+                </a:tc>
+                <a:tc>
+                  <a:txBody>
+                    <a:bodyPr/>
+                    <a:lstStyle/>
+                    <a:p>
+                      <a:pPr algn="ctr"/>
+                      <a:endParaRPr lang="en-GB" sz="1600" dirty="0"/>
+                    </a:p>
+                  </a:txBody>
+                  <a:tcPr anchor="ctr">
+                    <a:solidFill>
+                      <a:schemeClr val="accent5">
+                        <a:lumMod val="40000"/>
+                        <a:lumOff val="60000"/>
+                      </a:schemeClr>
+                    </a:solidFill>
+                  </a:tcPr>
+                </a:tc>
+                <a:tc>
+                  <a:txBody>
+                    <a:bodyPr/>
+                    <a:lstStyle/>
+                    <a:p>
+                      <a:pPr algn="ctr"/>
+                      <a:endParaRPr lang="en-GB" sz="1600" dirty="0"/>
+                    </a:p>
+                  </a:txBody>
+                  <a:tcPr anchor="ctr">
+                    <a:solidFill>
+                      <a:schemeClr val="accent5">
+                        <a:lumMod val="40000"/>
+                        <a:lumOff val="60000"/>
+                      </a:schemeClr>
+                    </a:solidFill>
+                  </a:tcPr>
+                </a:tc>
+                <a:tc>
+                  <a:txBody>
+                    <a:bodyPr/>
+                    <a:lstStyle/>
+                    <a:p>
+                      <a:pPr algn="ctr"/>
+                      <a:endParaRPr lang="en-GB" sz="1600" dirty="0"/>
+                    </a:p>
+                  </a:txBody>
+                  <a:tcPr anchor="ctr">
+                    <a:solidFill>
+                      <a:schemeClr val="accent5">
+                        <a:lumMod val="40000"/>
+                        <a:lumOff val="60000"/>
+                      </a:schemeClr>
+                    </a:solidFill>
+                  </a:tcPr>
+                </a:tc>
+                <a:tc>
+                  <a:txBody>
+                    <a:bodyPr/>
+                    <a:lstStyle/>
+                    <a:p>
+                      <a:pPr algn="ctr"/>
+                      <a:r>
+                        <a:rPr lang="en-GB" sz="2000" dirty="0" smtClean="0">
+                          <a:sym typeface="Wingdings"/>
+                        </a:rPr>
+                        <a:t></a:t>
+                      </a:r>
+                      <a:endParaRPr lang="en-GB" sz="2000" dirty="0"/>
+                    </a:p>
+                  </a:txBody>
+                  <a:tcPr anchor="ctr">
+                    <a:solidFill>
+                      <a:schemeClr val="accent5">
+                        <a:lumMod val="40000"/>
+                        <a:lumOff val="60000"/>
+                      </a:schemeClr>
+                    </a:solidFill>
+                  </a:tcPr>
+                </a:tc>
+              </a:tr>
+              <a:tr h="370840">
+                <a:tc>
+                  <a:txBody>
+                    <a:bodyPr/>
+                    <a:lstStyle/>
+                    <a:p>
+                      <a:r>
+                        <a:rPr lang="en-GB" sz="1800" kern="1200" dirty="0" smtClean="0">
+                          <a:solidFill>
+                            <a:schemeClr val="dk1"/>
+                          </a:solidFill>
+                          <a:latin typeface="+mn-lt"/>
+                          <a:ea typeface="+mn-ea"/>
+                          <a:cs typeface="+mn-cs"/>
+                        </a:rPr>
+                        <a:t>The game flowed smoothly</a:t>
+                      </a:r>
+                      <a:endParaRPr lang="en-GB" sz="1600" dirty="0"/>
+                    </a:p>
+                  </a:txBody>
+                  <a:tcPr>
+                    <a:solidFill>
+                      <a:schemeClr val="accent5">
+                        <a:lumMod val="20000"/>
+                        <a:lumOff val="80000"/>
+                      </a:schemeClr>
+                    </a:solidFill>
+                  </a:tcPr>
+                </a:tc>
+                <a:tc>
+                  <a:txBody>
+                    <a:bodyPr/>
+                    <a:lstStyle/>
+                    <a:p>
+                      <a:pPr algn="ctr"/>
+                      <a:endParaRPr lang="en-GB" sz="1600" dirty="0"/>
+                    </a:p>
+                  </a:txBody>
+                  <a:tcPr anchor="ctr">
+                    <a:solidFill>
+                      <a:schemeClr val="accent5">
+                        <a:lumMod val="20000"/>
+                        <a:lumOff val="80000"/>
+                      </a:schemeClr>
+                    </a:solidFill>
+                  </a:tcPr>
+                </a:tc>
+                <a:tc>
+                  <a:txBody>
+                    <a:bodyPr/>
+                    <a:lstStyle/>
+                    <a:p>
+                      <a:pPr algn="ctr"/>
+                      <a:endParaRPr lang="en-GB" sz="1600" dirty="0"/>
+                    </a:p>
+                  </a:txBody>
+                  <a:tcPr anchor="ctr">
+                    <a:solidFill>
+                      <a:schemeClr val="accent5">
+                        <a:lumMod val="20000"/>
+                        <a:lumOff val="80000"/>
+                      </a:schemeClr>
+                    </a:solidFill>
+                  </a:tcPr>
+                </a:tc>
+                <a:tc>
+                  <a:txBody>
+                    <a:bodyPr/>
+                    <a:lstStyle/>
+                    <a:p>
+                      <a:pPr marL="0" marR="0" indent="0" algn="ctr" defTabSz="914400" rtl="0" eaLnBrk="1" fontAlgn="auto" latinLnBrk="0" hangingPunct="1">
+                        <a:lnSpc>
+                          <a:spcPct val="100000"/>
+                        </a:lnSpc>
+                        <a:spcBef>
+                          <a:spcPts val="0"/>
+                        </a:spcBef>
+                        <a:spcAft>
+                          <a:spcPts val="0"/>
+                        </a:spcAft>
+                        <a:buClrTx/>
+                        <a:buSzTx/>
+                        <a:buFontTx/>
+                        <a:buNone/>
+                        <a:tabLst/>
+                        <a:defRPr/>
+                      </a:pPr>
+                      <a:endParaRPr lang="en-GB" sz="2000" dirty="0" smtClean="0"/>
+                    </a:p>
+                  </a:txBody>
+                  <a:tcPr anchor="ctr">
+                    <a:solidFill>
+                      <a:schemeClr val="accent5">
+                        <a:lumMod val="20000"/>
+                        <a:lumOff val="80000"/>
+                      </a:schemeClr>
+                    </a:solidFill>
+                  </a:tcPr>
+                </a:tc>
+                <a:tc>
+                  <a:txBody>
+                    <a:bodyPr/>
+                    <a:lstStyle/>
+                    <a:p>
+                      <a:pPr marL="0" marR="0" indent="0" algn="ctr" defTabSz="914400" rtl="0" eaLnBrk="1" fontAlgn="auto" latinLnBrk="0" hangingPunct="1">
+                        <a:lnSpc>
+                          <a:spcPct val="100000"/>
+                        </a:lnSpc>
+                        <a:spcBef>
+                          <a:spcPts val="0"/>
+                        </a:spcBef>
+                        <a:spcAft>
+                          <a:spcPts val="0"/>
+                        </a:spcAft>
+                        <a:buClrTx/>
+                        <a:buSzTx/>
+                        <a:buFontTx/>
+                        <a:buNone/>
+                        <a:tabLst/>
+                        <a:defRPr/>
+                      </a:pPr>
+                      <a:r>
+                        <a:rPr lang="en-GB" sz="2000" dirty="0" smtClean="0">
+                          <a:solidFill>
+                            <a:srgbClr val="FF0000"/>
+                          </a:solidFill>
+                          <a:sym typeface="Wingdings"/>
+                        </a:rPr>
+                        <a:t></a:t>
+                      </a:r>
+                      <a:endParaRPr lang="en-GB" sz="2000" dirty="0" smtClean="0">
+                        <a:solidFill>
+                          <a:srgbClr val="FF0000"/>
+                        </a:solidFill>
+                      </a:endParaRPr>
+                    </a:p>
+                  </a:txBody>
+                  <a:tcPr anchor="ctr">
+                    <a:solidFill>
+                      <a:schemeClr val="accent5">
+                        <a:lumMod val="20000"/>
+                        <a:lumOff val="80000"/>
+                      </a:schemeClr>
+                    </a:solidFill>
+                  </a:tcPr>
+                </a:tc>
+                <a:tc>
+                  <a:txBody>
+                    <a:bodyPr/>
+                    <a:lstStyle/>
+                    <a:p>
+                      <a:pPr algn="ctr"/>
+                      <a:endParaRPr lang="en-GB" sz="1600" dirty="0"/>
+                    </a:p>
+                  </a:txBody>
+                  <a:tcPr anchor="ctr">
+                    <a:solidFill>
+                      <a:schemeClr val="accent5">
+                        <a:lumMod val="20000"/>
+                        <a:lumOff val="80000"/>
+                      </a:schemeClr>
+                    </a:solidFill>
+                  </a:tcPr>
+                </a:tc>
+              </a:tr>
+              <a:tr h="370840">
+                <a:tc>
+                  <a:txBody>
+                    <a:bodyPr/>
+                    <a:lstStyle/>
+                    <a:p>
+                      <a:r>
+                        <a:rPr lang="en-GB" sz="1800" kern="1200" dirty="0" smtClean="0">
+                          <a:solidFill>
+                            <a:schemeClr val="dk1"/>
+                          </a:solidFill>
+                          <a:latin typeface="+mn-lt"/>
+                          <a:ea typeface="+mn-ea"/>
+                          <a:cs typeface="+mn-cs"/>
+                        </a:rPr>
+                        <a:t>I was happy with the length of time to complete the game</a:t>
+                      </a:r>
+                      <a:endParaRPr lang="en-GB" sz="1600" dirty="0"/>
+                    </a:p>
+                  </a:txBody>
+                  <a:tcPr>
+                    <a:solidFill>
+                      <a:schemeClr val="accent5">
+                        <a:lumMod val="40000"/>
+                        <a:lumOff val="60000"/>
+                      </a:schemeClr>
+                    </a:solidFill>
+                  </a:tcPr>
+                </a:tc>
+                <a:tc>
+                  <a:txBody>
+                    <a:bodyPr/>
+                    <a:lstStyle/>
+                    <a:p>
+                      <a:pPr algn="ctr"/>
+                      <a:endParaRPr lang="en-GB" sz="1600" dirty="0"/>
+                    </a:p>
+                  </a:txBody>
+                  <a:tcPr anchor="ctr">
+                    <a:solidFill>
+                      <a:schemeClr val="accent5">
+                        <a:lumMod val="40000"/>
+                        <a:lumOff val="60000"/>
+                      </a:schemeClr>
+                    </a:solidFill>
+                  </a:tcPr>
+                </a:tc>
+                <a:tc>
+                  <a:txBody>
+                    <a:bodyPr/>
+                    <a:lstStyle/>
+                    <a:p>
+                      <a:pPr algn="ctr"/>
+                      <a:endParaRPr lang="en-GB" sz="1600" dirty="0"/>
+                    </a:p>
+                  </a:txBody>
+                  <a:tcPr anchor="ctr">
+                    <a:solidFill>
+                      <a:schemeClr val="accent5">
+                        <a:lumMod val="40000"/>
+                        <a:lumOff val="60000"/>
+                      </a:schemeClr>
+                    </a:solidFill>
+                  </a:tcPr>
+                </a:tc>
+                <a:tc>
+                  <a:txBody>
+                    <a:bodyPr/>
+                    <a:lstStyle/>
+                    <a:p>
+                      <a:pPr algn="ctr"/>
+                      <a:endParaRPr lang="en-GB" sz="1600" dirty="0"/>
+                    </a:p>
+                  </a:txBody>
+                  <a:tcPr anchor="ctr">
+                    <a:solidFill>
+                      <a:schemeClr val="accent5">
+                        <a:lumMod val="40000"/>
+                        <a:lumOff val="60000"/>
+                      </a:schemeClr>
+                    </a:solidFill>
+                  </a:tcPr>
+                </a:tc>
+                <a:tc>
+                  <a:txBody>
+                    <a:bodyPr/>
+                    <a:lstStyle/>
+                    <a:p>
+                      <a:pPr marL="0" marR="0" indent="0" algn="ctr" defTabSz="914400" rtl="0" eaLnBrk="1" fontAlgn="auto" latinLnBrk="0" hangingPunct="1">
+                        <a:lnSpc>
+                          <a:spcPct val="100000"/>
+                        </a:lnSpc>
+                        <a:spcBef>
+                          <a:spcPts val="0"/>
+                        </a:spcBef>
+                        <a:spcAft>
+                          <a:spcPts val="0"/>
+                        </a:spcAft>
+                        <a:buClrTx/>
+                        <a:buSzTx/>
+                        <a:buFontTx/>
+                        <a:buNone/>
+                        <a:tabLst/>
+                        <a:defRPr/>
+                      </a:pPr>
+                      <a:r>
+                        <a:rPr lang="en-GB" sz="2000" dirty="0" smtClean="0">
+                          <a:sym typeface="Wingdings"/>
+                        </a:rPr>
+                        <a:t></a:t>
+                      </a:r>
+                      <a:endParaRPr lang="en-GB" sz="2000" dirty="0" smtClean="0"/>
+                    </a:p>
+                  </a:txBody>
+                  <a:tcPr anchor="ctr">
+                    <a:solidFill>
+                      <a:schemeClr val="accent5">
+                        <a:lumMod val="40000"/>
+                        <a:lumOff val="60000"/>
+                      </a:schemeClr>
+                    </a:solidFill>
+                  </a:tcPr>
+                </a:tc>
+                <a:tc>
+                  <a:txBody>
+                    <a:bodyPr/>
+                    <a:lstStyle/>
+                    <a:p>
+                      <a:pPr algn="ctr"/>
+                      <a:endParaRPr lang="en-GB" sz="1600" dirty="0"/>
+                    </a:p>
+                  </a:txBody>
+                  <a:tcPr anchor="ctr">
+                    <a:solidFill>
+                      <a:schemeClr val="accent5">
+                        <a:lumMod val="40000"/>
+                        <a:lumOff val="60000"/>
+                      </a:schemeClr>
+                    </a:solidFill>
+                  </a:tcPr>
+                </a:tc>
+              </a:tr>
+              <a:tr h="370840">
+                <a:tc>
+                  <a:txBody>
+                    <a:bodyPr/>
+                    <a:lstStyle/>
+                    <a:p>
+                      <a:r>
+                        <a:rPr lang="en-GB" sz="1800" kern="1200" dirty="0" smtClean="0">
+                          <a:solidFill>
+                            <a:schemeClr val="dk1"/>
+                          </a:solidFill>
+                          <a:latin typeface="+mn-lt"/>
+                          <a:ea typeface="+mn-ea"/>
+                          <a:cs typeface="+mn-cs"/>
+                        </a:rPr>
+                        <a:t>I found it easy to move the player where I wanted</a:t>
+                      </a:r>
+                      <a:endParaRPr lang="en-GB" sz="1600" dirty="0"/>
+                    </a:p>
+                  </a:txBody>
+                  <a:tcPr>
+                    <a:solidFill>
+                      <a:schemeClr val="accent5">
+                        <a:lumMod val="20000"/>
+                        <a:lumOff val="80000"/>
+                      </a:schemeClr>
+                    </a:solidFill>
+                  </a:tcPr>
+                </a:tc>
+                <a:tc>
+                  <a:txBody>
+                    <a:bodyPr/>
+                    <a:lstStyle/>
+                    <a:p>
+                      <a:pPr algn="ctr"/>
+                      <a:endParaRPr lang="en-GB" sz="1600" dirty="0"/>
+                    </a:p>
+                  </a:txBody>
+                  <a:tcPr anchor="ctr">
+                    <a:solidFill>
+                      <a:schemeClr val="accent5">
+                        <a:lumMod val="20000"/>
+                        <a:lumOff val="80000"/>
+                      </a:schemeClr>
+                    </a:solidFill>
+                  </a:tcPr>
+                </a:tc>
+                <a:tc>
+                  <a:txBody>
+                    <a:bodyPr/>
+                    <a:lstStyle/>
+                    <a:p>
+                      <a:pPr algn="ctr"/>
+                      <a:endParaRPr lang="en-GB" sz="1600" dirty="0"/>
+                    </a:p>
+                  </a:txBody>
+                  <a:tcPr anchor="ctr">
+                    <a:solidFill>
+                      <a:schemeClr val="accent5">
+                        <a:lumMod val="20000"/>
+                        <a:lumOff val="80000"/>
+                      </a:schemeClr>
+                    </a:solidFill>
+                  </a:tcPr>
+                </a:tc>
+                <a:tc>
+                  <a:txBody>
+                    <a:bodyPr/>
+                    <a:lstStyle/>
+                    <a:p>
+                      <a:pPr algn="ctr"/>
+                      <a:r>
+                        <a:rPr lang="en-GB" sz="2000" dirty="0" smtClean="0">
+                          <a:sym typeface="Wingdings"/>
+                        </a:rPr>
+                        <a:t></a:t>
+                      </a:r>
+                      <a:endParaRPr lang="en-GB" sz="2000" dirty="0"/>
+                    </a:p>
+                  </a:txBody>
+                  <a:tcPr anchor="ctr">
+                    <a:solidFill>
+                      <a:schemeClr val="accent5">
+                        <a:lumMod val="20000"/>
+                        <a:lumOff val="80000"/>
+                      </a:schemeClr>
+                    </a:solidFill>
+                  </a:tcPr>
+                </a:tc>
+                <a:tc>
+                  <a:txBody>
+                    <a:bodyPr/>
+                    <a:lstStyle/>
+                    <a:p>
+                      <a:pPr marL="0" marR="0" indent="0" algn="ctr" defTabSz="914400" rtl="0" eaLnBrk="1" fontAlgn="auto" latinLnBrk="0" hangingPunct="1">
+                        <a:lnSpc>
+                          <a:spcPct val="100000"/>
+                        </a:lnSpc>
+                        <a:spcBef>
+                          <a:spcPts val="0"/>
+                        </a:spcBef>
+                        <a:spcAft>
+                          <a:spcPts val="0"/>
+                        </a:spcAft>
+                        <a:buClrTx/>
+                        <a:buSzTx/>
+                        <a:buFontTx/>
+                        <a:buNone/>
+                        <a:tabLst/>
+                        <a:defRPr/>
+                      </a:pPr>
+                      <a:endParaRPr lang="en-GB" sz="2000" dirty="0" smtClean="0"/>
+                    </a:p>
+                  </a:txBody>
+                  <a:tcPr anchor="ctr">
+                    <a:solidFill>
+                      <a:schemeClr val="accent5">
+                        <a:lumMod val="20000"/>
+                        <a:lumOff val="80000"/>
+                      </a:schemeClr>
+                    </a:solidFill>
+                  </a:tcPr>
+                </a:tc>
+                <a:tc>
+                  <a:txBody>
+                    <a:bodyPr/>
+                    <a:lstStyle/>
+                    <a:p>
+                      <a:pPr algn="ctr"/>
+                      <a:endParaRPr lang="en-GB" sz="1600" dirty="0"/>
+                    </a:p>
+                  </a:txBody>
+                  <a:tcPr anchor="ctr">
+                    <a:solidFill>
+                      <a:schemeClr val="accent5">
+                        <a:lumMod val="20000"/>
+                        <a:lumOff val="80000"/>
+                      </a:schemeClr>
+                    </a:solidFill>
+                  </a:tcPr>
+                </a:tc>
+              </a:tr>
+              <a:tr h="370840">
+                <a:tc>
+                  <a:txBody>
+                    <a:bodyPr/>
+                    <a:lstStyle/>
+                    <a:p>
+                      <a:r>
+                        <a:rPr lang="en-GB" sz="1800" kern="1200" dirty="0" smtClean="0">
+                          <a:solidFill>
+                            <a:schemeClr val="dk1"/>
+                          </a:solidFill>
+                          <a:latin typeface="+mn-lt"/>
+                          <a:ea typeface="+mn-ea"/>
+                          <a:cs typeface="+mn-cs"/>
+                        </a:rPr>
+                        <a:t>I found the design attractive (characters, backgrounds, puzzles)</a:t>
+                      </a:r>
+                      <a:endParaRPr lang="en-GB" sz="1600" dirty="0"/>
+                    </a:p>
+                  </a:txBody>
+                  <a:tcPr>
+                    <a:solidFill>
+                      <a:schemeClr val="accent5">
+                        <a:lumMod val="40000"/>
+                        <a:lumOff val="60000"/>
+                      </a:schemeClr>
+                    </a:solidFill>
+                  </a:tcPr>
+                </a:tc>
+                <a:tc>
+                  <a:txBody>
+                    <a:bodyPr/>
+                    <a:lstStyle/>
+                    <a:p>
+                      <a:pPr algn="ctr"/>
+                      <a:endParaRPr lang="en-GB" sz="1600" dirty="0"/>
+                    </a:p>
+                  </a:txBody>
+                  <a:tcPr anchor="ctr">
+                    <a:solidFill>
+                      <a:schemeClr val="accent5">
+                        <a:lumMod val="40000"/>
+                        <a:lumOff val="60000"/>
+                      </a:schemeClr>
+                    </a:solidFill>
+                  </a:tcPr>
+                </a:tc>
+                <a:tc>
+                  <a:txBody>
+                    <a:bodyPr/>
+                    <a:lstStyle/>
+                    <a:p>
+                      <a:pPr algn="ctr"/>
+                      <a:endParaRPr lang="en-GB" sz="1600" dirty="0"/>
+                    </a:p>
+                  </a:txBody>
+                  <a:tcPr anchor="ctr">
+                    <a:solidFill>
+                      <a:schemeClr val="accent5">
+                        <a:lumMod val="40000"/>
+                        <a:lumOff val="60000"/>
+                      </a:schemeClr>
+                    </a:solidFill>
+                  </a:tcPr>
+                </a:tc>
+                <a:tc>
+                  <a:txBody>
+                    <a:bodyPr/>
+                    <a:lstStyle/>
+                    <a:p>
+                      <a:pPr algn="ctr"/>
+                      <a:endParaRPr lang="en-GB" sz="1600" dirty="0"/>
+                    </a:p>
+                  </a:txBody>
+                  <a:tcPr anchor="ctr">
+                    <a:solidFill>
+                      <a:schemeClr val="accent5">
+                        <a:lumMod val="40000"/>
+                        <a:lumOff val="60000"/>
+                      </a:schemeClr>
+                    </a:solidFill>
+                  </a:tcPr>
+                </a:tc>
+                <a:tc>
+                  <a:txBody>
+                    <a:bodyPr/>
+                    <a:lstStyle/>
+                    <a:p>
+                      <a:pPr algn="ctr"/>
+                      <a:endParaRPr lang="en-GB" sz="1600" dirty="0"/>
+                    </a:p>
+                  </a:txBody>
+                  <a:tcPr anchor="ctr">
+                    <a:solidFill>
+                      <a:schemeClr val="accent5">
+                        <a:lumMod val="40000"/>
+                        <a:lumOff val="60000"/>
+                      </a:schemeClr>
+                    </a:solidFill>
+                  </a:tcPr>
+                </a:tc>
+                <a:tc>
+                  <a:txBody>
+                    <a:bodyPr/>
+                    <a:lstStyle/>
+                    <a:p>
+                      <a:pPr marL="0" marR="0" indent="0" algn="ctr" defTabSz="914400" rtl="0" eaLnBrk="1" fontAlgn="auto" latinLnBrk="0" hangingPunct="1">
+                        <a:lnSpc>
+                          <a:spcPct val="100000"/>
+                        </a:lnSpc>
+                        <a:spcBef>
+                          <a:spcPts val="0"/>
+                        </a:spcBef>
+                        <a:spcAft>
+                          <a:spcPts val="0"/>
+                        </a:spcAft>
+                        <a:buClrTx/>
+                        <a:buSzTx/>
+                        <a:buFontTx/>
+                        <a:buNone/>
+                        <a:tabLst/>
+                        <a:defRPr/>
+                      </a:pPr>
+                      <a:r>
+                        <a:rPr lang="en-GB" sz="2000" dirty="0" smtClean="0">
+                          <a:sym typeface="Wingdings"/>
+                        </a:rPr>
+                        <a:t></a:t>
+                      </a:r>
+                      <a:endParaRPr lang="en-GB" sz="2000" dirty="0" smtClean="0"/>
+                    </a:p>
+                  </a:txBody>
+                  <a:tcPr anchor="ctr">
+                    <a:solidFill>
+                      <a:schemeClr val="accent5">
+                        <a:lumMod val="40000"/>
+                        <a:lumOff val="60000"/>
+                      </a:schemeClr>
+                    </a:solidFill>
+                  </a:tcPr>
+                </a:tc>
+              </a:tr>
+              <a:tr h="370840">
+                <a:tc>
+                  <a:txBody>
+                    <a:bodyPr/>
+                    <a:lstStyle/>
+                    <a:p>
+                      <a:r>
+                        <a:rPr lang="en-GB" sz="1800" kern="1200" dirty="0" smtClean="0">
+                          <a:solidFill>
+                            <a:schemeClr val="dk1"/>
+                          </a:solidFill>
+                          <a:latin typeface="+mn-lt"/>
+                          <a:ea typeface="+mn-ea"/>
+                          <a:cs typeface="+mn-cs"/>
+                        </a:rPr>
+                        <a:t>The game flowed well between platforms and puzzles</a:t>
+                      </a:r>
+                      <a:endParaRPr lang="en-GB" sz="1600" dirty="0"/>
+                    </a:p>
+                  </a:txBody>
+                  <a:tcPr>
+                    <a:solidFill>
+                      <a:schemeClr val="accent5">
+                        <a:lumMod val="20000"/>
+                        <a:lumOff val="80000"/>
+                      </a:schemeClr>
+                    </a:solidFill>
+                  </a:tcPr>
+                </a:tc>
+                <a:tc>
+                  <a:txBody>
+                    <a:bodyPr/>
+                    <a:lstStyle/>
+                    <a:p>
+                      <a:pPr algn="ctr"/>
+                      <a:endParaRPr lang="en-GB" sz="1600" dirty="0"/>
+                    </a:p>
+                  </a:txBody>
+                  <a:tcPr anchor="ctr">
+                    <a:solidFill>
+                      <a:schemeClr val="accent5">
+                        <a:lumMod val="20000"/>
+                        <a:lumOff val="80000"/>
+                      </a:schemeClr>
+                    </a:solidFill>
+                  </a:tcPr>
+                </a:tc>
+                <a:tc>
+                  <a:txBody>
+                    <a:bodyPr/>
+                    <a:lstStyle/>
+                    <a:p>
+                      <a:pPr marL="0" marR="0" indent="0" algn="ctr" defTabSz="914400" rtl="0" eaLnBrk="1" fontAlgn="auto" latinLnBrk="0" hangingPunct="1">
+                        <a:lnSpc>
+                          <a:spcPct val="100000"/>
+                        </a:lnSpc>
+                        <a:spcBef>
+                          <a:spcPts val="0"/>
+                        </a:spcBef>
+                        <a:spcAft>
+                          <a:spcPts val="0"/>
+                        </a:spcAft>
+                        <a:buClrTx/>
+                        <a:buSzTx/>
+                        <a:buFontTx/>
+                        <a:buNone/>
+                        <a:tabLst/>
+                        <a:defRPr/>
+                      </a:pPr>
+                      <a:endParaRPr lang="en-GB" sz="2000" dirty="0" smtClean="0"/>
+                    </a:p>
+                  </a:txBody>
+                  <a:tcPr anchor="ctr">
+                    <a:solidFill>
+                      <a:schemeClr val="accent5">
+                        <a:lumMod val="20000"/>
+                        <a:lumOff val="80000"/>
+                      </a:schemeClr>
+                    </a:solidFill>
+                  </a:tcPr>
+                </a:tc>
+                <a:tc>
+                  <a:txBody>
+                    <a:bodyPr/>
+                    <a:lstStyle/>
+                    <a:p>
+                      <a:pPr algn="ctr"/>
+                      <a:endParaRPr lang="en-GB" sz="1600" dirty="0"/>
+                    </a:p>
+                  </a:txBody>
+                  <a:tcPr anchor="ctr">
+                    <a:solidFill>
+                      <a:schemeClr val="accent5">
+                        <a:lumMod val="20000"/>
+                        <a:lumOff val="80000"/>
+                      </a:schemeClr>
+                    </a:solidFill>
+                  </a:tcPr>
+                </a:tc>
+                <a:tc>
+                  <a:txBody>
+                    <a:bodyPr/>
+                    <a:lstStyle/>
+                    <a:p>
+                      <a:pPr marL="0" marR="0" indent="0" algn="ctr" defTabSz="914400" rtl="0" eaLnBrk="1" fontAlgn="auto" latinLnBrk="0" hangingPunct="1">
+                        <a:lnSpc>
+                          <a:spcPct val="100000"/>
+                        </a:lnSpc>
+                        <a:spcBef>
+                          <a:spcPts val="0"/>
+                        </a:spcBef>
+                        <a:spcAft>
+                          <a:spcPts val="0"/>
+                        </a:spcAft>
+                        <a:buClrTx/>
+                        <a:buSzTx/>
+                        <a:buFontTx/>
+                        <a:buNone/>
+                        <a:tabLst/>
+                        <a:defRPr/>
+                      </a:pPr>
+                      <a:r>
+                        <a:rPr lang="en-GB" sz="2000" dirty="0" smtClean="0">
+                          <a:solidFill>
+                            <a:srgbClr val="FF0000"/>
+                          </a:solidFill>
+                          <a:sym typeface="Wingdings"/>
+                        </a:rPr>
+                        <a:t></a:t>
+                      </a:r>
+                      <a:endParaRPr lang="en-GB" sz="1600" dirty="0" smtClean="0">
+                        <a:solidFill>
+                          <a:srgbClr val="FF0000"/>
+                        </a:solidFill>
+                      </a:endParaRPr>
+                    </a:p>
+                  </a:txBody>
+                  <a:tcPr anchor="ctr">
+                    <a:solidFill>
+                      <a:schemeClr val="accent5">
+                        <a:lumMod val="20000"/>
+                        <a:lumOff val="80000"/>
+                      </a:schemeClr>
+                    </a:solidFill>
+                  </a:tcPr>
+                </a:tc>
+                <a:tc>
+                  <a:txBody>
+                    <a:bodyPr/>
+                    <a:lstStyle/>
+                    <a:p>
+                      <a:pPr algn="ctr"/>
+                      <a:endParaRPr lang="en-GB" sz="1600" dirty="0"/>
+                    </a:p>
+                  </a:txBody>
+                  <a:tcPr anchor="ctr">
+                    <a:solidFill>
+                      <a:schemeClr val="accent5">
+                        <a:lumMod val="20000"/>
+                        <a:lumOff val="80000"/>
+                      </a:schemeClr>
+                    </a:solidFill>
+                  </a:tcPr>
+                </a:tc>
+              </a:tr>
+              <a:tr h="370840">
+                <a:tc>
+                  <a:txBody>
+                    <a:bodyPr/>
+                    <a:lstStyle/>
+                    <a:p>
+                      <a:r>
+                        <a:rPr lang="en-GB" sz="1800" kern="1200" dirty="0" smtClean="0">
+                          <a:solidFill>
+                            <a:schemeClr val="dk1"/>
+                          </a:solidFill>
+                          <a:latin typeface="+mn-lt"/>
+                          <a:ea typeface="+mn-ea"/>
+                          <a:cs typeface="+mn-cs"/>
+                        </a:rPr>
+                        <a:t>I thought the idea of the Christmas room integrated well with the game</a:t>
+                      </a:r>
+                      <a:endParaRPr lang="en-GB" sz="1600" dirty="0"/>
+                    </a:p>
+                  </a:txBody>
+                  <a:tcPr>
+                    <a:solidFill>
+                      <a:schemeClr val="accent5">
+                        <a:lumMod val="40000"/>
+                        <a:lumOff val="60000"/>
+                      </a:schemeClr>
+                    </a:solidFill>
+                  </a:tcPr>
+                </a:tc>
+                <a:tc>
+                  <a:txBody>
+                    <a:bodyPr/>
+                    <a:lstStyle/>
+                    <a:p>
+                      <a:pPr algn="ctr"/>
+                      <a:endParaRPr lang="en-GB" sz="1600" dirty="0"/>
+                    </a:p>
+                  </a:txBody>
+                  <a:tcPr anchor="ctr">
+                    <a:solidFill>
+                      <a:schemeClr val="accent5">
+                        <a:lumMod val="40000"/>
+                        <a:lumOff val="60000"/>
+                      </a:schemeClr>
+                    </a:solidFill>
+                  </a:tcPr>
+                </a:tc>
+                <a:tc>
+                  <a:txBody>
+                    <a:bodyPr/>
+                    <a:lstStyle/>
+                    <a:p>
+                      <a:pPr algn="ctr"/>
+                      <a:endParaRPr lang="en-GB" sz="1600" dirty="0"/>
+                    </a:p>
+                  </a:txBody>
+                  <a:tcPr anchor="ctr">
+                    <a:solidFill>
+                      <a:schemeClr val="accent5">
+                        <a:lumMod val="40000"/>
+                        <a:lumOff val="60000"/>
+                      </a:schemeClr>
+                    </a:solidFill>
+                  </a:tcPr>
+                </a:tc>
+                <a:tc>
+                  <a:txBody>
+                    <a:bodyPr/>
+                    <a:lstStyle/>
+                    <a:p>
+                      <a:pPr marL="0" marR="0" indent="0" algn="ctr" defTabSz="914400" rtl="0" eaLnBrk="1" fontAlgn="auto" latinLnBrk="0" hangingPunct="1">
+                        <a:lnSpc>
+                          <a:spcPct val="100000"/>
+                        </a:lnSpc>
+                        <a:spcBef>
+                          <a:spcPts val="0"/>
+                        </a:spcBef>
+                        <a:spcAft>
+                          <a:spcPts val="0"/>
+                        </a:spcAft>
+                        <a:buClrTx/>
+                        <a:buSzTx/>
+                        <a:buFontTx/>
+                        <a:buNone/>
+                        <a:tabLst/>
+                        <a:defRPr/>
+                      </a:pPr>
+                      <a:endParaRPr lang="en-GB" sz="2000" dirty="0" smtClean="0"/>
+                    </a:p>
+                  </a:txBody>
+                  <a:tcPr anchor="ctr">
+                    <a:solidFill>
+                      <a:schemeClr val="accent5">
+                        <a:lumMod val="40000"/>
+                        <a:lumOff val="60000"/>
+                      </a:schemeClr>
+                    </a:solidFill>
+                  </a:tcPr>
+                </a:tc>
+                <a:tc>
+                  <a:txBody>
+                    <a:bodyPr/>
+                    <a:lstStyle/>
+                    <a:p>
+                      <a:pPr algn="ctr"/>
+                      <a:endParaRPr lang="en-GB" sz="1600" dirty="0"/>
+                    </a:p>
+                  </a:txBody>
+                  <a:tcPr anchor="ctr">
+                    <a:solidFill>
+                      <a:schemeClr val="accent5">
+                        <a:lumMod val="40000"/>
+                        <a:lumOff val="60000"/>
+                      </a:schemeClr>
+                    </a:solidFill>
+                  </a:tcPr>
+                </a:tc>
+                <a:tc>
+                  <a:txBody>
+                    <a:bodyPr/>
+                    <a:lstStyle/>
+                    <a:p>
+                      <a:pPr marL="0" marR="0" indent="0" algn="ctr" defTabSz="914400" rtl="0" eaLnBrk="1" fontAlgn="auto" latinLnBrk="0" hangingPunct="1">
+                        <a:lnSpc>
+                          <a:spcPct val="100000"/>
+                        </a:lnSpc>
+                        <a:spcBef>
+                          <a:spcPts val="0"/>
+                        </a:spcBef>
+                        <a:spcAft>
+                          <a:spcPts val="0"/>
+                        </a:spcAft>
+                        <a:buClrTx/>
+                        <a:buSzTx/>
+                        <a:buFontTx/>
+                        <a:buNone/>
+                        <a:tabLst/>
+                        <a:defRPr/>
+                      </a:pPr>
+                      <a:r>
+                        <a:rPr lang="en-GB" sz="2000" dirty="0" smtClean="0">
+                          <a:solidFill>
+                            <a:srgbClr val="FF0000"/>
+                          </a:solidFill>
+                          <a:sym typeface="Wingdings"/>
+                        </a:rPr>
+                        <a:t></a:t>
+                      </a:r>
+                      <a:endParaRPr lang="en-GB" sz="1200" dirty="0" smtClean="0">
+                        <a:solidFill>
+                          <a:srgbClr val="FF0000"/>
+                        </a:solidFill>
+                      </a:endParaRPr>
+                    </a:p>
+                  </a:txBody>
+                  <a:tcPr anchor="ctr">
+                    <a:solidFill>
+                      <a:schemeClr val="accent5">
+                        <a:lumMod val="40000"/>
+                        <a:lumOff val="60000"/>
+                      </a:schemeClr>
+                    </a:solidFill>
+                  </a:tcPr>
+                </a:tc>
+              </a:tr>
+            </a:tbl>
+          </a:graphicData>
+        </a:graphic>
+      </p:graphicFrame>
+      <p:sp>
+        <p:nvSpPr>
+          <p:cNvPr id="13" name="TextBox 12"/>
+          <p:cNvSpPr txBox="1"/>
+          <p:nvPr/>
+        </p:nvSpPr>
+        <p:spPr>
+          <a:xfrm>
+            <a:off x="881026" y="5786454"/>
+            <a:ext cx="10215634" cy="338554"/>
+          </a:xfrm>
+          <a:prstGeom prst="rect">
+            <a:avLst/>
+          </a:prstGeom>
+          <a:noFill/>
+        </p:spPr>
+        <p:txBody>
+          <a:bodyPr wrap="square" rtlCol="0">
+            <a:spAutoFit/>
+          </a:bodyPr>
+          <a:lstStyle/>
+          <a:p>
+            <a:r>
+              <a:rPr lang="en-GB" sz="1600" i="1" dirty="0" smtClean="0"/>
+              <a:t>Based on feedback from a </a:t>
+            </a:r>
+            <a:r>
+              <a:rPr lang="en-GB" sz="1600" i="1" dirty="0" smtClean="0"/>
+              <a:t>same single </a:t>
+            </a:r>
+            <a:r>
+              <a:rPr lang="en-GB" sz="1600" i="1" dirty="0" smtClean="0"/>
+              <a:t>tester, </a:t>
+            </a:r>
+            <a:r>
+              <a:rPr lang="en-GB" sz="1600" i="1" dirty="0" smtClean="0"/>
+              <a:t>after we </a:t>
+            </a:r>
+            <a:r>
+              <a:rPr lang="en-GB" sz="1600" i="1" dirty="0" smtClean="0"/>
+              <a:t>did all the fixes arising from their observations</a:t>
+            </a:r>
+            <a:endParaRPr lang="en-GB" sz="1600" i="1" dirty="0"/>
+          </a:p>
+        </p:txBody>
+      </p:sp>
+    </p:spTree>
+    <p:extLst>
+      <p:ext uri="{BB962C8B-B14F-4D97-AF65-F5344CB8AC3E}">
+        <p14:creationId xmlns="" xmlns:p14="http://schemas.microsoft.com/office/powerpoint/2010/main" val="2083772189"/>
+      </p:ext>
+    </p:extLst>
+  </p:cSld>
+  <p:clrMapOvr>
+    <a:masterClrMapping/>
+  </p:clrMapOvr>
+  <p:timing>
+    <p:tnLst>
+      <p:par>
+        <p:cTn id="1" dur="indefinite" restart="never" nodeType="tmRoot"/>
+      </p:par>
+    </p:tnLst>
+  </p:timing>
+</p:sld>
+</file>
+
+<file path=ppt/slides/slide18.xml><?xml version="1.0" encoding="utf-8"?>
+<p:sld xmlns:a="http://schemas.openxmlformats.org/drawingml/2006/main" xmlns:r="http://schemas.openxmlformats.org/officeDocument/2006/relationships" xmlns:p="http://schemas.openxmlformats.org/presentationml/2006/main">
+  <p:cSld>
+    <p:spTree>
+      <p:nvGrpSpPr>
+        <p:cNvPr id="1" name=""/>
+        <p:cNvGrpSpPr/>
+        <p:nvPr/>
+      </p:nvGrpSpPr>
+      <p:grpSpPr>
+        <a:xfrm>
+          <a:off x="0" y="0"/>
+          <a:ext cx="0" cy="0"/>
+          <a:chOff x="0" y="0"/>
+          <a:chExt cx="0" cy="0"/>
+        </a:xfrm>
+      </p:grpSpPr>
+      <p:pic>
+        <p:nvPicPr>
+          <p:cNvPr id="4" name="Picture 3">
+            <a:extLst>
+              <a:ext uri="{FF2B5EF4-FFF2-40B4-BE49-F238E27FC236}">
+                <a16:creationId xmlns="" xmlns:a16="http://schemas.microsoft.com/office/drawing/2014/main" id="{1F7B8747-803D-41C8-89FD-730522D4A3D6}"/>
               </a:ext>
             </a:extLst>
           </p:cNvPr>
@@ -10847,7 +12456,7 @@
           <p:cNvPr id="2" name="Title 1">
             <a:extLst>
               <a:ext uri="{FF2B5EF4-FFF2-40B4-BE49-F238E27FC236}">
-                <a16:creationId xmlns:a16="http://schemas.microsoft.com/office/drawing/2014/main" xmlns="" id="{DFC049F8-2284-4161-BE3C-431BCD0EFAB7}"/>
+                <a16:creationId xmlns="" xmlns:a16="http://schemas.microsoft.com/office/drawing/2014/main" id="{DFC049F8-2284-4161-BE3C-431BCD0EFAB7}"/>
               </a:ext>
             </a:extLst>
           </p:cNvPr>
@@ -10919,7 +12528,7 @@
           <p:cNvPr id="3" name="Content Placeholder 2">
             <a:extLst>
               <a:ext uri="{FF2B5EF4-FFF2-40B4-BE49-F238E27FC236}">
-                <a16:creationId xmlns:a16="http://schemas.microsoft.com/office/drawing/2014/main" xmlns="" id="{F2E045F5-714F-4E07-87A1-F5696A62ED28}"/>
+                <a16:creationId xmlns="" xmlns:a16="http://schemas.microsoft.com/office/drawing/2014/main" id="{F2E045F5-714F-4E07-87A1-F5696A62ED28}"/>
               </a:ext>
             </a:extLst>
           </p:cNvPr>
@@ -10999,7 +12608,7 @@
     </p:spTree>
     <p:extLst>
       <p:ext uri="{BB962C8B-B14F-4D97-AF65-F5344CB8AC3E}">
-        <p14:creationId xmlns:p14="http://schemas.microsoft.com/office/powerpoint/2010/main" xmlns="" val="3875203172"/>
+        <p14:creationId xmlns="" xmlns:p14="http://schemas.microsoft.com/office/powerpoint/2010/main" val="3875203172"/>
       </p:ext>
     </p:extLst>
   </p:cSld>
@@ -11009,7 +12618,7 @@
 </p:sld>
 </file>
 
-<file path=ppt/slides/slide18.xml><?xml version="1.0" encoding="utf-8"?>
+<file path=ppt/slides/slide19.xml><?xml version="1.0" encoding="utf-8"?>
 <p:sld xmlns:a="http://schemas.openxmlformats.org/drawingml/2006/main" xmlns:r="http://schemas.openxmlformats.org/officeDocument/2006/relationships" xmlns:p="http://schemas.openxmlformats.org/presentationml/2006/main">
   <p:cSld>
     <p:spTree>
@@ -11031,7 +12640,7 @@
           <p:cNvPr id="4" name="Picture 3">
             <a:extLst>
               <a:ext uri="{FF2B5EF4-FFF2-40B4-BE49-F238E27FC236}">
-                <a16:creationId xmlns:a16="http://schemas.microsoft.com/office/drawing/2014/main" xmlns="" id="{1F7B8747-803D-41C8-89FD-730522D4A3D6}"/>
+                <a16:creationId xmlns="" xmlns:a16="http://schemas.microsoft.com/office/drawing/2014/main" id="{1F7B8747-803D-41C8-89FD-730522D4A3D6}"/>
               </a:ext>
             </a:extLst>
           </p:cNvPr>
@@ -11066,7 +12675,7 @@
           <p:cNvPr id="2" name="Title 1">
             <a:extLst>
               <a:ext uri="{FF2B5EF4-FFF2-40B4-BE49-F238E27FC236}">
-                <a16:creationId xmlns:a16="http://schemas.microsoft.com/office/drawing/2014/main" xmlns="" id="{DFC049F8-2284-4161-BE3C-431BCD0EFAB7}"/>
+                <a16:creationId xmlns="" xmlns:a16="http://schemas.microsoft.com/office/drawing/2014/main" id="{DFC049F8-2284-4161-BE3C-431BCD0EFAB7}"/>
               </a:ext>
             </a:extLst>
           </p:cNvPr>
@@ -11119,13 +12728,7 @@
               <a:rPr lang="en-GB" dirty="0" smtClean="0">
                 <a:latin typeface="Bodoni MT" panose="02070603080606020203" pitchFamily="18" charset="0"/>
               </a:rPr>
-              <a:t>-</a:t>
-            </a:r>
-            <a:r>
-              <a:rPr lang="en-GB" dirty="0" smtClean="0">
-                <a:latin typeface="Bodoni MT" panose="02070603080606020203" pitchFamily="18" charset="0"/>
-              </a:rPr>
-              <a:t> Ben	</a:t>
+              <a:t>- Ben	</a:t>
             </a:r>
             <a:r>
               <a:rPr lang="en-GB" i="1" dirty="0" smtClean="0">
@@ -11144,7 +12747,7 @@
           <p:cNvPr id="3" name="Content Placeholder 2">
             <a:extLst>
               <a:ext uri="{FF2B5EF4-FFF2-40B4-BE49-F238E27FC236}">
-                <a16:creationId xmlns:a16="http://schemas.microsoft.com/office/drawing/2014/main" xmlns="" id="{F2E045F5-714F-4E07-87A1-F5696A62ED28}"/>
+                <a16:creationId xmlns="" xmlns:a16="http://schemas.microsoft.com/office/drawing/2014/main" id="{F2E045F5-714F-4E07-87A1-F5696A62ED28}"/>
               </a:ext>
             </a:extLst>
           </p:cNvPr>
@@ -11215,7 +12818,7 @@
     </p:spTree>
     <p:extLst>
       <p:ext uri="{BB962C8B-B14F-4D97-AF65-F5344CB8AC3E}">
-        <p14:creationId xmlns:p14="http://schemas.microsoft.com/office/powerpoint/2010/main" xmlns="" val="2467745637"/>
+        <p14:creationId xmlns="" xmlns:p14="http://schemas.microsoft.com/office/powerpoint/2010/main" val="2467745637"/>
       </p:ext>
     </p:extLst>
   </p:cSld>
@@ -11524,7 +13127,7 @@
             <p:cNvPr id="11" name="Picture 10">
               <a:extLst>
                 <a:ext uri="{FF2B5EF4-FFF2-40B4-BE49-F238E27FC236}">
-                  <a16:creationId xmlns:a16="http://schemas.microsoft.com/office/drawing/2014/main" xmlns="" id="{17AE45ED-A673-4FA2-B597-465724426CB5}"/>
+                  <a16:creationId xmlns="" xmlns:a16="http://schemas.microsoft.com/office/drawing/2014/main" id="{17AE45ED-A673-4FA2-B597-465724426CB5}"/>
                 </a:ext>
               </a:extLst>
             </p:cNvPr>
@@ -11537,7 +13140,7 @@
             <a:blip r:embed="rId5">
               <a:extLst>
                 <a:ext uri="{28A0092B-C50C-407E-A947-70E740481C1C}">
-                  <a14:useLocalDpi xmlns:a14="http://schemas.microsoft.com/office/drawing/2010/main" xmlns="" val="0"/>
+                  <a14:useLocalDpi xmlns="" xmlns:a14="http://schemas.microsoft.com/office/drawing/2010/main" val="0"/>
                 </a:ext>
               </a:extLst>
             </a:blip>
@@ -11560,7 +13163,7 @@
             <p:cNvPr id="12" name="Picture 11">
               <a:extLst>
                 <a:ext uri="{FF2B5EF4-FFF2-40B4-BE49-F238E27FC236}">
-                  <a16:creationId xmlns:a16="http://schemas.microsoft.com/office/drawing/2014/main" xmlns="" id="{17AE45ED-A673-4FA2-B597-465724426CB5}"/>
+                  <a16:creationId xmlns="" xmlns:a16="http://schemas.microsoft.com/office/drawing/2014/main" id="{17AE45ED-A673-4FA2-B597-465724426CB5}"/>
                 </a:ext>
               </a:extLst>
             </p:cNvPr>
@@ -11573,7 +13176,7 @@
             <a:blip r:embed="rId5">
               <a:extLst>
                 <a:ext uri="{28A0092B-C50C-407E-A947-70E740481C1C}">
-                  <a14:useLocalDpi xmlns:a14="http://schemas.microsoft.com/office/drawing/2010/main" xmlns="" val="0"/>
+                  <a14:useLocalDpi xmlns="" xmlns:a14="http://schemas.microsoft.com/office/drawing/2010/main" val="0"/>
                 </a:ext>
               </a:extLst>
             </a:blip>
@@ -11596,7 +13199,7 @@
             <p:cNvPr id="13" name="Picture 12">
               <a:extLst>
                 <a:ext uri="{FF2B5EF4-FFF2-40B4-BE49-F238E27FC236}">
-                  <a16:creationId xmlns:a16="http://schemas.microsoft.com/office/drawing/2014/main" xmlns="" id="{17AE45ED-A673-4FA2-B597-465724426CB5}"/>
+                  <a16:creationId xmlns="" xmlns:a16="http://schemas.microsoft.com/office/drawing/2014/main" id="{17AE45ED-A673-4FA2-B597-465724426CB5}"/>
                 </a:ext>
               </a:extLst>
             </p:cNvPr>
@@ -11609,7 +13212,7 @@
             <a:blip r:embed="rId5">
               <a:extLst>
                 <a:ext uri="{28A0092B-C50C-407E-A947-70E740481C1C}">
-                  <a14:useLocalDpi xmlns:a14="http://schemas.microsoft.com/office/drawing/2010/main" xmlns="" val="0"/>
+                  <a14:useLocalDpi xmlns="" xmlns:a14="http://schemas.microsoft.com/office/drawing/2010/main" val="0"/>
                 </a:ext>
               </a:extLst>
             </a:blip>
@@ -11632,7 +13235,7 @@
             <p:cNvPr id="14" name="Picture 13">
               <a:extLst>
                 <a:ext uri="{FF2B5EF4-FFF2-40B4-BE49-F238E27FC236}">
-                  <a16:creationId xmlns:a16="http://schemas.microsoft.com/office/drawing/2014/main" xmlns="" id="{23C87C0A-6BB6-4417-AAE8-9B7AE0A10355}"/>
+                  <a16:creationId xmlns="" xmlns:a16="http://schemas.microsoft.com/office/drawing/2014/main" id="{23C87C0A-6BB6-4417-AAE8-9B7AE0A10355}"/>
                 </a:ext>
               </a:extLst>
             </p:cNvPr>
@@ -11645,7 +13248,7 @@
             <a:blip r:embed="rId6">
               <a:extLst>
                 <a:ext uri="{28A0092B-C50C-407E-A947-70E740481C1C}">
-                  <a14:useLocalDpi xmlns:a14="http://schemas.microsoft.com/office/drawing/2010/main" xmlns="" val="0"/>
+                  <a14:useLocalDpi xmlns="" xmlns:a14="http://schemas.microsoft.com/office/drawing/2010/main" val="0"/>
                 </a:ext>
               </a:extLst>
             </a:blip>
@@ -11821,7 +13424,7 @@
           <p:cNvPr id="2" name="Title 1">
             <a:extLst>
               <a:ext uri="{FF2B5EF4-FFF2-40B4-BE49-F238E27FC236}">
-                <a16:creationId xmlns:a16="http://schemas.microsoft.com/office/drawing/2014/main" xmlns="" id="{DFC049F8-2284-4161-BE3C-431BCD0EFAB7}"/>
+                <a16:creationId xmlns="" xmlns:a16="http://schemas.microsoft.com/office/drawing/2014/main" id="{DFC049F8-2284-4161-BE3C-431BCD0EFAB7}"/>
               </a:ext>
             </a:extLst>
           </p:cNvPr>
@@ -11890,7 +13493,7 @@
           <p:cNvPr id="5" name="Picture 4">
             <a:extLst>
               <a:ext uri="{FF2B5EF4-FFF2-40B4-BE49-F238E27FC236}">
-                <a16:creationId xmlns:a16="http://schemas.microsoft.com/office/drawing/2014/main" xmlns="" id="{020817A5-9300-4D98-B692-D6147E3BD93A}"/>
+                <a16:creationId xmlns="" xmlns:a16="http://schemas.microsoft.com/office/drawing/2014/main" id="{020817A5-9300-4D98-B692-D6147E3BD93A}"/>
               </a:ext>
             </a:extLst>
           </p:cNvPr>
@@ -11901,7 +13504,7 @@
           <a:blip r:embed="rId3" cstate="print">
             <a:extLst>
               <a:ext uri="{28A0092B-C50C-407E-A947-70E740481C1C}">
-                <a14:useLocalDpi xmlns:a14="http://schemas.microsoft.com/office/drawing/2010/main" xmlns="" val="0"/>
+                <a14:useLocalDpi xmlns="" xmlns:a14="http://schemas.microsoft.com/office/drawing/2010/main" val="0"/>
               </a:ext>
             </a:extLst>
           </a:blip>
@@ -11929,7 +13532,7 @@
           <p:cNvPr id="7" name="Content Placeholder 6">
             <a:extLst>
               <a:ext uri="{FF2B5EF4-FFF2-40B4-BE49-F238E27FC236}">
-                <a16:creationId xmlns:a16="http://schemas.microsoft.com/office/drawing/2014/main" xmlns="" id="{70CDBECA-B97D-4C2C-AC55-CFFC02982EF8}"/>
+                <a16:creationId xmlns="" xmlns:a16="http://schemas.microsoft.com/office/drawing/2014/main" id="{70CDBECA-B97D-4C2C-AC55-CFFC02982EF8}"/>
               </a:ext>
             </a:extLst>
           </p:cNvPr>
@@ -11944,7 +13547,7 @@
           <a:blip r:embed="rId4" cstate="print">
             <a:extLst>
               <a:ext uri="{28A0092B-C50C-407E-A947-70E740481C1C}">
-                <a14:useLocalDpi xmlns:a14="http://schemas.microsoft.com/office/drawing/2010/main" xmlns="" val="0"/>
+                <a14:useLocalDpi xmlns="" xmlns:a14="http://schemas.microsoft.com/office/drawing/2010/main" val="0"/>
               </a:ext>
             </a:extLst>
           </a:blip>
@@ -11972,7 +13575,7 @@
           <p:cNvPr id="8" name="Picture 7">
             <a:extLst>
               <a:ext uri="{FF2B5EF4-FFF2-40B4-BE49-F238E27FC236}">
-                <a16:creationId xmlns:a16="http://schemas.microsoft.com/office/drawing/2014/main" xmlns="" id="{31976AD6-994F-4EFA-9220-B0F8E43BE61B}"/>
+                <a16:creationId xmlns="" xmlns:a16="http://schemas.microsoft.com/office/drawing/2014/main" id="{31976AD6-994F-4EFA-9220-B0F8E43BE61B}"/>
               </a:ext>
             </a:extLst>
           </p:cNvPr>
@@ -11983,7 +13586,7 @@
           <a:blip r:embed="rId5" cstate="print">
             <a:extLst>
               <a:ext uri="{28A0092B-C50C-407E-A947-70E740481C1C}">
-                <a14:useLocalDpi xmlns:a14="http://schemas.microsoft.com/office/drawing/2010/main" xmlns="" val="0"/>
+                <a14:useLocalDpi xmlns="" xmlns:a14="http://schemas.microsoft.com/office/drawing/2010/main" val="0"/>
               </a:ext>
             </a:extLst>
           </a:blip>
@@ -12011,7 +13614,7 @@
           <p:cNvPr id="9" name="Picture 8">
             <a:extLst>
               <a:ext uri="{FF2B5EF4-FFF2-40B4-BE49-F238E27FC236}">
-                <a16:creationId xmlns:a16="http://schemas.microsoft.com/office/drawing/2014/main" xmlns="" id="{2820CE08-0969-4652-A714-794DE1C22F36}"/>
+                <a16:creationId xmlns="" xmlns:a16="http://schemas.microsoft.com/office/drawing/2014/main" id="{2820CE08-0969-4652-A714-794DE1C22F36}"/>
               </a:ext>
             </a:extLst>
           </p:cNvPr>
@@ -12024,7 +13627,7 @@
           <a:blip r:embed="rId6" cstate="print">
             <a:extLst>
               <a:ext uri="{28A0092B-C50C-407E-A947-70E740481C1C}">
-                <a14:useLocalDpi xmlns:a14="http://schemas.microsoft.com/office/drawing/2010/main" xmlns="" val="0"/>
+                <a14:useLocalDpi xmlns="" xmlns:a14="http://schemas.microsoft.com/office/drawing/2010/main" val="0"/>
               </a:ext>
             </a:extLst>
           </a:blip>
@@ -12046,7 +13649,7 @@
           </a:ln>
           <a:extLst>
             <a:ext uri="{53640926-AAD7-44D8-BBD7-CCE9431645EC}">
-              <a14:shadowObscured xmlns:a14="http://schemas.microsoft.com/office/drawing/2010/main" xmlns=""/>
+              <a14:shadowObscured xmlns="" xmlns:a14="http://schemas.microsoft.com/office/drawing/2010/main"/>
             </a:ext>
           </a:extLst>
         </p:spPr>
@@ -12193,7 +13796,7 @@
     </p:spTree>
     <p:extLst>
       <p:ext uri="{BB962C8B-B14F-4D97-AF65-F5344CB8AC3E}">
-        <p14:creationId xmlns:p14="http://schemas.microsoft.com/office/powerpoint/2010/main" xmlns="" val="2515389119"/>
+        <p14:creationId xmlns="" xmlns:p14="http://schemas.microsoft.com/office/powerpoint/2010/main" val="2515389119"/>
       </p:ext>
     </p:extLst>
   </p:cSld>
@@ -12232,7 +13835,7 @@
           <p:cNvPr id="2" name="Title 1">
             <a:extLst>
               <a:ext uri="{FF2B5EF4-FFF2-40B4-BE49-F238E27FC236}">
-                <a16:creationId xmlns:a16="http://schemas.microsoft.com/office/drawing/2014/main" xmlns="" id="{DFC049F8-2284-4161-BE3C-431BCD0EFAB7}"/>
+                <a16:creationId xmlns="" xmlns:a16="http://schemas.microsoft.com/office/drawing/2014/main" id="{DFC049F8-2284-4161-BE3C-431BCD0EFAB7}"/>
               </a:ext>
             </a:extLst>
           </p:cNvPr>
@@ -12289,7 +13892,7 @@
           <p:cNvPr id="3" name="Content Placeholder 2">
             <a:extLst>
               <a:ext uri="{FF2B5EF4-FFF2-40B4-BE49-F238E27FC236}">
-                <a16:creationId xmlns:a16="http://schemas.microsoft.com/office/drawing/2014/main" xmlns="" id="{F2E045F5-714F-4E07-87A1-F5696A62ED28}"/>
+                <a16:creationId xmlns="" xmlns:a16="http://schemas.microsoft.com/office/drawing/2014/main" id="{F2E045F5-714F-4E07-87A1-F5696A62ED28}"/>
               </a:ext>
             </a:extLst>
           </p:cNvPr>
@@ -12393,7 +13996,7 @@
           <p:cNvPr id="5" name="Content Placeholder 2">
             <a:extLst>
               <a:ext uri="{FF2B5EF4-FFF2-40B4-BE49-F238E27FC236}">
-                <a16:creationId xmlns:a16="http://schemas.microsoft.com/office/drawing/2014/main" xmlns="" id="{C7089040-DF2C-484B-AFBB-ECF62504C88A}"/>
+                <a16:creationId xmlns="" xmlns:a16="http://schemas.microsoft.com/office/drawing/2014/main" id="{C7089040-DF2C-484B-AFBB-ECF62504C88A}"/>
               </a:ext>
             </a:extLst>
           </p:cNvPr>
@@ -12727,7 +14330,7 @@
           <p:cNvPr id="9" name="Picture 8">
             <a:extLst>
               <a:ext uri="{FF2B5EF4-FFF2-40B4-BE49-F238E27FC236}">
-                <a16:creationId xmlns:a16="http://schemas.microsoft.com/office/drawing/2014/main" xmlns="" id="{40C29DDE-834E-4869-B4AB-47C72B5ED44E}"/>
+                <a16:creationId xmlns="" xmlns:a16="http://schemas.microsoft.com/office/drawing/2014/main" id="{40C29DDE-834E-4869-B4AB-47C72B5ED44E}"/>
               </a:ext>
             </a:extLst>
           </p:cNvPr>
@@ -12740,7 +14343,7 @@
           <a:blip r:embed="rId3">
             <a:extLst>
               <a:ext uri="{28A0092B-C50C-407E-A947-70E740481C1C}">
-                <a14:useLocalDpi xmlns:a14="http://schemas.microsoft.com/office/drawing/2010/main" xmlns="" val="0"/>
+                <a14:useLocalDpi xmlns="" xmlns:a14="http://schemas.microsoft.com/office/drawing/2010/main" val="0"/>
               </a:ext>
             </a:extLst>
           </a:blip>
@@ -12768,7 +14371,7 @@
           <p:cNvPr id="7" name="Content Placeholder 2">
             <a:extLst>
               <a:ext uri="{FF2B5EF4-FFF2-40B4-BE49-F238E27FC236}">
-                <a16:creationId xmlns:a16="http://schemas.microsoft.com/office/drawing/2014/main" xmlns="" id="{C7089040-DF2C-484B-AFBB-ECF62504C88A}"/>
+                <a16:creationId xmlns="" xmlns:a16="http://schemas.microsoft.com/office/drawing/2014/main" id="{C7089040-DF2C-484B-AFBB-ECF62504C88A}"/>
               </a:ext>
             </a:extLst>
           </p:cNvPr>
@@ -13031,7 +14634,7 @@
     </p:spTree>
     <p:extLst>
       <p:ext uri="{BB962C8B-B14F-4D97-AF65-F5344CB8AC3E}">
-        <p14:creationId xmlns:p14="http://schemas.microsoft.com/office/powerpoint/2010/main" xmlns="" val="1039289397"/>
+        <p14:creationId xmlns="" xmlns:p14="http://schemas.microsoft.com/office/powerpoint/2010/main" val="1039289397"/>
       </p:ext>
     </p:extLst>
   </p:cSld>
@@ -13070,7 +14673,7 @@
           <p:cNvPr id="4" name="Picture 3">
             <a:extLst>
               <a:ext uri="{FF2B5EF4-FFF2-40B4-BE49-F238E27FC236}">
-                <a16:creationId xmlns:a16="http://schemas.microsoft.com/office/drawing/2014/main" xmlns="" id="{22743576-691A-4405-BDDF-B116F148661C}"/>
+                <a16:creationId xmlns="" xmlns:a16="http://schemas.microsoft.com/office/drawing/2014/main" id="{22743576-691A-4405-BDDF-B116F148661C}"/>
               </a:ext>
             </a:extLst>
           </p:cNvPr>
@@ -13100,7 +14703,7 @@
           <p:cNvPr id="2" name="Title 1">
             <a:extLst>
               <a:ext uri="{FF2B5EF4-FFF2-40B4-BE49-F238E27FC236}">
-                <a16:creationId xmlns:a16="http://schemas.microsoft.com/office/drawing/2014/main" xmlns="" id="{DFC049F8-2284-4161-BE3C-431BCD0EFAB7}"/>
+                <a16:creationId xmlns="" xmlns:a16="http://schemas.microsoft.com/office/drawing/2014/main" id="{DFC049F8-2284-4161-BE3C-431BCD0EFAB7}"/>
               </a:ext>
             </a:extLst>
           </p:cNvPr>
@@ -13172,7 +14775,7 @@
           <p:cNvPr id="3" name="Content Placeholder 2">
             <a:extLst>
               <a:ext uri="{FF2B5EF4-FFF2-40B4-BE49-F238E27FC236}">
-                <a16:creationId xmlns:a16="http://schemas.microsoft.com/office/drawing/2014/main" xmlns="" id="{F2E045F5-714F-4E07-87A1-F5696A62ED28}"/>
+                <a16:creationId xmlns="" xmlns:a16="http://schemas.microsoft.com/office/drawing/2014/main" id="{F2E045F5-714F-4E07-87A1-F5696A62ED28}"/>
               </a:ext>
             </a:extLst>
           </p:cNvPr>
@@ -13223,7 +14826,7 @@
           <p:cNvPr id="9" name="Rectangle 8">
             <a:extLst>
               <a:ext uri="{FF2B5EF4-FFF2-40B4-BE49-F238E27FC236}">
-                <a16:creationId xmlns:a16="http://schemas.microsoft.com/office/drawing/2014/main" xmlns="" id="{FB310605-3378-4195-AFE3-29D4E582C8A6}"/>
+                <a16:creationId xmlns="" xmlns:a16="http://schemas.microsoft.com/office/drawing/2014/main" id="{FB310605-3378-4195-AFE3-29D4E582C8A6}"/>
               </a:ext>
             </a:extLst>
           </p:cNvPr>
@@ -13455,7 +15058,7 @@
     </p:spTree>
     <p:extLst>
       <p:ext uri="{BB962C8B-B14F-4D97-AF65-F5344CB8AC3E}">
-        <p14:creationId xmlns:p14="http://schemas.microsoft.com/office/powerpoint/2010/main" xmlns="" val="3604554826"/>
+        <p14:creationId xmlns="" xmlns:p14="http://schemas.microsoft.com/office/powerpoint/2010/main" val="3604554826"/>
       </p:ext>
     </p:extLst>
   </p:cSld>
@@ -13494,7 +15097,7 @@
           <p:cNvPr id="4" name="Picture 3">
             <a:extLst>
               <a:ext uri="{FF2B5EF4-FFF2-40B4-BE49-F238E27FC236}">
-                <a16:creationId xmlns:a16="http://schemas.microsoft.com/office/drawing/2014/main" xmlns="" id="{0673D7FF-79D1-47CC-9F17-8BD3F4A92FD2}"/>
+                <a16:creationId xmlns="" xmlns:a16="http://schemas.microsoft.com/office/drawing/2014/main" id="{0673D7FF-79D1-47CC-9F17-8BD3F4A92FD2}"/>
               </a:ext>
             </a:extLst>
           </p:cNvPr>
@@ -13524,7 +15127,7 @@
           <p:cNvPr id="9" name="Picture 8">
             <a:extLst>
               <a:ext uri="{FF2B5EF4-FFF2-40B4-BE49-F238E27FC236}">
-                <a16:creationId xmlns:a16="http://schemas.microsoft.com/office/drawing/2014/main" xmlns="" id="{90E7F56C-9544-4654-9D9C-A258B0BC56B3}"/>
+                <a16:creationId xmlns="" xmlns:a16="http://schemas.microsoft.com/office/drawing/2014/main" id="{90E7F56C-9544-4654-9D9C-A258B0BC56B3}"/>
               </a:ext>
             </a:extLst>
           </p:cNvPr>
@@ -13554,7 +15157,7 @@
           <p:cNvPr id="10" name="Rectangle 9">
             <a:extLst>
               <a:ext uri="{FF2B5EF4-FFF2-40B4-BE49-F238E27FC236}">
-                <a16:creationId xmlns:a16="http://schemas.microsoft.com/office/drawing/2014/main" xmlns="" id="{7CE6DF49-6ADC-40B9-93F3-F6495F2DC7AB}"/>
+                <a16:creationId xmlns="" xmlns:a16="http://schemas.microsoft.com/office/drawing/2014/main" id="{7CE6DF49-6ADC-40B9-93F3-F6495F2DC7AB}"/>
               </a:ext>
             </a:extLst>
           </p:cNvPr>
@@ -13606,7 +15209,7 @@
           <p:cNvPr id="3" name="Content Placeholder 2">
             <a:extLst>
               <a:ext uri="{FF2B5EF4-FFF2-40B4-BE49-F238E27FC236}">
-                <a16:creationId xmlns:a16="http://schemas.microsoft.com/office/drawing/2014/main" xmlns="" id="{F2E045F5-714F-4E07-87A1-F5696A62ED28}"/>
+                <a16:creationId xmlns="" xmlns:a16="http://schemas.microsoft.com/office/drawing/2014/main" id="{F2E045F5-714F-4E07-87A1-F5696A62ED28}"/>
               </a:ext>
             </a:extLst>
           </p:cNvPr>
@@ -13657,7 +15260,7 @@
           <p:cNvPr id="7" name="Picture 6">
             <a:extLst>
               <a:ext uri="{FF2B5EF4-FFF2-40B4-BE49-F238E27FC236}">
-                <a16:creationId xmlns:a16="http://schemas.microsoft.com/office/drawing/2014/main" xmlns="" id="{1119E4FB-68D3-4DFF-B454-B6AECA5CCC92}"/>
+                <a16:creationId xmlns="" xmlns:a16="http://schemas.microsoft.com/office/drawing/2014/main" id="{1119E4FB-68D3-4DFF-B454-B6AECA5CCC92}"/>
               </a:ext>
             </a:extLst>
           </p:cNvPr>
@@ -13670,7 +15273,7 @@
           <a:blip r:embed="rId4">
             <a:extLst>
               <a:ext uri="{28A0092B-C50C-407E-A947-70E740481C1C}">
-                <a14:useLocalDpi xmlns:a14="http://schemas.microsoft.com/office/drawing/2010/main" xmlns="" val="0"/>
+                <a14:useLocalDpi xmlns="" xmlns:a14="http://schemas.microsoft.com/office/drawing/2010/main" val="0"/>
               </a:ext>
             </a:extLst>
           </a:blip>
@@ -13693,7 +15296,7 @@
           <p:cNvPr id="8" name="Picture 7">
             <a:extLst>
               <a:ext uri="{FF2B5EF4-FFF2-40B4-BE49-F238E27FC236}">
-                <a16:creationId xmlns:a16="http://schemas.microsoft.com/office/drawing/2014/main" xmlns="" id="{851FDD01-2E36-4FB2-AEC3-1AD80666AF50}"/>
+                <a16:creationId xmlns="" xmlns:a16="http://schemas.microsoft.com/office/drawing/2014/main" id="{851FDD01-2E36-4FB2-AEC3-1AD80666AF50}"/>
               </a:ext>
             </a:extLst>
           </p:cNvPr>
@@ -13706,7 +15309,7 @@
           <a:blip r:embed="rId5">
             <a:extLst>
               <a:ext uri="{28A0092B-C50C-407E-A947-70E740481C1C}">
-                <a14:useLocalDpi xmlns:a14="http://schemas.microsoft.com/office/drawing/2010/main" xmlns="" val="0"/>
+                <a14:useLocalDpi xmlns="" xmlns:a14="http://schemas.microsoft.com/office/drawing/2010/main" val="0"/>
               </a:ext>
             </a:extLst>
           </a:blip>
@@ -13729,7 +15332,7 @@
           <p:cNvPr id="13" name="Content Placeholder 2">
             <a:extLst>
               <a:ext uri="{FF2B5EF4-FFF2-40B4-BE49-F238E27FC236}">
-                <a16:creationId xmlns:a16="http://schemas.microsoft.com/office/drawing/2014/main" xmlns="" id="{A6B71EFB-4EB9-48D0-A7CA-693B1830CB7E}"/>
+                <a16:creationId xmlns="" xmlns:a16="http://schemas.microsoft.com/office/drawing/2014/main" id="{A6B71EFB-4EB9-48D0-A7CA-693B1830CB7E}"/>
               </a:ext>
             </a:extLst>
           </p:cNvPr>
@@ -13988,7 +15591,7 @@
           <p:cNvPr id="15" name="Title 1">
             <a:extLst>
               <a:ext uri="{FF2B5EF4-FFF2-40B4-BE49-F238E27FC236}">
-                <a16:creationId xmlns:a16="http://schemas.microsoft.com/office/drawing/2014/main" xmlns="" id="{DFC049F8-2284-4161-BE3C-431BCD0EFAB7}"/>
+                <a16:creationId xmlns="" xmlns:a16="http://schemas.microsoft.com/office/drawing/2014/main" id="{DFC049F8-2284-4161-BE3C-431BCD0EFAB7}"/>
               </a:ext>
             </a:extLst>
           </p:cNvPr>
@@ -14206,7 +15809,7 @@
           <p:cNvPr id="20" name="Picture 19">
             <a:extLst>
               <a:ext uri="{FF2B5EF4-FFF2-40B4-BE49-F238E27FC236}">
-                <a16:creationId xmlns:a16="http://schemas.microsoft.com/office/drawing/2014/main" xmlns="" id="{23C87C0A-6BB6-4417-AAE8-9B7AE0A10355}"/>
+                <a16:creationId xmlns="" xmlns:a16="http://schemas.microsoft.com/office/drawing/2014/main" id="{23C87C0A-6BB6-4417-AAE8-9B7AE0A10355}"/>
               </a:ext>
             </a:extLst>
           </p:cNvPr>
@@ -14219,7 +15822,7 @@
           <a:blip r:embed="rId9">
             <a:extLst>
               <a:ext uri="{28A0092B-C50C-407E-A947-70E740481C1C}">
-                <a14:useLocalDpi xmlns:a14="http://schemas.microsoft.com/office/drawing/2010/main" xmlns="" val="0"/>
+                <a14:useLocalDpi xmlns="" xmlns:a14="http://schemas.microsoft.com/office/drawing/2010/main" val="0"/>
               </a:ext>
             </a:extLst>
           </a:blip>
@@ -14283,7 +15886,7 @@
     </p:spTree>
     <p:extLst>
       <p:ext uri="{BB962C8B-B14F-4D97-AF65-F5344CB8AC3E}">
-        <p14:creationId xmlns:p14="http://schemas.microsoft.com/office/powerpoint/2010/main" xmlns="" val="2083772189"/>
+        <p14:creationId xmlns="" xmlns:p14="http://schemas.microsoft.com/office/powerpoint/2010/main" val="2083772189"/>
       </p:ext>
     </p:extLst>
   </p:cSld>
@@ -14322,7 +15925,7 @@
           <p:cNvPr id="4" name="Picture 3">
             <a:extLst>
               <a:ext uri="{FF2B5EF4-FFF2-40B4-BE49-F238E27FC236}">
-                <a16:creationId xmlns:a16="http://schemas.microsoft.com/office/drawing/2014/main" xmlns="" id="{22743576-691A-4405-BDDF-B116F148661C}"/>
+                <a16:creationId xmlns="" xmlns:a16="http://schemas.microsoft.com/office/drawing/2014/main" id="{22743576-691A-4405-BDDF-B116F148661C}"/>
               </a:ext>
             </a:extLst>
           </p:cNvPr>
@@ -14352,7 +15955,7 @@
           <p:cNvPr id="2" name="Title 1">
             <a:extLst>
               <a:ext uri="{FF2B5EF4-FFF2-40B4-BE49-F238E27FC236}">
-                <a16:creationId xmlns:a16="http://schemas.microsoft.com/office/drawing/2014/main" xmlns="" id="{DFC049F8-2284-4161-BE3C-431BCD0EFAB7}"/>
+                <a16:creationId xmlns="" xmlns:a16="http://schemas.microsoft.com/office/drawing/2014/main" id="{DFC049F8-2284-4161-BE3C-431BCD0EFAB7}"/>
               </a:ext>
             </a:extLst>
           </p:cNvPr>
@@ -14424,7 +16027,7 @@
           <p:cNvPr id="3" name="Content Placeholder 2">
             <a:extLst>
               <a:ext uri="{FF2B5EF4-FFF2-40B4-BE49-F238E27FC236}">
-                <a16:creationId xmlns:a16="http://schemas.microsoft.com/office/drawing/2014/main" xmlns="" id="{F2E045F5-714F-4E07-87A1-F5696A62ED28}"/>
+                <a16:creationId xmlns="" xmlns:a16="http://schemas.microsoft.com/office/drawing/2014/main" id="{F2E045F5-714F-4E07-87A1-F5696A62ED28}"/>
               </a:ext>
             </a:extLst>
           </p:cNvPr>
@@ -14475,7 +16078,7 @@
           <p:cNvPr id="9" name="Rectangle 8">
             <a:extLst>
               <a:ext uri="{FF2B5EF4-FFF2-40B4-BE49-F238E27FC236}">
-                <a16:creationId xmlns:a16="http://schemas.microsoft.com/office/drawing/2014/main" xmlns="" id="{FB310605-3378-4195-AFE3-29D4E582C8A6}"/>
+                <a16:creationId xmlns="" xmlns:a16="http://schemas.microsoft.com/office/drawing/2014/main" id="{FB310605-3378-4195-AFE3-29D4E582C8A6}"/>
               </a:ext>
             </a:extLst>
           </p:cNvPr>
@@ -14924,7 +16527,7 @@
     </p:spTree>
     <p:extLst>
       <p:ext uri="{BB962C8B-B14F-4D97-AF65-F5344CB8AC3E}">
-        <p14:creationId xmlns:p14="http://schemas.microsoft.com/office/powerpoint/2010/main" xmlns="" val="3604554826"/>
+        <p14:creationId xmlns="" xmlns:p14="http://schemas.microsoft.com/office/powerpoint/2010/main" val="3604554826"/>
       </p:ext>
     </p:extLst>
   </p:cSld>
@@ -14963,7 +16566,7 @@
           <p:cNvPr id="4" name="Picture 3">
             <a:extLst>
               <a:ext uri="{FF2B5EF4-FFF2-40B4-BE49-F238E27FC236}">
-                <a16:creationId xmlns:a16="http://schemas.microsoft.com/office/drawing/2014/main" xmlns="" id="{0673D7FF-79D1-47CC-9F17-8BD3F4A92FD2}"/>
+                <a16:creationId xmlns="" xmlns:a16="http://schemas.microsoft.com/office/drawing/2014/main" id="{0673D7FF-79D1-47CC-9F17-8BD3F4A92FD2}"/>
               </a:ext>
             </a:extLst>
           </p:cNvPr>
@@ -14993,7 +16596,7 @@
           <p:cNvPr id="9" name="Picture 8">
             <a:extLst>
               <a:ext uri="{FF2B5EF4-FFF2-40B4-BE49-F238E27FC236}">
-                <a16:creationId xmlns:a16="http://schemas.microsoft.com/office/drawing/2014/main" xmlns="" id="{90E7F56C-9544-4654-9D9C-A258B0BC56B3}"/>
+                <a16:creationId xmlns="" xmlns:a16="http://schemas.microsoft.com/office/drawing/2014/main" id="{90E7F56C-9544-4654-9D9C-A258B0BC56B3}"/>
               </a:ext>
             </a:extLst>
           </p:cNvPr>
@@ -15023,7 +16626,7 @@
           <p:cNvPr id="10" name="Rectangle 9">
             <a:extLst>
               <a:ext uri="{FF2B5EF4-FFF2-40B4-BE49-F238E27FC236}">
-                <a16:creationId xmlns:a16="http://schemas.microsoft.com/office/drawing/2014/main" xmlns="" id="{7CE6DF49-6ADC-40B9-93F3-F6495F2DC7AB}"/>
+                <a16:creationId xmlns="" xmlns:a16="http://schemas.microsoft.com/office/drawing/2014/main" id="{7CE6DF49-6ADC-40B9-93F3-F6495F2DC7AB}"/>
               </a:ext>
             </a:extLst>
           </p:cNvPr>
@@ -15075,7 +16678,7 @@
           <p:cNvPr id="2" name="Title 1">
             <a:extLst>
               <a:ext uri="{FF2B5EF4-FFF2-40B4-BE49-F238E27FC236}">
-                <a16:creationId xmlns:a16="http://schemas.microsoft.com/office/drawing/2014/main" xmlns="" id="{DFC049F8-2284-4161-BE3C-431BCD0EFAB7}"/>
+                <a16:creationId xmlns="" xmlns:a16="http://schemas.microsoft.com/office/drawing/2014/main" id="{DFC049F8-2284-4161-BE3C-431BCD0EFAB7}"/>
               </a:ext>
             </a:extLst>
           </p:cNvPr>
@@ -15147,7 +16750,7 @@
           <p:cNvPr id="3" name="Content Placeholder 2">
             <a:extLst>
               <a:ext uri="{FF2B5EF4-FFF2-40B4-BE49-F238E27FC236}">
-                <a16:creationId xmlns:a16="http://schemas.microsoft.com/office/drawing/2014/main" xmlns="" id="{F2E045F5-714F-4E07-87A1-F5696A62ED28}"/>
+                <a16:creationId xmlns="" xmlns:a16="http://schemas.microsoft.com/office/drawing/2014/main" id="{F2E045F5-714F-4E07-87A1-F5696A62ED28}"/>
               </a:ext>
             </a:extLst>
           </p:cNvPr>
@@ -15328,7 +16931,7 @@
     </p:spTree>
     <p:extLst>
       <p:ext uri="{BB962C8B-B14F-4D97-AF65-F5344CB8AC3E}">
-        <p14:creationId xmlns:p14="http://schemas.microsoft.com/office/powerpoint/2010/main" xmlns="" val="2083772189"/>
+        <p14:creationId xmlns="" xmlns:p14="http://schemas.microsoft.com/office/powerpoint/2010/main" val="2083772189"/>
       </p:ext>
     </p:extLst>
   </p:cSld>
@@ -15367,7 +16970,7 @@
           <p:cNvPr id="7" name="Picture 6">
             <a:extLst>
               <a:ext uri="{FF2B5EF4-FFF2-40B4-BE49-F238E27FC236}">
-                <a16:creationId xmlns:a16="http://schemas.microsoft.com/office/drawing/2014/main" xmlns="" id="{2FF80050-A6DA-4A1C-B6D8-AA5AA7F78A23}"/>
+                <a16:creationId xmlns="" xmlns:a16="http://schemas.microsoft.com/office/drawing/2014/main" id="{2FF80050-A6DA-4A1C-B6D8-AA5AA7F78A23}"/>
               </a:ext>
             </a:extLst>
           </p:cNvPr>
@@ -15397,7 +17000,7 @@
           <p:cNvPr id="8" name="Rectangle 7">
             <a:extLst>
               <a:ext uri="{FF2B5EF4-FFF2-40B4-BE49-F238E27FC236}">
-                <a16:creationId xmlns:a16="http://schemas.microsoft.com/office/drawing/2014/main" xmlns="" id="{5E3721CF-6C16-4B38-8E56-417FAD19673B}"/>
+                <a16:creationId xmlns="" xmlns:a16="http://schemas.microsoft.com/office/drawing/2014/main" id="{5E3721CF-6C16-4B38-8E56-417FAD19673B}"/>
               </a:ext>
             </a:extLst>
           </p:cNvPr>
@@ -15449,7 +17052,7 @@
           <p:cNvPr id="5" name="Picture 4">
             <a:extLst>
               <a:ext uri="{FF2B5EF4-FFF2-40B4-BE49-F238E27FC236}">
-                <a16:creationId xmlns:a16="http://schemas.microsoft.com/office/drawing/2014/main" xmlns="" id="{BE6895F0-339F-4782-9F13-51BA81259136}"/>
+                <a16:creationId xmlns="" xmlns:a16="http://schemas.microsoft.com/office/drawing/2014/main" id="{BE6895F0-339F-4782-9F13-51BA81259136}"/>
               </a:ext>
             </a:extLst>
           </p:cNvPr>
@@ -15479,7 +17082,7 @@
           <p:cNvPr id="2" name="Title 1">
             <a:extLst>
               <a:ext uri="{FF2B5EF4-FFF2-40B4-BE49-F238E27FC236}">
-                <a16:creationId xmlns:a16="http://schemas.microsoft.com/office/drawing/2014/main" xmlns="" id="{DFC049F8-2284-4161-BE3C-431BCD0EFAB7}"/>
+                <a16:creationId xmlns="" xmlns:a16="http://schemas.microsoft.com/office/drawing/2014/main" id="{DFC049F8-2284-4161-BE3C-431BCD0EFAB7}"/>
               </a:ext>
             </a:extLst>
           </p:cNvPr>
@@ -15539,7 +17142,7 @@
           <p:cNvPr id="3" name="Content Placeholder 2">
             <a:extLst>
               <a:ext uri="{FF2B5EF4-FFF2-40B4-BE49-F238E27FC236}">
-                <a16:creationId xmlns:a16="http://schemas.microsoft.com/office/drawing/2014/main" xmlns="" id="{F2E045F5-714F-4E07-87A1-F5696A62ED28}"/>
+                <a16:creationId xmlns="" xmlns:a16="http://schemas.microsoft.com/office/drawing/2014/main" id="{F2E045F5-714F-4E07-87A1-F5696A62ED28}"/>
               </a:ext>
             </a:extLst>
           </p:cNvPr>
@@ -15586,7 +17189,7 @@
           <p:cNvPr id="10" name="Oval 9">
             <a:extLst>
               <a:ext uri="{FF2B5EF4-FFF2-40B4-BE49-F238E27FC236}">
-                <a16:creationId xmlns:a16="http://schemas.microsoft.com/office/drawing/2014/main" xmlns="" id="{C29C5979-7CCB-416B-B3A4-A452F3F30A10}"/>
+                <a16:creationId xmlns="" xmlns:a16="http://schemas.microsoft.com/office/drawing/2014/main" id="{C29C5979-7CCB-416B-B3A4-A452F3F30A10}"/>
               </a:ext>
             </a:extLst>
           </p:cNvPr>
@@ -15641,7 +17244,7 @@
           <p:cNvPr id="11" name="Rectangle: Rounded Corners 10">
             <a:extLst>
               <a:ext uri="{FF2B5EF4-FFF2-40B4-BE49-F238E27FC236}">
-                <a16:creationId xmlns:a16="http://schemas.microsoft.com/office/drawing/2014/main" xmlns="" id="{F6A5F7EB-82A6-484E-9C43-CFB554F813E9}"/>
+                <a16:creationId xmlns="" xmlns:a16="http://schemas.microsoft.com/office/drawing/2014/main" id="{F6A5F7EB-82A6-484E-9C43-CFB554F813E9}"/>
               </a:ext>
             </a:extLst>
           </p:cNvPr>
@@ -15696,7 +17299,7 @@
           <p:cNvPr id="13" name="Rectangle: Rounded Corners 12">
             <a:extLst>
               <a:ext uri="{FF2B5EF4-FFF2-40B4-BE49-F238E27FC236}">
-                <a16:creationId xmlns:a16="http://schemas.microsoft.com/office/drawing/2014/main" xmlns="" id="{3719CF2D-2824-4299-B2CC-CE697E27AA7E}"/>
+                <a16:creationId xmlns="" xmlns:a16="http://schemas.microsoft.com/office/drawing/2014/main" id="{3719CF2D-2824-4299-B2CC-CE697E27AA7E}"/>
               </a:ext>
             </a:extLst>
           </p:cNvPr>
@@ -15751,7 +17354,7 @@
           <p:cNvPr id="15" name="Straight Connector 14">
             <a:extLst>
               <a:ext uri="{FF2B5EF4-FFF2-40B4-BE49-F238E27FC236}">
-                <a16:creationId xmlns:a16="http://schemas.microsoft.com/office/drawing/2014/main" xmlns="" id="{30710670-372E-4F34-950F-06F225466007}"/>
+                <a16:creationId xmlns="" xmlns:a16="http://schemas.microsoft.com/office/drawing/2014/main" id="{30710670-372E-4F34-950F-06F225466007}"/>
               </a:ext>
             </a:extLst>
           </p:cNvPr>
@@ -15796,7 +17399,7 @@
           <p:cNvPr id="16" name="Straight Connector 15">
             <a:extLst>
               <a:ext uri="{FF2B5EF4-FFF2-40B4-BE49-F238E27FC236}">
-                <a16:creationId xmlns:a16="http://schemas.microsoft.com/office/drawing/2014/main" xmlns="" id="{288054B3-BE24-4398-9D5F-A28183FA7014}"/>
+                <a16:creationId xmlns="" xmlns:a16="http://schemas.microsoft.com/office/drawing/2014/main" id="{288054B3-BE24-4398-9D5F-A28183FA7014}"/>
               </a:ext>
             </a:extLst>
           </p:cNvPr>
@@ -15843,7 +17446,7 @@
           <p:cNvPr id="17" name="TextBox 16">
             <a:extLst>
               <a:ext uri="{FF2B5EF4-FFF2-40B4-BE49-F238E27FC236}">
-                <a16:creationId xmlns:a16="http://schemas.microsoft.com/office/drawing/2014/main" xmlns="" id="{971E6CAA-6D6E-412E-9FD7-5D77D4FC053C}"/>
+                <a16:creationId xmlns="" xmlns:a16="http://schemas.microsoft.com/office/drawing/2014/main" id="{971E6CAA-6D6E-412E-9FD7-5D77D4FC053C}"/>
               </a:ext>
             </a:extLst>
           </p:cNvPr>
@@ -15878,7 +17481,7 @@
           <p:cNvPr id="19" name="Straight Connector 18">
             <a:extLst>
               <a:ext uri="{FF2B5EF4-FFF2-40B4-BE49-F238E27FC236}">
-                <a16:creationId xmlns:a16="http://schemas.microsoft.com/office/drawing/2014/main" xmlns="" id="{FFECA4B2-B854-4585-9ECA-1FD3048F8E67}"/>
+                <a16:creationId xmlns="" xmlns:a16="http://schemas.microsoft.com/office/drawing/2014/main" id="{FFECA4B2-B854-4585-9ECA-1FD3048F8E67}"/>
               </a:ext>
             </a:extLst>
           </p:cNvPr>
@@ -15925,7 +17528,7 @@
           <p:cNvPr id="23" name="Straight Arrow Connector 22">
             <a:extLst>
               <a:ext uri="{FF2B5EF4-FFF2-40B4-BE49-F238E27FC236}">
-                <a16:creationId xmlns:a16="http://schemas.microsoft.com/office/drawing/2014/main" xmlns="" id="{7FAC0E52-268B-4550-B064-28EAE19CA4A2}"/>
+                <a16:creationId xmlns="" xmlns:a16="http://schemas.microsoft.com/office/drawing/2014/main" id="{7FAC0E52-268B-4550-B064-28EAE19CA4A2}"/>
               </a:ext>
             </a:extLst>
           </p:cNvPr>
@@ -15972,7 +17575,7 @@
           <p:cNvPr id="24" name="TextBox 23">
             <a:extLst>
               <a:ext uri="{FF2B5EF4-FFF2-40B4-BE49-F238E27FC236}">
-                <a16:creationId xmlns:a16="http://schemas.microsoft.com/office/drawing/2014/main" xmlns="" id="{1FB9C7CE-2331-47EB-A1D2-D8DB9B0C2513}"/>
+                <a16:creationId xmlns="" xmlns:a16="http://schemas.microsoft.com/office/drawing/2014/main" id="{1FB9C7CE-2331-47EB-A1D2-D8DB9B0C2513}"/>
               </a:ext>
             </a:extLst>
           </p:cNvPr>
@@ -16007,7 +17610,7 @@
           <p:cNvPr id="25" name="TextBox 24">
             <a:extLst>
               <a:ext uri="{FF2B5EF4-FFF2-40B4-BE49-F238E27FC236}">
-                <a16:creationId xmlns:a16="http://schemas.microsoft.com/office/drawing/2014/main" xmlns="" id="{DBBC0D55-02A6-4EDB-AF84-B16D0A2B2E7B}"/>
+                <a16:creationId xmlns="" xmlns:a16="http://schemas.microsoft.com/office/drawing/2014/main" id="{DBBC0D55-02A6-4EDB-AF84-B16D0A2B2E7B}"/>
               </a:ext>
             </a:extLst>
           </p:cNvPr>
@@ -16042,7 +17645,7 @@
           <p:cNvPr id="26" name="TextBox 25">
             <a:extLst>
               <a:ext uri="{FF2B5EF4-FFF2-40B4-BE49-F238E27FC236}">
-                <a16:creationId xmlns:a16="http://schemas.microsoft.com/office/drawing/2014/main" xmlns="" id="{C1CD6ED1-DC11-4F49-B765-F575D41091A5}"/>
+                <a16:creationId xmlns="" xmlns:a16="http://schemas.microsoft.com/office/drawing/2014/main" id="{C1CD6ED1-DC11-4F49-B765-F575D41091A5}"/>
               </a:ext>
             </a:extLst>
           </p:cNvPr>
@@ -16077,7 +17680,7 @@
           <p:cNvPr id="27" name="Straight Arrow Connector 26">
             <a:extLst>
               <a:ext uri="{FF2B5EF4-FFF2-40B4-BE49-F238E27FC236}">
-                <a16:creationId xmlns:a16="http://schemas.microsoft.com/office/drawing/2014/main" xmlns="" id="{5E8555D3-376F-417B-8432-5BEEAFCBB21F}"/>
+                <a16:creationId xmlns="" xmlns:a16="http://schemas.microsoft.com/office/drawing/2014/main" id="{5E8555D3-376F-417B-8432-5BEEAFCBB21F}"/>
               </a:ext>
             </a:extLst>
           </p:cNvPr>
@@ -16126,7 +17729,7 @@
           <p:cNvPr id="30" name="Straight Arrow Connector 29">
             <a:extLst>
               <a:ext uri="{FF2B5EF4-FFF2-40B4-BE49-F238E27FC236}">
-                <a16:creationId xmlns:a16="http://schemas.microsoft.com/office/drawing/2014/main" xmlns="" id="{183EB38B-BC90-4354-BB70-B17AD571698C}"/>
+                <a16:creationId xmlns="" xmlns:a16="http://schemas.microsoft.com/office/drawing/2014/main" id="{183EB38B-BC90-4354-BB70-B17AD571698C}"/>
               </a:ext>
             </a:extLst>
           </p:cNvPr>
@@ -16175,7 +17778,7 @@
           <p:cNvPr id="33" name="Rectangle: Rounded Corners 32">
             <a:extLst>
               <a:ext uri="{FF2B5EF4-FFF2-40B4-BE49-F238E27FC236}">
-                <a16:creationId xmlns:a16="http://schemas.microsoft.com/office/drawing/2014/main" xmlns="" id="{5D612AEE-5C5A-45AE-9431-93F8F6FB3305}"/>
+                <a16:creationId xmlns="" xmlns:a16="http://schemas.microsoft.com/office/drawing/2014/main" id="{5D612AEE-5C5A-45AE-9431-93F8F6FB3305}"/>
               </a:ext>
             </a:extLst>
           </p:cNvPr>
@@ -16231,7 +17834,7 @@
           <p:cNvPr id="34" name="Rectangle: Rounded Corners 33">
             <a:extLst>
               <a:ext uri="{FF2B5EF4-FFF2-40B4-BE49-F238E27FC236}">
-                <a16:creationId xmlns:a16="http://schemas.microsoft.com/office/drawing/2014/main" xmlns="" id="{5351534C-969F-4206-A607-10E3CBD3EB6E}"/>
+                <a16:creationId xmlns="" xmlns:a16="http://schemas.microsoft.com/office/drawing/2014/main" id="{5351534C-969F-4206-A607-10E3CBD3EB6E}"/>
               </a:ext>
             </a:extLst>
           </p:cNvPr>
@@ -16287,7 +17890,7 @@
           <p:cNvPr id="35" name="Rectangle: Rounded Corners 34">
             <a:extLst>
               <a:ext uri="{FF2B5EF4-FFF2-40B4-BE49-F238E27FC236}">
-                <a16:creationId xmlns:a16="http://schemas.microsoft.com/office/drawing/2014/main" xmlns="" id="{CC0DB683-0D5F-4A20-8627-22A83FCA57C0}"/>
+                <a16:creationId xmlns="" xmlns:a16="http://schemas.microsoft.com/office/drawing/2014/main" id="{CC0DB683-0D5F-4A20-8627-22A83FCA57C0}"/>
               </a:ext>
             </a:extLst>
           </p:cNvPr>
@@ -16342,7 +17945,7 @@
           <p:cNvPr id="36" name="Rectangle: Rounded Corners 35">
             <a:extLst>
               <a:ext uri="{FF2B5EF4-FFF2-40B4-BE49-F238E27FC236}">
-                <a16:creationId xmlns:a16="http://schemas.microsoft.com/office/drawing/2014/main" xmlns="" id="{58471160-97AC-4E81-A948-3E6D85AFAB8E}"/>
+                <a16:creationId xmlns="" xmlns:a16="http://schemas.microsoft.com/office/drawing/2014/main" id="{58471160-97AC-4E81-A948-3E6D85AFAB8E}"/>
               </a:ext>
             </a:extLst>
           </p:cNvPr>
@@ -16397,7 +18000,7 @@
           <p:cNvPr id="37" name="Rectangle: Rounded Corners 36">
             <a:extLst>
               <a:ext uri="{FF2B5EF4-FFF2-40B4-BE49-F238E27FC236}">
-                <a16:creationId xmlns:a16="http://schemas.microsoft.com/office/drawing/2014/main" xmlns="" id="{92E98563-DB25-47E0-BFE7-B8A52201AFBF}"/>
+                <a16:creationId xmlns="" xmlns:a16="http://schemas.microsoft.com/office/drawing/2014/main" id="{92E98563-DB25-47E0-BFE7-B8A52201AFBF}"/>
               </a:ext>
             </a:extLst>
           </p:cNvPr>
@@ -16452,7 +18055,7 @@
           <p:cNvPr id="38" name="Rectangle: Rounded Corners 37">
             <a:extLst>
               <a:ext uri="{FF2B5EF4-FFF2-40B4-BE49-F238E27FC236}">
-                <a16:creationId xmlns:a16="http://schemas.microsoft.com/office/drawing/2014/main" xmlns="" id="{F9DE6B22-A874-4C5B-A2F4-37E624346379}"/>
+                <a16:creationId xmlns="" xmlns:a16="http://schemas.microsoft.com/office/drawing/2014/main" id="{F9DE6B22-A874-4C5B-A2F4-37E624346379}"/>
               </a:ext>
             </a:extLst>
           </p:cNvPr>
@@ -16507,7 +18110,7 @@
           <p:cNvPr id="39" name="Rectangle: Rounded Corners 38">
             <a:extLst>
               <a:ext uri="{FF2B5EF4-FFF2-40B4-BE49-F238E27FC236}">
-                <a16:creationId xmlns:a16="http://schemas.microsoft.com/office/drawing/2014/main" xmlns="" id="{EB977FAA-DCA6-4B55-ACC4-847FBF97687B}"/>
+                <a16:creationId xmlns="" xmlns:a16="http://schemas.microsoft.com/office/drawing/2014/main" id="{EB977FAA-DCA6-4B55-ACC4-847FBF97687B}"/>
               </a:ext>
             </a:extLst>
           </p:cNvPr>
@@ -16562,7 +18165,7 @@
           <p:cNvPr id="40" name="Rectangle: Rounded Corners 39">
             <a:extLst>
               <a:ext uri="{FF2B5EF4-FFF2-40B4-BE49-F238E27FC236}">
-                <a16:creationId xmlns:a16="http://schemas.microsoft.com/office/drawing/2014/main" xmlns="" id="{57387805-6EE0-4686-A3AD-F33DE6D3DA9D}"/>
+                <a16:creationId xmlns="" xmlns:a16="http://schemas.microsoft.com/office/drawing/2014/main" id="{57387805-6EE0-4686-A3AD-F33DE6D3DA9D}"/>
               </a:ext>
             </a:extLst>
           </p:cNvPr>
@@ -16617,7 +18220,7 @@
           <p:cNvPr id="41" name="Rectangle: Rounded Corners 40">
             <a:extLst>
               <a:ext uri="{FF2B5EF4-FFF2-40B4-BE49-F238E27FC236}">
-                <a16:creationId xmlns:a16="http://schemas.microsoft.com/office/drawing/2014/main" xmlns="" id="{0AF77ADA-8652-49EA-87E9-2EBD25A9D60F}"/>
+                <a16:creationId xmlns="" xmlns:a16="http://schemas.microsoft.com/office/drawing/2014/main" id="{0AF77ADA-8652-49EA-87E9-2EBD25A9D60F}"/>
               </a:ext>
             </a:extLst>
           </p:cNvPr>
@@ -16672,7 +18275,7 @@
           <p:cNvPr id="42" name="Straight Arrow Connector 41">
             <a:extLst>
               <a:ext uri="{FF2B5EF4-FFF2-40B4-BE49-F238E27FC236}">
-                <a16:creationId xmlns:a16="http://schemas.microsoft.com/office/drawing/2014/main" xmlns="" id="{37A39690-B33F-4ED6-BE2F-C59BC2ABAA73}"/>
+                <a16:creationId xmlns="" xmlns:a16="http://schemas.microsoft.com/office/drawing/2014/main" id="{37A39690-B33F-4ED6-BE2F-C59BC2ABAA73}"/>
               </a:ext>
             </a:extLst>
           </p:cNvPr>
@@ -16720,7 +18323,7 @@
           <p:cNvPr id="49" name="Connector: Elbow 48">
             <a:extLst>
               <a:ext uri="{FF2B5EF4-FFF2-40B4-BE49-F238E27FC236}">
-                <a16:creationId xmlns:a16="http://schemas.microsoft.com/office/drawing/2014/main" xmlns="" id="{6F018749-49F9-4969-A271-C3C29767FD5C}"/>
+                <a16:creationId xmlns="" xmlns:a16="http://schemas.microsoft.com/office/drawing/2014/main" id="{6F018749-49F9-4969-A271-C3C29767FD5C}"/>
               </a:ext>
             </a:extLst>
           </p:cNvPr>
@@ -16768,7 +18371,7 @@
           <p:cNvPr id="51" name="Straight Arrow Connector 50">
             <a:extLst>
               <a:ext uri="{FF2B5EF4-FFF2-40B4-BE49-F238E27FC236}">
-                <a16:creationId xmlns:a16="http://schemas.microsoft.com/office/drawing/2014/main" xmlns="" id="{529BEA91-D614-4620-8E3D-97946455F9B8}"/>
+                <a16:creationId xmlns="" xmlns:a16="http://schemas.microsoft.com/office/drawing/2014/main" id="{529BEA91-D614-4620-8E3D-97946455F9B8}"/>
               </a:ext>
             </a:extLst>
           </p:cNvPr>
@@ -16816,7 +18419,7 @@
           <p:cNvPr id="52" name="Straight Arrow Connector 51">
             <a:extLst>
               <a:ext uri="{FF2B5EF4-FFF2-40B4-BE49-F238E27FC236}">
-                <a16:creationId xmlns:a16="http://schemas.microsoft.com/office/drawing/2014/main" xmlns="" id="{5B84C7E6-A42F-4657-A73B-3CBEE18B7E6F}"/>
+                <a16:creationId xmlns="" xmlns:a16="http://schemas.microsoft.com/office/drawing/2014/main" id="{5B84C7E6-A42F-4657-A73B-3CBEE18B7E6F}"/>
               </a:ext>
             </a:extLst>
           </p:cNvPr>
@@ -16863,7 +18466,7 @@
           <p:cNvPr id="55" name="Connector: Elbow 54">
             <a:extLst>
               <a:ext uri="{FF2B5EF4-FFF2-40B4-BE49-F238E27FC236}">
-                <a16:creationId xmlns:a16="http://schemas.microsoft.com/office/drawing/2014/main" xmlns="" id="{0EC221BA-BD1E-4AE7-B1B2-90EE3720F5FB}"/>
+                <a16:creationId xmlns="" xmlns:a16="http://schemas.microsoft.com/office/drawing/2014/main" id="{0EC221BA-BD1E-4AE7-B1B2-90EE3720F5FB}"/>
               </a:ext>
             </a:extLst>
           </p:cNvPr>
@@ -16910,7 +18513,7 @@
           <p:cNvPr id="56" name="Connector: Elbow 55">
             <a:extLst>
               <a:ext uri="{FF2B5EF4-FFF2-40B4-BE49-F238E27FC236}">
-                <a16:creationId xmlns:a16="http://schemas.microsoft.com/office/drawing/2014/main" xmlns="" id="{7ED8B67D-2C95-4C7F-B66D-35ED490532B0}"/>
+                <a16:creationId xmlns="" xmlns:a16="http://schemas.microsoft.com/office/drawing/2014/main" id="{7ED8B67D-2C95-4C7F-B66D-35ED490532B0}"/>
               </a:ext>
             </a:extLst>
           </p:cNvPr>
@@ -16958,7 +18561,7 @@
           <p:cNvPr id="60" name="Straight Connector 59">
             <a:extLst>
               <a:ext uri="{FF2B5EF4-FFF2-40B4-BE49-F238E27FC236}">
-                <a16:creationId xmlns:a16="http://schemas.microsoft.com/office/drawing/2014/main" xmlns="" id="{2DE7001C-61A4-4D8C-9487-D0519BB5C287}"/>
+                <a16:creationId xmlns="" xmlns:a16="http://schemas.microsoft.com/office/drawing/2014/main" id="{2DE7001C-61A4-4D8C-9487-D0519BB5C287}"/>
               </a:ext>
             </a:extLst>
           </p:cNvPr>
@@ -16997,7 +18600,7 @@
           <p:cNvPr id="67" name="Connector: Elbow 66">
             <a:extLst>
               <a:ext uri="{FF2B5EF4-FFF2-40B4-BE49-F238E27FC236}">
-                <a16:creationId xmlns:a16="http://schemas.microsoft.com/office/drawing/2014/main" xmlns="" id="{9BE8C34A-75B0-466E-B230-A6AA0EF6FF90}"/>
+                <a16:creationId xmlns="" xmlns:a16="http://schemas.microsoft.com/office/drawing/2014/main" id="{9BE8C34A-75B0-466E-B230-A6AA0EF6FF90}"/>
               </a:ext>
             </a:extLst>
           </p:cNvPr>
@@ -17046,7 +18649,7 @@
           <p:cNvPr id="66" name="Connector: Elbow 65">
             <a:extLst>
               <a:ext uri="{FF2B5EF4-FFF2-40B4-BE49-F238E27FC236}">
-                <a16:creationId xmlns:a16="http://schemas.microsoft.com/office/drawing/2014/main" xmlns="" id="{2B6EBE20-55B6-4C79-AC8D-3D2DEACD0F27}"/>
+                <a16:creationId xmlns="" xmlns:a16="http://schemas.microsoft.com/office/drawing/2014/main" id="{2B6EBE20-55B6-4C79-AC8D-3D2DEACD0F27}"/>
               </a:ext>
             </a:extLst>
           </p:cNvPr>
@@ -17093,7 +18696,7 @@
           <p:cNvPr id="12" name="Rectangle: Rounded Corners 11">
             <a:extLst>
               <a:ext uri="{FF2B5EF4-FFF2-40B4-BE49-F238E27FC236}">
-                <a16:creationId xmlns:a16="http://schemas.microsoft.com/office/drawing/2014/main" xmlns="" id="{0EF29BEE-62BD-4987-BA52-D89AE53A8B33}"/>
+                <a16:creationId xmlns="" xmlns:a16="http://schemas.microsoft.com/office/drawing/2014/main" id="{0EF29BEE-62BD-4987-BA52-D89AE53A8B33}"/>
               </a:ext>
             </a:extLst>
           </p:cNvPr>
@@ -17146,7 +18749,7 @@
           <p:cNvPr id="73" name="Straight Arrow Connector 72">
             <a:extLst>
               <a:ext uri="{FF2B5EF4-FFF2-40B4-BE49-F238E27FC236}">
-                <a16:creationId xmlns:a16="http://schemas.microsoft.com/office/drawing/2014/main" xmlns="" id="{69C2A71F-34B3-45C5-B5C2-CAD80873AAD3}"/>
+                <a16:creationId xmlns="" xmlns:a16="http://schemas.microsoft.com/office/drawing/2014/main" id="{69C2A71F-34B3-45C5-B5C2-CAD80873AAD3}"/>
               </a:ext>
             </a:extLst>
           </p:cNvPr>
@@ -17195,7 +18798,7 @@
           <p:cNvPr id="77" name="Straight Arrow Connector 76">
             <a:extLst>
               <a:ext uri="{FF2B5EF4-FFF2-40B4-BE49-F238E27FC236}">
-                <a16:creationId xmlns:a16="http://schemas.microsoft.com/office/drawing/2014/main" xmlns="" id="{57464C7E-A3BB-4249-922D-CFCFCCBF91D6}"/>
+                <a16:creationId xmlns="" xmlns:a16="http://schemas.microsoft.com/office/drawing/2014/main" id="{57464C7E-A3BB-4249-922D-CFCFCCBF91D6}"/>
               </a:ext>
             </a:extLst>
           </p:cNvPr>
@@ -17243,7 +18846,7 @@
           <p:cNvPr id="78" name="Straight Arrow Connector 77">
             <a:extLst>
               <a:ext uri="{FF2B5EF4-FFF2-40B4-BE49-F238E27FC236}">
-                <a16:creationId xmlns:a16="http://schemas.microsoft.com/office/drawing/2014/main" xmlns="" id="{D03E9D33-30E8-457E-9B54-73E66853B100}"/>
+                <a16:creationId xmlns="" xmlns:a16="http://schemas.microsoft.com/office/drawing/2014/main" id="{D03E9D33-30E8-457E-9B54-73E66853B100}"/>
               </a:ext>
             </a:extLst>
           </p:cNvPr>
@@ -17290,7 +18893,7 @@
           <p:cNvPr id="79" name="Straight Arrow Connector 78">
             <a:extLst>
               <a:ext uri="{FF2B5EF4-FFF2-40B4-BE49-F238E27FC236}">
-                <a16:creationId xmlns:a16="http://schemas.microsoft.com/office/drawing/2014/main" xmlns="" id="{0A90E022-FEFC-46DE-89ED-17C345356F2C}"/>
+                <a16:creationId xmlns="" xmlns:a16="http://schemas.microsoft.com/office/drawing/2014/main" id="{0A90E022-FEFC-46DE-89ED-17C345356F2C}"/>
               </a:ext>
             </a:extLst>
           </p:cNvPr>
@@ -17337,7 +18940,7 @@
           <p:cNvPr id="80" name="Straight Arrow Connector 79">
             <a:extLst>
               <a:ext uri="{FF2B5EF4-FFF2-40B4-BE49-F238E27FC236}">
-                <a16:creationId xmlns:a16="http://schemas.microsoft.com/office/drawing/2014/main" xmlns="" id="{3A681EC4-C304-44D6-8FE8-F7EBE52D4E19}"/>
+                <a16:creationId xmlns="" xmlns:a16="http://schemas.microsoft.com/office/drawing/2014/main" id="{3A681EC4-C304-44D6-8FE8-F7EBE52D4E19}"/>
               </a:ext>
             </a:extLst>
           </p:cNvPr>
@@ -17384,7 +18987,7 @@
           <p:cNvPr id="81" name="Straight Arrow Connector 80">
             <a:extLst>
               <a:ext uri="{FF2B5EF4-FFF2-40B4-BE49-F238E27FC236}">
-                <a16:creationId xmlns:a16="http://schemas.microsoft.com/office/drawing/2014/main" xmlns="" id="{19F654F4-6D55-4385-8976-5B80EBD24850}"/>
+                <a16:creationId xmlns="" xmlns:a16="http://schemas.microsoft.com/office/drawing/2014/main" id="{19F654F4-6D55-4385-8976-5B80EBD24850}"/>
               </a:ext>
             </a:extLst>
           </p:cNvPr>
@@ -17429,7 +19032,7 @@
     </p:spTree>
     <p:extLst>
       <p:ext uri="{BB962C8B-B14F-4D97-AF65-F5344CB8AC3E}">
-        <p14:creationId xmlns:p14="http://schemas.microsoft.com/office/powerpoint/2010/main" xmlns="" val="2766657188"/>
+        <p14:creationId xmlns="" xmlns:p14="http://schemas.microsoft.com/office/powerpoint/2010/main" val="2766657188"/>
       </p:ext>
     </p:extLst>
   </p:cSld>
@@ -17735,7 +19338,7 @@
   <a:extraClrSchemeLst/>
   <a:extLst>
     <a:ext uri="{05A4C25C-085E-4340-85A3-A5531E510DB2}">
-      <thm15:themeFamily xmlns:thm15="http://schemas.microsoft.com/office/thememl/2012/main" xmlns="" name="Office Theme" id="{62F939B6-93AF-4DB8-9C6B-D6C7DFDC589F}" vid="{4A3C46E8-61CC-4603-A589-7422A47A8E4A}"/>
+      <thm15:themeFamily xmlns="" xmlns:thm15="http://schemas.microsoft.com/office/thememl/2012/main" name="Office Theme" id="{62F939B6-93AF-4DB8-9C6B-D6C7DFDC589F}" vid="{4A3C46E8-61CC-4603-A589-7422A47A8E4A}"/>
     </a:ext>
   </a:extLst>
 </a:theme>
@@ -17996,7 +19599,7 @@
   <a:extraClrSchemeLst/>
   <a:extLst>
     <a:ext uri="{05A4C25C-085E-4340-85A3-A5531E510DB2}">
-      <thm15:themeFamily xmlns:thm15="http://schemas.microsoft.com/office/thememl/2012/main" xmlns="" name="Office Theme" id="{62F939B6-93AF-4DB8-9C6B-D6C7DFDC589F}" vid="{4A3C46E8-61CC-4603-A589-7422A47A8E4A}"/>
+      <thm15:themeFamily xmlns="" xmlns:thm15="http://schemas.microsoft.com/office/thememl/2012/main" name="Office Theme" id="{62F939B6-93AF-4DB8-9C6B-D6C7DFDC589F}" vid="{4A3C46E8-61CC-4603-A589-7422A47A8E4A}"/>
     </a:ext>
   </a:extLst>
 </a:theme>

</xml_diff>